<commit_message>
add an example of square box usage
</commit_message>
<xml_diff>
--- a/specification/imgsrc/4.pptx
+++ b/specification/imgsrc/4.pptx
@@ -4,6 +4,9 @@
   <p:sldMasterIdLst>
     <p:sldMasterId id="2147483648" r:id="rId1"/>
   </p:sldMasterIdLst>
+  <p:notesMasterIdLst>
+    <p:notesMasterId r:id="rId8"/>
+  </p:notesMasterIdLst>
   <p:sldIdLst>
     <p:sldId id="256" r:id="rId2"/>
     <p:sldId id="257" r:id="rId3"/>
@@ -128,6 +131,439 @@
 </p:presentation>
 </file>
 
+<file path=ppt/notesMasters/notesMaster1.xml><?xml version="1.0" encoding="utf-8"?>
+<p:notesMaster xmlns:a="http://schemas.openxmlformats.org/drawingml/2006/main" xmlns:r="http://schemas.openxmlformats.org/officeDocument/2006/relationships" xmlns:p="http://schemas.openxmlformats.org/presentationml/2006/main">
+  <p:cSld>
+    <p:bg>
+      <p:bgRef idx="1001">
+        <a:schemeClr val="bg1"/>
+      </p:bgRef>
+    </p:bg>
+    <p:spTree>
+      <p:nvGrpSpPr>
+        <p:cNvPr id="1" name=""/>
+        <p:cNvGrpSpPr/>
+        <p:nvPr/>
+      </p:nvGrpSpPr>
+      <p:grpSpPr>
+        <a:xfrm>
+          <a:off x="0" y="0"/>
+          <a:ext cx="0" cy="0"/>
+          <a:chOff x="0" y="0"/>
+          <a:chExt cx="0" cy="0"/>
+        </a:xfrm>
+      </p:grpSpPr>
+      <p:sp>
+        <p:nvSpPr>
+          <p:cNvPr id="2" name="Header Placeholder 1"/>
+          <p:cNvSpPr>
+            <a:spLocks noGrp="1"/>
+          </p:cNvSpPr>
+          <p:nvPr>
+            <p:ph type="hdr" sz="quarter"/>
+          </p:nvPr>
+        </p:nvSpPr>
+        <p:spPr>
+          <a:xfrm>
+            <a:off x="0" y="0"/>
+            <a:ext cx="2971800" cy="458788"/>
+          </a:xfrm>
+          <a:prstGeom prst="rect">
+            <a:avLst/>
+          </a:prstGeom>
+        </p:spPr>
+        <p:txBody>
+          <a:bodyPr vert="horz" lIns="91440" tIns="45720" rIns="91440" bIns="45720" rtlCol="0"/>
+          <a:lstStyle>
+            <a:lvl1pPr algn="l">
+              <a:defRPr sz="1200"/>
+            </a:lvl1pPr>
+          </a:lstStyle>
+          <a:p>
+            <a:endParaRPr lang="en-US"/>
+          </a:p>
+        </p:txBody>
+      </p:sp>
+      <p:sp>
+        <p:nvSpPr>
+          <p:cNvPr id="3" name="Date Placeholder 2"/>
+          <p:cNvSpPr>
+            <a:spLocks noGrp="1"/>
+          </p:cNvSpPr>
+          <p:nvPr>
+            <p:ph type="dt" idx="1"/>
+          </p:nvPr>
+        </p:nvSpPr>
+        <p:spPr>
+          <a:xfrm>
+            <a:off x="3884613" y="0"/>
+            <a:ext cx="2971800" cy="458788"/>
+          </a:xfrm>
+          <a:prstGeom prst="rect">
+            <a:avLst/>
+          </a:prstGeom>
+        </p:spPr>
+        <p:txBody>
+          <a:bodyPr vert="horz" lIns="91440" tIns="45720" rIns="91440" bIns="45720" rtlCol="0"/>
+          <a:lstStyle>
+            <a:lvl1pPr algn="r">
+              <a:defRPr sz="1200"/>
+            </a:lvl1pPr>
+          </a:lstStyle>
+          <a:p>
+            <a:fld id="{9E808448-E5C1-6044-9A1D-E68767CBF56D}" type="datetimeFigureOut">
+              <a:rPr lang="en-US" smtClean="0"/>
+              <a:t>11/4/18</a:t>
+            </a:fld>
+            <a:endParaRPr lang="en-US"/>
+          </a:p>
+        </p:txBody>
+      </p:sp>
+      <p:sp>
+        <p:nvSpPr>
+          <p:cNvPr id="4" name="Slide Image Placeholder 3"/>
+          <p:cNvSpPr>
+            <a:spLocks noGrp="1" noRot="1" noChangeAspect="1"/>
+          </p:cNvSpPr>
+          <p:nvPr>
+            <p:ph type="sldImg" idx="2"/>
+          </p:nvPr>
+        </p:nvSpPr>
+        <p:spPr>
+          <a:xfrm>
+            <a:off x="1371600" y="1143000"/>
+            <a:ext cx="4114800" cy="3086100"/>
+          </a:xfrm>
+          <a:prstGeom prst="rect">
+            <a:avLst/>
+          </a:prstGeom>
+          <a:noFill/>
+          <a:ln w="12700">
+            <a:solidFill>
+              <a:prstClr val="black"/>
+            </a:solidFill>
+          </a:ln>
+        </p:spPr>
+        <p:txBody>
+          <a:bodyPr vert="horz" lIns="91440" tIns="45720" rIns="91440" bIns="45720" rtlCol="0" anchor="ctr"/>
+          <a:lstStyle/>
+          <a:p>
+            <a:endParaRPr lang="en-US"/>
+          </a:p>
+        </p:txBody>
+      </p:sp>
+      <p:sp>
+        <p:nvSpPr>
+          <p:cNvPr id="5" name="Notes Placeholder 4"/>
+          <p:cNvSpPr>
+            <a:spLocks noGrp="1"/>
+          </p:cNvSpPr>
+          <p:nvPr>
+            <p:ph type="body" sz="quarter" idx="3"/>
+          </p:nvPr>
+        </p:nvSpPr>
+        <p:spPr>
+          <a:xfrm>
+            <a:off x="685800" y="4400550"/>
+            <a:ext cx="5486400" cy="3600450"/>
+          </a:xfrm>
+          <a:prstGeom prst="rect">
+            <a:avLst/>
+          </a:prstGeom>
+        </p:spPr>
+        <p:txBody>
+          <a:bodyPr vert="horz" lIns="91440" tIns="45720" rIns="91440" bIns="45720" rtlCol="0"/>
+          <a:lstStyle/>
+          <a:p>
+            <a:pPr lvl="0"/>
+            <a:r>
+              <a:rPr lang="en-US"/>
+              <a:t>Edit Master text styles</a:t>
+            </a:r>
+          </a:p>
+          <a:p>
+            <a:pPr lvl="1"/>
+            <a:r>
+              <a:rPr lang="en-US"/>
+              <a:t>Second level</a:t>
+            </a:r>
+          </a:p>
+          <a:p>
+            <a:pPr lvl="2"/>
+            <a:r>
+              <a:rPr lang="en-US"/>
+              <a:t>Third level</a:t>
+            </a:r>
+          </a:p>
+          <a:p>
+            <a:pPr lvl="3"/>
+            <a:r>
+              <a:rPr lang="en-US"/>
+              <a:t>Fourth level</a:t>
+            </a:r>
+          </a:p>
+          <a:p>
+            <a:pPr lvl="4"/>
+            <a:r>
+              <a:rPr lang="en-US"/>
+              <a:t>Fifth level</a:t>
+            </a:r>
+          </a:p>
+        </p:txBody>
+      </p:sp>
+      <p:sp>
+        <p:nvSpPr>
+          <p:cNvPr id="6" name="Footer Placeholder 5"/>
+          <p:cNvSpPr>
+            <a:spLocks noGrp="1"/>
+          </p:cNvSpPr>
+          <p:nvPr>
+            <p:ph type="ftr" sz="quarter" idx="4"/>
+          </p:nvPr>
+        </p:nvSpPr>
+        <p:spPr>
+          <a:xfrm>
+            <a:off x="0" y="8685213"/>
+            <a:ext cx="2971800" cy="458787"/>
+          </a:xfrm>
+          <a:prstGeom prst="rect">
+            <a:avLst/>
+          </a:prstGeom>
+        </p:spPr>
+        <p:txBody>
+          <a:bodyPr vert="horz" lIns="91440" tIns="45720" rIns="91440" bIns="45720" rtlCol="0" anchor="b"/>
+          <a:lstStyle>
+            <a:lvl1pPr algn="l">
+              <a:defRPr sz="1200"/>
+            </a:lvl1pPr>
+          </a:lstStyle>
+          <a:p>
+            <a:endParaRPr lang="en-US"/>
+          </a:p>
+        </p:txBody>
+      </p:sp>
+      <p:sp>
+        <p:nvSpPr>
+          <p:cNvPr id="7" name="Slide Number Placeholder 6"/>
+          <p:cNvSpPr>
+            <a:spLocks noGrp="1"/>
+          </p:cNvSpPr>
+          <p:nvPr>
+            <p:ph type="sldNum" sz="quarter" idx="5"/>
+          </p:nvPr>
+        </p:nvSpPr>
+        <p:spPr>
+          <a:xfrm>
+            <a:off x="3884613" y="8685213"/>
+            <a:ext cx="2971800" cy="458787"/>
+          </a:xfrm>
+          <a:prstGeom prst="rect">
+            <a:avLst/>
+          </a:prstGeom>
+        </p:spPr>
+        <p:txBody>
+          <a:bodyPr vert="horz" lIns="91440" tIns="45720" rIns="91440" bIns="45720" rtlCol="0" anchor="b"/>
+          <a:lstStyle>
+            <a:lvl1pPr algn="r">
+              <a:defRPr sz="1200"/>
+            </a:lvl1pPr>
+          </a:lstStyle>
+          <a:p>
+            <a:fld id="{4BEE635C-C192-1544-AEBD-5E7ED9C03D3D}" type="slidenum">
+              <a:rPr lang="en-US" smtClean="0"/>
+              <a:t>‹#›</a:t>
+            </a:fld>
+            <a:endParaRPr lang="en-US"/>
+          </a:p>
+        </p:txBody>
+      </p:sp>
+    </p:spTree>
+    <p:extLst>
+      <p:ext uri="{BB962C8B-B14F-4D97-AF65-F5344CB8AC3E}">
+        <p14:creationId xmlns:p14="http://schemas.microsoft.com/office/powerpoint/2010/main" val="3875060177"/>
+      </p:ext>
+    </p:extLst>
+  </p:cSld>
+  <p:clrMap bg1="lt1" tx1="dk1" bg2="lt2" tx2="dk2" accent1="accent1" accent2="accent2" accent3="accent3" accent4="accent4" accent5="accent5" accent6="accent6" hlink="hlink" folHlink="folHlink"/>
+  <p:notesStyle>
+    <a:lvl1pPr marL="0" algn="l" defTabSz="914400" rtl="0" eaLnBrk="1" latinLnBrk="0" hangingPunct="1">
+      <a:defRPr sz="1200" kern="1200">
+        <a:solidFill>
+          <a:schemeClr val="tx1"/>
+        </a:solidFill>
+        <a:latin typeface="+mn-lt"/>
+        <a:ea typeface="+mn-ea"/>
+        <a:cs typeface="+mn-cs"/>
+      </a:defRPr>
+    </a:lvl1pPr>
+    <a:lvl2pPr marL="457200" algn="l" defTabSz="914400" rtl="0" eaLnBrk="1" latinLnBrk="0" hangingPunct="1">
+      <a:defRPr sz="1200" kern="1200">
+        <a:solidFill>
+          <a:schemeClr val="tx1"/>
+        </a:solidFill>
+        <a:latin typeface="+mn-lt"/>
+        <a:ea typeface="+mn-ea"/>
+        <a:cs typeface="+mn-cs"/>
+      </a:defRPr>
+    </a:lvl2pPr>
+    <a:lvl3pPr marL="914400" algn="l" defTabSz="914400" rtl="0" eaLnBrk="1" latinLnBrk="0" hangingPunct="1">
+      <a:defRPr sz="1200" kern="1200">
+        <a:solidFill>
+          <a:schemeClr val="tx1"/>
+        </a:solidFill>
+        <a:latin typeface="+mn-lt"/>
+        <a:ea typeface="+mn-ea"/>
+        <a:cs typeface="+mn-cs"/>
+      </a:defRPr>
+    </a:lvl3pPr>
+    <a:lvl4pPr marL="1371600" algn="l" defTabSz="914400" rtl="0" eaLnBrk="1" latinLnBrk="0" hangingPunct="1">
+      <a:defRPr sz="1200" kern="1200">
+        <a:solidFill>
+          <a:schemeClr val="tx1"/>
+        </a:solidFill>
+        <a:latin typeface="+mn-lt"/>
+        <a:ea typeface="+mn-ea"/>
+        <a:cs typeface="+mn-cs"/>
+      </a:defRPr>
+    </a:lvl4pPr>
+    <a:lvl5pPr marL="1828800" algn="l" defTabSz="914400" rtl="0" eaLnBrk="1" latinLnBrk="0" hangingPunct="1">
+      <a:defRPr sz="1200" kern="1200">
+        <a:solidFill>
+          <a:schemeClr val="tx1"/>
+        </a:solidFill>
+        <a:latin typeface="+mn-lt"/>
+        <a:ea typeface="+mn-ea"/>
+        <a:cs typeface="+mn-cs"/>
+      </a:defRPr>
+    </a:lvl5pPr>
+    <a:lvl6pPr marL="2286000" algn="l" defTabSz="914400" rtl="0" eaLnBrk="1" latinLnBrk="0" hangingPunct="1">
+      <a:defRPr sz="1200" kern="1200">
+        <a:solidFill>
+          <a:schemeClr val="tx1"/>
+        </a:solidFill>
+        <a:latin typeface="+mn-lt"/>
+        <a:ea typeface="+mn-ea"/>
+        <a:cs typeface="+mn-cs"/>
+      </a:defRPr>
+    </a:lvl6pPr>
+    <a:lvl7pPr marL="2743200" algn="l" defTabSz="914400" rtl="0" eaLnBrk="1" latinLnBrk="0" hangingPunct="1">
+      <a:defRPr sz="1200" kern="1200">
+        <a:solidFill>
+          <a:schemeClr val="tx1"/>
+        </a:solidFill>
+        <a:latin typeface="+mn-lt"/>
+        <a:ea typeface="+mn-ea"/>
+        <a:cs typeface="+mn-cs"/>
+      </a:defRPr>
+    </a:lvl7pPr>
+    <a:lvl8pPr marL="3200400" algn="l" defTabSz="914400" rtl="0" eaLnBrk="1" latinLnBrk="0" hangingPunct="1">
+      <a:defRPr sz="1200" kern="1200">
+        <a:solidFill>
+          <a:schemeClr val="tx1"/>
+        </a:solidFill>
+        <a:latin typeface="+mn-lt"/>
+        <a:ea typeface="+mn-ea"/>
+        <a:cs typeface="+mn-cs"/>
+      </a:defRPr>
+    </a:lvl8pPr>
+    <a:lvl9pPr marL="3657600" algn="l" defTabSz="914400" rtl="0" eaLnBrk="1" latinLnBrk="0" hangingPunct="1">
+      <a:defRPr sz="1200" kern="1200">
+        <a:solidFill>
+          <a:schemeClr val="tx1"/>
+        </a:solidFill>
+        <a:latin typeface="+mn-lt"/>
+        <a:ea typeface="+mn-ea"/>
+        <a:cs typeface="+mn-cs"/>
+      </a:defRPr>
+    </a:lvl9pPr>
+  </p:notesStyle>
+</p:notesMaster>
+</file>
+
+<file path=ppt/notesSlides/notesSlide1.xml><?xml version="1.0" encoding="utf-8"?>
+<p:notes xmlns:a="http://schemas.openxmlformats.org/drawingml/2006/main" xmlns:r="http://schemas.openxmlformats.org/officeDocument/2006/relationships" xmlns:p="http://schemas.openxmlformats.org/presentationml/2006/main">
+  <p:cSld>
+    <p:spTree>
+      <p:nvGrpSpPr>
+        <p:cNvPr id="1" name=""/>
+        <p:cNvGrpSpPr/>
+        <p:nvPr/>
+      </p:nvGrpSpPr>
+      <p:grpSpPr>
+        <a:xfrm>
+          <a:off x="0" y="0"/>
+          <a:ext cx="0" cy="0"/>
+          <a:chOff x="0" y="0"/>
+          <a:chExt cx="0" cy="0"/>
+        </a:xfrm>
+      </p:grpSpPr>
+      <p:sp>
+        <p:nvSpPr>
+          <p:cNvPr id="2" name="Slide Image Placeholder 1"/>
+          <p:cNvSpPr>
+            <a:spLocks noGrp="1" noRot="1" noChangeAspect="1"/>
+          </p:cNvSpPr>
+          <p:nvPr>
+            <p:ph type="sldImg"/>
+          </p:nvPr>
+        </p:nvSpPr>
+        <p:spPr/>
+      </p:sp>
+      <p:sp>
+        <p:nvSpPr>
+          <p:cNvPr id="3" name="Notes Placeholder 2"/>
+          <p:cNvSpPr>
+            <a:spLocks noGrp="1"/>
+          </p:cNvSpPr>
+          <p:nvPr>
+            <p:ph type="body" idx="1"/>
+          </p:nvPr>
+        </p:nvSpPr>
+        <p:spPr/>
+        <p:txBody>
+          <a:bodyPr/>
+          <a:lstStyle/>
+          <a:p>
+            <a:endParaRPr lang="en-US" dirty="0"/>
+          </a:p>
+        </p:txBody>
+      </p:sp>
+      <p:sp>
+        <p:nvSpPr>
+          <p:cNvPr id="4" name="Slide Number Placeholder 3"/>
+          <p:cNvSpPr>
+            <a:spLocks noGrp="1"/>
+          </p:cNvSpPr>
+          <p:nvPr>
+            <p:ph type="sldNum" sz="quarter" idx="5"/>
+          </p:nvPr>
+        </p:nvSpPr>
+        <p:spPr/>
+        <p:txBody>
+          <a:bodyPr/>
+          <a:lstStyle/>
+          <a:p>
+            <a:fld id="{4BEE635C-C192-1544-AEBD-5E7ED9C03D3D}" type="slidenum">
+              <a:rPr lang="en-US" smtClean="0"/>
+              <a:t>6</a:t>
+            </a:fld>
+            <a:endParaRPr lang="en-US"/>
+          </a:p>
+        </p:txBody>
+      </p:sp>
+    </p:spTree>
+    <p:extLst>
+      <p:ext uri="{BB962C8B-B14F-4D97-AF65-F5344CB8AC3E}">
+        <p14:creationId xmlns:p14="http://schemas.microsoft.com/office/powerpoint/2010/main" val="3381700434"/>
+      </p:ext>
+    </p:extLst>
+  </p:cSld>
+  <p:clrMapOvr>
+    <a:masterClrMapping/>
+  </p:clrMapOvr>
+</p:notes>
+</file>
+
 <file path=ppt/slideLayouts/slideLayout1.xml><?xml version="1.0" encoding="utf-8"?>
 <p:sldLayout xmlns:a="http://schemas.openxmlformats.org/drawingml/2006/main" xmlns:r="http://schemas.openxmlformats.org/officeDocument/2006/relationships" xmlns:p="http://schemas.openxmlformats.org/presentationml/2006/main" type="title" preserve="1">
   <p:cSld name="Title Slide">
@@ -307,7 +743,7 @@
           <a:p>
             <a:fld id="{EBC7FFC8-011D-1246-B320-9C4FD100F423}" type="datetimeFigureOut">
               <a:rPr lang="en-US" smtClean="0"/>
-              <a:t>11/3/18</a:t>
+              <a:t>11/4/18</a:t>
             </a:fld>
             <a:endParaRPr lang="en-US"/>
           </a:p>
@@ -475,7 +911,7 @@
           <a:p>
             <a:fld id="{EBC7FFC8-011D-1246-B320-9C4FD100F423}" type="datetimeFigureOut">
               <a:rPr lang="en-US" smtClean="0"/>
-              <a:t>11/3/18</a:t>
+              <a:t>11/4/18</a:t>
             </a:fld>
             <a:endParaRPr lang="en-US"/>
           </a:p>
@@ -653,7 +1089,7 @@
           <a:p>
             <a:fld id="{EBC7FFC8-011D-1246-B320-9C4FD100F423}" type="datetimeFigureOut">
               <a:rPr lang="en-US" smtClean="0"/>
-              <a:t>11/3/18</a:t>
+              <a:t>11/4/18</a:t>
             </a:fld>
             <a:endParaRPr lang="en-US"/>
           </a:p>
@@ -821,7 +1257,7 @@
           <a:p>
             <a:fld id="{EBC7FFC8-011D-1246-B320-9C4FD100F423}" type="datetimeFigureOut">
               <a:rPr lang="en-US" smtClean="0"/>
-              <a:t>11/3/18</a:t>
+              <a:t>11/4/18</a:t>
             </a:fld>
             <a:endParaRPr lang="en-US"/>
           </a:p>
@@ -1066,7 +1502,7 @@
           <a:p>
             <a:fld id="{EBC7FFC8-011D-1246-B320-9C4FD100F423}" type="datetimeFigureOut">
               <a:rPr lang="en-US" smtClean="0"/>
-              <a:t>11/3/18</a:t>
+              <a:t>11/4/18</a:t>
             </a:fld>
             <a:endParaRPr lang="en-US"/>
           </a:p>
@@ -1351,7 +1787,7 @@
           <a:p>
             <a:fld id="{EBC7FFC8-011D-1246-B320-9C4FD100F423}" type="datetimeFigureOut">
               <a:rPr lang="en-US" smtClean="0"/>
-              <a:t>11/3/18</a:t>
+              <a:t>11/4/18</a:t>
             </a:fld>
             <a:endParaRPr lang="en-US"/>
           </a:p>
@@ -1770,7 +2206,7 @@
           <a:p>
             <a:fld id="{EBC7FFC8-011D-1246-B320-9C4FD100F423}" type="datetimeFigureOut">
               <a:rPr lang="en-US" smtClean="0"/>
-              <a:t>11/3/18</a:t>
+              <a:t>11/4/18</a:t>
             </a:fld>
             <a:endParaRPr lang="en-US"/>
           </a:p>
@@ -1887,7 +2323,7 @@
           <a:p>
             <a:fld id="{EBC7FFC8-011D-1246-B320-9C4FD100F423}" type="datetimeFigureOut">
               <a:rPr lang="en-US" smtClean="0"/>
-              <a:t>11/3/18</a:t>
+              <a:t>11/4/18</a:t>
             </a:fld>
             <a:endParaRPr lang="en-US"/>
           </a:p>
@@ -1982,7 +2418,7 @@
           <a:p>
             <a:fld id="{EBC7FFC8-011D-1246-B320-9C4FD100F423}" type="datetimeFigureOut">
               <a:rPr lang="en-US" smtClean="0"/>
-              <a:t>11/3/18</a:t>
+              <a:t>11/4/18</a:t>
             </a:fld>
             <a:endParaRPr lang="en-US"/>
           </a:p>
@@ -2257,7 +2693,7 @@
           <a:p>
             <a:fld id="{EBC7FFC8-011D-1246-B320-9C4FD100F423}" type="datetimeFigureOut">
               <a:rPr lang="en-US" smtClean="0"/>
-              <a:t>11/3/18</a:t>
+              <a:t>11/4/18</a:t>
             </a:fld>
             <a:endParaRPr lang="en-US"/>
           </a:p>
@@ -2509,7 +2945,7 @@
           <a:p>
             <a:fld id="{EBC7FFC8-011D-1246-B320-9C4FD100F423}" type="datetimeFigureOut">
               <a:rPr lang="en-US" smtClean="0"/>
-              <a:t>11/3/18</a:t>
+              <a:t>11/4/18</a:t>
             </a:fld>
             <a:endParaRPr lang="en-US"/>
           </a:p>
@@ -2720,7 +3156,7 @@
           <a:p>
             <a:fld id="{EBC7FFC8-011D-1246-B320-9C4FD100F423}" type="datetimeFigureOut">
               <a:rPr lang="en-US" smtClean="0"/>
-              <a:t>11/3/18</a:t>
+              <a:t>11/4/18</a:t>
             </a:fld>
             <a:endParaRPr lang="en-US"/>
           </a:p>
@@ -11592,56 +12028,27 @@
           </a:p>
         </p:txBody>
       </p:sp>
-      <p:pic>
-        <p:nvPicPr>
-          <p:cNvPr id="62" name="Picture 61" descr="1a-singlestrand.pdf"/>
-          <p:cNvPicPr>
-            <a:picLocks noChangeAspect="1"/>
-          </p:cNvPicPr>
-          <p:nvPr/>
-        </p:nvPicPr>
-        <p:blipFill>
-          <a:blip r:embed="rId2">
-            <a:extLst>
-              <a:ext uri="{28A0092B-C50C-407E-A947-70E740481C1C}">
-                <a14:useLocalDpi xmlns:a14="http://schemas.microsoft.com/office/drawing/2010/main" val="0"/>
-              </a:ext>
-            </a:extLst>
-          </a:blip>
-          <a:stretch>
-            <a:fillRect/>
-          </a:stretch>
-        </p:blipFill>
-        <p:spPr>
-          <a:xfrm>
-            <a:off x="2311400" y="2335953"/>
-            <a:ext cx="4140200" cy="546100"/>
-          </a:xfrm>
-          <a:prstGeom prst="rect">
-            <a:avLst/>
-          </a:prstGeom>
-        </p:spPr>
-      </p:pic>
       <p:cxnSp>
         <p:nvCxnSpPr>
           <p:cNvPr id="63" name="Straight Arrow Connector 5"/>
           <p:cNvCxnSpPr>
-            <a:stCxn id="60" idx="0"/>
-            <a:endCxn id="58" idx="2"/>
+            <a:cxnSpLocks/>
+            <a:endCxn id="33" idx="0"/>
           </p:cNvCxnSpPr>
           <p:nvPr/>
         </p:nvCxnSpPr>
         <p:spPr>
-          <a:xfrm rot="16200000" flipV="1">
-            <a:off x="3597004" y="1981378"/>
-            <a:ext cx="279401" cy="2080751"/>
+          <a:xfrm flipV="1">
+            <a:off x="3043156" y="2882053"/>
+            <a:ext cx="2386721" cy="536442"/>
           </a:xfrm>
-          <a:prstGeom prst="bentConnector3">
+          <a:prstGeom prst="bentConnector4">
             <a:avLst>
-              <a:gd name="adj1" fmla="val 50000"/>
+              <a:gd name="adj1" fmla="val 410"/>
+              <a:gd name="adj2" fmla="val 142614"/>
             </a:avLst>
           </a:prstGeom>
-          <a:ln>
+          <a:ln w="28575">
             <a:solidFill>
               <a:srgbClr val="FF0000"/>
             </a:solidFill>
@@ -11668,20 +12075,21 @@
       <p:cxnSp>
         <p:nvCxnSpPr>
           <p:cNvPr id="59" name="Straight Arrow Connector 5"/>
-          <p:cNvCxnSpPr/>
+          <p:cNvCxnSpPr>
+            <a:cxnSpLocks/>
+            <a:endCxn id="27" idx="0"/>
+          </p:cNvCxnSpPr>
           <p:nvPr/>
         </p:nvCxnSpPr>
         <p:spPr>
-          <a:xfrm rot="16200000" flipV="1">
-            <a:off x="3673339" y="2423694"/>
-            <a:ext cx="129642" cy="2087761"/>
+          <a:xfrm rot="10800000" flipV="1">
+            <a:off x="907394" y="2650415"/>
+            <a:ext cx="2135760" cy="231637"/>
           </a:xfrm>
-          <a:prstGeom prst="bentConnector3">
-            <a:avLst>
-              <a:gd name="adj1" fmla="val 276332"/>
-            </a:avLst>
+          <a:prstGeom prst="bentConnector2">
+            <a:avLst/>
           </a:prstGeom>
-          <a:ln>
+          <a:ln w="28575">
             <a:solidFill>
               <a:srgbClr val="008000"/>
             </a:solidFill>
@@ -11713,13 +12121,13 @@
         </p:nvCxnSpPr>
         <p:spPr>
           <a:xfrm>
-            <a:off x="2605379" y="2888073"/>
+            <a:off x="5334627" y="2882053"/>
             <a:ext cx="190500" cy="0"/>
           </a:xfrm>
           <a:prstGeom prst="line">
             <a:avLst/>
           </a:prstGeom>
-          <a:ln>
+          <a:ln w="28575">
             <a:solidFill>
               <a:srgbClr val="FF0000"/>
             </a:solidFill>
@@ -11770,36 +12178,538 @@
           </a:p>
         </p:txBody>
       </p:sp>
-      <p:pic>
-        <p:nvPicPr>
-          <p:cNvPr id="61" name="Picture 60" descr="1a-singlestrand.pdf"/>
-          <p:cNvPicPr>
-            <a:picLocks noChangeAspect="1"/>
-          </p:cNvPicPr>
-          <p:nvPr/>
-        </p:nvPicPr>
-        <p:blipFill>
-          <a:blip r:embed="rId2">
+      <p:grpSp>
+        <p:nvGrpSpPr>
+          <p:cNvPr id="23" name="Group 22">
             <a:extLst>
-              <a:ext uri="{28A0092B-C50C-407E-A947-70E740481C1C}">
-                <a14:useLocalDpi xmlns:a14="http://schemas.microsoft.com/office/drawing/2010/main" val="0"/>
+              <a:ext uri="{FF2B5EF4-FFF2-40B4-BE49-F238E27FC236}">
+                <a16:creationId xmlns:a16="http://schemas.microsoft.com/office/drawing/2014/main" id="{28F6F8C6-E52F-2D40-8914-AAD083AF6BC3}"/>
               </a:ext>
             </a:extLst>
-          </a:blip>
-          <a:stretch>
-            <a:fillRect/>
-          </a:stretch>
-        </p:blipFill>
-        <p:spPr>
+          </p:cNvPr>
+          <p:cNvGrpSpPr/>
+          <p:nvPr/>
+        </p:nvGrpSpPr>
+        <p:grpSpPr>
           <a:xfrm>
-            <a:off x="2311400" y="3402754"/>
-            <a:ext cx="4140200" cy="546100"/>
+            <a:off x="287254" y="2882053"/>
+            <a:ext cx="4196538" cy="1003545"/>
+            <a:chOff x="2569133" y="413397"/>
+            <a:chExt cx="4196538" cy="1003545"/>
           </a:xfrm>
-          <a:prstGeom prst="rect">
-            <a:avLst/>
-          </a:prstGeom>
-        </p:spPr>
-      </p:pic>
+        </p:grpSpPr>
+        <p:cxnSp>
+          <p:nvCxnSpPr>
+            <p:cNvPr id="24" name="Straight Connector 23">
+              <a:extLst>
+                <a:ext uri="{FF2B5EF4-FFF2-40B4-BE49-F238E27FC236}">
+                  <a16:creationId xmlns:a16="http://schemas.microsoft.com/office/drawing/2014/main" id="{5B4C060A-5E0C-544B-A9EB-A25BA9098BF8}"/>
+                </a:ext>
+              </a:extLst>
+            </p:cNvPr>
+            <p:cNvCxnSpPr/>
+            <p:nvPr/>
+          </p:nvCxnSpPr>
+          <p:spPr>
+            <a:xfrm>
+              <a:off x="2569133" y="1140336"/>
+              <a:ext cx="4191000" cy="0"/>
+            </a:xfrm>
+            <a:prstGeom prst="line">
+              <a:avLst/>
+            </a:prstGeom>
+            <a:ln w="38100" cap="flat" cmpd="sng" algn="ctr">
+              <a:solidFill>
+                <a:srgbClr val="000000"/>
+              </a:solidFill>
+              <a:prstDash val="solid"/>
+              <a:round/>
+              <a:headEnd type="none" w="med" len="med"/>
+              <a:tailEnd type="none" w="med" len="med"/>
+            </a:ln>
+            <a:effectLst/>
+          </p:spPr>
+          <p:style>
+            <a:lnRef idx="2">
+              <a:schemeClr val="accent1"/>
+            </a:lnRef>
+            <a:fillRef idx="0">
+              <a:schemeClr val="accent1"/>
+            </a:fillRef>
+            <a:effectRef idx="1">
+              <a:schemeClr val="accent1"/>
+            </a:effectRef>
+            <a:fontRef idx="minor">
+              <a:schemeClr val="tx1"/>
+            </a:fontRef>
+          </p:style>
+        </p:cxnSp>
+        <p:sp>
+          <p:nvSpPr>
+            <p:cNvPr id="25" name="Right Arrow 24">
+              <a:extLst>
+                <a:ext uri="{FF2B5EF4-FFF2-40B4-BE49-F238E27FC236}">
+                  <a16:creationId xmlns:a16="http://schemas.microsoft.com/office/drawing/2014/main" id="{93D0B5D3-EF91-7C43-BFED-2A7ACD415720}"/>
+                </a:ext>
+              </a:extLst>
+            </p:cNvPr>
+            <p:cNvSpPr/>
+            <p:nvPr/>
+          </p:nvSpPr>
+          <p:spPr>
+            <a:xfrm>
+              <a:off x="4740833" y="949836"/>
+              <a:ext cx="1168400" cy="350140"/>
+            </a:xfrm>
+            <a:prstGeom prst="rightArrow">
+              <a:avLst>
+                <a:gd name="adj1" fmla="val 100000"/>
+                <a:gd name="adj2" fmla="val 52194"/>
+              </a:avLst>
+            </a:prstGeom>
+            <a:solidFill>
+              <a:schemeClr val="accent2"/>
+            </a:solidFill>
+            <a:ln w="38100" cap="flat" cmpd="sng" algn="ctr">
+              <a:solidFill>
+                <a:srgbClr val="000000"/>
+              </a:solidFill>
+              <a:prstDash val="solid"/>
+              <a:round/>
+              <a:headEnd type="none" w="med" len="med"/>
+              <a:tailEnd type="none" w="med" len="med"/>
+            </a:ln>
+            <a:effectLst/>
+          </p:spPr>
+          <p:style>
+            <a:lnRef idx="1">
+              <a:schemeClr val="accent1"/>
+            </a:lnRef>
+            <a:fillRef idx="3">
+              <a:schemeClr val="accent1"/>
+            </a:fillRef>
+            <a:effectRef idx="2">
+              <a:schemeClr val="accent1"/>
+            </a:effectRef>
+            <a:fontRef idx="minor">
+              <a:schemeClr val="lt1"/>
+            </a:fontRef>
+          </p:style>
+          <p:txBody>
+            <a:bodyPr rtlCol="0" anchor="ctr"/>
+            <a:lstStyle/>
+            <a:p>
+              <a:pPr algn="ctr"/>
+              <a:endParaRPr lang="en-US" i="1" dirty="0">
+                <a:solidFill>
+                  <a:schemeClr val="tx1"/>
+                </a:solidFill>
+              </a:endParaRPr>
+            </a:p>
+          </p:txBody>
+        </p:sp>
+        <p:sp>
+          <p:nvSpPr>
+            <p:cNvPr id="26" name="Chord 25">
+              <a:extLst>
+                <a:ext uri="{FF2B5EF4-FFF2-40B4-BE49-F238E27FC236}">
+                  <a16:creationId xmlns:a16="http://schemas.microsoft.com/office/drawing/2014/main" id="{E675A9D9-6A9D-4143-AD19-C8EBA9032734}"/>
+                </a:ext>
+              </a:extLst>
+            </p:cNvPr>
+            <p:cNvSpPr/>
+            <p:nvPr/>
+          </p:nvSpPr>
+          <p:spPr>
+            <a:xfrm>
+              <a:off x="3734347" y="784736"/>
+              <a:ext cx="632206" cy="632206"/>
+            </a:xfrm>
+            <a:prstGeom prst="chord">
+              <a:avLst>
+                <a:gd name="adj1" fmla="val 10506229"/>
+                <a:gd name="adj2" fmla="val 301460"/>
+              </a:avLst>
+            </a:prstGeom>
+            <a:solidFill>
+              <a:schemeClr val="accent4">
+                <a:lumMod val="60000"/>
+                <a:lumOff val="40000"/>
+              </a:schemeClr>
+            </a:solidFill>
+            <a:ln w="38100" cap="flat" cmpd="sng" algn="ctr">
+              <a:solidFill>
+                <a:srgbClr val="000000"/>
+              </a:solidFill>
+              <a:prstDash val="solid"/>
+              <a:round/>
+              <a:headEnd type="none" w="med" len="med"/>
+              <a:tailEnd type="none" w="med" len="med"/>
+            </a:ln>
+            <a:effectLst/>
+          </p:spPr>
+          <p:style>
+            <a:lnRef idx="1">
+              <a:schemeClr val="accent1"/>
+            </a:lnRef>
+            <a:fillRef idx="3">
+              <a:schemeClr val="accent1"/>
+            </a:fillRef>
+            <a:effectRef idx="2">
+              <a:schemeClr val="accent1"/>
+            </a:effectRef>
+            <a:fontRef idx="minor">
+              <a:schemeClr val="lt1"/>
+            </a:fontRef>
+          </p:style>
+          <p:txBody>
+            <a:bodyPr rtlCol="0" anchor="ctr"/>
+            <a:lstStyle/>
+            <a:p>
+              <a:pPr algn="ctr"/>
+              <a:endParaRPr lang="en-US"/>
+            </a:p>
+          </p:txBody>
+        </p:sp>
+        <p:pic>
+          <p:nvPicPr>
+            <p:cNvPr id="27" name="Picture 26">
+              <a:extLst>
+                <a:ext uri="{FF2B5EF4-FFF2-40B4-BE49-F238E27FC236}">
+                  <a16:creationId xmlns:a16="http://schemas.microsoft.com/office/drawing/2014/main" id="{CF9AB9B2-E8A1-F847-82F2-9B370628DA2A}"/>
+                </a:ext>
+              </a:extLst>
+            </p:cNvPr>
+            <p:cNvPicPr>
+              <a:picLocks noChangeAspect="1"/>
+            </p:cNvPicPr>
+            <p:nvPr/>
+          </p:nvPicPr>
+          <p:blipFill>
+            <a:blip r:embed="rId3">
+              <a:extLst>
+                <a:ext uri="{28A0092B-C50C-407E-A947-70E740481C1C}">
+                  <a14:useLocalDpi xmlns:a14="http://schemas.microsoft.com/office/drawing/2010/main" val="0"/>
+                </a:ext>
+              </a:extLst>
+            </a:blip>
+            <a:stretch>
+              <a:fillRect/>
+            </a:stretch>
+          </p:blipFill>
+          <p:spPr>
+            <a:xfrm>
+              <a:off x="2803319" y="413397"/>
+              <a:ext cx="771908" cy="771908"/>
+            </a:xfrm>
+            <a:prstGeom prst="rect">
+              <a:avLst/>
+            </a:prstGeom>
+          </p:spPr>
+        </p:pic>
+        <p:pic>
+          <p:nvPicPr>
+            <p:cNvPr id="28" name="Picture 27">
+              <a:extLst>
+                <a:ext uri="{FF2B5EF4-FFF2-40B4-BE49-F238E27FC236}">
+                  <a16:creationId xmlns:a16="http://schemas.microsoft.com/office/drawing/2014/main" id="{78B1AC86-74D4-0745-BFE9-287DF275D736}"/>
+                </a:ext>
+              </a:extLst>
+            </p:cNvPr>
+            <p:cNvPicPr>
+              <a:picLocks noChangeAspect="1"/>
+            </p:cNvPicPr>
+            <p:nvPr/>
+          </p:nvPicPr>
+          <p:blipFill>
+            <a:blip r:embed="rId4">
+              <a:extLst>
+                <a:ext uri="{28A0092B-C50C-407E-A947-70E740481C1C}">
+                  <a14:useLocalDpi xmlns:a14="http://schemas.microsoft.com/office/drawing/2010/main" val="0"/>
+                </a:ext>
+              </a:extLst>
+            </a:blip>
+            <a:stretch>
+              <a:fillRect/>
+            </a:stretch>
+          </p:blipFill>
+          <p:spPr>
+            <a:xfrm>
+              <a:off x="5971536" y="499461"/>
+              <a:ext cx="794135" cy="794135"/>
+            </a:xfrm>
+            <a:prstGeom prst="rect">
+              <a:avLst/>
+            </a:prstGeom>
+          </p:spPr>
+        </p:pic>
+      </p:grpSp>
+      <p:grpSp>
+        <p:nvGrpSpPr>
+          <p:cNvPr id="29" name="Group 28">
+            <a:extLst>
+              <a:ext uri="{FF2B5EF4-FFF2-40B4-BE49-F238E27FC236}">
+                <a16:creationId xmlns:a16="http://schemas.microsoft.com/office/drawing/2014/main" id="{4DEA648E-0501-D149-83F7-E7570AB22EA5}"/>
+              </a:ext>
+            </a:extLst>
+          </p:cNvPr>
+          <p:cNvGrpSpPr/>
+          <p:nvPr/>
+        </p:nvGrpSpPr>
+        <p:grpSpPr>
+          <a:xfrm>
+            <a:off x="4809737" y="2882053"/>
+            <a:ext cx="4196538" cy="1003545"/>
+            <a:chOff x="2569133" y="413397"/>
+            <a:chExt cx="4196538" cy="1003545"/>
+          </a:xfrm>
+        </p:grpSpPr>
+        <p:cxnSp>
+          <p:nvCxnSpPr>
+            <p:cNvPr id="30" name="Straight Connector 29">
+              <a:extLst>
+                <a:ext uri="{FF2B5EF4-FFF2-40B4-BE49-F238E27FC236}">
+                  <a16:creationId xmlns:a16="http://schemas.microsoft.com/office/drawing/2014/main" id="{8D11829E-196D-7945-A4A7-211FAA29D7BF}"/>
+                </a:ext>
+              </a:extLst>
+            </p:cNvPr>
+            <p:cNvCxnSpPr/>
+            <p:nvPr/>
+          </p:nvCxnSpPr>
+          <p:spPr>
+            <a:xfrm>
+              <a:off x="2569133" y="1140336"/>
+              <a:ext cx="4191000" cy="0"/>
+            </a:xfrm>
+            <a:prstGeom prst="line">
+              <a:avLst/>
+            </a:prstGeom>
+            <a:ln w="38100" cap="flat" cmpd="sng" algn="ctr">
+              <a:solidFill>
+                <a:srgbClr val="000000"/>
+              </a:solidFill>
+              <a:prstDash val="solid"/>
+              <a:round/>
+              <a:headEnd type="none" w="med" len="med"/>
+              <a:tailEnd type="none" w="med" len="med"/>
+            </a:ln>
+            <a:effectLst/>
+          </p:spPr>
+          <p:style>
+            <a:lnRef idx="2">
+              <a:schemeClr val="accent1"/>
+            </a:lnRef>
+            <a:fillRef idx="0">
+              <a:schemeClr val="accent1"/>
+            </a:fillRef>
+            <a:effectRef idx="1">
+              <a:schemeClr val="accent1"/>
+            </a:effectRef>
+            <a:fontRef idx="minor">
+              <a:schemeClr val="tx1"/>
+            </a:fontRef>
+          </p:style>
+        </p:cxnSp>
+        <p:sp>
+          <p:nvSpPr>
+            <p:cNvPr id="31" name="Right Arrow 30">
+              <a:extLst>
+                <a:ext uri="{FF2B5EF4-FFF2-40B4-BE49-F238E27FC236}">
+                  <a16:creationId xmlns:a16="http://schemas.microsoft.com/office/drawing/2014/main" id="{109D4472-25BF-C249-A09D-5F05B63D75AA}"/>
+                </a:ext>
+              </a:extLst>
+            </p:cNvPr>
+            <p:cNvSpPr/>
+            <p:nvPr/>
+          </p:nvSpPr>
+          <p:spPr>
+            <a:xfrm>
+              <a:off x="4740833" y="949836"/>
+              <a:ext cx="1168400" cy="350140"/>
+            </a:xfrm>
+            <a:prstGeom prst="rightArrow">
+              <a:avLst>
+                <a:gd name="adj1" fmla="val 100000"/>
+                <a:gd name="adj2" fmla="val 52194"/>
+              </a:avLst>
+            </a:prstGeom>
+            <a:solidFill>
+              <a:schemeClr val="accent2"/>
+            </a:solidFill>
+            <a:ln w="38100" cap="flat" cmpd="sng" algn="ctr">
+              <a:solidFill>
+                <a:srgbClr val="000000"/>
+              </a:solidFill>
+              <a:prstDash val="solid"/>
+              <a:round/>
+              <a:headEnd type="none" w="med" len="med"/>
+              <a:tailEnd type="none" w="med" len="med"/>
+            </a:ln>
+            <a:effectLst/>
+          </p:spPr>
+          <p:style>
+            <a:lnRef idx="1">
+              <a:schemeClr val="accent1"/>
+            </a:lnRef>
+            <a:fillRef idx="3">
+              <a:schemeClr val="accent1"/>
+            </a:fillRef>
+            <a:effectRef idx="2">
+              <a:schemeClr val="accent1"/>
+            </a:effectRef>
+            <a:fontRef idx="minor">
+              <a:schemeClr val="lt1"/>
+            </a:fontRef>
+          </p:style>
+          <p:txBody>
+            <a:bodyPr rtlCol="0" anchor="ctr"/>
+            <a:lstStyle/>
+            <a:p>
+              <a:pPr algn="ctr"/>
+              <a:endParaRPr lang="en-US" i="1" dirty="0">
+                <a:solidFill>
+                  <a:schemeClr val="tx1"/>
+                </a:solidFill>
+              </a:endParaRPr>
+            </a:p>
+          </p:txBody>
+        </p:sp>
+        <p:sp>
+          <p:nvSpPr>
+            <p:cNvPr id="32" name="Chord 31">
+              <a:extLst>
+                <a:ext uri="{FF2B5EF4-FFF2-40B4-BE49-F238E27FC236}">
+                  <a16:creationId xmlns:a16="http://schemas.microsoft.com/office/drawing/2014/main" id="{7A99DCE2-854F-5B4B-A8FA-573A82EB188F}"/>
+                </a:ext>
+              </a:extLst>
+            </p:cNvPr>
+            <p:cNvSpPr/>
+            <p:nvPr/>
+          </p:nvSpPr>
+          <p:spPr>
+            <a:xfrm>
+              <a:off x="3734347" y="784736"/>
+              <a:ext cx="632206" cy="632206"/>
+            </a:xfrm>
+            <a:prstGeom prst="chord">
+              <a:avLst>
+                <a:gd name="adj1" fmla="val 10506229"/>
+                <a:gd name="adj2" fmla="val 301460"/>
+              </a:avLst>
+            </a:prstGeom>
+            <a:solidFill>
+              <a:schemeClr val="accent4">
+                <a:lumMod val="60000"/>
+                <a:lumOff val="40000"/>
+              </a:schemeClr>
+            </a:solidFill>
+            <a:ln w="38100" cap="flat" cmpd="sng" algn="ctr">
+              <a:solidFill>
+                <a:srgbClr val="000000"/>
+              </a:solidFill>
+              <a:prstDash val="solid"/>
+              <a:round/>
+              <a:headEnd type="none" w="med" len="med"/>
+              <a:tailEnd type="none" w="med" len="med"/>
+            </a:ln>
+            <a:effectLst/>
+          </p:spPr>
+          <p:style>
+            <a:lnRef idx="1">
+              <a:schemeClr val="accent1"/>
+            </a:lnRef>
+            <a:fillRef idx="3">
+              <a:schemeClr val="accent1"/>
+            </a:fillRef>
+            <a:effectRef idx="2">
+              <a:schemeClr val="accent1"/>
+            </a:effectRef>
+            <a:fontRef idx="minor">
+              <a:schemeClr val="lt1"/>
+            </a:fontRef>
+          </p:style>
+          <p:txBody>
+            <a:bodyPr rtlCol="0" anchor="ctr"/>
+            <a:lstStyle/>
+            <a:p>
+              <a:pPr algn="ctr"/>
+              <a:endParaRPr lang="en-US"/>
+            </a:p>
+          </p:txBody>
+        </p:sp>
+        <p:pic>
+          <p:nvPicPr>
+            <p:cNvPr id="33" name="Picture 32">
+              <a:extLst>
+                <a:ext uri="{FF2B5EF4-FFF2-40B4-BE49-F238E27FC236}">
+                  <a16:creationId xmlns:a16="http://schemas.microsoft.com/office/drawing/2014/main" id="{C577A355-FDAD-F641-839D-7074009646CB}"/>
+                </a:ext>
+              </a:extLst>
+            </p:cNvPr>
+            <p:cNvPicPr>
+              <a:picLocks noChangeAspect="1"/>
+            </p:cNvPicPr>
+            <p:nvPr/>
+          </p:nvPicPr>
+          <p:blipFill>
+            <a:blip r:embed="rId3">
+              <a:extLst>
+                <a:ext uri="{28A0092B-C50C-407E-A947-70E740481C1C}">
+                  <a14:useLocalDpi xmlns:a14="http://schemas.microsoft.com/office/drawing/2010/main" val="0"/>
+                </a:ext>
+              </a:extLst>
+            </a:blip>
+            <a:stretch>
+              <a:fillRect/>
+            </a:stretch>
+          </p:blipFill>
+          <p:spPr>
+            <a:xfrm>
+              <a:off x="2803319" y="413397"/>
+              <a:ext cx="771908" cy="771908"/>
+            </a:xfrm>
+            <a:prstGeom prst="rect">
+              <a:avLst/>
+            </a:prstGeom>
+          </p:spPr>
+        </p:pic>
+        <p:pic>
+          <p:nvPicPr>
+            <p:cNvPr id="34" name="Picture 33">
+              <a:extLst>
+                <a:ext uri="{FF2B5EF4-FFF2-40B4-BE49-F238E27FC236}">
+                  <a16:creationId xmlns:a16="http://schemas.microsoft.com/office/drawing/2014/main" id="{75D13738-BFCF-BE49-8124-0270020C2DCF}"/>
+                </a:ext>
+              </a:extLst>
+            </p:cNvPr>
+            <p:cNvPicPr>
+              <a:picLocks noChangeAspect="1"/>
+            </p:cNvPicPr>
+            <p:nvPr/>
+          </p:nvPicPr>
+          <p:blipFill>
+            <a:blip r:embed="rId4">
+              <a:extLst>
+                <a:ext uri="{28A0092B-C50C-407E-A947-70E740481C1C}">
+                  <a14:useLocalDpi xmlns:a14="http://schemas.microsoft.com/office/drawing/2010/main" val="0"/>
+                </a:ext>
+              </a:extLst>
+            </a:blip>
+            <a:stretch>
+              <a:fillRect/>
+            </a:stretch>
+          </p:blipFill>
+          <p:spPr>
+            <a:xfrm>
+              <a:off x="5971536" y="499461"/>
+              <a:ext cx="794135" cy="794135"/>
+            </a:xfrm>
+            <a:prstGeom prst="rect">
+              <a:avLst/>
+            </a:prstGeom>
+          </p:spPr>
+        </p:pic>
+      </p:grpSp>
     </p:spTree>
     <p:extLst>
       <p:ext uri="{BB962C8B-B14F-4D97-AF65-F5344CB8AC3E}">
@@ -12131,4 +13041,299 @@
   </a:objectDefaults>
   <a:extraClrSchemeLst/>
 </a:theme>
+</file>
+
+<file path=ppt/theme/theme2.xml><?xml version="1.0" encoding="utf-8"?>
+<a:theme xmlns:a="http://schemas.openxmlformats.org/drawingml/2006/main" name="Office Theme">
+  <a:themeElements>
+    <a:clrScheme name="Office">
+      <a:dk1>
+        <a:sysClr val="windowText" lastClr="000000"/>
+      </a:dk1>
+      <a:lt1>
+        <a:sysClr val="window" lastClr="FFFFFF"/>
+      </a:lt1>
+      <a:dk2>
+        <a:srgbClr val="44546A"/>
+      </a:dk2>
+      <a:lt2>
+        <a:srgbClr val="E7E6E6"/>
+      </a:lt2>
+      <a:accent1>
+        <a:srgbClr val="4472C4"/>
+      </a:accent1>
+      <a:accent2>
+        <a:srgbClr val="ED7D31"/>
+      </a:accent2>
+      <a:accent3>
+        <a:srgbClr val="A5A5A5"/>
+      </a:accent3>
+      <a:accent4>
+        <a:srgbClr val="FFC000"/>
+      </a:accent4>
+      <a:accent5>
+        <a:srgbClr val="5B9BD5"/>
+      </a:accent5>
+      <a:accent6>
+        <a:srgbClr val="70AD47"/>
+      </a:accent6>
+      <a:hlink>
+        <a:srgbClr val="0563C1"/>
+      </a:hlink>
+      <a:folHlink>
+        <a:srgbClr val="954F72"/>
+      </a:folHlink>
+    </a:clrScheme>
+    <a:fontScheme name="Office">
+      <a:majorFont>
+        <a:latin typeface="Calibri Light" panose="020F0302020204030204"/>
+        <a:ea typeface=""/>
+        <a:cs typeface=""/>
+        <a:font script="Jpan" typeface="游ゴシック Light"/>
+        <a:font script="Hang" typeface="맑은 고딕"/>
+        <a:font script="Hans" typeface="等线 Light"/>
+        <a:font script="Hant" typeface="新細明體"/>
+        <a:font script="Arab" typeface="Times New Roman"/>
+        <a:font script="Hebr" typeface="Times New Roman"/>
+        <a:font script="Thai" typeface="Angsana New"/>
+        <a:font script="Ethi" typeface="Nyala"/>
+        <a:font script="Beng" typeface="Vrinda"/>
+        <a:font script="Gujr" typeface="Shruti"/>
+        <a:font script="Khmr" typeface="MoolBoran"/>
+        <a:font script="Knda" typeface="Tunga"/>
+        <a:font script="Guru" typeface="Raavi"/>
+        <a:font script="Cans" typeface="Euphemia"/>
+        <a:font script="Cher" typeface="Plantagenet Cherokee"/>
+        <a:font script="Yiii" typeface="Microsoft Yi Baiti"/>
+        <a:font script="Tibt" typeface="Microsoft Himalaya"/>
+        <a:font script="Thaa" typeface="MV Boli"/>
+        <a:font script="Deva" typeface="Mangal"/>
+        <a:font script="Telu" typeface="Gautami"/>
+        <a:font script="Taml" typeface="Latha"/>
+        <a:font script="Syrc" typeface="Estrangelo Edessa"/>
+        <a:font script="Orya" typeface="Kalinga"/>
+        <a:font script="Mlym" typeface="Kartika"/>
+        <a:font script="Laoo" typeface="DokChampa"/>
+        <a:font script="Sinh" typeface="Iskoola Pota"/>
+        <a:font script="Mong" typeface="Mongolian Baiti"/>
+        <a:font script="Viet" typeface="Times New Roman"/>
+        <a:font script="Uigh" typeface="Microsoft Uighur"/>
+        <a:font script="Geor" typeface="Sylfaen"/>
+        <a:font script="Armn" typeface="Arial"/>
+        <a:font script="Bugi" typeface="Leelawadee UI"/>
+        <a:font script="Bopo" typeface="Microsoft JhengHei"/>
+        <a:font script="Java" typeface="Javanese Text"/>
+        <a:font script="Lisu" typeface="Segoe UI"/>
+        <a:font script="Mymr" typeface="Myanmar Text"/>
+        <a:font script="Nkoo" typeface="Ebrima"/>
+        <a:font script="Olck" typeface="Nirmala UI"/>
+        <a:font script="Osma" typeface="Ebrima"/>
+        <a:font script="Phag" typeface="Phagspa"/>
+        <a:font script="Syrn" typeface="Estrangelo Edessa"/>
+        <a:font script="Syrj" typeface="Estrangelo Edessa"/>
+        <a:font script="Syre" typeface="Estrangelo Edessa"/>
+        <a:font script="Sora" typeface="Nirmala UI"/>
+        <a:font script="Tale" typeface="Microsoft Tai Le"/>
+        <a:font script="Talu" typeface="Microsoft New Tai Lue"/>
+        <a:font script="Tfng" typeface="Ebrima"/>
+      </a:majorFont>
+      <a:minorFont>
+        <a:latin typeface="Calibri" panose="020F0502020204030204"/>
+        <a:ea typeface=""/>
+        <a:cs typeface=""/>
+        <a:font script="Jpan" typeface="游ゴシック"/>
+        <a:font script="Hang" typeface="맑은 고딕"/>
+        <a:font script="Hans" typeface="等线"/>
+        <a:font script="Hant" typeface="新細明體"/>
+        <a:font script="Arab" typeface="Arial"/>
+        <a:font script="Hebr" typeface="Arial"/>
+        <a:font script="Thai" typeface="Cordia New"/>
+        <a:font script="Ethi" typeface="Nyala"/>
+        <a:font script="Beng" typeface="Vrinda"/>
+        <a:font script="Gujr" typeface="Shruti"/>
+        <a:font script="Khmr" typeface="DaunPenh"/>
+        <a:font script="Knda" typeface="Tunga"/>
+        <a:font script="Guru" typeface="Raavi"/>
+        <a:font script="Cans" typeface="Euphemia"/>
+        <a:font script="Cher" typeface="Plantagenet Cherokee"/>
+        <a:font script="Yiii" typeface="Microsoft Yi Baiti"/>
+        <a:font script="Tibt" typeface="Microsoft Himalaya"/>
+        <a:font script="Thaa" typeface="MV Boli"/>
+        <a:font script="Deva" typeface="Mangal"/>
+        <a:font script="Telu" typeface="Gautami"/>
+        <a:font script="Taml" typeface="Latha"/>
+        <a:font script="Syrc" typeface="Estrangelo Edessa"/>
+        <a:font script="Orya" typeface="Kalinga"/>
+        <a:font script="Mlym" typeface="Kartika"/>
+        <a:font script="Laoo" typeface="DokChampa"/>
+        <a:font script="Sinh" typeface="Iskoola Pota"/>
+        <a:font script="Mong" typeface="Mongolian Baiti"/>
+        <a:font script="Viet" typeface="Arial"/>
+        <a:font script="Uigh" typeface="Microsoft Uighur"/>
+        <a:font script="Geor" typeface="Sylfaen"/>
+        <a:font script="Armn" typeface="Arial"/>
+        <a:font script="Bugi" typeface="Leelawadee UI"/>
+        <a:font script="Bopo" typeface="Microsoft JhengHei"/>
+        <a:font script="Java" typeface="Javanese Text"/>
+        <a:font script="Lisu" typeface="Segoe UI"/>
+        <a:font script="Mymr" typeface="Myanmar Text"/>
+        <a:font script="Nkoo" typeface="Ebrima"/>
+        <a:font script="Olck" typeface="Nirmala UI"/>
+        <a:font script="Osma" typeface="Ebrima"/>
+        <a:font script="Phag" typeface="Phagspa"/>
+        <a:font script="Syrn" typeface="Estrangelo Edessa"/>
+        <a:font script="Syrj" typeface="Estrangelo Edessa"/>
+        <a:font script="Syre" typeface="Estrangelo Edessa"/>
+        <a:font script="Sora" typeface="Nirmala UI"/>
+        <a:font script="Tale" typeface="Microsoft Tai Le"/>
+        <a:font script="Talu" typeface="Microsoft New Tai Lue"/>
+        <a:font script="Tfng" typeface="Ebrima"/>
+      </a:minorFont>
+    </a:fontScheme>
+    <a:fmtScheme name="Office">
+      <a:fillStyleLst>
+        <a:solidFill>
+          <a:schemeClr val="phClr"/>
+        </a:solidFill>
+        <a:gradFill rotWithShape="1">
+          <a:gsLst>
+            <a:gs pos="0">
+              <a:schemeClr val="phClr">
+                <a:lumMod val="110000"/>
+                <a:satMod val="105000"/>
+                <a:tint val="67000"/>
+              </a:schemeClr>
+            </a:gs>
+            <a:gs pos="50000">
+              <a:schemeClr val="phClr">
+                <a:lumMod val="105000"/>
+                <a:satMod val="103000"/>
+                <a:tint val="73000"/>
+              </a:schemeClr>
+            </a:gs>
+            <a:gs pos="100000">
+              <a:schemeClr val="phClr">
+                <a:lumMod val="105000"/>
+                <a:satMod val="109000"/>
+                <a:tint val="81000"/>
+              </a:schemeClr>
+            </a:gs>
+          </a:gsLst>
+          <a:lin ang="5400000" scaled="0"/>
+        </a:gradFill>
+        <a:gradFill rotWithShape="1">
+          <a:gsLst>
+            <a:gs pos="0">
+              <a:schemeClr val="phClr">
+                <a:satMod val="103000"/>
+                <a:lumMod val="102000"/>
+                <a:tint val="94000"/>
+              </a:schemeClr>
+            </a:gs>
+            <a:gs pos="50000">
+              <a:schemeClr val="phClr">
+                <a:satMod val="110000"/>
+                <a:lumMod val="100000"/>
+                <a:shade val="100000"/>
+              </a:schemeClr>
+            </a:gs>
+            <a:gs pos="100000">
+              <a:schemeClr val="phClr">
+                <a:lumMod val="99000"/>
+                <a:satMod val="120000"/>
+                <a:shade val="78000"/>
+              </a:schemeClr>
+            </a:gs>
+          </a:gsLst>
+          <a:lin ang="5400000" scaled="0"/>
+        </a:gradFill>
+      </a:fillStyleLst>
+      <a:lnStyleLst>
+        <a:ln w="6350" cap="flat" cmpd="sng" algn="ctr">
+          <a:solidFill>
+            <a:schemeClr val="phClr"/>
+          </a:solidFill>
+          <a:prstDash val="solid"/>
+          <a:miter lim="800000"/>
+        </a:ln>
+        <a:ln w="12700" cap="flat" cmpd="sng" algn="ctr">
+          <a:solidFill>
+            <a:schemeClr val="phClr"/>
+          </a:solidFill>
+          <a:prstDash val="solid"/>
+          <a:miter lim="800000"/>
+        </a:ln>
+        <a:ln w="19050" cap="flat" cmpd="sng" algn="ctr">
+          <a:solidFill>
+            <a:schemeClr val="phClr"/>
+          </a:solidFill>
+          <a:prstDash val="solid"/>
+          <a:miter lim="800000"/>
+        </a:ln>
+      </a:lnStyleLst>
+      <a:effectStyleLst>
+        <a:effectStyle>
+          <a:effectLst/>
+        </a:effectStyle>
+        <a:effectStyle>
+          <a:effectLst/>
+        </a:effectStyle>
+        <a:effectStyle>
+          <a:effectLst>
+            <a:outerShdw blurRad="57150" dist="19050" dir="5400000" algn="ctr" rotWithShape="0">
+              <a:srgbClr val="000000">
+                <a:alpha val="63000"/>
+              </a:srgbClr>
+            </a:outerShdw>
+          </a:effectLst>
+        </a:effectStyle>
+      </a:effectStyleLst>
+      <a:bgFillStyleLst>
+        <a:solidFill>
+          <a:schemeClr val="phClr"/>
+        </a:solidFill>
+        <a:solidFill>
+          <a:schemeClr val="phClr">
+            <a:tint val="95000"/>
+            <a:satMod val="170000"/>
+          </a:schemeClr>
+        </a:solidFill>
+        <a:gradFill rotWithShape="1">
+          <a:gsLst>
+            <a:gs pos="0">
+              <a:schemeClr val="phClr">
+                <a:tint val="93000"/>
+                <a:satMod val="150000"/>
+                <a:shade val="98000"/>
+                <a:lumMod val="102000"/>
+              </a:schemeClr>
+            </a:gs>
+            <a:gs pos="50000">
+              <a:schemeClr val="phClr">
+                <a:tint val="98000"/>
+                <a:satMod val="130000"/>
+                <a:shade val="90000"/>
+                <a:lumMod val="103000"/>
+              </a:schemeClr>
+            </a:gs>
+            <a:gs pos="100000">
+              <a:schemeClr val="phClr">
+                <a:shade val="63000"/>
+                <a:satMod val="120000"/>
+              </a:schemeClr>
+            </a:gs>
+          </a:gsLst>
+          <a:lin ang="5400000" scaled="0"/>
+        </a:gradFill>
+      </a:bgFillStyleLst>
+    </a:fmtScheme>
+  </a:themeElements>
+  <a:objectDefaults/>
+  <a:extraClrSchemeLst/>
+  <a:extLst>
+    <a:ext uri="{05A4C25C-085E-4340-85A3-A5531E510DB2}">
+      <thm15:themeFamily xmlns:thm15="http://schemas.microsoft.com/office/thememl/2012/main" name="Office Theme" id="{62F939B6-93AF-4DB8-9C6B-D6C7DFDC589F}" vid="{4A3C46E8-61CC-4603-A589-7422A47A8E4A}"/>
+    </a:ext>
+  </a:extLst>
+</a:theme>
 </file>
</xml_diff>

<commit_message>
draft SEP V018 spec change
</commit_message>
<xml_diff>
--- a/specification/imgsrc/4.pptx
+++ b/specification/imgsrc/4.pptx
@@ -5,7 +5,7 @@
     <p:sldMasterId id="2147483648" r:id="rId1"/>
   </p:sldMasterIdLst>
   <p:notesMasterIdLst>
-    <p:notesMasterId r:id="rId8"/>
+    <p:notesMasterId r:id="rId10"/>
   </p:notesMasterIdLst>
   <p:sldIdLst>
     <p:sldId id="256" r:id="rId2"/>
@@ -14,6 +14,8 @@
     <p:sldId id="260" r:id="rId5"/>
     <p:sldId id="261" r:id="rId6"/>
     <p:sldId id="258" r:id="rId7"/>
+    <p:sldId id="262" r:id="rId8"/>
+    <p:sldId id="263" r:id="rId9"/>
   </p:sldIdLst>
   <p:sldSz cx="9144000" cy="6858000" type="screen4x3"/>
   <p:notesSz cx="6858000" cy="9144000"/>
@@ -213,7 +215,7 @@
           <a:p>
             <a:fld id="{9E808448-E5C1-6044-9A1D-E68767CBF56D}" type="datetimeFigureOut">
               <a:rPr lang="en-US" smtClean="0"/>
-              <a:t>11/4/18</a:t>
+              <a:t>10/5/19</a:t>
             </a:fld>
             <a:endParaRPr lang="en-US"/>
           </a:p>
@@ -743,7 +745,7 @@
           <a:p>
             <a:fld id="{EBC7FFC8-011D-1246-B320-9C4FD100F423}" type="datetimeFigureOut">
               <a:rPr lang="en-US" smtClean="0"/>
-              <a:t>11/4/18</a:t>
+              <a:t>10/5/19</a:t>
             </a:fld>
             <a:endParaRPr lang="en-US"/>
           </a:p>
@@ -911,7 +913,7 @@
           <a:p>
             <a:fld id="{EBC7FFC8-011D-1246-B320-9C4FD100F423}" type="datetimeFigureOut">
               <a:rPr lang="en-US" smtClean="0"/>
-              <a:t>11/4/18</a:t>
+              <a:t>10/5/19</a:t>
             </a:fld>
             <a:endParaRPr lang="en-US"/>
           </a:p>
@@ -1089,7 +1091,7 @@
           <a:p>
             <a:fld id="{EBC7FFC8-011D-1246-B320-9C4FD100F423}" type="datetimeFigureOut">
               <a:rPr lang="en-US" smtClean="0"/>
-              <a:t>11/4/18</a:t>
+              <a:t>10/5/19</a:t>
             </a:fld>
             <a:endParaRPr lang="en-US"/>
           </a:p>
@@ -1257,7 +1259,7 @@
           <a:p>
             <a:fld id="{EBC7FFC8-011D-1246-B320-9C4FD100F423}" type="datetimeFigureOut">
               <a:rPr lang="en-US" smtClean="0"/>
-              <a:t>11/4/18</a:t>
+              <a:t>10/5/19</a:t>
             </a:fld>
             <a:endParaRPr lang="en-US"/>
           </a:p>
@@ -1502,7 +1504,7 @@
           <a:p>
             <a:fld id="{EBC7FFC8-011D-1246-B320-9C4FD100F423}" type="datetimeFigureOut">
               <a:rPr lang="en-US" smtClean="0"/>
-              <a:t>11/4/18</a:t>
+              <a:t>10/5/19</a:t>
             </a:fld>
             <a:endParaRPr lang="en-US"/>
           </a:p>
@@ -1787,7 +1789,7 @@
           <a:p>
             <a:fld id="{EBC7FFC8-011D-1246-B320-9C4FD100F423}" type="datetimeFigureOut">
               <a:rPr lang="en-US" smtClean="0"/>
-              <a:t>11/4/18</a:t>
+              <a:t>10/5/19</a:t>
             </a:fld>
             <a:endParaRPr lang="en-US"/>
           </a:p>
@@ -2206,7 +2208,7 @@
           <a:p>
             <a:fld id="{EBC7FFC8-011D-1246-B320-9C4FD100F423}" type="datetimeFigureOut">
               <a:rPr lang="en-US" smtClean="0"/>
-              <a:t>11/4/18</a:t>
+              <a:t>10/5/19</a:t>
             </a:fld>
             <a:endParaRPr lang="en-US"/>
           </a:p>
@@ -2323,7 +2325,7 @@
           <a:p>
             <a:fld id="{EBC7FFC8-011D-1246-B320-9C4FD100F423}" type="datetimeFigureOut">
               <a:rPr lang="en-US" smtClean="0"/>
-              <a:t>11/4/18</a:t>
+              <a:t>10/5/19</a:t>
             </a:fld>
             <a:endParaRPr lang="en-US"/>
           </a:p>
@@ -2418,7 +2420,7 @@
           <a:p>
             <a:fld id="{EBC7FFC8-011D-1246-B320-9C4FD100F423}" type="datetimeFigureOut">
               <a:rPr lang="en-US" smtClean="0"/>
-              <a:t>11/4/18</a:t>
+              <a:t>10/5/19</a:t>
             </a:fld>
             <a:endParaRPr lang="en-US"/>
           </a:p>
@@ -2693,7 +2695,7 @@
           <a:p>
             <a:fld id="{EBC7FFC8-011D-1246-B320-9C4FD100F423}" type="datetimeFigureOut">
               <a:rPr lang="en-US" smtClean="0"/>
-              <a:t>11/4/18</a:t>
+              <a:t>10/5/19</a:t>
             </a:fld>
             <a:endParaRPr lang="en-US"/>
           </a:p>
@@ -2945,7 +2947,7 @@
           <a:p>
             <a:fld id="{EBC7FFC8-011D-1246-B320-9C4FD100F423}" type="datetimeFigureOut">
               <a:rPr lang="en-US" smtClean="0"/>
-              <a:t>11/4/18</a:t>
+              <a:t>10/5/19</a:t>
             </a:fld>
             <a:endParaRPr lang="en-US"/>
           </a:p>
@@ -3156,7 +3158,7 @@
           <a:p>
             <a:fld id="{EBC7FFC8-011D-1246-B320-9C4FD100F423}" type="datetimeFigureOut">
               <a:rPr lang="en-US" smtClean="0"/>
-              <a:t>11/4/18</a:t>
+              <a:t>10/5/19</a:t>
             </a:fld>
             <a:endParaRPr lang="en-US"/>
           </a:p>
@@ -12723,6 +12725,4012 @@
 </p:sld>
 </file>
 
+<file path=ppt/slides/slide7.xml><?xml version="1.0" encoding="utf-8"?>
+<p:sld xmlns:a="http://schemas.openxmlformats.org/drawingml/2006/main" xmlns:r="http://schemas.openxmlformats.org/officeDocument/2006/relationships" xmlns:p="http://schemas.openxmlformats.org/presentationml/2006/main">
+  <p:cSld>
+    <p:spTree>
+      <p:nvGrpSpPr>
+        <p:cNvPr id="1" name=""/>
+        <p:cNvGrpSpPr/>
+        <p:nvPr/>
+      </p:nvGrpSpPr>
+      <p:grpSpPr>
+        <a:xfrm>
+          <a:off x="0" y="0"/>
+          <a:ext cx="0" cy="0"/>
+          <a:chOff x="0" y="0"/>
+          <a:chExt cx="0" cy="0"/>
+        </a:xfrm>
+      </p:grpSpPr>
+      <p:sp>
+        <p:nvSpPr>
+          <p:cNvPr id="67" name="TextBox 66"/>
+          <p:cNvSpPr txBox="1"/>
+          <p:nvPr/>
+        </p:nvSpPr>
+        <p:spPr>
+          <a:xfrm>
+            <a:off x="139700" y="165100"/>
+            <a:ext cx="720069" cy="369332"/>
+          </a:xfrm>
+          <a:prstGeom prst="rect">
+            <a:avLst/>
+          </a:prstGeom>
+          <a:noFill/>
+        </p:spPr>
+        <p:txBody>
+          <a:bodyPr wrap="none" rtlCol="0">
+            <a:spAutoFit/>
+          </a:bodyPr>
+          <a:lstStyle/>
+          <a:p>
+            <a:r>
+              <a:rPr lang="en-US" dirty="0"/>
+              <a:t>4e-ab</a:t>
+            </a:r>
+          </a:p>
+        </p:txBody>
+      </p:sp>
+      <p:sp>
+        <p:nvSpPr>
+          <p:cNvPr id="43" name="TextBox 42"/>
+          <p:cNvSpPr txBox="1"/>
+          <p:nvPr/>
+        </p:nvSpPr>
+        <p:spPr>
+          <a:xfrm>
+            <a:off x="2736937" y="324200"/>
+            <a:ext cx="633507" cy="369332"/>
+          </a:xfrm>
+          <a:prstGeom prst="rect">
+            <a:avLst/>
+          </a:prstGeom>
+          <a:noFill/>
+        </p:spPr>
+        <p:txBody>
+          <a:bodyPr wrap="none" rtlCol="0">
+            <a:spAutoFit/>
+          </a:bodyPr>
+          <a:lstStyle/>
+          <a:p>
+            <a:r>
+              <a:rPr lang="en-US" dirty="0"/>
+              <a:t>MAY</a:t>
+            </a:r>
+          </a:p>
+        </p:txBody>
+      </p:sp>
+      <p:grpSp>
+        <p:nvGrpSpPr>
+          <p:cNvPr id="3" name="Group 2">
+            <a:extLst>
+              <a:ext uri="{FF2B5EF4-FFF2-40B4-BE49-F238E27FC236}">
+                <a16:creationId xmlns:a16="http://schemas.microsoft.com/office/drawing/2014/main" id="{01A052B2-298B-9C40-8C96-ADD836CAFCE1}"/>
+              </a:ext>
+            </a:extLst>
+          </p:cNvPr>
+          <p:cNvGrpSpPr/>
+          <p:nvPr/>
+        </p:nvGrpSpPr>
+        <p:grpSpPr>
+          <a:xfrm>
+            <a:off x="451212" y="1259352"/>
+            <a:ext cx="8416471" cy="1920082"/>
+            <a:chOff x="451212" y="534432"/>
+            <a:chExt cx="8416471" cy="1920082"/>
+          </a:xfrm>
+        </p:grpSpPr>
+        <p:cxnSp>
+          <p:nvCxnSpPr>
+            <p:cNvPr id="99" name="Straight Arrow Connector 5">
+              <a:extLst>
+                <a:ext uri="{FF2B5EF4-FFF2-40B4-BE49-F238E27FC236}">
+                  <a16:creationId xmlns:a16="http://schemas.microsoft.com/office/drawing/2014/main" id="{AC10A760-BF4D-DB4A-9E3F-70C1A6C16040}"/>
+                </a:ext>
+              </a:extLst>
+            </p:cNvPr>
+            <p:cNvCxnSpPr>
+              <a:cxnSpLocks/>
+              <a:endCxn id="97" idx="0"/>
+            </p:cNvCxnSpPr>
+            <p:nvPr/>
+          </p:nvCxnSpPr>
+          <p:spPr>
+            <a:xfrm flipV="1">
+              <a:off x="5095644" y="1796957"/>
+              <a:ext cx="1439006" cy="343873"/>
+            </a:xfrm>
+            <a:prstGeom prst="bentConnector4">
+              <a:avLst>
+                <a:gd name="adj1" fmla="val 20"/>
+                <a:gd name="adj2" fmla="val 166478"/>
+              </a:avLst>
+            </a:prstGeom>
+            <a:ln>
+              <a:solidFill>
+                <a:srgbClr val="FF0000"/>
+              </a:solidFill>
+              <a:headEnd type="none"/>
+              <a:tailEnd type="none"/>
+            </a:ln>
+            <a:effectLst/>
+          </p:spPr>
+          <p:style>
+            <a:lnRef idx="2">
+              <a:schemeClr val="accent1"/>
+            </a:lnRef>
+            <a:fillRef idx="0">
+              <a:schemeClr val="accent1"/>
+            </a:fillRef>
+            <a:effectRef idx="1">
+              <a:schemeClr val="accent1"/>
+            </a:effectRef>
+            <a:fontRef idx="minor">
+              <a:schemeClr val="tx1"/>
+            </a:fontRef>
+          </p:style>
+        </p:cxnSp>
+        <p:cxnSp>
+          <p:nvCxnSpPr>
+            <p:cNvPr id="38" name="Straight Arrow Connector 5"/>
+            <p:cNvCxnSpPr>
+              <a:cxnSpLocks/>
+            </p:cNvCxnSpPr>
+            <p:nvPr/>
+          </p:nvCxnSpPr>
+          <p:spPr>
+            <a:xfrm flipV="1">
+              <a:off x="2249000" y="1566880"/>
+              <a:ext cx="2846644" cy="578944"/>
+            </a:xfrm>
+            <a:prstGeom prst="bentConnector3">
+              <a:avLst>
+                <a:gd name="adj1" fmla="val 203"/>
+              </a:avLst>
+            </a:prstGeom>
+            <a:ln>
+              <a:solidFill>
+                <a:srgbClr val="FF0000"/>
+              </a:solidFill>
+              <a:headEnd type="none"/>
+              <a:tailEnd type="none"/>
+            </a:ln>
+            <a:effectLst/>
+          </p:spPr>
+          <p:style>
+            <a:lnRef idx="2">
+              <a:schemeClr val="accent1"/>
+            </a:lnRef>
+            <a:fillRef idx="0">
+              <a:schemeClr val="accent1"/>
+            </a:fillRef>
+            <a:effectRef idx="1">
+              <a:schemeClr val="accent1"/>
+            </a:effectRef>
+            <a:fontRef idx="minor">
+              <a:schemeClr val="tx1"/>
+            </a:fontRef>
+          </p:style>
+        </p:cxnSp>
+        <p:cxnSp>
+          <p:nvCxnSpPr>
+            <p:cNvPr id="39" name="Straight Connector 38"/>
+            <p:cNvCxnSpPr/>
+            <p:nvPr/>
+          </p:nvCxnSpPr>
+          <p:spPr>
+            <a:xfrm>
+              <a:off x="6439400" y="1797802"/>
+              <a:ext cx="190500" cy="0"/>
+            </a:xfrm>
+            <a:prstGeom prst="line">
+              <a:avLst/>
+            </a:prstGeom>
+            <a:ln>
+              <a:solidFill>
+                <a:srgbClr val="FF0000"/>
+              </a:solidFill>
+            </a:ln>
+            <a:effectLst/>
+          </p:spPr>
+          <p:style>
+            <a:lnRef idx="2">
+              <a:schemeClr val="accent1"/>
+            </a:lnRef>
+            <a:fillRef idx="0">
+              <a:schemeClr val="accent1"/>
+            </a:fillRef>
+            <a:effectRef idx="1">
+              <a:schemeClr val="accent1"/>
+            </a:effectRef>
+            <a:fontRef idx="minor">
+              <a:schemeClr val="tx1"/>
+            </a:fontRef>
+          </p:style>
+        </p:cxnSp>
+        <p:grpSp>
+          <p:nvGrpSpPr>
+            <p:cNvPr id="2" name="Group 1">
+              <a:extLst>
+                <a:ext uri="{FF2B5EF4-FFF2-40B4-BE49-F238E27FC236}">
+                  <a16:creationId xmlns:a16="http://schemas.microsoft.com/office/drawing/2014/main" id="{651CB433-FCA4-2142-9F1D-11A6AF7DF91D}"/>
+                </a:ext>
+              </a:extLst>
+            </p:cNvPr>
+            <p:cNvGrpSpPr/>
+            <p:nvPr/>
+          </p:nvGrpSpPr>
+          <p:grpSpPr>
+            <a:xfrm>
+              <a:off x="451212" y="1796957"/>
+              <a:ext cx="8416471" cy="657557"/>
+              <a:chOff x="139700" y="1207886"/>
+              <a:chExt cx="12901942" cy="1007995"/>
+            </a:xfrm>
+          </p:grpSpPr>
+          <p:grpSp>
+            <p:nvGrpSpPr>
+              <p:cNvPr id="60" name="Group 59"/>
+              <p:cNvGrpSpPr/>
+              <p:nvPr/>
+            </p:nvGrpSpPr>
+            <p:grpSpPr>
+              <a:xfrm>
+                <a:off x="139700" y="1212336"/>
+                <a:ext cx="4196538" cy="1003545"/>
+                <a:chOff x="2569133" y="413397"/>
+                <a:chExt cx="4196538" cy="1003545"/>
+              </a:xfrm>
+            </p:grpSpPr>
+            <p:cxnSp>
+              <p:nvCxnSpPr>
+                <p:cNvPr id="64" name="Straight Connector 63"/>
+                <p:cNvCxnSpPr/>
+                <p:nvPr/>
+              </p:nvCxnSpPr>
+              <p:spPr>
+                <a:xfrm>
+                  <a:off x="2569133" y="1140336"/>
+                  <a:ext cx="4191000" cy="0"/>
+                </a:xfrm>
+                <a:prstGeom prst="line">
+                  <a:avLst/>
+                </a:prstGeom>
+                <a:ln w="38100" cap="flat" cmpd="sng" algn="ctr">
+                  <a:solidFill>
+                    <a:srgbClr val="000000"/>
+                  </a:solidFill>
+                  <a:prstDash val="solid"/>
+                  <a:round/>
+                  <a:headEnd type="none" w="med" len="med"/>
+                  <a:tailEnd type="none" w="med" len="med"/>
+                </a:ln>
+                <a:effectLst/>
+              </p:spPr>
+              <p:style>
+                <a:lnRef idx="2">
+                  <a:schemeClr val="accent1"/>
+                </a:lnRef>
+                <a:fillRef idx="0">
+                  <a:schemeClr val="accent1"/>
+                </a:fillRef>
+                <a:effectRef idx="1">
+                  <a:schemeClr val="accent1"/>
+                </a:effectRef>
+                <a:fontRef idx="minor">
+                  <a:schemeClr val="tx1"/>
+                </a:fontRef>
+              </p:style>
+            </p:cxnSp>
+            <p:sp>
+              <p:nvSpPr>
+                <p:cNvPr id="65" name="Right Arrow 64"/>
+                <p:cNvSpPr/>
+                <p:nvPr/>
+              </p:nvSpPr>
+              <p:spPr>
+                <a:xfrm>
+                  <a:off x="4740833" y="949836"/>
+                  <a:ext cx="1168400" cy="350140"/>
+                </a:xfrm>
+                <a:prstGeom prst="rightArrow">
+                  <a:avLst>
+                    <a:gd name="adj1" fmla="val 100000"/>
+                    <a:gd name="adj2" fmla="val 52194"/>
+                  </a:avLst>
+                </a:prstGeom>
+                <a:solidFill>
+                  <a:schemeClr val="accent2"/>
+                </a:solidFill>
+                <a:ln w="38100" cap="flat" cmpd="sng" algn="ctr">
+                  <a:solidFill>
+                    <a:srgbClr val="000000"/>
+                  </a:solidFill>
+                  <a:prstDash val="solid"/>
+                  <a:round/>
+                  <a:headEnd type="none" w="med" len="med"/>
+                  <a:tailEnd type="none" w="med" len="med"/>
+                </a:ln>
+                <a:effectLst/>
+              </p:spPr>
+              <p:style>
+                <a:lnRef idx="1">
+                  <a:schemeClr val="accent1"/>
+                </a:lnRef>
+                <a:fillRef idx="3">
+                  <a:schemeClr val="accent1"/>
+                </a:fillRef>
+                <a:effectRef idx="2">
+                  <a:schemeClr val="accent1"/>
+                </a:effectRef>
+                <a:fontRef idx="minor">
+                  <a:schemeClr val="lt1"/>
+                </a:fontRef>
+              </p:style>
+              <p:txBody>
+                <a:bodyPr rtlCol="0" anchor="ctr"/>
+                <a:lstStyle/>
+                <a:p>
+                  <a:pPr algn="ctr"/>
+                  <a:endParaRPr lang="en-US" i="1" dirty="0">
+                    <a:solidFill>
+                      <a:schemeClr val="tx1"/>
+                    </a:solidFill>
+                  </a:endParaRPr>
+                </a:p>
+              </p:txBody>
+            </p:sp>
+            <p:sp>
+              <p:nvSpPr>
+                <p:cNvPr id="68" name="Chord 67"/>
+                <p:cNvSpPr/>
+                <p:nvPr/>
+              </p:nvSpPr>
+              <p:spPr>
+                <a:xfrm>
+                  <a:off x="3734347" y="784736"/>
+                  <a:ext cx="632206" cy="632206"/>
+                </a:xfrm>
+                <a:prstGeom prst="chord">
+                  <a:avLst>
+                    <a:gd name="adj1" fmla="val 10506229"/>
+                    <a:gd name="adj2" fmla="val 301460"/>
+                  </a:avLst>
+                </a:prstGeom>
+                <a:solidFill>
+                  <a:schemeClr val="accent4">
+                    <a:lumMod val="60000"/>
+                    <a:lumOff val="40000"/>
+                  </a:schemeClr>
+                </a:solidFill>
+                <a:ln w="38100" cap="flat" cmpd="sng" algn="ctr">
+                  <a:solidFill>
+                    <a:srgbClr val="000000"/>
+                  </a:solidFill>
+                  <a:prstDash val="solid"/>
+                  <a:round/>
+                  <a:headEnd type="none" w="med" len="med"/>
+                  <a:tailEnd type="none" w="med" len="med"/>
+                </a:ln>
+                <a:effectLst/>
+              </p:spPr>
+              <p:style>
+                <a:lnRef idx="1">
+                  <a:schemeClr val="accent1"/>
+                </a:lnRef>
+                <a:fillRef idx="3">
+                  <a:schemeClr val="accent1"/>
+                </a:fillRef>
+                <a:effectRef idx="2">
+                  <a:schemeClr val="accent1"/>
+                </a:effectRef>
+                <a:fontRef idx="minor">
+                  <a:schemeClr val="lt1"/>
+                </a:fontRef>
+              </p:style>
+              <p:txBody>
+                <a:bodyPr rtlCol="0" anchor="ctr"/>
+                <a:lstStyle/>
+                <a:p>
+                  <a:pPr algn="ctr"/>
+                  <a:endParaRPr lang="en-US"/>
+                </a:p>
+              </p:txBody>
+            </p:sp>
+            <p:pic>
+              <p:nvPicPr>
+                <p:cNvPr id="69" name="Picture 68"/>
+                <p:cNvPicPr>
+                  <a:picLocks noChangeAspect="1"/>
+                </p:cNvPicPr>
+                <p:nvPr/>
+              </p:nvPicPr>
+              <p:blipFill>
+                <a:blip r:embed="rId2">
+                  <a:extLst>
+                    <a:ext uri="{28A0092B-C50C-407E-A947-70E740481C1C}">
+                      <a14:useLocalDpi xmlns:a14="http://schemas.microsoft.com/office/drawing/2010/main" val="0"/>
+                    </a:ext>
+                  </a:extLst>
+                </a:blip>
+                <a:stretch>
+                  <a:fillRect/>
+                </a:stretch>
+              </p:blipFill>
+              <p:spPr>
+                <a:xfrm>
+                  <a:off x="2803319" y="413397"/>
+                  <a:ext cx="771908" cy="771908"/>
+                </a:xfrm>
+                <a:prstGeom prst="rect">
+                  <a:avLst/>
+                </a:prstGeom>
+              </p:spPr>
+            </p:pic>
+            <p:pic>
+              <p:nvPicPr>
+                <p:cNvPr id="70" name="Picture 69"/>
+                <p:cNvPicPr>
+                  <a:picLocks noChangeAspect="1"/>
+                </p:cNvPicPr>
+                <p:nvPr/>
+              </p:nvPicPr>
+              <p:blipFill>
+                <a:blip r:embed="rId3">
+                  <a:extLst>
+                    <a:ext uri="{28A0092B-C50C-407E-A947-70E740481C1C}">
+                      <a14:useLocalDpi xmlns:a14="http://schemas.microsoft.com/office/drawing/2010/main" val="0"/>
+                    </a:ext>
+                  </a:extLst>
+                </a:blip>
+                <a:stretch>
+                  <a:fillRect/>
+                </a:stretch>
+              </p:blipFill>
+              <p:spPr>
+                <a:xfrm>
+                  <a:off x="5971536" y="499461"/>
+                  <a:ext cx="794135" cy="794135"/>
+                </a:xfrm>
+                <a:prstGeom prst="rect">
+                  <a:avLst/>
+                </a:prstGeom>
+              </p:spPr>
+            </p:pic>
+          </p:grpSp>
+          <p:grpSp>
+            <p:nvGrpSpPr>
+              <p:cNvPr id="61" name="Group 60">
+                <a:extLst>
+                  <a:ext uri="{FF2B5EF4-FFF2-40B4-BE49-F238E27FC236}">
+                    <a16:creationId xmlns:a16="http://schemas.microsoft.com/office/drawing/2014/main" id="{5F0A003D-F3D5-BE4D-98A5-E28807500151}"/>
+                  </a:ext>
+                </a:extLst>
+              </p:cNvPr>
+              <p:cNvGrpSpPr/>
+              <p:nvPr/>
+            </p:nvGrpSpPr>
+            <p:grpSpPr>
+              <a:xfrm>
+                <a:off x="4489820" y="1207886"/>
+                <a:ext cx="4196538" cy="1003545"/>
+                <a:chOff x="2569133" y="413397"/>
+                <a:chExt cx="4196538" cy="1003545"/>
+              </a:xfrm>
+            </p:grpSpPr>
+            <p:cxnSp>
+              <p:nvCxnSpPr>
+                <p:cNvPr id="62" name="Straight Connector 61">
+                  <a:extLst>
+                    <a:ext uri="{FF2B5EF4-FFF2-40B4-BE49-F238E27FC236}">
+                      <a16:creationId xmlns:a16="http://schemas.microsoft.com/office/drawing/2014/main" id="{0C636ACD-E0DD-D742-BD04-B2971D284046}"/>
+                    </a:ext>
+                  </a:extLst>
+                </p:cNvPr>
+                <p:cNvCxnSpPr/>
+                <p:nvPr/>
+              </p:nvCxnSpPr>
+              <p:spPr>
+                <a:xfrm>
+                  <a:off x="2569133" y="1140336"/>
+                  <a:ext cx="4191000" cy="0"/>
+                </a:xfrm>
+                <a:prstGeom prst="line">
+                  <a:avLst/>
+                </a:prstGeom>
+                <a:ln w="38100" cap="flat" cmpd="sng" algn="ctr">
+                  <a:solidFill>
+                    <a:srgbClr val="000000"/>
+                  </a:solidFill>
+                  <a:prstDash val="solid"/>
+                  <a:round/>
+                  <a:headEnd type="none" w="med" len="med"/>
+                  <a:tailEnd type="none" w="med" len="med"/>
+                </a:ln>
+                <a:effectLst/>
+              </p:spPr>
+              <p:style>
+                <a:lnRef idx="2">
+                  <a:schemeClr val="accent1"/>
+                </a:lnRef>
+                <a:fillRef idx="0">
+                  <a:schemeClr val="accent1"/>
+                </a:fillRef>
+                <a:effectRef idx="1">
+                  <a:schemeClr val="accent1"/>
+                </a:effectRef>
+                <a:fontRef idx="minor">
+                  <a:schemeClr val="tx1"/>
+                </a:fontRef>
+              </p:style>
+            </p:cxnSp>
+            <p:sp>
+              <p:nvSpPr>
+                <p:cNvPr id="89" name="Right Arrow 88">
+                  <a:extLst>
+                    <a:ext uri="{FF2B5EF4-FFF2-40B4-BE49-F238E27FC236}">
+                      <a16:creationId xmlns:a16="http://schemas.microsoft.com/office/drawing/2014/main" id="{FC66DEAD-CBAB-6147-969A-1D54C4F7643B}"/>
+                    </a:ext>
+                  </a:extLst>
+                </p:cNvPr>
+                <p:cNvSpPr/>
+                <p:nvPr/>
+              </p:nvSpPr>
+              <p:spPr>
+                <a:xfrm>
+                  <a:off x="4740833" y="949836"/>
+                  <a:ext cx="1168400" cy="350140"/>
+                </a:xfrm>
+                <a:prstGeom prst="rightArrow">
+                  <a:avLst>
+                    <a:gd name="adj1" fmla="val 100000"/>
+                    <a:gd name="adj2" fmla="val 52194"/>
+                  </a:avLst>
+                </a:prstGeom>
+                <a:solidFill>
+                  <a:schemeClr val="accent2"/>
+                </a:solidFill>
+                <a:ln w="38100" cap="flat" cmpd="sng" algn="ctr">
+                  <a:solidFill>
+                    <a:srgbClr val="000000"/>
+                  </a:solidFill>
+                  <a:prstDash val="solid"/>
+                  <a:round/>
+                  <a:headEnd type="none" w="med" len="med"/>
+                  <a:tailEnd type="none" w="med" len="med"/>
+                </a:ln>
+                <a:effectLst/>
+              </p:spPr>
+              <p:style>
+                <a:lnRef idx="1">
+                  <a:schemeClr val="accent1"/>
+                </a:lnRef>
+                <a:fillRef idx="3">
+                  <a:schemeClr val="accent1"/>
+                </a:fillRef>
+                <a:effectRef idx="2">
+                  <a:schemeClr val="accent1"/>
+                </a:effectRef>
+                <a:fontRef idx="minor">
+                  <a:schemeClr val="lt1"/>
+                </a:fontRef>
+              </p:style>
+              <p:txBody>
+                <a:bodyPr rtlCol="0" anchor="ctr"/>
+                <a:lstStyle/>
+                <a:p>
+                  <a:pPr algn="ctr"/>
+                  <a:endParaRPr lang="en-US" i="1" dirty="0">
+                    <a:solidFill>
+                      <a:schemeClr val="tx1"/>
+                    </a:solidFill>
+                  </a:endParaRPr>
+                </a:p>
+              </p:txBody>
+            </p:sp>
+            <p:sp>
+              <p:nvSpPr>
+                <p:cNvPr id="90" name="Chord 89">
+                  <a:extLst>
+                    <a:ext uri="{FF2B5EF4-FFF2-40B4-BE49-F238E27FC236}">
+                      <a16:creationId xmlns:a16="http://schemas.microsoft.com/office/drawing/2014/main" id="{F8E252DC-2D99-2F4B-B8AD-22AF82DA93BC}"/>
+                    </a:ext>
+                  </a:extLst>
+                </p:cNvPr>
+                <p:cNvSpPr/>
+                <p:nvPr/>
+              </p:nvSpPr>
+              <p:spPr>
+                <a:xfrm>
+                  <a:off x="3734347" y="784736"/>
+                  <a:ext cx="632206" cy="632206"/>
+                </a:xfrm>
+                <a:prstGeom prst="chord">
+                  <a:avLst>
+                    <a:gd name="adj1" fmla="val 10506229"/>
+                    <a:gd name="adj2" fmla="val 301460"/>
+                  </a:avLst>
+                </a:prstGeom>
+                <a:solidFill>
+                  <a:schemeClr val="accent4">
+                    <a:lumMod val="60000"/>
+                    <a:lumOff val="40000"/>
+                  </a:schemeClr>
+                </a:solidFill>
+                <a:ln w="38100" cap="flat" cmpd="sng" algn="ctr">
+                  <a:solidFill>
+                    <a:srgbClr val="000000"/>
+                  </a:solidFill>
+                  <a:prstDash val="solid"/>
+                  <a:round/>
+                  <a:headEnd type="none" w="med" len="med"/>
+                  <a:tailEnd type="none" w="med" len="med"/>
+                </a:ln>
+                <a:effectLst/>
+              </p:spPr>
+              <p:style>
+                <a:lnRef idx="1">
+                  <a:schemeClr val="accent1"/>
+                </a:lnRef>
+                <a:fillRef idx="3">
+                  <a:schemeClr val="accent1"/>
+                </a:fillRef>
+                <a:effectRef idx="2">
+                  <a:schemeClr val="accent1"/>
+                </a:effectRef>
+                <a:fontRef idx="minor">
+                  <a:schemeClr val="lt1"/>
+                </a:fontRef>
+              </p:style>
+              <p:txBody>
+                <a:bodyPr rtlCol="0" anchor="ctr"/>
+                <a:lstStyle/>
+                <a:p>
+                  <a:pPr algn="ctr"/>
+                  <a:endParaRPr lang="en-US"/>
+                </a:p>
+              </p:txBody>
+            </p:sp>
+            <p:pic>
+              <p:nvPicPr>
+                <p:cNvPr id="91" name="Picture 90">
+                  <a:extLst>
+                    <a:ext uri="{FF2B5EF4-FFF2-40B4-BE49-F238E27FC236}">
+                      <a16:creationId xmlns:a16="http://schemas.microsoft.com/office/drawing/2014/main" id="{0DC979EE-EBE8-BD4E-B309-79F868E205FC}"/>
+                    </a:ext>
+                  </a:extLst>
+                </p:cNvPr>
+                <p:cNvPicPr>
+                  <a:picLocks noChangeAspect="1"/>
+                </p:cNvPicPr>
+                <p:nvPr/>
+              </p:nvPicPr>
+              <p:blipFill>
+                <a:blip r:embed="rId2">
+                  <a:extLst>
+                    <a:ext uri="{28A0092B-C50C-407E-A947-70E740481C1C}">
+                      <a14:useLocalDpi xmlns:a14="http://schemas.microsoft.com/office/drawing/2010/main" val="0"/>
+                    </a:ext>
+                  </a:extLst>
+                </a:blip>
+                <a:stretch>
+                  <a:fillRect/>
+                </a:stretch>
+              </p:blipFill>
+              <p:spPr>
+                <a:xfrm>
+                  <a:off x="2803319" y="413397"/>
+                  <a:ext cx="771908" cy="771908"/>
+                </a:xfrm>
+                <a:prstGeom prst="rect">
+                  <a:avLst/>
+                </a:prstGeom>
+              </p:spPr>
+            </p:pic>
+            <p:pic>
+              <p:nvPicPr>
+                <p:cNvPr id="92" name="Picture 91">
+                  <a:extLst>
+                    <a:ext uri="{FF2B5EF4-FFF2-40B4-BE49-F238E27FC236}">
+                      <a16:creationId xmlns:a16="http://schemas.microsoft.com/office/drawing/2014/main" id="{856B719D-280C-694D-BF91-6EF2371F280E}"/>
+                    </a:ext>
+                  </a:extLst>
+                </p:cNvPr>
+                <p:cNvPicPr>
+                  <a:picLocks noChangeAspect="1"/>
+                </p:cNvPicPr>
+                <p:nvPr/>
+              </p:nvPicPr>
+              <p:blipFill>
+                <a:blip r:embed="rId3">
+                  <a:extLst>
+                    <a:ext uri="{28A0092B-C50C-407E-A947-70E740481C1C}">
+                      <a14:useLocalDpi xmlns:a14="http://schemas.microsoft.com/office/drawing/2010/main" val="0"/>
+                    </a:ext>
+                  </a:extLst>
+                </a:blip>
+                <a:stretch>
+                  <a:fillRect/>
+                </a:stretch>
+              </p:blipFill>
+              <p:spPr>
+                <a:xfrm>
+                  <a:off x="5971536" y="499461"/>
+                  <a:ext cx="794135" cy="794135"/>
+                </a:xfrm>
+                <a:prstGeom prst="rect">
+                  <a:avLst/>
+                </a:prstGeom>
+              </p:spPr>
+            </p:pic>
+          </p:grpSp>
+          <p:grpSp>
+            <p:nvGrpSpPr>
+              <p:cNvPr id="93" name="Group 92">
+                <a:extLst>
+                  <a:ext uri="{FF2B5EF4-FFF2-40B4-BE49-F238E27FC236}">
+                    <a16:creationId xmlns:a16="http://schemas.microsoft.com/office/drawing/2014/main" id="{F6D9AAC4-C17D-AA44-8CBA-DF73264BB433}"/>
+                  </a:ext>
+                </a:extLst>
+              </p:cNvPr>
+              <p:cNvGrpSpPr/>
+              <p:nvPr/>
+            </p:nvGrpSpPr>
+            <p:grpSpPr>
+              <a:xfrm>
+                <a:off x="8845104" y="1207886"/>
+                <a:ext cx="4196538" cy="1003545"/>
+                <a:chOff x="2569133" y="413397"/>
+                <a:chExt cx="4196538" cy="1003545"/>
+              </a:xfrm>
+            </p:grpSpPr>
+            <p:cxnSp>
+              <p:nvCxnSpPr>
+                <p:cNvPr id="94" name="Straight Connector 93">
+                  <a:extLst>
+                    <a:ext uri="{FF2B5EF4-FFF2-40B4-BE49-F238E27FC236}">
+                      <a16:creationId xmlns:a16="http://schemas.microsoft.com/office/drawing/2014/main" id="{AC6E8ADE-C851-B34F-B92B-8A7DB23E7D9A}"/>
+                    </a:ext>
+                  </a:extLst>
+                </p:cNvPr>
+                <p:cNvCxnSpPr/>
+                <p:nvPr/>
+              </p:nvCxnSpPr>
+              <p:spPr>
+                <a:xfrm>
+                  <a:off x="2569133" y="1140336"/>
+                  <a:ext cx="4191000" cy="0"/>
+                </a:xfrm>
+                <a:prstGeom prst="line">
+                  <a:avLst/>
+                </a:prstGeom>
+                <a:ln w="38100" cap="flat" cmpd="sng" algn="ctr">
+                  <a:solidFill>
+                    <a:srgbClr val="000000"/>
+                  </a:solidFill>
+                  <a:prstDash val="solid"/>
+                  <a:round/>
+                  <a:headEnd type="none" w="med" len="med"/>
+                  <a:tailEnd type="none" w="med" len="med"/>
+                </a:ln>
+                <a:effectLst/>
+              </p:spPr>
+              <p:style>
+                <a:lnRef idx="2">
+                  <a:schemeClr val="accent1"/>
+                </a:lnRef>
+                <a:fillRef idx="0">
+                  <a:schemeClr val="accent1"/>
+                </a:fillRef>
+                <a:effectRef idx="1">
+                  <a:schemeClr val="accent1"/>
+                </a:effectRef>
+                <a:fontRef idx="minor">
+                  <a:schemeClr val="tx1"/>
+                </a:fontRef>
+              </p:style>
+            </p:cxnSp>
+            <p:sp>
+              <p:nvSpPr>
+                <p:cNvPr id="95" name="Right Arrow 94">
+                  <a:extLst>
+                    <a:ext uri="{FF2B5EF4-FFF2-40B4-BE49-F238E27FC236}">
+                      <a16:creationId xmlns:a16="http://schemas.microsoft.com/office/drawing/2014/main" id="{833F9E49-A69A-AD49-8120-EB62256129F7}"/>
+                    </a:ext>
+                  </a:extLst>
+                </p:cNvPr>
+                <p:cNvSpPr/>
+                <p:nvPr/>
+              </p:nvSpPr>
+              <p:spPr>
+                <a:xfrm>
+                  <a:off x="4740833" y="949836"/>
+                  <a:ext cx="1168400" cy="350140"/>
+                </a:xfrm>
+                <a:prstGeom prst="rightArrow">
+                  <a:avLst>
+                    <a:gd name="adj1" fmla="val 100000"/>
+                    <a:gd name="adj2" fmla="val 52194"/>
+                  </a:avLst>
+                </a:prstGeom>
+                <a:solidFill>
+                  <a:srgbClr val="92D050"/>
+                </a:solidFill>
+                <a:ln w="38100" cap="flat" cmpd="sng" algn="ctr">
+                  <a:solidFill>
+                    <a:srgbClr val="000000"/>
+                  </a:solidFill>
+                  <a:prstDash val="solid"/>
+                  <a:round/>
+                  <a:headEnd type="none" w="med" len="med"/>
+                  <a:tailEnd type="none" w="med" len="med"/>
+                </a:ln>
+                <a:effectLst/>
+              </p:spPr>
+              <p:style>
+                <a:lnRef idx="1">
+                  <a:schemeClr val="accent1"/>
+                </a:lnRef>
+                <a:fillRef idx="3">
+                  <a:schemeClr val="accent1"/>
+                </a:fillRef>
+                <a:effectRef idx="2">
+                  <a:schemeClr val="accent1"/>
+                </a:effectRef>
+                <a:fontRef idx="minor">
+                  <a:schemeClr val="lt1"/>
+                </a:fontRef>
+              </p:style>
+              <p:txBody>
+                <a:bodyPr rtlCol="0" anchor="ctr"/>
+                <a:lstStyle/>
+                <a:p>
+                  <a:pPr algn="ctr"/>
+                  <a:endParaRPr lang="en-US" i="1" dirty="0">
+                    <a:solidFill>
+                      <a:schemeClr val="tx1"/>
+                    </a:solidFill>
+                  </a:endParaRPr>
+                </a:p>
+              </p:txBody>
+            </p:sp>
+            <p:sp>
+              <p:nvSpPr>
+                <p:cNvPr id="96" name="Chord 95">
+                  <a:extLst>
+                    <a:ext uri="{FF2B5EF4-FFF2-40B4-BE49-F238E27FC236}">
+                      <a16:creationId xmlns:a16="http://schemas.microsoft.com/office/drawing/2014/main" id="{6B1CA32C-D843-1144-9420-E4F443DCF975}"/>
+                    </a:ext>
+                  </a:extLst>
+                </p:cNvPr>
+                <p:cNvSpPr/>
+                <p:nvPr/>
+              </p:nvSpPr>
+              <p:spPr>
+                <a:xfrm>
+                  <a:off x="3734347" y="784736"/>
+                  <a:ext cx="632206" cy="632206"/>
+                </a:xfrm>
+                <a:prstGeom prst="chord">
+                  <a:avLst>
+                    <a:gd name="adj1" fmla="val 10506229"/>
+                    <a:gd name="adj2" fmla="val 301460"/>
+                  </a:avLst>
+                </a:prstGeom>
+                <a:solidFill>
+                  <a:schemeClr val="accent4">
+                    <a:lumMod val="60000"/>
+                    <a:lumOff val="40000"/>
+                  </a:schemeClr>
+                </a:solidFill>
+                <a:ln w="38100" cap="flat" cmpd="sng" algn="ctr">
+                  <a:solidFill>
+                    <a:srgbClr val="000000"/>
+                  </a:solidFill>
+                  <a:prstDash val="solid"/>
+                  <a:round/>
+                  <a:headEnd type="none" w="med" len="med"/>
+                  <a:tailEnd type="none" w="med" len="med"/>
+                </a:ln>
+                <a:effectLst/>
+              </p:spPr>
+              <p:style>
+                <a:lnRef idx="1">
+                  <a:schemeClr val="accent1"/>
+                </a:lnRef>
+                <a:fillRef idx="3">
+                  <a:schemeClr val="accent1"/>
+                </a:fillRef>
+                <a:effectRef idx="2">
+                  <a:schemeClr val="accent1"/>
+                </a:effectRef>
+                <a:fontRef idx="minor">
+                  <a:schemeClr val="lt1"/>
+                </a:fontRef>
+              </p:style>
+              <p:txBody>
+                <a:bodyPr rtlCol="0" anchor="ctr"/>
+                <a:lstStyle/>
+                <a:p>
+                  <a:pPr algn="ctr"/>
+                  <a:endParaRPr lang="en-US"/>
+                </a:p>
+              </p:txBody>
+            </p:sp>
+            <p:pic>
+              <p:nvPicPr>
+                <p:cNvPr id="97" name="Picture 96">
+                  <a:extLst>
+                    <a:ext uri="{FF2B5EF4-FFF2-40B4-BE49-F238E27FC236}">
+                      <a16:creationId xmlns:a16="http://schemas.microsoft.com/office/drawing/2014/main" id="{8C5AB0E7-D26A-0447-BEF7-384CB5219E43}"/>
+                    </a:ext>
+                  </a:extLst>
+                </p:cNvPr>
+                <p:cNvPicPr>
+                  <a:picLocks noChangeAspect="1"/>
+                </p:cNvPicPr>
+                <p:nvPr/>
+              </p:nvPicPr>
+              <p:blipFill>
+                <a:blip r:embed="rId2">
+                  <a:extLst>
+                    <a:ext uri="{28A0092B-C50C-407E-A947-70E740481C1C}">
+                      <a14:useLocalDpi xmlns:a14="http://schemas.microsoft.com/office/drawing/2010/main" val="0"/>
+                    </a:ext>
+                  </a:extLst>
+                </a:blip>
+                <a:stretch>
+                  <a:fillRect/>
+                </a:stretch>
+              </p:blipFill>
+              <p:spPr>
+                <a:xfrm>
+                  <a:off x="2803319" y="413397"/>
+                  <a:ext cx="771908" cy="771908"/>
+                </a:xfrm>
+                <a:prstGeom prst="rect">
+                  <a:avLst/>
+                </a:prstGeom>
+              </p:spPr>
+            </p:pic>
+            <p:pic>
+              <p:nvPicPr>
+                <p:cNvPr id="98" name="Picture 97">
+                  <a:extLst>
+                    <a:ext uri="{FF2B5EF4-FFF2-40B4-BE49-F238E27FC236}">
+                      <a16:creationId xmlns:a16="http://schemas.microsoft.com/office/drawing/2014/main" id="{90AA2553-9805-624A-991C-B6E0FA5CB9C4}"/>
+                    </a:ext>
+                  </a:extLst>
+                </p:cNvPr>
+                <p:cNvPicPr>
+                  <a:picLocks noChangeAspect="1"/>
+                </p:cNvPicPr>
+                <p:nvPr/>
+              </p:nvPicPr>
+              <p:blipFill>
+                <a:blip r:embed="rId3">
+                  <a:extLst>
+                    <a:ext uri="{28A0092B-C50C-407E-A947-70E740481C1C}">
+                      <a14:useLocalDpi xmlns:a14="http://schemas.microsoft.com/office/drawing/2010/main" val="0"/>
+                    </a:ext>
+                  </a:extLst>
+                </a:blip>
+                <a:stretch>
+                  <a:fillRect/>
+                </a:stretch>
+              </p:blipFill>
+              <p:spPr>
+                <a:xfrm>
+                  <a:off x="5971536" y="499461"/>
+                  <a:ext cx="794135" cy="794135"/>
+                </a:xfrm>
+                <a:prstGeom prst="rect">
+                  <a:avLst/>
+                </a:prstGeom>
+              </p:spPr>
+            </p:pic>
+          </p:grpSp>
+        </p:grpSp>
+        <p:sp>
+          <p:nvSpPr>
+            <p:cNvPr id="124" name="Oval 123">
+              <a:extLst>
+                <a:ext uri="{FF2B5EF4-FFF2-40B4-BE49-F238E27FC236}">
+                  <a16:creationId xmlns:a16="http://schemas.microsoft.com/office/drawing/2014/main" id="{19DB127A-99CE-9641-858D-41CAD8A97CFE}"/>
+                </a:ext>
+              </a:extLst>
+            </p:cNvPr>
+            <p:cNvSpPr/>
+            <p:nvPr/>
+          </p:nvSpPr>
+          <p:spPr>
+            <a:xfrm>
+              <a:off x="5712308" y="1449183"/>
+              <a:ext cx="234913" cy="234913"/>
+            </a:xfrm>
+            <a:prstGeom prst="ellipse">
+              <a:avLst/>
+            </a:prstGeom>
+            <a:solidFill>
+              <a:srgbClr val="FF0000"/>
+            </a:solidFill>
+            <a:ln>
+              <a:solidFill>
+                <a:srgbClr val="FF0000"/>
+              </a:solidFill>
+            </a:ln>
+          </p:spPr>
+          <p:style>
+            <a:lnRef idx="2">
+              <a:schemeClr val="dk1">
+                <a:shade val="50000"/>
+              </a:schemeClr>
+            </a:lnRef>
+            <a:fillRef idx="1">
+              <a:schemeClr val="dk1"/>
+            </a:fillRef>
+            <a:effectRef idx="0">
+              <a:schemeClr val="dk1"/>
+            </a:effectRef>
+            <a:fontRef idx="minor">
+              <a:schemeClr val="lt1"/>
+            </a:fontRef>
+          </p:style>
+          <p:txBody>
+            <a:bodyPr rtlCol="0" anchor="ctr"/>
+            <a:lstStyle/>
+            <a:p>
+              <a:pPr algn="ctr"/>
+              <a:endParaRPr lang="en-US"/>
+            </a:p>
+          </p:txBody>
+        </p:sp>
+        <p:cxnSp>
+          <p:nvCxnSpPr>
+            <p:cNvPr id="129" name="Straight Connector 128">
+              <a:extLst>
+                <a:ext uri="{FF2B5EF4-FFF2-40B4-BE49-F238E27FC236}">
+                  <a16:creationId xmlns:a16="http://schemas.microsoft.com/office/drawing/2014/main" id="{70A397AA-2DC9-334C-A69F-5C077046FC0E}"/>
+                </a:ext>
+              </a:extLst>
+            </p:cNvPr>
+            <p:cNvCxnSpPr>
+              <a:cxnSpLocks/>
+            </p:cNvCxnSpPr>
+            <p:nvPr/>
+          </p:nvCxnSpPr>
+          <p:spPr>
+            <a:xfrm>
+              <a:off x="5829763" y="1094022"/>
+              <a:ext cx="0" cy="355161"/>
+            </a:xfrm>
+            <a:prstGeom prst="line">
+              <a:avLst/>
+            </a:prstGeom>
+            <a:ln w="28575">
+              <a:solidFill>
+                <a:srgbClr val="00B050"/>
+              </a:solidFill>
+              <a:headEnd type="none" w="med" len="med"/>
+              <a:tailEnd type="triangle" w="lg" len="lg"/>
+            </a:ln>
+            <a:effectLst/>
+          </p:spPr>
+          <p:style>
+            <a:lnRef idx="2">
+              <a:schemeClr val="accent1"/>
+            </a:lnRef>
+            <a:fillRef idx="0">
+              <a:schemeClr val="accent1"/>
+            </a:fillRef>
+            <a:effectRef idx="1">
+              <a:schemeClr val="accent1"/>
+            </a:effectRef>
+            <a:fontRef idx="minor">
+              <a:schemeClr val="tx1"/>
+            </a:fontRef>
+          </p:style>
+        </p:cxnSp>
+        <p:pic>
+          <p:nvPicPr>
+            <p:cNvPr id="72" name="Picture 71">
+              <a:extLst>
+                <a:ext uri="{FF2B5EF4-FFF2-40B4-BE49-F238E27FC236}">
+                  <a16:creationId xmlns:a16="http://schemas.microsoft.com/office/drawing/2014/main" id="{7D36C71F-8757-A140-BFAB-C610F7147B73}"/>
+                </a:ext>
+              </a:extLst>
+            </p:cNvPr>
+            <p:cNvPicPr>
+              <a:picLocks noChangeAspect="1"/>
+            </p:cNvPicPr>
+            <p:nvPr/>
+          </p:nvPicPr>
+          <p:blipFill>
+            <a:blip r:embed="rId4"/>
+            <a:stretch>
+              <a:fillRect/>
+            </a:stretch>
+          </p:blipFill>
+          <p:spPr>
+            <a:xfrm>
+              <a:off x="5367295" y="534432"/>
+              <a:ext cx="881743" cy="881743"/>
+            </a:xfrm>
+            <a:prstGeom prst="rect">
+              <a:avLst/>
+            </a:prstGeom>
+          </p:spPr>
+        </p:pic>
+        <p:sp>
+          <p:nvSpPr>
+            <p:cNvPr id="29" name="Triangle 28">
+              <a:extLst>
+                <a:ext uri="{FF2B5EF4-FFF2-40B4-BE49-F238E27FC236}">
+                  <a16:creationId xmlns:a16="http://schemas.microsoft.com/office/drawing/2014/main" id="{63213269-2DB2-AB42-89FE-B445202BBA4F}"/>
+                </a:ext>
+              </a:extLst>
+            </p:cNvPr>
+            <p:cNvSpPr/>
+            <p:nvPr/>
+          </p:nvSpPr>
+          <p:spPr>
+            <a:xfrm rot="10800000">
+              <a:off x="5791663" y="1338240"/>
+              <a:ext cx="76201" cy="67196"/>
+            </a:xfrm>
+            <a:prstGeom prst="triangle">
+              <a:avLst/>
+            </a:prstGeom>
+            <a:solidFill>
+              <a:schemeClr val="bg1"/>
+            </a:solidFill>
+            <a:ln>
+              <a:noFill/>
+            </a:ln>
+            <a:effectLst/>
+          </p:spPr>
+          <p:style>
+            <a:lnRef idx="1">
+              <a:schemeClr val="accent1"/>
+            </a:lnRef>
+            <a:fillRef idx="3">
+              <a:schemeClr val="accent1"/>
+            </a:fillRef>
+            <a:effectRef idx="2">
+              <a:schemeClr val="accent1"/>
+            </a:effectRef>
+            <a:fontRef idx="minor">
+              <a:schemeClr val="lt1"/>
+            </a:fontRef>
+          </p:style>
+          <p:txBody>
+            <a:bodyPr rtlCol="0" anchor="ctr"/>
+            <a:lstStyle/>
+            <a:p>
+              <a:pPr algn="ctr"/>
+              <a:endParaRPr lang="en-US"/>
+            </a:p>
+          </p:txBody>
+        </p:sp>
+      </p:grpSp>
+      <p:grpSp>
+        <p:nvGrpSpPr>
+          <p:cNvPr id="31" name="Group 30">
+            <a:extLst>
+              <a:ext uri="{FF2B5EF4-FFF2-40B4-BE49-F238E27FC236}">
+                <a16:creationId xmlns:a16="http://schemas.microsoft.com/office/drawing/2014/main" id="{41905109-4322-F64D-AFA1-75C11B8EF751}"/>
+              </a:ext>
+            </a:extLst>
+          </p:cNvPr>
+          <p:cNvGrpSpPr/>
+          <p:nvPr/>
+        </p:nvGrpSpPr>
+        <p:grpSpPr>
+          <a:xfrm>
+            <a:off x="351082" y="3423736"/>
+            <a:ext cx="8416471" cy="1920082"/>
+            <a:chOff x="451212" y="534432"/>
+            <a:chExt cx="8416471" cy="1920082"/>
+          </a:xfrm>
+        </p:grpSpPr>
+        <p:cxnSp>
+          <p:nvCxnSpPr>
+            <p:cNvPr id="32" name="Straight Arrow Connector 5">
+              <a:extLst>
+                <a:ext uri="{FF2B5EF4-FFF2-40B4-BE49-F238E27FC236}">
+                  <a16:creationId xmlns:a16="http://schemas.microsoft.com/office/drawing/2014/main" id="{3002C0E1-D114-2547-A1D5-3567E156C43F}"/>
+                </a:ext>
+              </a:extLst>
+            </p:cNvPr>
+            <p:cNvCxnSpPr>
+              <a:cxnSpLocks/>
+              <a:endCxn id="49" idx="0"/>
+            </p:cNvCxnSpPr>
+            <p:nvPr/>
+          </p:nvCxnSpPr>
+          <p:spPr>
+            <a:xfrm flipV="1">
+              <a:off x="5095644" y="1796957"/>
+              <a:ext cx="1439006" cy="343873"/>
+            </a:xfrm>
+            <a:prstGeom prst="bentConnector4">
+              <a:avLst>
+                <a:gd name="adj1" fmla="val 20"/>
+                <a:gd name="adj2" fmla="val 166478"/>
+              </a:avLst>
+            </a:prstGeom>
+            <a:ln>
+              <a:solidFill>
+                <a:srgbClr val="FF0000"/>
+              </a:solidFill>
+              <a:headEnd type="none"/>
+              <a:tailEnd type="none"/>
+            </a:ln>
+            <a:effectLst/>
+          </p:spPr>
+          <p:style>
+            <a:lnRef idx="2">
+              <a:schemeClr val="accent1"/>
+            </a:lnRef>
+            <a:fillRef idx="0">
+              <a:schemeClr val="accent1"/>
+            </a:fillRef>
+            <a:effectRef idx="1">
+              <a:schemeClr val="accent1"/>
+            </a:effectRef>
+            <a:fontRef idx="minor">
+              <a:schemeClr val="tx1"/>
+            </a:fontRef>
+          </p:style>
+        </p:cxnSp>
+        <p:cxnSp>
+          <p:nvCxnSpPr>
+            <p:cNvPr id="33" name="Straight Arrow Connector 5">
+              <a:extLst>
+                <a:ext uri="{FF2B5EF4-FFF2-40B4-BE49-F238E27FC236}">
+                  <a16:creationId xmlns:a16="http://schemas.microsoft.com/office/drawing/2014/main" id="{70EB59DE-4A06-2741-B1DD-F231DB1EF599}"/>
+                </a:ext>
+              </a:extLst>
+            </p:cNvPr>
+            <p:cNvCxnSpPr>
+              <a:cxnSpLocks/>
+            </p:cNvCxnSpPr>
+            <p:nvPr/>
+          </p:nvCxnSpPr>
+          <p:spPr>
+            <a:xfrm flipV="1">
+              <a:off x="2249000" y="1566880"/>
+              <a:ext cx="2846644" cy="578944"/>
+            </a:xfrm>
+            <a:prstGeom prst="bentConnector3">
+              <a:avLst>
+                <a:gd name="adj1" fmla="val 203"/>
+              </a:avLst>
+            </a:prstGeom>
+            <a:ln>
+              <a:solidFill>
+                <a:srgbClr val="FF0000"/>
+              </a:solidFill>
+              <a:headEnd type="none"/>
+              <a:tailEnd type="none"/>
+            </a:ln>
+            <a:effectLst/>
+          </p:spPr>
+          <p:style>
+            <a:lnRef idx="2">
+              <a:schemeClr val="accent1"/>
+            </a:lnRef>
+            <a:fillRef idx="0">
+              <a:schemeClr val="accent1"/>
+            </a:fillRef>
+            <a:effectRef idx="1">
+              <a:schemeClr val="accent1"/>
+            </a:effectRef>
+            <a:fontRef idx="minor">
+              <a:schemeClr val="tx1"/>
+            </a:fontRef>
+          </p:style>
+        </p:cxnSp>
+        <p:cxnSp>
+          <p:nvCxnSpPr>
+            <p:cNvPr id="34" name="Straight Connector 33">
+              <a:extLst>
+                <a:ext uri="{FF2B5EF4-FFF2-40B4-BE49-F238E27FC236}">
+                  <a16:creationId xmlns:a16="http://schemas.microsoft.com/office/drawing/2014/main" id="{230DA7CF-4141-754C-8805-CB5535D01369}"/>
+                </a:ext>
+              </a:extLst>
+            </p:cNvPr>
+            <p:cNvCxnSpPr/>
+            <p:nvPr/>
+          </p:nvCxnSpPr>
+          <p:spPr>
+            <a:xfrm>
+              <a:off x="6439400" y="1797802"/>
+              <a:ext cx="190500" cy="0"/>
+            </a:xfrm>
+            <a:prstGeom prst="line">
+              <a:avLst/>
+            </a:prstGeom>
+            <a:ln>
+              <a:solidFill>
+                <a:srgbClr val="FF0000"/>
+              </a:solidFill>
+            </a:ln>
+            <a:effectLst/>
+          </p:spPr>
+          <p:style>
+            <a:lnRef idx="2">
+              <a:schemeClr val="accent1"/>
+            </a:lnRef>
+            <a:fillRef idx="0">
+              <a:schemeClr val="accent1"/>
+            </a:fillRef>
+            <a:effectRef idx="1">
+              <a:schemeClr val="accent1"/>
+            </a:effectRef>
+            <a:fontRef idx="minor">
+              <a:schemeClr val="tx1"/>
+            </a:fontRef>
+          </p:style>
+        </p:cxnSp>
+        <p:grpSp>
+          <p:nvGrpSpPr>
+            <p:cNvPr id="35" name="Group 34">
+              <a:extLst>
+                <a:ext uri="{FF2B5EF4-FFF2-40B4-BE49-F238E27FC236}">
+                  <a16:creationId xmlns:a16="http://schemas.microsoft.com/office/drawing/2014/main" id="{29B2D35E-8496-1644-98CD-BC1C6784721A}"/>
+                </a:ext>
+              </a:extLst>
+            </p:cNvPr>
+            <p:cNvGrpSpPr/>
+            <p:nvPr/>
+          </p:nvGrpSpPr>
+          <p:grpSpPr>
+            <a:xfrm>
+              <a:off x="451212" y="1796957"/>
+              <a:ext cx="8416471" cy="657557"/>
+              <a:chOff x="139700" y="1207886"/>
+              <a:chExt cx="12901942" cy="1007995"/>
+            </a:xfrm>
+          </p:grpSpPr>
+          <p:grpSp>
+            <p:nvGrpSpPr>
+              <p:cNvPr id="42" name="Group 41">
+                <a:extLst>
+                  <a:ext uri="{FF2B5EF4-FFF2-40B4-BE49-F238E27FC236}">
+                    <a16:creationId xmlns:a16="http://schemas.microsoft.com/office/drawing/2014/main" id="{1CD935A2-6949-F946-874B-C832065F62DB}"/>
+                  </a:ext>
+                </a:extLst>
+              </p:cNvPr>
+              <p:cNvGrpSpPr/>
+              <p:nvPr/>
+            </p:nvGrpSpPr>
+            <p:grpSpPr>
+              <a:xfrm>
+                <a:off x="139700" y="1212336"/>
+                <a:ext cx="4196538" cy="1003545"/>
+                <a:chOff x="2569133" y="413397"/>
+                <a:chExt cx="4196538" cy="1003545"/>
+              </a:xfrm>
+            </p:grpSpPr>
+            <p:cxnSp>
+              <p:nvCxnSpPr>
+                <p:cNvPr id="56" name="Straight Connector 55">
+                  <a:extLst>
+                    <a:ext uri="{FF2B5EF4-FFF2-40B4-BE49-F238E27FC236}">
+                      <a16:creationId xmlns:a16="http://schemas.microsoft.com/office/drawing/2014/main" id="{8F8388BB-384E-0F4F-BD00-CB02E14E3A48}"/>
+                    </a:ext>
+                  </a:extLst>
+                </p:cNvPr>
+                <p:cNvCxnSpPr/>
+                <p:nvPr/>
+              </p:nvCxnSpPr>
+              <p:spPr>
+                <a:xfrm>
+                  <a:off x="2569133" y="1140336"/>
+                  <a:ext cx="4191000" cy="0"/>
+                </a:xfrm>
+                <a:prstGeom prst="line">
+                  <a:avLst/>
+                </a:prstGeom>
+                <a:ln w="38100" cap="flat" cmpd="sng" algn="ctr">
+                  <a:solidFill>
+                    <a:srgbClr val="000000"/>
+                  </a:solidFill>
+                  <a:prstDash val="solid"/>
+                  <a:round/>
+                  <a:headEnd type="none" w="med" len="med"/>
+                  <a:tailEnd type="none" w="med" len="med"/>
+                </a:ln>
+                <a:effectLst/>
+              </p:spPr>
+              <p:style>
+                <a:lnRef idx="2">
+                  <a:schemeClr val="accent1"/>
+                </a:lnRef>
+                <a:fillRef idx="0">
+                  <a:schemeClr val="accent1"/>
+                </a:fillRef>
+                <a:effectRef idx="1">
+                  <a:schemeClr val="accent1"/>
+                </a:effectRef>
+                <a:fontRef idx="minor">
+                  <a:schemeClr val="tx1"/>
+                </a:fontRef>
+              </p:style>
+            </p:cxnSp>
+            <p:sp>
+              <p:nvSpPr>
+                <p:cNvPr id="57" name="Right Arrow 56">
+                  <a:extLst>
+                    <a:ext uri="{FF2B5EF4-FFF2-40B4-BE49-F238E27FC236}">
+                      <a16:creationId xmlns:a16="http://schemas.microsoft.com/office/drawing/2014/main" id="{4DC1F98A-08C6-EC48-A043-346904AED0A6}"/>
+                    </a:ext>
+                  </a:extLst>
+                </p:cNvPr>
+                <p:cNvSpPr/>
+                <p:nvPr/>
+              </p:nvSpPr>
+              <p:spPr>
+                <a:xfrm>
+                  <a:off x="4740833" y="949836"/>
+                  <a:ext cx="1168400" cy="350140"/>
+                </a:xfrm>
+                <a:prstGeom prst="rightArrow">
+                  <a:avLst>
+                    <a:gd name="adj1" fmla="val 100000"/>
+                    <a:gd name="adj2" fmla="val 52194"/>
+                  </a:avLst>
+                </a:prstGeom>
+                <a:solidFill>
+                  <a:schemeClr val="accent2"/>
+                </a:solidFill>
+                <a:ln w="38100" cap="flat" cmpd="sng" algn="ctr">
+                  <a:solidFill>
+                    <a:srgbClr val="000000"/>
+                  </a:solidFill>
+                  <a:prstDash val="solid"/>
+                  <a:round/>
+                  <a:headEnd type="none" w="med" len="med"/>
+                  <a:tailEnd type="none" w="med" len="med"/>
+                </a:ln>
+                <a:effectLst/>
+              </p:spPr>
+              <p:style>
+                <a:lnRef idx="1">
+                  <a:schemeClr val="accent1"/>
+                </a:lnRef>
+                <a:fillRef idx="3">
+                  <a:schemeClr val="accent1"/>
+                </a:fillRef>
+                <a:effectRef idx="2">
+                  <a:schemeClr val="accent1"/>
+                </a:effectRef>
+                <a:fontRef idx="minor">
+                  <a:schemeClr val="lt1"/>
+                </a:fontRef>
+              </p:style>
+              <p:txBody>
+                <a:bodyPr rtlCol="0" anchor="ctr"/>
+                <a:lstStyle/>
+                <a:p>
+                  <a:pPr algn="ctr"/>
+                  <a:endParaRPr lang="en-US" i="1" dirty="0">
+                    <a:solidFill>
+                      <a:schemeClr val="tx1"/>
+                    </a:solidFill>
+                  </a:endParaRPr>
+                </a:p>
+              </p:txBody>
+            </p:sp>
+            <p:sp>
+              <p:nvSpPr>
+                <p:cNvPr id="58" name="Chord 57">
+                  <a:extLst>
+                    <a:ext uri="{FF2B5EF4-FFF2-40B4-BE49-F238E27FC236}">
+                      <a16:creationId xmlns:a16="http://schemas.microsoft.com/office/drawing/2014/main" id="{F1B777F4-411E-C446-900D-B1269C9F0E0F}"/>
+                    </a:ext>
+                  </a:extLst>
+                </p:cNvPr>
+                <p:cNvSpPr/>
+                <p:nvPr/>
+              </p:nvSpPr>
+              <p:spPr>
+                <a:xfrm>
+                  <a:off x="3734347" y="784736"/>
+                  <a:ext cx="632206" cy="632206"/>
+                </a:xfrm>
+                <a:prstGeom prst="chord">
+                  <a:avLst>
+                    <a:gd name="adj1" fmla="val 10506229"/>
+                    <a:gd name="adj2" fmla="val 301460"/>
+                  </a:avLst>
+                </a:prstGeom>
+                <a:solidFill>
+                  <a:schemeClr val="accent4">
+                    <a:lumMod val="60000"/>
+                    <a:lumOff val="40000"/>
+                  </a:schemeClr>
+                </a:solidFill>
+                <a:ln w="38100" cap="flat" cmpd="sng" algn="ctr">
+                  <a:solidFill>
+                    <a:srgbClr val="000000"/>
+                  </a:solidFill>
+                  <a:prstDash val="solid"/>
+                  <a:round/>
+                  <a:headEnd type="none" w="med" len="med"/>
+                  <a:tailEnd type="none" w="med" len="med"/>
+                </a:ln>
+                <a:effectLst/>
+              </p:spPr>
+              <p:style>
+                <a:lnRef idx="1">
+                  <a:schemeClr val="accent1"/>
+                </a:lnRef>
+                <a:fillRef idx="3">
+                  <a:schemeClr val="accent1"/>
+                </a:fillRef>
+                <a:effectRef idx="2">
+                  <a:schemeClr val="accent1"/>
+                </a:effectRef>
+                <a:fontRef idx="minor">
+                  <a:schemeClr val="lt1"/>
+                </a:fontRef>
+              </p:style>
+              <p:txBody>
+                <a:bodyPr rtlCol="0" anchor="ctr"/>
+                <a:lstStyle/>
+                <a:p>
+                  <a:pPr algn="ctr"/>
+                  <a:endParaRPr lang="en-US"/>
+                </a:p>
+              </p:txBody>
+            </p:sp>
+            <p:pic>
+              <p:nvPicPr>
+                <p:cNvPr id="59" name="Picture 58">
+                  <a:extLst>
+                    <a:ext uri="{FF2B5EF4-FFF2-40B4-BE49-F238E27FC236}">
+                      <a16:creationId xmlns:a16="http://schemas.microsoft.com/office/drawing/2014/main" id="{FB201996-3586-0246-B5D0-D473B74F7DD0}"/>
+                    </a:ext>
+                  </a:extLst>
+                </p:cNvPr>
+                <p:cNvPicPr>
+                  <a:picLocks noChangeAspect="1"/>
+                </p:cNvPicPr>
+                <p:nvPr/>
+              </p:nvPicPr>
+              <p:blipFill>
+                <a:blip r:embed="rId2">
+                  <a:extLst>
+                    <a:ext uri="{28A0092B-C50C-407E-A947-70E740481C1C}">
+                      <a14:useLocalDpi xmlns:a14="http://schemas.microsoft.com/office/drawing/2010/main" val="0"/>
+                    </a:ext>
+                  </a:extLst>
+                </a:blip>
+                <a:stretch>
+                  <a:fillRect/>
+                </a:stretch>
+              </p:blipFill>
+              <p:spPr>
+                <a:xfrm>
+                  <a:off x="2803319" y="413397"/>
+                  <a:ext cx="771908" cy="771908"/>
+                </a:xfrm>
+                <a:prstGeom prst="rect">
+                  <a:avLst/>
+                </a:prstGeom>
+              </p:spPr>
+            </p:pic>
+            <p:pic>
+              <p:nvPicPr>
+                <p:cNvPr id="63" name="Picture 62">
+                  <a:extLst>
+                    <a:ext uri="{FF2B5EF4-FFF2-40B4-BE49-F238E27FC236}">
+                      <a16:creationId xmlns:a16="http://schemas.microsoft.com/office/drawing/2014/main" id="{3A785DBF-FF43-AB41-8271-2AA646868DBD}"/>
+                    </a:ext>
+                  </a:extLst>
+                </p:cNvPr>
+                <p:cNvPicPr>
+                  <a:picLocks noChangeAspect="1"/>
+                </p:cNvPicPr>
+                <p:nvPr/>
+              </p:nvPicPr>
+              <p:blipFill>
+                <a:blip r:embed="rId3">
+                  <a:extLst>
+                    <a:ext uri="{28A0092B-C50C-407E-A947-70E740481C1C}">
+                      <a14:useLocalDpi xmlns:a14="http://schemas.microsoft.com/office/drawing/2010/main" val="0"/>
+                    </a:ext>
+                  </a:extLst>
+                </a:blip>
+                <a:stretch>
+                  <a:fillRect/>
+                </a:stretch>
+              </p:blipFill>
+              <p:spPr>
+                <a:xfrm>
+                  <a:off x="5971536" y="499461"/>
+                  <a:ext cx="794135" cy="794135"/>
+                </a:xfrm>
+                <a:prstGeom prst="rect">
+                  <a:avLst/>
+                </a:prstGeom>
+              </p:spPr>
+            </p:pic>
+          </p:grpSp>
+          <p:grpSp>
+            <p:nvGrpSpPr>
+              <p:cNvPr id="44" name="Group 43">
+                <a:extLst>
+                  <a:ext uri="{FF2B5EF4-FFF2-40B4-BE49-F238E27FC236}">
+                    <a16:creationId xmlns:a16="http://schemas.microsoft.com/office/drawing/2014/main" id="{7DF45E57-6DBE-FC40-8663-025A2480060D}"/>
+                  </a:ext>
+                </a:extLst>
+              </p:cNvPr>
+              <p:cNvGrpSpPr/>
+              <p:nvPr/>
+            </p:nvGrpSpPr>
+            <p:grpSpPr>
+              <a:xfrm>
+                <a:off x="4489820" y="1207886"/>
+                <a:ext cx="4196538" cy="1003545"/>
+                <a:chOff x="2569133" y="413397"/>
+                <a:chExt cx="4196538" cy="1003545"/>
+              </a:xfrm>
+            </p:grpSpPr>
+            <p:cxnSp>
+              <p:nvCxnSpPr>
+                <p:cNvPr id="51" name="Straight Connector 50">
+                  <a:extLst>
+                    <a:ext uri="{FF2B5EF4-FFF2-40B4-BE49-F238E27FC236}">
+                      <a16:creationId xmlns:a16="http://schemas.microsoft.com/office/drawing/2014/main" id="{8E8087C0-F49B-3144-BB1B-F4B266F71246}"/>
+                    </a:ext>
+                  </a:extLst>
+                </p:cNvPr>
+                <p:cNvCxnSpPr/>
+                <p:nvPr/>
+              </p:nvCxnSpPr>
+              <p:spPr>
+                <a:xfrm>
+                  <a:off x="2569133" y="1140336"/>
+                  <a:ext cx="4191000" cy="0"/>
+                </a:xfrm>
+                <a:prstGeom prst="line">
+                  <a:avLst/>
+                </a:prstGeom>
+                <a:ln w="38100" cap="flat" cmpd="sng" algn="ctr">
+                  <a:solidFill>
+                    <a:srgbClr val="000000"/>
+                  </a:solidFill>
+                  <a:prstDash val="solid"/>
+                  <a:round/>
+                  <a:headEnd type="none" w="med" len="med"/>
+                  <a:tailEnd type="none" w="med" len="med"/>
+                </a:ln>
+                <a:effectLst/>
+              </p:spPr>
+              <p:style>
+                <a:lnRef idx="2">
+                  <a:schemeClr val="accent1"/>
+                </a:lnRef>
+                <a:fillRef idx="0">
+                  <a:schemeClr val="accent1"/>
+                </a:fillRef>
+                <a:effectRef idx="1">
+                  <a:schemeClr val="accent1"/>
+                </a:effectRef>
+                <a:fontRef idx="minor">
+                  <a:schemeClr val="tx1"/>
+                </a:fontRef>
+              </p:style>
+            </p:cxnSp>
+            <p:sp>
+              <p:nvSpPr>
+                <p:cNvPr id="52" name="Right Arrow 51">
+                  <a:extLst>
+                    <a:ext uri="{FF2B5EF4-FFF2-40B4-BE49-F238E27FC236}">
+                      <a16:creationId xmlns:a16="http://schemas.microsoft.com/office/drawing/2014/main" id="{06A45CCF-7EB4-1A44-B1DE-CEC047F2A879}"/>
+                    </a:ext>
+                  </a:extLst>
+                </p:cNvPr>
+                <p:cNvSpPr/>
+                <p:nvPr/>
+              </p:nvSpPr>
+              <p:spPr>
+                <a:xfrm>
+                  <a:off x="4740833" y="949836"/>
+                  <a:ext cx="1168400" cy="350140"/>
+                </a:xfrm>
+                <a:prstGeom prst="rightArrow">
+                  <a:avLst>
+                    <a:gd name="adj1" fmla="val 100000"/>
+                    <a:gd name="adj2" fmla="val 52194"/>
+                  </a:avLst>
+                </a:prstGeom>
+                <a:solidFill>
+                  <a:schemeClr val="accent2"/>
+                </a:solidFill>
+                <a:ln w="38100" cap="flat" cmpd="sng" algn="ctr">
+                  <a:solidFill>
+                    <a:srgbClr val="000000"/>
+                  </a:solidFill>
+                  <a:prstDash val="solid"/>
+                  <a:round/>
+                  <a:headEnd type="none" w="med" len="med"/>
+                  <a:tailEnd type="none" w="med" len="med"/>
+                </a:ln>
+                <a:effectLst/>
+              </p:spPr>
+              <p:style>
+                <a:lnRef idx="1">
+                  <a:schemeClr val="accent1"/>
+                </a:lnRef>
+                <a:fillRef idx="3">
+                  <a:schemeClr val="accent1"/>
+                </a:fillRef>
+                <a:effectRef idx="2">
+                  <a:schemeClr val="accent1"/>
+                </a:effectRef>
+                <a:fontRef idx="minor">
+                  <a:schemeClr val="lt1"/>
+                </a:fontRef>
+              </p:style>
+              <p:txBody>
+                <a:bodyPr rtlCol="0" anchor="ctr"/>
+                <a:lstStyle/>
+                <a:p>
+                  <a:pPr algn="ctr"/>
+                  <a:endParaRPr lang="en-US" i="1" dirty="0">
+                    <a:solidFill>
+                      <a:schemeClr val="tx1"/>
+                    </a:solidFill>
+                  </a:endParaRPr>
+                </a:p>
+              </p:txBody>
+            </p:sp>
+            <p:sp>
+              <p:nvSpPr>
+                <p:cNvPr id="53" name="Chord 52">
+                  <a:extLst>
+                    <a:ext uri="{FF2B5EF4-FFF2-40B4-BE49-F238E27FC236}">
+                      <a16:creationId xmlns:a16="http://schemas.microsoft.com/office/drawing/2014/main" id="{AC504D4B-32B6-0C4D-B8C3-147D77D4F0AB}"/>
+                    </a:ext>
+                  </a:extLst>
+                </p:cNvPr>
+                <p:cNvSpPr/>
+                <p:nvPr/>
+              </p:nvSpPr>
+              <p:spPr>
+                <a:xfrm>
+                  <a:off x="3734347" y="784736"/>
+                  <a:ext cx="632206" cy="632206"/>
+                </a:xfrm>
+                <a:prstGeom prst="chord">
+                  <a:avLst>
+                    <a:gd name="adj1" fmla="val 10506229"/>
+                    <a:gd name="adj2" fmla="val 301460"/>
+                  </a:avLst>
+                </a:prstGeom>
+                <a:solidFill>
+                  <a:schemeClr val="accent4">
+                    <a:lumMod val="60000"/>
+                    <a:lumOff val="40000"/>
+                  </a:schemeClr>
+                </a:solidFill>
+                <a:ln w="38100" cap="flat" cmpd="sng" algn="ctr">
+                  <a:solidFill>
+                    <a:srgbClr val="000000"/>
+                  </a:solidFill>
+                  <a:prstDash val="solid"/>
+                  <a:round/>
+                  <a:headEnd type="none" w="med" len="med"/>
+                  <a:tailEnd type="none" w="med" len="med"/>
+                </a:ln>
+                <a:effectLst/>
+              </p:spPr>
+              <p:style>
+                <a:lnRef idx="1">
+                  <a:schemeClr val="accent1"/>
+                </a:lnRef>
+                <a:fillRef idx="3">
+                  <a:schemeClr val="accent1"/>
+                </a:fillRef>
+                <a:effectRef idx="2">
+                  <a:schemeClr val="accent1"/>
+                </a:effectRef>
+                <a:fontRef idx="minor">
+                  <a:schemeClr val="lt1"/>
+                </a:fontRef>
+              </p:style>
+              <p:txBody>
+                <a:bodyPr rtlCol="0" anchor="ctr"/>
+                <a:lstStyle/>
+                <a:p>
+                  <a:pPr algn="ctr"/>
+                  <a:endParaRPr lang="en-US"/>
+                </a:p>
+              </p:txBody>
+            </p:sp>
+            <p:pic>
+              <p:nvPicPr>
+                <p:cNvPr id="54" name="Picture 53">
+                  <a:extLst>
+                    <a:ext uri="{FF2B5EF4-FFF2-40B4-BE49-F238E27FC236}">
+                      <a16:creationId xmlns:a16="http://schemas.microsoft.com/office/drawing/2014/main" id="{CF543E37-055A-B84D-8C79-E2A851B713A0}"/>
+                    </a:ext>
+                  </a:extLst>
+                </p:cNvPr>
+                <p:cNvPicPr>
+                  <a:picLocks noChangeAspect="1"/>
+                </p:cNvPicPr>
+                <p:nvPr/>
+              </p:nvPicPr>
+              <p:blipFill>
+                <a:blip r:embed="rId2">
+                  <a:extLst>
+                    <a:ext uri="{28A0092B-C50C-407E-A947-70E740481C1C}">
+                      <a14:useLocalDpi xmlns:a14="http://schemas.microsoft.com/office/drawing/2010/main" val="0"/>
+                    </a:ext>
+                  </a:extLst>
+                </a:blip>
+                <a:stretch>
+                  <a:fillRect/>
+                </a:stretch>
+              </p:blipFill>
+              <p:spPr>
+                <a:xfrm>
+                  <a:off x="2803319" y="413397"/>
+                  <a:ext cx="771908" cy="771908"/>
+                </a:xfrm>
+                <a:prstGeom prst="rect">
+                  <a:avLst/>
+                </a:prstGeom>
+              </p:spPr>
+            </p:pic>
+            <p:pic>
+              <p:nvPicPr>
+                <p:cNvPr id="55" name="Picture 54">
+                  <a:extLst>
+                    <a:ext uri="{FF2B5EF4-FFF2-40B4-BE49-F238E27FC236}">
+                      <a16:creationId xmlns:a16="http://schemas.microsoft.com/office/drawing/2014/main" id="{52D51FBE-266B-2745-B619-7A22A1392A93}"/>
+                    </a:ext>
+                  </a:extLst>
+                </p:cNvPr>
+                <p:cNvPicPr>
+                  <a:picLocks noChangeAspect="1"/>
+                </p:cNvPicPr>
+                <p:nvPr/>
+              </p:nvPicPr>
+              <p:blipFill>
+                <a:blip r:embed="rId3">
+                  <a:extLst>
+                    <a:ext uri="{28A0092B-C50C-407E-A947-70E740481C1C}">
+                      <a14:useLocalDpi xmlns:a14="http://schemas.microsoft.com/office/drawing/2010/main" val="0"/>
+                    </a:ext>
+                  </a:extLst>
+                </a:blip>
+                <a:stretch>
+                  <a:fillRect/>
+                </a:stretch>
+              </p:blipFill>
+              <p:spPr>
+                <a:xfrm>
+                  <a:off x="5971536" y="499461"/>
+                  <a:ext cx="794135" cy="794135"/>
+                </a:xfrm>
+                <a:prstGeom prst="rect">
+                  <a:avLst/>
+                </a:prstGeom>
+              </p:spPr>
+            </p:pic>
+          </p:grpSp>
+          <p:grpSp>
+            <p:nvGrpSpPr>
+              <p:cNvPr id="45" name="Group 44">
+                <a:extLst>
+                  <a:ext uri="{FF2B5EF4-FFF2-40B4-BE49-F238E27FC236}">
+                    <a16:creationId xmlns:a16="http://schemas.microsoft.com/office/drawing/2014/main" id="{D3B72F2D-94B8-8244-BC11-59F268208753}"/>
+                  </a:ext>
+                </a:extLst>
+              </p:cNvPr>
+              <p:cNvGrpSpPr/>
+              <p:nvPr/>
+            </p:nvGrpSpPr>
+            <p:grpSpPr>
+              <a:xfrm>
+                <a:off x="8845104" y="1207886"/>
+                <a:ext cx="4196538" cy="1003545"/>
+                <a:chOff x="2569133" y="413397"/>
+                <a:chExt cx="4196538" cy="1003545"/>
+              </a:xfrm>
+            </p:grpSpPr>
+            <p:cxnSp>
+              <p:nvCxnSpPr>
+                <p:cNvPr id="46" name="Straight Connector 45">
+                  <a:extLst>
+                    <a:ext uri="{FF2B5EF4-FFF2-40B4-BE49-F238E27FC236}">
+                      <a16:creationId xmlns:a16="http://schemas.microsoft.com/office/drawing/2014/main" id="{47B79F16-CDD9-604E-B0D3-BE7ABA67D9CA}"/>
+                    </a:ext>
+                  </a:extLst>
+                </p:cNvPr>
+                <p:cNvCxnSpPr/>
+                <p:nvPr/>
+              </p:nvCxnSpPr>
+              <p:spPr>
+                <a:xfrm>
+                  <a:off x="2569133" y="1140336"/>
+                  <a:ext cx="4191000" cy="0"/>
+                </a:xfrm>
+                <a:prstGeom prst="line">
+                  <a:avLst/>
+                </a:prstGeom>
+                <a:ln w="38100" cap="flat" cmpd="sng" algn="ctr">
+                  <a:solidFill>
+                    <a:srgbClr val="000000"/>
+                  </a:solidFill>
+                  <a:prstDash val="solid"/>
+                  <a:round/>
+                  <a:headEnd type="none" w="med" len="med"/>
+                  <a:tailEnd type="none" w="med" len="med"/>
+                </a:ln>
+                <a:effectLst/>
+              </p:spPr>
+              <p:style>
+                <a:lnRef idx="2">
+                  <a:schemeClr val="accent1"/>
+                </a:lnRef>
+                <a:fillRef idx="0">
+                  <a:schemeClr val="accent1"/>
+                </a:fillRef>
+                <a:effectRef idx="1">
+                  <a:schemeClr val="accent1"/>
+                </a:effectRef>
+                <a:fontRef idx="minor">
+                  <a:schemeClr val="tx1"/>
+                </a:fontRef>
+              </p:style>
+            </p:cxnSp>
+            <p:sp>
+              <p:nvSpPr>
+                <p:cNvPr id="47" name="Right Arrow 46">
+                  <a:extLst>
+                    <a:ext uri="{FF2B5EF4-FFF2-40B4-BE49-F238E27FC236}">
+                      <a16:creationId xmlns:a16="http://schemas.microsoft.com/office/drawing/2014/main" id="{6CAD88FF-3D71-D148-AF8D-AC5C5894075E}"/>
+                    </a:ext>
+                  </a:extLst>
+                </p:cNvPr>
+                <p:cNvSpPr/>
+                <p:nvPr/>
+              </p:nvSpPr>
+              <p:spPr>
+                <a:xfrm>
+                  <a:off x="4740833" y="949836"/>
+                  <a:ext cx="1168400" cy="350140"/>
+                </a:xfrm>
+                <a:prstGeom prst="rightArrow">
+                  <a:avLst>
+                    <a:gd name="adj1" fmla="val 100000"/>
+                    <a:gd name="adj2" fmla="val 52194"/>
+                  </a:avLst>
+                </a:prstGeom>
+                <a:solidFill>
+                  <a:srgbClr val="92D050"/>
+                </a:solidFill>
+                <a:ln w="38100" cap="flat" cmpd="sng" algn="ctr">
+                  <a:solidFill>
+                    <a:srgbClr val="000000"/>
+                  </a:solidFill>
+                  <a:prstDash val="solid"/>
+                  <a:round/>
+                  <a:headEnd type="none" w="med" len="med"/>
+                  <a:tailEnd type="none" w="med" len="med"/>
+                </a:ln>
+                <a:effectLst/>
+              </p:spPr>
+              <p:style>
+                <a:lnRef idx="1">
+                  <a:schemeClr val="accent1"/>
+                </a:lnRef>
+                <a:fillRef idx="3">
+                  <a:schemeClr val="accent1"/>
+                </a:fillRef>
+                <a:effectRef idx="2">
+                  <a:schemeClr val="accent1"/>
+                </a:effectRef>
+                <a:fontRef idx="minor">
+                  <a:schemeClr val="lt1"/>
+                </a:fontRef>
+              </p:style>
+              <p:txBody>
+                <a:bodyPr rtlCol="0" anchor="ctr"/>
+                <a:lstStyle/>
+                <a:p>
+                  <a:pPr algn="ctr"/>
+                  <a:endParaRPr lang="en-US" i="1" dirty="0">
+                    <a:solidFill>
+                      <a:schemeClr val="tx1"/>
+                    </a:solidFill>
+                  </a:endParaRPr>
+                </a:p>
+              </p:txBody>
+            </p:sp>
+            <p:sp>
+              <p:nvSpPr>
+                <p:cNvPr id="48" name="Chord 47">
+                  <a:extLst>
+                    <a:ext uri="{FF2B5EF4-FFF2-40B4-BE49-F238E27FC236}">
+                      <a16:creationId xmlns:a16="http://schemas.microsoft.com/office/drawing/2014/main" id="{654BF24D-C2D1-4441-9E75-CA5990835FAF}"/>
+                    </a:ext>
+                  </a:extLst>
+                </p:cNvPr>
+                <p:cNvSpPr/>
+                <p:nvPr/>
+              </p:nvSpPr>
+              <p:spPr>
+                <a:xfrm>
+                  <a:off x="3734347" y="784736"/>
+                  <a:ext cx="632206" cy="632206"/>
+                </a:xfrm>
+                <a:prstGeom prst="chord">
+                  <a:avLst>
+                    <a:gd name="adj1" fmla="val 10506229"/>
+                    <a:gd name="adj2" fmla="val 301460"/>
+                  </a:avLst>
+                </a:prstGeom>
+                <a:solidFill>
+                  <a:schemeClr val="accent4">
+                    <a:lumMod val="60000"/>
+                    <a:lumOff val="40000"/>
+                  </a:schemeClr>
+                </a:solidFill>
+                <a:ln w="38100" cap="flat" cmpd="sng" algn="ctr">
+                  <a:solidFill>
+                    <a:srgbClr val="000000"/>
+                  </a:solidFill>
+                  <a:prstDash val="solid"/>
+                  <a:round/>
+                  <a:headEnd type="none" w="med" len="med"/>
+                  <a:tailEnd type="none" w="med" len="med"/>
+                </a:ln>
+                <a:effectLst/>
+              </p:spPr>
+              <p:style>
+                <a:lnRef idx="1">
+                  <a:schemeClr val="accent1"/>
+                </a:lnRef>
+                <a:fillRef idx="3">
+                  <a:schemeClr val="accent1"/>
+                </a:fillRef>
+                <a:effectRef idx="2">
+                  <a:schemeClr val="accent1"/>
+                </a:effectRef>
+                <a:fontRef idx="minor">
+                  <a:schemeClr val="lt1"/>
+                </a:fontRef>
+              </p:style>
+              <p:txBody>
+                <a:bodyPr rtlCol="0" anchor="ctr"/>
+                <a:lstStyle/>
+                <a:p>
+                  <a:pPr algn="ctr"/>
+                  <a:endParaRPr lang="en-US"/>
+                </a:p>
+              </p:txBody>
+            </p:sp>
+            <p:pic>
+              <p:nvPicPr>
+                <p:cNvPr id="49" name="Picture 48">
+                  <a:extLst>
+                    <a:ext uri="{FF2B5EF4-FFF2-40B4-BE49-F238E27FC236}">
+                      <a16:creationId xmlns:a16="http://schemas.microsoft.com/office/drawing/2014/main" id="{2530CAF8-1F9F-674D-AB46-1C8CDD844F0F}"/>
+                    </a:ext>
+                  </a:extLst>
+                </p:cNvPr>
+                <p:cNvPicPr>
+                  <a:picLocks noChangeAspect="1"/>
+                </p:cNvPicPr>
+                <p:nvPr/>
+              </p:nvPicPr>
+              <p:blipFill>
+                <a:blip r:embed="rId2">
+                  <a:extLst>
+                    <a:ext uri="{28A0092B-C50C-407E-A947-70E740481C1C}">
+                      <a14:useLocalDpi xmlns:a14="http://schemas.microsoft.com/office/drawing/2010/main" val="0"/>
+                    </a:ext>
+                  </a:extLst>
+                </a:blip>
+                <a:stretch>
+                  <a:fillRect/>
+                </a:stretch>
+              </p:blipFill>
+              <p:spPr>
+                <a:xfrm>
+                  <a:off x="2803319" y="413397"/>
+                  <a:ext cx="771908" cy="771908"/>
+                </a:xfrm>
+                <a:prstGeom prst="rect">
+                  <a:avLst/>
+                </a:prstGeom>
+              </p:spPr>
+            </p:pic>
+            <p:pic>
+              <p:nvPicPr>
+                <p:cNvPr id="50" name="Picture 49">
+                  <a:extLst>
+                    <a:ext uri="{FF2B5EF4-FFF2-40B4-BE49-F238E27FC236}">
+                      <a16:creationId xmlns:a16="http://schemas.microsoft.com/office/drawing/2014/main" id="{E608D5A5-ACE0-B343-9E98-1ACB5EA7C9E5}"/>
+                    </a:ext>
+                  </a:extLst>
+                </p:cNvPr>
+                <p:cNvPicPr>
+                  <a:picLocks noChangeAspect="1"/>
+                </p:cNvPicPr>
+                <p:nvPr/>
+              </p:nvPicPr>
+              <p:blipFill>
+                <a:blip r:embed="rId3">
+                  <a:extLst>
+                    <a:ext uri="{28A0092B-C50C-407E-A947-70E740481C1C}">
+                      <a14:useLocalDpi xmlns:a14="http://schemas.microsoft.com/office/drawing/2010/main" val="0"/>
+                    </a:ext>
+                  </a:extLst>
+                </a:blip>
+                <a:stretch>
+                  <a:fillRect/>
+                </a:stretch>
+              </p:blipFill>
+              <p:spPr>
+                <a:xfrm>
+                  <a:off x="5971536" y="499461"/>
+                  <a:ext cx="794135" cy="794135"/>
+                </a:xfrm>
+                <a:prstGeom prst="rect">
+                  <a:avLst/>
+                </a:prstGeom>
+              </p:spPr>
+            </p:pic>
+          </p:grpSp>
+        </p:grpSp>
+        <p:cxnSp>
+          <p:nvCxnSpPr>
+            <p:cNvPr id="37" name="Straight Connector 36">
+              <a:extLst>
+                <a:ext uri="{FF2B5EF4-FFF2-40B4-BE49-F238E27FC236}">
+                  <a16:creationId xmlns:a16="http://schemas.microsoft.com/office/drawing/2014/main" id="{5B3ABE99-8DA2-AF49-A117-3C9F22F4D4F8}"/>
+                </a:ext>
+              </a:extLst>
+            </p:cNvPr>
+            <p:cNvCxnSpPr>
+              <a:cxnSpLocks/>
+            </p:cNvCxnSpPr>
+            <p:nvPr/>
+          </p:nvCxnSpPr>
+          <p:spPr>
+            <a:xfrm>
+              <a:off x="5829763" y="1057650"/>
+              <a:ext cx="0" cy="508893"/>
+            </a:xfrm>
+            <a:prstGeom prst="line">
+              <a:avLst/>
+            </a:prstGeom>
+            <a:ln w="28575">
+              <a:solidFill>
+                <a:srgbClr val="00B050"/>
+              </a:solidFill>
+              <a:headEnd type="none" w="med" len="med"/>
+              <a:tailEnd type="triangle" w="lg" len="lg"/>
+            </a:ln>
+            <a:effectLst/>
+          </p:spPr>
+          <p:style>
+            <a:lnRef idx="2">
+              <a:schemeClr val="accent1"/>
+            </a:lnRef>
+            <a:fillRef idx="0">
+              <a:schemeClr val="accent1"/>
+            </a:fillRef>
+            <a:effectRef idx="1">
+              <a:schemeClr val="accent1"/>
+            </a:effectRef>
+            <a:fontRef idx="minor">
+              <a:schemeClr val="tx1"/>
+            </a:fontRef>
+          </p:style>
+        </p:cxnSp>
+        <p:pic>
+          <p:nvPicPr>
+            <p:cNvPr id="40" name="Picture 39">
+              <a:extLst>
+                <a:ext uri="{FF2B5EF4-FFF2-40B4-BE49-F238E27FC236}">
+                  <a16:creationId xmlns:a16="http://schemas.microsoft.com/office/drawing/2014/main" id="{4F6A7D2D-A073-0744-AA30-8DAB44E657F9}"/>
+                </a:ext>
+              </a:extLst>
+            </p:cNvPr>
+            <p:cNvPicPr>
+              <a:picLocks noChangeAspect="1"/>
+            </p:cNvPicPr>
+            <p:nvPr/>
+          </p:nvPicPr>
+          <p:blipFill>
+            <a:blip r:embed="rId4"/>
+            <a:stretch>
+              <a:fillRect/>
+            </a:stretch>
+          </p:blipFill>
+          <p:spPr>
+            <a:xfrm>
+              <a:off x="5367295" y="534432"/>
+              <a:ext cx="881743" cy="881743"/>
+            </a:xfrm>
+            <a:prstGeom prst="rect">
+              <a:avLst/>
+            </a:prstGeom>
+          </p:spPr>
+        </p:pic>
+        <p:sp>
+          <p:nvSpPr>
+            <p:cNvPr id="41" name="Triangle 40">
+              <a:extLst>
+                <a:ext uri="{FF2B5EF4-FFF2-40B4-BE49-F238E27FC236}">
+                  <a16:creationId xmlns:a16="http://schemas.microsoft.com/office/drawing/2014/main" id="{E3F55624-2794-AC46-83B9-E0537AE80656}"/>
+                </a:ext>
+              </a:extLst>
+            </p:cNvPr>
+            <p:cNvSpPr/>
+            <p:nvPr/>
+          </p:nvSpPr>
+          <p:spPr>
+            <a:xfrm rot="10800000">
+              <a:off x="5791663" y="1455600"/>
+              <a:ext cx="76201" cy="67196"/>
+            </a:xfrm>
+            <a:prstGeom prst="triangle">
+              <a:avLst/>
+            </a:prstGeom>
+            <a:solidFill>
+              <a:schemeClr val="bg1"/>
+            </a:solidFill>
+            <a:ln>
+              <a:noFill/>
+            </a:ln>
+            <a:effectLst/>
+          </p:spPr>
+          <p:style>
+            <a:lnRef idx="1">
+              <a:schemeClr val="accent1"/>
+            </a:lnRef>
+            <a:fillRef idx="3">
+              <a:schemeClr val="accent1"/>
+            </a:fillRef>
+            <a:effectRef idx="2">
+              <a:schemeClr val="accent1"/>
+            </a:effectRef>
+            <a:fontRef idx="minor">
+              <a:schemeClr val="lt1"/>
+            </a:fontRef>
+          </p:style>
+          <p:txBody>
+            <a:bodyPr rtlCol="0" anchor="ctr"/>
+            <a:lstStyle/>
+            <a:p>
+              <a:pPr algn="ctr"/>
+              <a:endParaRPr lang="en-US"/>
+            </a:p>
+          </p:txBody>
+        </p:sp>
+      </p:grpSp>
+    </p:spTree>
+    <p:extLst>
+      <p:ext uri="{BB962C8B-B14F-4D97-AF65-F5344CB8AC3E}">
+        <p14:creationId xmlns:p14="http://schemas.microsoft.com/office/powerpoint/2010/main" val="1894891757"/>
+      </p:ext>
+    </p:extLst>
+  </p:cSld>
+  <p:clrMapOvr>
+    <a:masterClrMapping/>
+  </p:clrMapOvr>
+</p:sld>
+</file>
+
+<file path=ppt/slides/slide8.xml><?xml version="1.0" encoding="utf-8"?>
+<p:sld xmlns:a="http://schemas.openxmlformats.org/drawingml/2006/main" xmlns:r="http://schemas.openxmlformats.org/officeDocument/2006/relationships" xmlns:p="http://schemas.openxmlformats.org/presentationml/2006/main">
+  <p:cSld>
+    <p:spTree>
+      <p:nvGrpSpPr>
+        <p:cNvPr id="1" name=""/>
+        <p:cNvGrpSpPr/>
+        <p:nvPr/>
+      </p:nvGrpSpPr>
+      <p:grpSpPr>
+        <a:xfrm>
+          <a:off x="0" y="0"/>
+          <a:ext cx="0" cy="0"/>
+          <a:chOff x="0" y="0"/>
+          <a:chExt cx="0" cy="0"/>
+        </a:xfrm>
+      </p:grpSpPr>
+      <p:sp>
+        <p:nvSpPr>
+          <p:cNvPr id="67" name="TextBox 66"/>
+          <p:cNvSpPr txBox="1"/>
+          <p:nvPr/>
+        </p:nvSpPr>
+        <p:spPr>
+          <a:xfrm>
+            <a:off x="139700" y="165100"/>
+            <a:ext cx="707245" cy="369332"/>
+          </a:xfrm>
+          <a:prstGeom prst="rect">
+            <a:avLst/>
+          </a:prstGeom>
+          <a:noFill/>
+        </p:spPr>
+        <p:txBody>
+          <a:bodyPr wrap="none" rtlCol="0">
+            <a:spAutoFit/>
+          </a:bodyPr>
+          <a:lstStyle/>
+          <a:p>
+            <a:r>
+              <a:rPr lang="en-US" dirty="0"/>
+              <a:t>4e-cd</a:t>
+            </a:r>
+          </a:p>
+        </p:txBody>
+      </p:sp>
+      <p:sp>
+        <p:nvSpPr>
+          <p:cNvPr id="43" name="TextBox 42"/>
+          <p:cNvSpPr txBox="1"/>
+          <p:nvPr/>
+        </p:nvSpPr>
+        <p:spPr>
+          <a:xfrm>
+            <a:off x="2736937" y="324200"/>
+            <a:ext cx="1205971" cy="369332"/>
+          </a:xfrm>
+          <a:prstGeom prst="rect">
+            <a:avLst/>
+          </a:prstGeom>
+          <a:noFill/>
+        </p:spPr>
+        <p:txBody>
+          <a:bodyPr wrap="none" rtlCol="0">
+            <a:spAutoFit/>
+          </a:bodyPr>
+          <a:lstStyle/>
+          <a:p>
+            <a:r>
+              <a:rPr lang="en-US" dirty="0"/>
+              <a:t>MUST NOT</a:t>
+            </a:r>
+          </a:p>
+        </p:txBody>
+      </p:sp>
+      <p:grpSp>
+        <p:nvGrpSpPr>
+          <p:cNvPr id="66" name="Group 65">
+            <a:extLst>
+              <a:ext uri="{FF2B5EF4-FFF2-40B4-BE49-F238E27FC236}">
+                <a16:creationId xmlns:a16="http://schemas.microsoft.com/office/drawing/2014/main" id="{CB555CA7-D5F7-2648-A60B-5A1996460E65}"/>
+              </a:ext>
+            </a:extLst>
+          </p:cNvPr>
+          <p:cNvGrpSpPr/>
+          <p:nvPr/>
+        </p:nvGrpSpPr>
+        <p:grpSpPr>
+          <a:xfrm>
+            <a:off x="197324" y="952545"/>
+            <a:ext cx="8416471" cy="1920082"/>
+            <a:chOff x="451212" y="534432"/>
+            <a:chExt cx="8416471" cy="1920082"/>
+          </a:xfrm>
+        </p:grpSpPr>
+        <p:cxnSp>
+          <p:nvCxnSpPr>
+            <p:cNvPr id="71" name="Straight Arrow Connector 5">
+              <a:extLst>
+                <a:ext uri="{FF2B5EF4-FFF2-40B4-BE49-F238E27FC236}">
+                  <a16:creationId xmlns:a16="http://schemas.microsoft.com/office/drawing/2014/main" id="{CD7755B5-233A-EB47-B052-D3A80288C009}"/>
+                </a:ext>
+              </a:extLst>
+            </p:cNvPr>
+            <p:cNvCxnSpPr>
+              <a:cxnSpLocks/>
+              <a:endCxn id="85" idx="0"/>
+            </p:cNvCxnSpPr>
+            <p:nvPr/>
+          </p:nvCxnSpPr>
+          <p:spPr>
+            <a:xfrm flipV="1">
+              <a:off x="5095644" y="1796957"/>
+              <a:ext cx="1439006" cy="343873"/>
+            </a:xfrm>
+            <a:prstGeom prst="bentConnector4">
+              <a:avLst>
+                <a:gd name="adj1" fmla="val 20"/>
+                <a:gd name="adj2" fmla="val 166478"/>
+              </a:avLst>
+            </a:prstGeom>
+            <a:ln>
+              <a:solidFill>
+                <a:srgbClr val="FF0000"/>
+              </a:solidFill>
+              <a:headEnd type="none"/>
+              <a:tailEnd type="none"/>
+            </a:ln>
+            <a:effectLst/>
+          </p:spPr>
+          <p:style>
+            <a:lnRef idx="2">
+              <a:schemeClr val="accent1"/>
+            </a:lnRef>
+            <a:fillRef idx="0">
+              <a:schemeClr val="accent1"/>
+            </a:fillRef>
+            <a:effectRef idx="1">
+              <a:schemeClr val="accent1"/>
+            </a:effectRef>
+            <a:fontRef idx="minor">
+              <a:schemeClr val="tx1"/>
+            </a:fontRef>
+          </p:style>
+        </p:cxnSp>
+        <p:cxnSp>
+          <p:nvCxnSpPr>
+            <p:cNvPr id="73" name="Straight Arrow Connector 5">
+              <a:extLst>
+                <a:ext uri="{FF2B5EF4-FFF2-40B4-BE49-F238E27FC236}">
+                  <a16:creationId xmlns:a16="http://schemas.microsoft.com/office/drawing/2014/main" id="{86CE35DD-C14C-5C44-94B7-DDD0F4F9DB8B}"/>
+                </a:ext>
+              </a:extLst>
+            </p:cNvPr>
+            <p:cNvCxnSpPr>
+              <a:cxnSpLocks/>
+            </p:cNvCxnSpPr>
+            <p:nvPr/>
+          </p:nvCxnSpPr>
+          <p:spPr>
+            <a:xfrm flipV="1">
+              <a:off x="2249000" y="1566880"/>
+              <a:ext cx="2846644" cy="578944"/>
+            </a:xfrm>
+            <a:prstGeom prst="bentConnector3">
+              <a:avLst>
+                <a:gd name="adj1" fmla="val 203"/>
+              </a:avLst>
+            </a:prstGeom>
+            <a:ln>
+              <a:solidFill>
+                <a:srgbClr val="FF0000"/>
+              </a:solidFill>
+              <a:headEnd type="none"/>
+              <a:tailEnd type="none"/>
+            </a:ln>
+            <a:effectLst/>
+          </p:spPr>
+          <p:style>
+            <a:lnRef idx="2">
+              <a:schemeClr val="accent1"/>
+            </a:lnRef>
+            <a:fillRef idx="0">
+              <a:schemeClr val="accent1"/>
+            </a:fillRef>
+            <a:effectRef idx="1">
+              <a:schemeClr val="accent1"/>
+            </a:effectRef>
+            <a:fontRef idx="minor">
+              <a:schemeClr val="tx1"/>
+            </a:fontRef>
+          </p:style>
+        </p:cxnSp>
+        <p:cxnSp>
+          <p:nvCxnSpPr>
+            <p:cNvPr id="74" name="Straight Connector 73">
+              <a:extLst>
+                <a:ext uri="{FF2B5EF4-FFF2-40B4-BE49-F238E27FC236}">
+                  <a16:creationId xmlns:a16="http://schemas.microsoft.com/office/drawing/2014/main" id="{2A40AB04-36B2-7B4A-A4E1-361A6C954FD2}"/>
+                </a:ext>
+              </a:extLst>
+            </p:cNvPr>
+            <p:cNvCxnSpPr/>
+            <p:nvPr/>
+          </p:nvCxnSpPr>
+          <p:spPr>
+            <a:xfrm>
+              <a:off x="6439400" y="1797802"/>
+              <a:ext cx="190500" cy="0"/>
+            </a:xfrm>
+            <a:prstGeom prst="line">
+              <a:avLst/>
+            </a:prstGeom>
+            <a:ln>
+              <a:solidFill>
+                <a:srgbClr val="FF0000"/>
+              </a:solidFill>
+            </a:ln>
+            <a:effectLst/>
+          </p:spPr>
+          <p:style>
+            <a:lnRef idx="2">
+              <a:schemeClr val="accent1"/>
+            </a:lnRef>
+            <a:fillRef idx="0">
+              <a:schemeClr val="accent1"/>
+            </a:fillRef>
+            <a:effectRef idx="1">
+              <a:schemeClr val="accent1"/>
+            </a:effectRef>
+            <a:fontRef idx="minor">
+              <a:schemeClr val="tx1"/>
+            </a:fontRef>
+          </p:style>
+        </p:cxnSp>
+        <p:grpSp>
+          <p:nvGrpSpPr>
+            <p:cNvPr id="75" name="Group 74">
+              <a:extLst>
+                <a:ext uri="{FF2B5EF4-FFF2-40B4-BE49-F238E27FC236}">
+                  <a16:creationId xmlns:a16="http://schemas.microsoft.com/office/drawing/2014/main" id="{488254A4-1783-D94B-9F35-8B72414B8EFA}"/>
+                </a:ext>
+              </a:extLst>
+            </p:cNvPr>
+            <p:cNvGrpSpPr/>
+            <p:nvPr/>
+          </p:nvGrpSpPr>
+          <p:grpSpPr>
+            <a:xfrm>
+              <a:off x="451212" y="1796957"/>
+              <a:ext cx="8416471" cy="657557"/>
+              <a:chOff x="139700" y="1207886"/>
+              <a:chExt cx="12901942" cy="1007995"/>
+            </a:xfrm>
+          </p:grpSpPr>
+          <p:grpSp>
+            <p:nvGrpSpPr>
+              <p:cNvPr id="79" name="Group 78">
+                <a:extLst>
+                  <a:ext uri="{FF2B5EF4-FFF2-40B4-BE49-F238E27FC236}">
+                    <a16:creationId xmlns:a16="http://schemas.microsoft.com/office/drawing/2014/main" id="{98212708-4443-4643-ABB4-77AD49CAB2C7}"/>
+                  </a:ext>
+                </a:extLst>
+              </p:cNvPr>
+              <p:cNvGrpSpPr/>
+              <p:nvPr/>
+            </p:nvGrpSpPr>
+            <p:grpSpPr>
+              <a:xfrm>
+                <a:off x="139700" y="1212336"/>
+                <a:ext cx="4196538" cy="1003545"/>
+                <a:chOff x="2569133" y="413397"/>
+                <a:chExt cx="4196538" cy="1003545"/>
+              </a:xfrm>
+            </p:grpSpPr>
+            <p:cxnSp>
+              <p:nvCxnSpPr>
+                <p:cNvPr id="103" name="Straight Connector 102">
+                  <a:extLst>
+                    <a:ext uri="{FF2B5EF4-FFF2-40B4-BE49-F238E27FC236}">
+                      <a16:creationId xmlns:a16="http://schemas.microsoft.com/office/drawing/2014/main" id="{D945E62A-E4AE-4842-B78E-D1621182DBBE}"/>
+                    </a:ext>
+                  </a:extLst>
+                </p:cNvPr>
+                <p:cNvCxnSpPr/>
+                <p:nvPr/>
+              </p:nvCxnSpPr>
+              <p:spPr>
+                <a:xfrm>
+                  <a:off x="2569133" y="1140336"/>
+                  <a:ext cx="4191000" cy="0"/>
+                </a:xfrm>
+                <a:prstGeom prst="line">
+                  <a:avLst/>
+                </a:prstGeom>
+                <a:ln w="38100" cap="flat" cmpd="sng" algn="ctr">
+                  <a:solidFill>
+                    <a:srgbClr val="000000"/>
+                  </a:solidFill>
+                  <a:prstDash val="solid"/>
+                  <a:round/>
+                  <a:headEnd type="none" w="med" len="med"/>
+                  <a:tailEnd type="none" w="med" len="med"/>
+                </a:ln>
+                <a:effectLst/>
+              </p:spPr>
+              <p:style>
+                <a:lnRef idx="2">
+                  <a:schemeClr val="accent1"/>
+                </a:lnRef>
+                <a:fillRef idx="0">
+                  <a:schemeClr val="accent1"/>
+                </a:fillRef>
+                <a:effectRef idx="1">
+                  <a:schemeClr val="accent1"/>
+                </a:effectRef>
+                <a:fontRef idx="minor">
+                  <a:schemeClr val="tx1"/>
+                </a:fontRef>
+              </p:style>
+            </p:cxnSp>
+            <p:sp>
+              <p:nvSpPr>
+                <p:cNvPr id="104" name="Right Arrow 103">
+                  <a:extLst>
+                    <a:ext uri="{FF2B5EF4-FFF2-40B4-BE49-F238E27FC236}">
+                      <a16:creationId xmlns:a16="http://schemas.microsoft.com/office/drawing/2014/main" id="{2173063B-22DE-A641-BE1B-7F5DF5C9FAC6}"/>
+                    </a:ext>
+                  </a:extLst>
+                </p:cNvPr>
+                <p:cNvSpPr/>
+                <p:nvPr/>
+              </p:nvSpPr>
+              <p:spPr>
+                <a:xfrm>
+                  <a:off x="4740833" y="949836"/>
+                  <a:ext cx="1168400" cy="350140"/>
+                </a:xfrm>
+                <a:prstGeom prst="rightArrow">
+                  <a:avLst>
+                    <a:gd name="adj1" fmla="val 100000"/>
+                    <a:gd name="adj2" fmla="val 52194"/>
+                  </a:avLst>
+                </a:prstGeom>
+                <a:solidFill>
+                  <a:schemeClr val="accent2"/>
+                </a:solidFill>
+                <a:ln w="38100" cap="flat" cmpd="sng" algn="ctr">
+                  <a:solidFill>
+                    <a:srgbClr val="000000"/>
+                  </a:solidFill>
+                  <a:prstDash val="solid"/>
+                  <a:round/>
+                  <a:headEnd type="none" w="med" len="med"/>
+                  <a:tailEnd type="none" w="med" len="med"/>
+                </a:ln>
+                <a:effectLst/>
+              </p:spPr>
+              <p:style>
+                <a:lnRef idx="1">
+                  <a:schemeClr val="accent1"/>
+                </a:lnRef>
+                <a:fillRef idx="3">
+                  <a:schemeClr val="accent1"/>
+                </a:fillRef>
+                <a:effectRef idx="2">
+                  <a:schemeClr val="accent1"/>
+                </a:effectRef>
+                <a:fontRef idx="minor">
+                  <a:schemeClr val="lt1"/>
+                </a:fontRef>
+              </p:style>
+              <p:txBody>
+                <a:bodyPr rtlCol="0" anchor="ctr"/>
+                <a:lstStyle/>
+                <a:p>
+                  <a:pPr algn="ctr"/>
+                  <a:endParaRPr lang="en-US" i="1" dirty="0">
+                    <a:solidFill>
+                      <a:schemeClr val="tx1"/>
+                    </a:solidFill>
+                  </a:endParaRPr>
+                </a:p>
+              </p:txBody>
+            </p:sp>
+            <p:sp>
+              <p:nvSpPr>
+                <p:cNvPr id="105" name="Chord 104">
+                  <a:extLst>
+                    <a:ext uri="{FF2B5EF4-FFF2-40B4-BE49-F238E27FC236}">
+                      <a16:creationId xmlns:a16="http://schemas.microsoft.com/office/drawing/2014/main" id="{6E18E8A1-BEDF-6C48-A3B4-99FEC480F461}"/>
+                    </a:ext>
+                  </a:extLst>
+                </p:cNvPr>
+                <p:cNvSpPr/>
+                <p:nvPr/>
+              </p:nvSpPr>
+              <p:spPr>
+                <a:xfrm>
+                  <a:off x="3734347" y="784736"/>
+                  <a:ext cx="632206" cy="632206"/>
+                </a:xfrm>
+                <a:prstGeom prst="chord">
+                  <a:avLst>
+                    <a:gd name="adj1" fmla="val 10506229"/>
+                    <a:gd name="adj2" fmla="val 301460"/>
+                  </a:avLst>
+                </a:prstGeom>
+                <a:solidFill>
+                  <a:schemeClr val="accent4">
+                    <a:lumMod val="60000"/>
+                    <a:lumOff val="40000"/>
+                  </a:schemeClr>
+                </a:solidFill>
+                <a:ln w="38100" cap="flat" cmpd="sng" algn="ctr">
+                  <a:solidFill>
+                    <a:srgbClr val="000000"/>
+                  </a:solidFill>
+                  <a:prstDash val="solid"/>
+                  <a:round/>
+                  <a:headEnd type="none" w="med" len="med"/>
+                  <a:tailEnd type="none" w="med" len="med"/>
+                </a:ln>
+                <a:effectLst/>
+              </p:spPr>
+              <p:style>
+                <a:lnRef idx="1">
+                  <a:schemeClr val="accent1"/>
+                </a:lnRef>
+                <a:fillRef idx="3">
+                  <a:schemeClr val="accent1"/>
+                </a:fillRef>
+                <a:effectRef idx="2">
+                  <a:schemeClr val="accent1"/>
+                </a:effectRef>
+                <a:fontRef idx="minor">
+                  <a:schemeClr val="lt1"/>
+                </a:fontRef>
+              </p:style>
+              <p:txBody>
+                <a:bodyPr rtlCol="0" anchor="ctr"/>
+                <a:lstStyle/>
+                <a:p>
+                  <a:pPr algn="ctr"/>
+                  <a:endParaRPr lang="en-US"/>
+                </a:p>
+              </p:txBody>
+            </p:sp>
+            <p:pic>
+              <p:nvPicPr>
+                <p:cNvPr id="106" name="Picture 105">
+                  <a:extLst>
+                    <a:ext uri="{FF2B5EF4-FFF2-40B4-BE49-F238E27FC236}">
+                      <a16:creationId xmlns:a16="http://schemas.microsoft.com/office/drawing/2014/main" id="{B033FB47-966B-D04E-9F2B-827710845A82}"/>
+                    </a:ext>
+                  </a:extLst>
+                </p:cNvPr>
+                <p:cNvPicPr>
+                  <a:picLocks noChangeAspect="1"/>
+                </p:cNvPicPr>
+                <p:nvPr/>
+              </p:nvPicPr>
+              <p:blipFill>
+                <a:blip r:embed="rId2">
+                  <a:extLst>
+                    <a:ext uri="{28A0092B-C50C-407E-A947-70E740481C1C}">
+                      <a14:useLocalDpi xmlns:a14="http://schemas.microsoft.com/office/drawing/2010/main" val="0"/>
+                    </a:ext>
+                  </a:extLst>
+                </a:blip>
+                <a:stretch>
+                  <a:fillRect/>
+                </a:stretch>
+              </p:blipFill>
+              <p:spPr>
+                <a:xfrm>
+                  <a:off x="2803319" y="413397"/>
+                  <a:ext cx="771908" cy="771908"/>
+                </a:xfrm>
+                <a:prstGeom prst="rect">
+                  <a:avLst/>
+                </a:prstGeom>
+              </p:spPr>
+            </p:pic>
+            <p:pic>
+              <p:nvPicPr>
+                <p:cNvPr id="107" name="Picture 106">
+                  <a:extLst>
+                    <a:ext uri="{FF2B5EF4-FFF2-40B4-BE49-F238E27FC236}">
+                      <a16:creationId xmlns:a16="http://schemas.microsoft.com/office/drawing/2014/main" id="{DC2C8D30-F4BA-C044-9F34-0946218FF146}"/>
+                    </a:ext>
+                  </a:extLst>
+                </p:cNvPr>
+                <p:cNvPicPr>
+                  <a:picLocks noChangeAspect="1"/>
+                </p:cNvPicPr>
+                <p:nvPr/>
+              </p:nvPicPr>
+              <p:blipFill>
+                <a:blip r:embed="rId3">
+                  <a:extLst>
+                    <a:ext uri="{28A0092B-C50C-407E-A947-70E740481C1C}">
+                      <a14:useLocalDpi xmlns:a14="http://schemas.microsoft.com/office/drawing/2010/main" val="0"/>
+                    </a:ext>
+                  </a:extLst>
+                </a:blip>
+                <a:stretch>
+                  <a:fillRect/>
+                </a:stretch>
+              </p:blipFill>
+              <p:spPr>
+                <a:xfrm>
+                  <a:off x="5971536" y="499461"/>
+                  <a:ext cx="794135" cy="794135"/>
+                </a:xfrm>
+                <a:prstGeom prst="rect">
+                  <a:avLst/>
+                </a:prstGeom>
+              </p:spPr>
+            </p:pic>
+          </p:grpSp>
+          <p:grpSp>
+            <p:nvGrpSpPr>
+              <p:cNvPr id="80" name="Group 79">
+                <a:extLst>
+                  <a:ext uri="{FF2B5EF4-FFF2-40B4-BE49-F238E27FC236}">
+                    <a16:creationId xmlns:a16="http://schemas.microsoft.com/office/drawing/2014/main" id="{207C6EF1-D72E-5A48-9CFF-6FD7AACB3BEE}"/>
+                  </a:ext>
+                </a:extLst>
+              </p:cNvPr>
+              <p:cNvGrpSpPr/>
+              <p:nvPr/>
+            </p:nvGrpSpPr>
+            <p:grpSpPr>
+              <a:xfrm>
+                <a:off x="4489820" y="1207886"/>
+                <a:ext cx="4196538" cy="1003545"/>
+                <a:chOff x="2569133" y="413397"/>
+                <a:chExt cx="4196538" cy="1003545"/>
+              </a:xfrm>
+            </p:grpSpPr>
+            <p:cxnSp>
+              <p:nvCxnSpPr>
+                <p:cNvPr id="87" name="Straight Connector 86">
+                  <a:extLst>
+                    <a:ext uri="{FF2B5EF4-FFF2-40B4-BE49-F238E27FC236}">
+                      <a16:creationId xmlns:a16="http://schemas.microsoft.com/office/drawing/2014/main" id="{5F67806B-0185-7F4E-8F09-B362CB90FDBD}"/>
+                    </a:ext>
+                  </a:extLst>
+                </p:cNvPr>
+                <p:cNvCxnSpPr/>
+                <p:nvPr/>
+              </p:nvCxnSpPr>
+              <p:spPr>
+                <a:xfrm>
+                  <a:off x="2569133" y="1140336"/>
+                  <a:ext cx="4191000" cy="0"/>
+                </a:xfrm>
+                <a:prstGeom prst="line">
+                  <a:avLst/>
+                </a:prstGeom>
+                <a:ln w="38100" cap="flat" cmpd="sng" algn="ctr">
+                  <a:solidFill>
+                    <a:srgbClr val="000000"/>
+                  </a:solidFill>
+                  <a:prstDash val="solid"/>
+                  <a:round/>
+                  <a:headEnd type="none" w="med" len="med"/>
+                  <a:tailEnd type="none" w="med" len="med"/>
+                </a:ln>
+                <a:effectLst/>
+              </p:spPr>
+              <p:style>
+                <a:lnRef idx="2">
+                  <a:schemeClr val="accent1"/>
+                </a:lnRef>
+                <a:fillRef idx="0">
+                  <a:schemeClr val="accent1"/>
+                </a:fillRef>
+                <a:effectRef idx="1">
+                  <a:schemeClr val="accent1"/>
+                </a:effectRef>
+                <a:fontRef idx="minor">
+                  <a:schemeClr val="tx1"/>
+                </a:fontRef>
+              </p:style>
+            </p:cxnSp>
+            <p:sp>
+              <p:nvSpPr>
+                <p:cNvPr id="88" name="Right Arrow 87">
+                  <a:extLst>
+                    <a:ext uri="{FF2B5EF4-FFF2-40B4-BE49-F238E27FC236}">
+                      <a16:creationId xmlns:a16="http://schemas.microsoft.com/office/drawing/2014/main" id="{E30841D7-4D8B-FC49-8CCD-E452E714C338}"/>
+                    </a:ext>
+                  </a:extLst>
+                </p:cNvPr>
+                <p:cNvSpPr/>
+                <p:nvPr/>
+              </p:nvSpPr>
+              <p:spPr>
+                <a:xfrm>
+                  <a:off x="4740833" y="949836"/>
+                  <a:ext cx="1168400" cy="350140"/>
+                </a:xfrm>
+                <a:prstGeom prst="rightArrow">
+                  <a:avLst>
+                    <a:gd name="adj1" fmla="val 100000"/>
+                    <a:gd name="adj2" fmla="val 52194"/>
+                  </a:avLst>
+                </a:prstGeom>
+                <a:solidFill>
+                  <a:schemeClr val="accent2"/>
+                </a:solidFill>
+                <a:ln w="38100" cap="flat" cmpd="sng" algn="ctr">
+                  <a:solidFill>
+                    <a:srgbClr val="000000"/>
+                  </a:solidFill>
+                  <a:prstDash val="solid"/>
+                  <a:round/>
+                  <a:headEnd type="none" w="med" len="med"/>
+                  <a:tailEnd type="none" w="med" len="med"/>
+                </a:ln>
+                <a:effectLst/>
+              </p:spPr>
+              <p:style>
+                <a:lnRef idx="1">
+                  <a:schemeClr val="accent1"/>
+                </a:lnRef>
+                <a:fillRef idx="3">
+                  <a:schemeClr val="accent1"/>
+                </a:fillRef>
+                <a:effectRef idx="2">
+                  <a:schemeClr val="accent1"/>
+                </a:effectRef>
+                <a:fontRef idx="minor">
+                  <a:schemeClr val="lt1"/>
+                </a:fontRef>
+              </p:style>
+              <p:txBody>
+                <a:bodyPr rtlCol="0" anchor="ctr"/>
+                <a:lstStyle/>
+                <a:p>
+                  <a:pPr algn="ctr"/>
+                  <a:endParaRPr lang="en-US" i="1" dirty="0">
+                    <a:solidFill>
+                      <a:schemeClr val="tx1"/>
+                    </a:solidFill>
+                  </a:endParaRPr>
+                </a:p>
+              </p:txBody>
+            </p:sp>
+            <p:sp>
+              <p:nvSpPr>
+                <p:cNvPr id="100" name="Chord 99">
+                  <a:extLst>
+                    <a:ext uri="{FF2B5EF4-FFF2-40B4-BE49-F238E27FC236}">
+                      <a16:creationId xmlns:a16="http://schemas.microsoft.com/office/drawing/2014/main" id="{7D386452-C20A-FF43-945C-E76EA44502B7}"/>
+                    </a:ext>
+                  </a:extLst>
+                </p:cNvPr>
+                <p:cNvSpPr/>
+                <p:nvPr/>
+              </p:nvSpPr>
+              <p:spPr>
+                <a:xfrm>
+                  <a:off x="3734347" y="784736"/>
+                  <a:ext cx="632206" cy="632206"/>
+                </a:xfrm>
+                <a:prstGeom prst="chord">
+                  <a:avLst>
+                    <a:gd name="adj1" fmla="val 10506229"/>
+                    <a:gd name="adj2" fmla="val 301460"/>
+                  </a:avLst>
+                </a:prstGeom>
+                <a:solidFill>
+                  <a:schemeClr val="accent4">
+                    <a:lumMod val="60000"/>
+                    <a:lumOff val="40000"/>
+                  </a:schemeClr>
+                </a:solidFill>
+                <a:ln w="38100" cap="flat" cmpd="sng" algn="ctr">
+                  <a:solidFill>
+                    <a:srgbClr val="000000"/>
+                  </a:solidFill>
+                  <a:prstDash val="solid"/>
+                  <a:round/>
+                  <a:headEnd type="none" w="med" len="med"/>
+                  <a:tailEnd type="none" w="med" len="med"/>
+                </a:ln>
+                <a:effectLst/>
+              </p:spPr>
+              <p:style>
+                <a:lnRef idx="1">
+                  <a:schemeClr val="accent1"/>
+                </a:lnRef>
+                <a:fillRef idx="3">
+                  <a:schemeClr val="accent1"/>
+                </a:fillRef>
+                <a:effectRef idx="2">
+                  <a:schemeClr val="accent1"/>
+                </a:effectRef>
+                <a:fontRef idx="minor">
+                  <a:schemeClr val="lt1"/>
+                </a:fontRef>
+              </p:style>
+              <p:txBody>
+                <a:bodyPr rtlCol="0" anchor="ctr"/>
+                <a:lstStyle/>
+                <a:p>
+                  <a:pPr algn="ctr"/>
+                  <a:endParaRPr lang="en-US"/>
+                </a:p>
+              </p:txBody>
+            </p:sp>
+            <p:pic>
+              <p:nvPicPr>
+                <p:cNvPr id="101" name="Picture 100">
+                  <a:extLst>
+                    <a:ext uri="{FF2B5EF4-FFF2-40B4-BE49-F238E27FC236}">
+                      <a16:creationId xmlns:a16="http://schemas.microsoft.com/office/drawing/2014/main" id="{F5CE2FD9-B0EA-0043-97F2-D8B1BE676F96}"/>
+                    </a:ext>
+                  </a:extLst>
+                </p:cNvPr>
+                <p:cNvPicPr>
+                  <a:picLocks noChangeAspect="1"/>
+                </p:cNvPicPr>
+                <p:nvPr/>
+              </p:nvPicPr>
+              <p:blipFill>
+                <a:blip r:embed="rId2">
+                  <a:extLst>
+                    <a:ext uri="{28A0092B-C50C-407E-A947-70E740481C1C}">
+                      <a14:useLocalDpi xmlns:a14="http://schemas.microsoft.com/office/drawing/2010/main" val="0"/>
+                    </a:ext>
+                  </a:extLst>
+                </a:blip>
+                <a:stretch>
+                  <a:fillRect/>
+                </a:stretch>
+              </p:blipFill>
+              <p:spPr>
+                <a:xfrm>
+                  <a:off x="2803319" y="413397"/>
+                  <a:ext cx="771908" cy="771908"/>
+                </a:xfrm>
+                <a:prstGeom prst="rect">
+                  <a:avLst/>
+                </a:prstGeom>
+              </p:spPr>
+            </p:pic>
+            <p:pic>
+              <p:nvPicPr>
+                <p:cNvPr id="102" name="Picture 101">
+                  <a:extLst>
+                    <a:ext uri="{FF2B5EF4-FFF2-40B4-BE49-F238E27FC236}">
+                      <a16:creationId xmlns:a16="http://schemas.microsoft.com/office/drawing/2014/main" id="{57A90F63-3779-D84C-9277-1EC1197D09D7}"/>
+                    </a:ext>
+                  </a:extLst>
+                </p:cNvPr>
+                <p:cNvPicPr>
+                  <a:picLocks noChangeAspect="1"/>
+                </p:cNvPicPr>
+                <p:nvPr/>
+              </p:nvPicPr>
+              <p:blipFill>
+                <a:blip r:embed="rId3">
+                  <a:extLst>
+                    <a:ext uri="{28A0092B-C50C-407E-A947-70E740481C1C}">
+                      <a14:useLocalDpi xmlns:a14="http://schemas.microsoft.com/office/drawing/2010/main" val="0"/>
+                    </a:ext>
+                  </a:extLst>
+                </a:blip>
+                <a:stretch>
+                  <a:fillRect/>
+                </a:stretch>
+              </p:blipFill>
+              <p:spPr>
+                <a:xfrm>
+                  <a:off x="5971536" y="499461"/>
+                  <a:ext cx="794135" cy="794135"/>
+                </a:xfrm>
+                <a:prstGeom prst="rect">
+                  <a:avLst/>
+                </a:prstGeom>
+              </p:spPr>
+            </p:pic>
+          </p:grpSp>
+          <p:grpSp>
+            <p:nvGrpSpPr>
+              <p:cNvPr id="81" name="Group 80">
+                <a:extLst>
+                  <a:ext uri="{FF2B5EF4-FFF2-40B4-BE49-F238E27FC236}">
+                    <a16:creationId xmlns:a16="http://schemas.microsoft.com/office/drawing/2014/main" id="{50DDD19B-8A33-0344-B08D-D3A5EF236BB9}"/>
+                  </a:ext>
+                </a:extLst>
+              </p:cNvPr>
+              <p:cNvGrpSpPr/>
+              <p:nvPr/>
+            </p:nvGrpSpPr>
+            <p:grpSpPr>
+              <a:xfrm>
+                <a:off x="8845104" y="1207886"/>
+                <a:ext cx="4196538" cy="1003545"/>
+                <a:chOff x="2569133" y="413397"/>
+                <a:chExt cx="4196538" cy="1003545"/>
+              </a:xfrm>
+            </p:grpSpPr>
+            <p:cxnSp>
+              <p:nvCxnSpPr>
+                <p:cNvPr id="82" name="Straight Connector 81">
+                  <a:extLst>
+                    <a:ext uri="{FF2B5EF4-FFF2-40B4-BE49-F238E27FC236}">
+                      <a16:creationId xmlns:a16="http://schemas.microsoft.com/office/drawing/2014/main" id="{DA436051-C1E2-AE4F-918E-A2C874EC82EC}"/>
+                    </a:ext>
+                  </a:extLst>
+                </p:cNvPr>
+                <p:cNvCxnSpPr/>
+                <p:nvPr/>
+              </p:nvCxnSpPr>
+              <p:spPr>
+                <a:xfrm>
+                  <a:off x="2569133" y="1140336"/>
+                  <a:ext cx="4191000" cy="0"/>
+                </a:xfrm>
+                <a:prstGeom prst="line">
+                  <a:avLst/>
+                </a:prstGeom>
+                <a:ln w="38100" cap="flat" cmpd="sng" algn="ctr">
+                  <a:solidFill>
+                    <a:srgbClr val="000000"/>
+                  </a:solidFill>
+                  <a:prstDash val="solid"/>
+                  <a:round/>
+                  <a:headEnd type="none" w="med" len="med"/>
+                  <a:tailEnd type="none" w="med" len="med"/>
+                </a:ln>
+                <a:effectLst/>
+              </p:spPr>
+              <p:style>
+                <a:lnRef idx="2">
+                  <a:schemeClr val="accent1"/>
+                </a:lnRef>
+                <a:fillRef idx="0">
+                  <a:schemeClr val="accent1"/>
+                </a:fillRef>
+                <a:effectRef idx="1">
+                  <a:schemeClr val="accent1"/>
+                </a:effectRef>
+                <a:fontRef idx="minor">
+                  <a:schemeClr val="tx1"/>
+                </a:fontRef>
+              </p:style>
+            </p:cxnSp>
+            <p:sp>
+              <p:nvSpPr>
+                <p:cNvPr id="83" name="Right Arrow 82">
+                  <a:extLst>
+                    <a:ext uri="{FF2B5EF4-FFF2-40B4-BE49-F238E27FC236}">
+                      <a16:creationId xmlns:a16="http://schemas.microsoft.com/office/drawing/2014/main" id="{4A5A38DD-8987-5D4B-9D82-16014572444B}"/>
+                    </a:ext>
+                  </a:extLst>
+                </p:cNvPr>
+                <p:cNvSpPr/>
+                <p:nvPr/>
+              </p:nvSpPr>
+              <p:spPr>
+                <a:xfrm>
+                  <a:off x="4740833" y="949836"/>
+                  <a:ext cx="1168400" cy="350140"/>
+                </a:xfrm>
+                <a:prstGeom prst="rightArrow">
+                  <a:avLst>
+                    <a:gd name="adj1" fmla="val 100000"/>
+                    <a:gd name="adj2" fmla="val 52194"/>
+                  </a:avLst>
+                </a:prstGeom>
+                <a:solidFill>
+                  <a:srgbClr val="92D050"/>
+                </a:solidFill>
+                <a:ln w="38100" cap="flat" cmpd="sng" algn="ctr">
+                  <a:solidFill>
+                    <a:srgbClr val="000000"/>
+                  </a:solidFill>
+                  <a:prstDash val="solid"/>
+                  <a:round/>
+                  <a:headEnd type="none" w="med" len="med"/>
+                  <a:tailEnd type="none" w="med" len="med"/>
+                </a:ln>
+                <a:effectLst/>
+              </p:spPr>
+              <p:style>
+                <a:lnRef idx="1">
+                  <a:schemeClr val="accent1"/>
+                </a:lnRef>
+                <a:fillRef idx="3">
+                  <a:schemeClr val="accent1"/>
+                </a:fillRef>
+                <a:effectRef idx="2">
+                  <a:schemeClr val="accent1"/>
+                </a:effectRef>
+                <a:fontRef idx="minor">
+                  <a:schemeClr val="lt1"/>
+                </a:fontRef>
+              </p:style>
+              <p:txBody>
+                <a:bodyPr rtlCol="0" anchor="ctr"/>
+                <a:lstStyle/>
+                <a:p>
+                  <a:pPr algn="ctr"/>
+                  <a:endParaRPr lang="en-US" i="1" dirty="0">
+                    <a:solidFill>
+                      <a:schemeClr val="tx1"/>
+                    </a:solidFill>
+                  </a:endParaRPr>
+                </a:p>
+              </p:txBody>
+            </p:sp>
+            <p:sp>
+              <p:nvSpPr>
+                <p:cNvPr id="84" name="Chord 83">
+                  <a:extLst>
+                    <a:ext uri="{FF2B5EF4-FFF2-40B4-BE49-F238E27FC236}">
+                      <a16:creationId xmlns:a16="http://schemas.microsoft.com/office/drawing/2014/main" id="{FF1A7D3C-F24C-5341-825B-9C64005A1976}"/>
+                    </a:ext>
+                  </a:extLst>
+                </p:cNvPr>
+                <p:cNvSpPr/>
+                <p:nvPr/>
+              </p:nvSpPr>
+              <p:spPr>
+                <a:xfrm>
+                  <a:off x="3734347" y="784736"/>
+                  <a:ext cx="632206" cy="632206"/>
+                </a:xfrm>
+                <a:prstGeom prst="chord">
+                  <a:avLst>
+                    <a:gd name="adj1" fmla="val 10506229"/>
+                    <a:gd name="adj2" fmla="val 301460"/>
+                  </a:avLst>
+                </a:prstGeom>
+                <a:solidFill>
+                  <a:schemeClr val="accent4">
+                    <a:lumMod val="60000"/>
+                    <a:lumOff val="40000"/>
+                  </a:schemeClr>
+                </a:solidFill>
+                <a:ln w="38100" cap="flat" cmpd="sng" algn="ctr">
+                  <a:solidFill>
+                    <a:srgbClr val="000000"/>
+                  </a:solidFill>
+                  <a:prstDash val="solid"/>
+                  <a:round/>
+                  <a:headEnd type="none" w="med" len="med"/>
+                  <a:tailEnd type="none" w="med" len="med"/>
+                </a:ln>
+                <a:effectLst/>
+              </p:spPr>
+              <p:style>
+                <a:lnRef idx="1">
+                  <a:schemeClr val="accent1"/>
+                </a:lnRef>
+                <a:fillRef idx="3">
+                  <a:schemeClr val="accent1"/>
+                </a:fillRef>
+                <a:effectRef idx="2">
+                  <a:schemeClr val="accent1"/>
+                </a:effectRef>
+                <a:fontRef idx="minor">
+                  <a:schemeClr val="lt1"/>
+                </a:fontRef>
+              </p:style>
+              <p:txBody>
+                <a:bodyPr rtlCol="0" anchor="ctr"/>
+                <a:lstStyle/>
+                <a:p>
+                  <a:pPr algn="ctr"/>
+                  <a:endParaRPr lang="en-US"/>
+                </a:p>
+              </p:txBody>
+            </p:sp>
+            <p:pic>
+              <p:nvPicPr>
+                <p:cNvPr id="85" name="Picture 84">
+                  <a:extLst>
+                    <a:ext uri="{FF2B5EF4-FFF2-40B4-BE49-F238E27FC236}">
+                      <a16:creationId xmlns:a16="http://schemas.microsoft.com/office/drawing/2014/main" id="{4255AE73-BDFF-0A49-BB6B-8722A8D5AD33}"/>
+                    </a:ext>
+                  </a:extLst>
+                </p:cNvPr>
+                <p:cNvPicPr>
+                  <a:picLocks noChangeAspect="1"/>
+                </p:cNvPicPr>
+                <p:nvPr/>
+              </p:nvPicPr>
+              <p:blipFill>
+                <a:blip r:embed="rId2">
+                  <a:extLst>
+                    <a:ext uri="{28A0092B-C50C-407E-A947-70E740481C1C}">
+                      <a14:useLocalDpi xmlns:a14="http://schemas.microsoft.com/office/drawing/2010/main" val="0"/>
+                    </a:ext>
+                  </a:extLst>
+                </a:blip>
+                <a:stretch>
+                  <a:fillRect/>
+                </a:stretch>
+              </p:blipFill>
+              <p:spPr>
+                <a:xfrm>
+                  <a:off x="2803319" y="413397"/>
+                  <a:ext cx="771908" cy="771908"/>
+                </a:xfrm>
+                <a:prstGeom prst="rect">
+                  <a:avLst/>
+                </a:prstGeom>
+              </p:spPr>
+            </p:pic>
+            <p:pic>
+              <p:nvPicPr>
+                <p:cNvPr id="86" name="Picture 85">
+                  <a:extLst>
+                    <a:ext uri="{FF2B5EF4-FFF2-40B4-BE49-F238E27FC236}">
+                      <a16:creationId xmlns:a16="http://schemas.microsoft.com/office/drawing/2014/main" id="{597459D4-8CA2-3645-A112-4F755A436397}"/>
+                    </a:ext>
+                  </a:extLst>
+                </p:cNvPr>
+                <p:cNvPicPr>
+                  <a:picLocks noChangeAspect="1"/>
+                </p:cNvPicPr>
+                <p:nvPr/>
+              </p:nvPicPr>
+              <p:blipFill>
+                <a:blip r:embed="rId3">
+                  <a:extLst>
+                    <a:ext uri="{28A0092B-C50C-407E-A947-70E740481C1C}">
+                      <a14:useLocalDpi xmlns:a14="http://schemas.microsoft.com/office/drawing/2010/main" val="0"/>
+                    </a:ext>
+                  </a:extLst>
+                </a:blip>
+                <a:stretch>
+                  <a:fillRect/>
+                </a:stretch>
+              </p:blipFill>
+              <p:spPr>
+                <a:xfrm>
+                  <a:off x="5971536" y="499461"/>
+                  <a:ext cx="794135" cy="794135"/>
+                </a:xfrm>
+                <a:prstGeom prst="rect">
+                  <a:avLst/>
+                </a:prstGeom>
+              </p:spPr>
+            </p:pic>
+          </p:grpSp>
+        </p:grpSp>
+        <p:cxnSp>
+          <p:nvCxnSpPr>
+            <p:cNvPr id="76" name="Straight Connector 75">
+              <a:extLst>
+                <a:ext uri="{FF2B5EF4-FFF2-40B4-BE49-F238E27FC236}">
+                  <a16:creationId xmlns:a16="http://schemas.microsoft.com/office/drawing/2014/main" id="{BD4942EA-B5A9-574D-A796-8CE448602E30}"/>
+                </a:ext>
+              </a:extLst>
+            </p:cNvPr>
+            <p:cNvCxnSpPr>
+              <a:cxnSpLocks/>
+            </p:cNvCxnSpPr>
+            <p:nvPr/>
+          </p:nvCxnSpPr>
+          <p:spPr>
+            <a:xfrm>
+              <a:off x="5102456" y="1057650"/>
+              <a:ext cx="0" cy="508893"/>
+            </a:xfrm>
+            <a:prstGeom prst="line">
+              <a:avLst/>
+            </a:prstGeom>
+            <a:ln w="28575">
+              <a:solidFill>
+                <a:srgbClr val="00B050"/>
+              </a:solidFill>
+              <a:headEnd type="none" w="med" len="med"/>
+              <a:tailEnd type="triangle" w="lg" len="lg"/>
+            </a:ln>
+            <a:effectLst/>
+          </p:spPr>
+          <p:style>
+            <a:lnRef idx="2">
+              <a:schemeClr val="accent1"/>
+            </a:lnRef>
+            <a:fillRef idx="0">
+              <a:schemeClr val="accent1"/>
+            </a:fillRef>
+            <a:effectRef idx="1">
+              <a:schemeClr val="accent1"/>
+            </a:effectRef>
+            <a:fontRef idx="minor">
+              <a:schemeClr val="tx1"/>
+            </a:fontRef>
+          </p:style>
+        </p:cxnSp>
+        <p:pic>
+          <p:nvPicPr>
+            <p:cNvPr id="77" name="Picture 76">
+              <a:extLst>
+                <a:ext uri="{FF2B5EF4-FFF2-40B4-BE49-F238E27FC236}">
+                  <a16:creationId xmlns:a16="http://schemas.microsoft.com/office/drawing/2014/main" id="{00E0D940-B82F-3B43-9BAD-FB9AA84411F1}"/>
+                </a:ext>
+              </a:extLst>
+            </p:cNvPr>
+            <p:cNvPicPr>
+              <a:picLocks noChangeAspect="1"/>
+            </p:cNvPicPr>
+            <p:nvPr/>
+          </p:nvPicPr>
+          <p:blipFill>
+            <a:blip r:embed="rId4"/>
+            <a:stretch>
+              <a:fillRect/>
+            </a:stretch>
+          </p:blipFill>
+          <p:spPr>
+            <a:xfrm>
+              <a:off x="4639988" y="534432"/>
+              <a:ext cx="881743" cy="881743"/>
+            </a:xfrm>
+            <a:prstGeom prst="rect">
+              <a:avLst/>
+            </a:prstGeom>
+          </p:spPr>
+        </p:pic>
+        <p:sp>
+          <p:nvSpPr>
+            <p:cNvPr id="78" name="Triangle 77">
+              <a:extLst>
+                <a:ext uri="{FF2B5EF4-FFF2-40B4-BE49-F238E27FC236}">
+                  <a16:creationId xmlns:a16="http://schemas.microsoft.com/office/drawing/2014/main" id="{E22A461E-EF2E-B542-B6BE-BC272B86BF47}"/>
+                </a:ext>
+              </a:extLst>
+            </p:cNvPr>
+            <p:cNvSpPr/>
+            <p:nvPr/>
+          </p:nvSpPr>
+          <p:spPr>
+            <a:xfrm rot="10800000">
+              <a:off x="5064356" y="1455600"/>
+              <a:ext cx="76201" cy="67196"/>
+            </a:xfrm>
+            <a:prstGeom prst="triangle">
+              <a:avLst/>
+            </a:prstGeom>
+            <a:solidFill>
+              <a:schemeClr val="bg1"/>
+            </a:solidFill>
+            <a:ln>
+              <a:noFill/>
+            </a:ln>
+            <a:effectLst/>
+          </p:spPr>
+          <p:style>
+            <a:lnRef idx="1">
+              <a:schemeClr val="accent1"/>
+            </a:lnRef>
+            <a:fillRef idx="3">
+              <a:schemeClr val="accent1"/>
+            </a:fillRef>
+            <a:effectRef idx="2">
+              <a:schemeClr val="accent1"/>
+            </a:effectRef>
+            <a:fontRef idx="minor">
+              <a:schemeClr val="lt1"/>
+            </a:fontRef>
+          </p:style>
+          <p:txBody>
+            <a:bodyPr rtlCol="0" anchor="ctr"/>
+            <a:lstStyle/>
+            <a:p>
+              <a:pPr algn="ctr"/>
+              <a:endParaRPr lang="en-US"/>
+            </a:p>
+          </p:txBody>
+        </p:sp>
+      </p:grpSp>
+      <p:grpSp>
+        <p:nvGrpSpPr>
+          <p:cNvPr id="108" name="Group 107">
+            <a:extLst>
+              <a:ext uri="{FF2B5EF4-FFF2-40B4-BE49-F238E27FC236}">
+                <a16:creationId xmlns:a16="http://schemas.microsoft.com/office/drawing/2014/main" id="{6F6B6018-B492-044E-8309-A6D70F35401D}"/>
+              </a:ext>
+            </a:extLst>
+          </p:cNvPr>
+          <p:cNvGrpSpPr/>
+          <p:nvPr/>
+        </p:nvGrpSpPr>
+        <p:grpSpPr>
+          <a:xfrm>
+            <a:off x="5798655" y="2977012"/>
+            <a:ext cx="2795681" cy="1917179"/>
+            <a:chOff x="6072003" y="534432"/>
+            <a:chExt cx="2795681" cy="1917179"/>
+          </a:xfrm>
+        </p:grpSpPr>
+        <p:cxnSp>
+          <p:nvCxnSpPr>
+            <p:cNvPr id="109" name="Straight Arrow Connector 5">
+              <a:extLst>
+                <a:ext uri="{FF2B5EF4-FFF2-40B4-BE49-F238E27FC236}">
+                  <a16:creationId xmlns:a16="http://schemas.microsoft.com/office/drawing/2014/main" id="{C8AC2283-399A-8242-8D66-DBA1BE0CCDE6}"/>
+                </a:ext>
+              </a:extLst>
+            </p:cNvPr>
+            <p:cNvCxnSpPr>
+              <a:cxnSpLocks/>
+              <a:endCxn id="122" idx="0"/>
+            </p:cNvCxnSpPr>
+            <p:nvPr/>
+          </p:nvCxnSpPr>
+          <p:spPr>
+            <a:xfrm>
+              <a:off x="6534649" y="1537207"/>
+              <a:ext cx="2" cy="259750"/>
+            </a:xfrm>
+            <a:prstGeom prst="straightConnector1">
+              <a:avLst/>
+            </a:prstGeom>
+            <a:ln>
+              <a:solidFill>
+                <a:srgbClr val="FF0000"/>
+              </a:solidFill>
+              <a:headEnd type="none"/>
+              <a:tailEnd type="none"/>
+            </a:ln>
+            <a:effectLst/>
+          </p:spPr>
+          <p:style>
+            <a:lnRef idx="2">
+              <a:schemeClr val="accent1"/>
+            </a:lnRef>
+            <a:fillRef idx="0">
+              <a:schemeClr val="accent1"/>
+            </a:fillRef>
+            <a:effectRef idx="1">
+              <a:schemeClr val="accent1"/>
+            </a:effectRef>
+            <a:fontRef idx="minor">
+              <a:schemeClr val="tx1"/>
+            </a:fontRef>
+          </p:style>
+        </p:cxnSp>
+        <p:cxnSp>
+          <p:nvCxnSpPr>
+            <p:cNvPr id="111" name="Straight Connector 110">
+              <a:extLst>
+                <a:ext uri="{FF2B5EF4-FFF2-40B4-BE49-F238E27FC236}">
+                  <a16:creationId xmlns:a16="http://schemas.microsoft.com/office/drawing/2014/main" id="{53CC25D1-C04B-C943-98C6-BC42478801EC}"/>
+                </a:ext>
+              </a:extLst>
+            </p:cNvPr>
+            <p:cNvCxnSpPr/>
+            <p:nvPr/>
+          </p:nvCxnSpPr>
+          <p:spPr>
+            <a:xfrm>
+              <a:off x="6439400" y="1797802"/>
+              <a:ext cx="190500" cy="0"/>
+            </a:xfrm>
+            <a:prstGeom prst="line">
+              <a:avLst/>
+            </a:prstGeom>
+            <a:ln>
+              <a:solidFill>
+                <a:srgbClr val="FF0000"/>
+              </a:solidFill>
+            </a:ln>
+            <a:effectLst/>
+          </p:spPr>
+          <p:style>
+            <a:lnRef idx="2">
+              <a:schemeClr val="accent1"/>
+            </a:lnRef>
+            <a:fillRef idx="0">
+              <a:schemeClr val="accent1"/>
+            </a:fillRef>
+            <a:effectRef idx="1">
+              <a:schemeClr val="accent1"/>
+            </a:effectRef>
+            <a:fontRef idx="minor">
+              <a:schemeClr val="tx1"/>
+            </a:fontRef>
+          </p:style>
+        </p:cxnSp>
+        <p:grpSp>
+          <p:nvGrpSpPr>
+            <p:cNvPr id="118" name="Group 117">
+              <a:extLst>
+                <a:ext uri="{FF2B5EF4-FFF2-40B4-BE49-F238E27FC236}">
+                  <a16:creationId xmlns:a16="http://schemas.microsoft.com/office/drawing/2014/main" id="{293E4A49-FDF1-134A-A46C-484F2839721A}"/>
+                </a:ext>
+              </a:extLst>
+            </p:cNvPr>
+            <p:cNvGrpSpPr/>
+            <p:nvPr/>
+          </p:nvGrpSpPr>
+          <p:grpSpPr>
+            <a:xfrm>
+              <a:off x="6130108" y="1796957"/>
+              <a:ext cx="2737576" cy="654654"/>
+              <a:chOff x="2569133" y="413397"/>
+              <a:chExt cx="4196538" cy="1003545"/>
+            </a:xfrm>
+          </p:grpSpPr>
+          <p:cxnSp>
+            <p:nvCxnSpPr>
+              <p:cNvPr id="119" name="Straight Connector 118">
+                <a:extLst>
+                  <a:ext uri="{FF2B5EF4-FFF2-40B4-BE49-F238E27FC236}">
+                    <a16:creationId xmlns:a16="http://schemas.microsoft.com/office/drawing/2014/main" id="{299606BA-19FB-384D-B504-03B0254D1034}"/>
+                  </a:ext>
+                </a:extLst>
+              </p:cNvPr>
+              <p:cNvCxnSpPr/>
+              <p:nvPr/>
+            </p:nvCxnSpPr>
+            <p:spPr>
+              <a:xfrm>
+                <a:off x="2569133" y="1140336"/>
+                <a:ext cx="4191000" cy="0"/>
+              </a:xfrm>
+              <a:prstGeom prst="line">
+                <a:avLst/>
+              </a:prstGeom>
+              <a:ln w="38100" cap="flat" cmpd="sng" algn="ctr">
+                <a:solidFill>
+                  <a:srgbClr val="000000"/>
+                </a:solidFill>
+                <a:prstDash val="solid"/>
+                <a:round/>
+                <a:headEnd type="none" w="med" len="med"/>
+                <a:tailEnd type="none" w="med" len="med"/>
+              </a:ln>
+              <a:effectLst/>
+            </p:spPr>
+            <p:style>
+              <a:lnRef idx="2">
+                <a:schemeClr val="accent1"/>
+              </a:lnRef>
+              <a:fillRef idx="0">
+                <a:schemeClr val="accent1"/>
+              </a:fillRef>
+              <a:effectRef idx="1">
+                <a:schemeClr val="accent1"/>
+              </a:effectRef>
+              <a:fontRef idx="minor">
+                <a:schemeClr val="tx1"/>
+              </a:fontRef>
+            </p:style>
+          </p:cxnSp>
+          <p:sp>
+            <p:nvSpPr>
+              <p:cNvPr id="120" name="Right Arrow 119">
+                <a:extLst>
+                  <a:ext uri="{FF2B5EF4-FFF2-40B4-BE49-F238E27FC236}">
+                    <a16:creationId xmlns:a16="http://schemas.microsoft.com/office/drawing/2014/main" id="{8B7744A4-18C5-2C45-BB9C-833970B42357}"/>
+                  </a:ext>
+                </a:extLst>
+              </p:cNvPr>
+              <p:cNvSpPr/>
+              <p:nvPr/>
+            </p:nvSpPr>
+            <p:spPr>
+              <a:xfrm>
+                <a:off x="4740833" y="949836"/>
+                <a:ext cx="1168400" cy="350140"/>
+              </a:xfrm>
+              <a:prstGeom prst="rightArrow">
+                <a:avLst>
+                  <a:gd name="adj1" fmla="val 100000"/>
+                  <a:gd name="adj2" fmla="val 52194"/>
+                </a:avLst>
+              </a:prstGeom>
+              <a:solidFill>
+                <a:srgbClr val="92D050"/>
+              </a:solidFill>
+              <a:ln w="38100" cap="flat" cmpd="sng" algn="ctr">
+                <a:solidFill>
+                  <a:srgbClr val="000000"/>
+                </a:solidFill>
+                <a:prstDash val="solid"/>
+                <a:round/>
+                <a:headEnd type="none" w="med" len="med"/>
+                <a:tailEnd type="none" w="med" len="med"/>
+              </a:ln>
+              <a:effectLst/>
+            </p:spPr>
+            <p:style>
+              <a:lnRef idx="1">
+                <a:schemeClr val="accent1"/>
+              </a:lnRef>
+              <a:fillRef idx="3">
+                <a:schemeClr val="accent1"/>
+              </a:fillRef>
+              <a:effectRef idx="2">
+                <a:schemeClr val="accent1"/>
+              </a:effectRef>
+              <a:fontRef idx="minor">
+                <a:schemeClr val="lt1"/>
+              </a:fontRef>
+            </p:style>
+            <p:txBody>
+              <a:bodyPr rtlCol="0" anchor="ctr"/>
+              <a:lstStyle/>
+              <a:p>
+                <a:pPr algn="ctr"/>
+                <a:endParaRPr lang="en-US" i="1" dirty="0">
+                  <a:solidFill>
+                    <a:schemeClr val="tx1"/>
+                  </a:solidFill>
+                </a:endParaRPr>
+              </a:p>
+            </p:txBody>
+          </p:sp>
+          <p:sp>
+            <p:nvSpPr>
+              <p:cNvPr id="121" name="Chord 120">
+                <a:extLst>
+                  <a:ext uri="{FF2B5EF4-FFF2-40B4-BE49-F238E27FC236}">
+                    <a16:creationId xmlns:a16="http://schemas.microsoft.com/office/drawing/2014/main" id="{40031C06-AFE2-4747-9D1C-053AFAD0204C}"/>
+                  </a:ext>
+                </a:extLst>
+              </p:cNvPr>
+              <p:cNvSpPr/>
+              <p:nvPr/>
+            </p:nvSpPr>
+            <p:spPr>
+              <a:xfrm>
+                <a:off x="3734347" y="784736"/>
+                <a:ext cx="632206" cy="632206"/>
+              </a:xfrm>
+              <a:prstGeom prst="chord">
+                <a:avLst>
+                  <a:gd name="adj1" fmla="val 10506229"/>
+                  <a:gd name="adj2" fmla="val 301460"/>
+                </a:avLst>
+              </a:prstGeom>
+              <a:solidFill>
+                <a:schemeClr val="accent4">
+                  <a:lumMod val="60000"/>
+                  <a:lumOff val="40000"/>
+                </a:schemeClr>
+              </a:solidFill>
+              <a:ln w="38100" cap="flat" cmpd="sng" algn="ctr">
+                <a:solidFill>
+                  <a:srgbClr val="000000"/>
+                </a:solidFill>
+                <a:prstDash val="solid"/>
+                <a:round/>
+                <a:headEnd type="none" w="med" len="med"/>
+                <a:tailEnd type="none" w="med" len="med"/>
+              </a:ln>
+              <a:effectLst/>
+            </p:spPr>
+            <p:style>
+              <a:lnRef idx="1">
+                <a:schemeClr val="accent1"/>
+              </a:lnRef>
+              <a:fillRef idx="3">
+                <a:schemeClr val="accent1"/>
+              </a:fillRef>
+              <a:effectRef idx="2">
+                <a:schemeClr val="accent1"/>
+              </a:effectRef>
+              <a:fontRef idx="minor">
+                <a:schemeClr val="lt1"/>
+              </a:fontRef>
+            </p:style>
+            <p:txBody>
+              <a:bodyPr rtlCol="0" anchor="ctr"/>
+              <a:lstStyle/>
+              <a:p>
+                <a:pPr algn="ctr"/>
+                <a:endParaRPr lang="en-US"/>
+              </a:p>
+            </p:txBody>
+          </p:sp>
+          <p:pic>
+            <p:nvPicPr>
+              <p:cNvPr id="122" name="Picture 121">
+                <a:extLst>
+                  <a:ext uri="{FF2B5EF4-FFF2-40B4-BE49-F238E27FC236}">
+                    <a16:creationId xmlns:a16="http://schemas.microsoft.com/office/drawing/2014/main" id="{7D7B99AC-35B7-6144-AFA2-8EB3E8870BD3}"/>
+                  </a:ext>
+                </a:extLst>
+              </p:cNvPr>
+              <p:cNvPicPr>
+                <a:picLocks noChangeAspect="1"/>
+              </p:cNvPicPr>
+              <p:nvPr/>
+            </p:nvPicPr>
+            <p:blipFill>
+              <a:blip r:embed="rId2">
+                <a:extLst>
+                  <a:ext uri="{28A0092B-C50C-407E-A947-70E740481C1C}">
+                    <a14:useLocalDpi xmlns:a14="http://schemas.microsoft.com/office/drawing/2010/main" val="0"/>
+                  </a:ext>
+                </a:extLst>
+              </a:blip>
+              <a:stretch>
+                <a:fillRect/>
+              </a:stretch>
+            </p:blipFill>
+            <p:spPr>
+              <a:xfrm>
+                <a:off x="2803319" y="413397"/>
+                <a:ext cx="771908" cy="771908"/>
+              </a:xfrm>
+              <a:prstGeom prst="rect">
+                <a:avLst/>
+              </a:prstGeom>
+            </p:spPr>
+          </p:pic>
+          <p:pic>
+            <p:nvPicPr>
+              <p:cNvPr id="123" name="Picture 122">
+                <a:extLst>
+                  <a:ext uri="{FF2B5EF4-FFF2-40B4-BE49-F238E27FC236}">
+                    <a16:creationId xmlns:a16="http://schemas.microsoft.com/office/drawing/2014/main" id="{FE18BD1E-D285-7A42-93E1-C766BD7A361F}"/>
+                  </a:ext>
+                </a:extLst>
+              </p:cNvPr>
+              <p:cNvPicPr>
+                <a:picLocks noChangeAspect="1"/>
+              </p:cNvPicPr>
+              <p:nvPr/>
+            </p:nvPicPr>
+            <p:blipFill>
+              <a:blip r:embed="rId3">
+                <a:extLst>
+                  <a:ext uri="{28A0092B-C50C-407E-A947-70E740481C1C}">
+                    <a14:useLocalDpi xmlns:a14="http://schemas.microsoft.com/office/drawing/2010/main" val="0"/>
+                  </a:ext>
+                </a:extLst>
+              </a:blip>
+              <a:stretch>
+                <a:fillRect/>
+              </a:stretch>
+            </p:blipFill>
+            <p:spPr>
+              <a:xfrm>
+                <a:off x="5971536" y="499461"/>
+                <a:ext cx="794135" cy="794135"/>
+              </a:xfrm>
+              <a:prstGeom prst="rect">
+                <a:avLst/>
+              </a:prstGeom>
+            </p:spPr>
+          </p:pic>
+        </p:grpSp>
+        <p:cxnSp>
+          <p:nvCxnSpPr>
+            <p:cNvPr id="113" name="Straight Connector 112">
+              <a:extLst>
+                <a:ext uri="{FF2B5EF4-FFF2-40B4-BE49-F238E27FC236}">
+                  <a16:creationId xmlns:a16="http://schemas.microsoft.com/office/drawing/2014/main" id="{87FE75F9-C147-2745-986D-C5B1321C5D79}"/>
+                </a:ext>
+              </a:extLst>
+            </p:cNvPr>
+            <p:cNvCxnSpPr>
+              <a:cxnSpLocks/>
+            </p:cNvCxnSpPr>
+            <p:nvPr/>
+          </p:nvCxnSpPr>
+          <p:spPr>
+            <a:xfrm>
+              <a:off x="6534471" y="1057650"/>
+              <a:ext cx="0" cy="508893"/>
+            </a:xfrm>
+            <a:prstGeom prst="line">
+              <a:avLst/>
+            </a:prstGeom>
+            <a:ln w="28575">
+              <a:solidFill>
+                <a:srgbClr val="00B050"/>
+              </a:solidFill>
+              <a:headEnd type="none" w="med" len="med"/>
+              <a:tailEnd type="triangle" w="lg" len="lg"/>
+            </a:ln>
+            <a:effectLst/>
+          </p:spPr>
+          <p:style>
+            <a:lnRef idx="2">
+              <a:schemeClr val="accent1"/>
+            </a:lnRef>
+            <a:fillRef idx="0">
+              <a:schemeClr val="accent1"/>
+            </a:fillRef>
+            <a:effectRef idx="1">
+              <a:schemeClr val="accent1"/>
+            </a:effectRef>
+            <a:fontRef idx="minor">
+              <a:schemeClr val="tx1"/>
+            </a:fontRef>
+          </p:style>
+        </p:cxnSp>
+        <p:pic>
+          <p:nvPicPr>
+            <p:cNvPr id="114" name="Picture 113">
+              <a:extLst>
+                <a:ext uri="{FF2B5EF4-FFF2-40B4-BE49-F238E27FC236}">
+                  <a16:creationId xmlns:a16="http://schemas.microsoft.com/office/drawing/2014/main" id="{E72EC5CF-74E9-BA41-8D89-C870F7803047}"/>
+                </a:ext>
+              </a:extLst>
+            </p:cNvPr>
+            <p:cNvPicPr>
+              <a:picLocks noChangeAspect="1"/>
+            </p:cNvPicPr>
+            <p:nvPr/>
+          </p:nvPicPr>
+          <p:blipFill>
+            <a:blip r:embed="rId4"/>
+            <a:stretch>
+              <a:fillRect/>
+            </a:stretch>
+          </p:blipFill>
+          <p:spPr>
+            <a:xfrm>
+              <a:off x="6072003" y="534432"/>
+              <a:ext cx="881743" cy="881743"/>
+            </a:xfrm>
+            <a:prstGeom prst="rect">
+              <a:avLst/>
+            </a:prstGeom>
+          </p:spPr>
+        </p:pic>
+        <p:sp>
+          <p:nvSpPr>
+            <p:cNvPr id="115" name="Triangle 114">
+              <a:extLst>
+                <a:ext uri="{FF2B5EF4-FFF2-40B4-BE49-F238E27FC236}">
+                  <a16:creationId xmlns:a16="http://schemas.microsoft.com/office/drawing/2014/main" id="{F7EE3164-3AA0-7848-9E57-F325EE13A319}"/>
+                </a:ext>
+              </a:extLst>
+            </p:cNvPr>
+            <p:cNvSpPr/>
+            <p:nvPr/>
+          </p:nvSpPr>
+          <p:spPr>
+            <a:xfrm rot="10800000">
+              <a:off x="6496371" y="1455600"/>
+              <a:ext cx="76201" cy="67196"/>
+            </a:xfrm>
+            <a:prstGeom prst="triangle">
+              <a:avLst/>
+            </a:prstGeom>
+            <a:solidFill>
+              <a:schemeClr val="bg1"/>
+            </a:solidFill>
+            <a:ln>
+              <a:noFill/>
+            </a:ln>
+            <a:effectLst/>
+          </p:spPr>
+          <p:style>
+            <a:lnRef idx="1">
+              <a:schemeClr val="accent1"/>
+            </a:lnRef>
+            <a:fillRef idx="3">
+              <a:schemeClr val="accent1"/>
+            </a:fillRef>
+            <a:effectRef idx="2">
+              <a:schemeClr val="accent1"/>
+            </a:effectRef>
+            <a:fontRef idx="minor">
+              <a:schemeClr val="lt1"/>
+            </a:fontRef>
+          </p:style>
+          <p:txBody>
+            <a:bodyPr rtlCol="0" anchor="ctr"/>
+            <a:lstStyle/>
+            <a:p>
+              <a:pPr algn="ctr"/>
+              <a:endParaRPr lang="en-US"/>
+            </a:p>
+          </p:txBody>
+        </p:sp>
+      </p:grpSp>
+    </p:spTree>
+    <p:extLst>
+      <p:ext uri="{BB962C8B-B14F-4D97-AF65-F5344CB8AC3E}">
+        <p14:creationId xmlns:p14="http://schemas.microsoft.com/office/powerpoint/2010/main" val="1074519592"/>
+      </p:ext>
+    </p:extLst>
+  </p:cSld>
+  <p:clrMapOvr>
+    <a:masterClrMapping/>
+  </p:clrMapOvr>
+</p:sld>
+</file>
+
 <file path=ppt/theme/theme1.xml><?xml version="1.0" encoding="utf-8"?>
 <a:theme xmlns:a="http://schemas.openxmlformats.org/drawingml/2006/main" name="Office Theme">
   <a:themeElements>

</xml_diff>

<commit_message>
fix node glyph in example diagram 4e-stimulate
</commit_message>
<xml_diff>
--- a/specification/imgsrc/4.pptx
+++ b/specification/imgsrc/4.pptx
@@ -215,7 +215,7 @@
           <a:p>
             <a:fld id="{9E808448-E5C1-6044-9A1D-E68767CBF56D}" type="datetimeFigureOut">
               <a:rPr lang="en-US" smtClean="0"/>
-              <a:t>10/5/19</a:t>
+              <a:t>10/12/19</a:t>
             </a:fld>
             <a:endParaRPr lang="en-US"/>
           </a:p>
@@ -745,7 +745,7 @@
           <a:p>
             <a:fld id="{EBC7FFC8-011D-1246-B320-9C4FD100F423}" type="datetimeFigureOut">
               <a:rPr lang="en-US" smtClean="0"/>
-              <a:t>10/5/19</a:t>
+              <a:t>10/12/19</a:t>
             </a:fld>
             <a:endParaRPr lang="en-US"/>
           </a:p>
@@ -913,7 +913,7 @@
           <a:p>
             <a:fld id="{EBC7FFC8-011D-1246-B320-9C4FD100F423}" type="datetimeFigureOut">
               <a:rPr lang="en-US" smtClean="0"/>
-              <a:t>10/5/19</a:t>
+              <a:t>10/12/19</a:t>
             </a:fld>
             <a:endParaRPr lang="en-US"/>
           </a:p>
@@ -1091,7 +1091,7 @@
           <a:p>
             <a:fld id="{EBC7FFC8-011D-1246-B320-9C4FD100F423}" type="datetimeFigureOut">
               <a:rPr lang="en-US" smtClean="0"/>
-              <a:t>10/5/19</a:t>
+              <a:t>10/12/19</a:t>
             </a:fld>
             <a:endParaRPr lang="en-US"/>
           </a:p>
@@ -1259,7 +1259,7 @@
           <a:p>
             <a:fld id="{EBC7FFC8-011D-1246-B320-9C4FD100F423}" type="datetimeFigureOut">
               <a:rPr lang="en-US" smtClean="0"/>
-              <a:t>10/5/19</a:t>
+              <a:t>10/12/19</a:t>
             </a:fld>
             <a:endParaRPr lang="en-US"/>
           </a:p>
@@ -1504,7 +1504,7 @@
           <a:p>
             <a:fld id="{EBC7FFC8-011D-1246-B320-9C4FD100F423}" type="datetimeFigureOut">
               <a:rPr lang="en-US" smtClean="0"/>
-              <a:t>10/5/19</a:t>
+              <a:t>10/12/19</a:t>
             </a:fld>
             <a:endParaRPr lang="en-US"/>
           </a:p>
@@ -1789,7 +1789,7 @@
           <a:p>
             <a:fld id="{EBC7FFC8-011D-1246-B320-9C4FD100F423}" type="datetimeFigureOut">
               <a:rPr lang="en-US" smtClean="0"/>
-              <a:t>10/5/19</a:t>
+              <a:t>10/12/19</a:t>
             </a:fld>
             <a:endParaRPr lang="en-US"/>
           </a:p>
@@ -2208,7 +2208,7 @@
           <a:p>
             <a:fld id="{EBC7FFC8-011D-1246-B320-9C4FD100F423}" type="datetimeFigureOut">
               <a:rPr lang="en-US" smtClean="0"/>
-              <a:t>10/5/19</a:t>
+              <a:t>10/12/19</a:t>
             </a:fld>
             <a:endParaRPr lang="en-US"/>
           </a:p>
@@ -2325,7 +2325,7 @@
           <a:p>
             <a:fld id="{EBC7FFC8-011D-1246-B320-9C4FD100F423}" type="datetimeFigureOut">
               <a:rPr lang="en-US" smtClean="0"/>
-              <a:t>10/5/19</a:t>
+              <a:t>10/12/19</a:t>
             </a:fld>
             <a:endParaRPr lang="en-US"/>
           </a:p>
@@ -2420,7 +2420,7 @@
           <a:p>
             <a:fld id="{EBC7FFC8-011D-1246-B320-9C4FD100F423}" type="datetimeFigureOut">
               <a:rPr lang="en-US" smtClean="0"/>
-              <a:t>10/5/19</a:t>
+              <a:t>10/12/19</a:t>
             </a:fld>
             <a:endParaRPr lang="en-US"/>
           </a:p>
@@ -2695,7 +2695,7 @@
           <a:p>
             <a:fld id="{EBC7FFC8-011D-1246-B320-9C4FD100F423}" type="datetimeFigureOut">
               <a:rPr lang="en-US" smtClean="0"/>
-              <a:t>10/5/19</a:t>
+              <a:t>10/12/19</a:t>
             </a:fld>
             <a:endParaRPr lang="en-US"/>
           </a:p>
@@ -2947,7 +2947,7 @@
           <a:p>
             <a:fld id="{EBC7FFC8-011D-1246-B320-9C4FD100F423}" type="datetimeFigureOut">
               <a:rPr lang="en-US" smtClean="0"/>
-              <a:t>10/5/19</a:t>
+              <a:t>10/12/19</a:t>
             </a:fld>
             <a:endParaRPr lang="en-US"/>
           </a:p>
@@ -3158,7 +3158,7 @@
           <a:p>
             <a:fld id="{EBC7FFC8-011D-1246-B320-9C4FD100F423}" type="datetimeFigureOut">
               <a:rPr lang="en-US" smtClean="0"/>
-              <a:t>10/5/19</a:t>
+              <a:t>10/12/19</a:t>
             </a:fld>
             <a:endParaRPr lang="en-US"/>
           </a:p>
@@ -12802,1119 +12802,6 @@
       </p:sp>
       <p:grpSp>
         <p:nvGrpSpPr>
-          <p:cNvPr id="3" name="Group 2">
-            <a:extLst>
-              <a:ext uri="{FF2B5EF4-FFF2-40B4-BE49-F238E27FC236}">
-                <a16:creationId xmlns:a16="http://schemas.microsoft.com/office/drawing/2014/main" id="{01A052B2-298B-9C40-8C96-ADD836CAFCE1}"/>
-              </a:ext>
-            </a:extLst>
-          </p:cNvPr>
-          <p:cNvGrpSpPr/>
-          <p:nvPr/>
-        </p:nvGrpSpPr>
-        <p:grpSpPr>
-          <a:xfrm>
-            <a:off x="451212" y="1259352"/>
-            <a:ext cx="8416471" cy="1920082"/>
-            <a:chOff x="451212" y="534432"/>
-            <a:chExt cx="8416471" cy="1920082"/>
-          </a:xfrm>
-        </p:grpSpPr>
-        <p:cxnSp>
-          <p:nvCxnSpPr>
-            <p:cNvPr id="99" name="Straight Arrow Connector 5">
-              <a:extLst>
-                <a:ext uri="{FF2B5EF4-FFF2-40B4-BE49-F238E27FC236}">
-                  <a16:creationId xmlns:a16="http://schemas.microsoft.com/office/drawing/2014/main" id="{AC10A760-BF4D-DB4A-9E3F-70C1A6C16040}"/>
-                </a:ext>
-              </a:extLst>
-            </p:cNvPr>
-            <p:cNvCxnSpPr>
-              <a:cxnSpLocks/>
-              <a:endCxn id="97" idx="0"/>
-            </p:cNvCxnSpPr>
-            <p:nvPr/>
-          </p:nvCxnSpPr>
-          <p:spPr>
-            <a:xfrm flipV="1">
-              <a:off x="5095644" y="1796957"/>
-              <a:ext cx="1439006" cy="343873"/>
-            </a:xfrm>
-            <a:prstGeom prst="bentConnector4">
-              <a:avLst>
-                <a:gd name="adj1" fmla="val 20"/>
-                <a:gd name="adj2" fmla="val 166478"/>
-              </a:avLst>
-            </a:prstGeom>
-            <a:ln>
-              <a:solidFill>
-                <a:srgbClr val="FF0000"/>
-              </a:solidFill>
-              <a:headEnd type="none"/>
-              <a:tailEnd type="none"/>
-            </a:ln>
-            <a:effectLst/>
-          </p:spPr>
-          <p:style>
-            <a:lnRef idx="2">
-              <a:schemeClr val="accent1"/>
-            </a:lnRef>
-            <a:fillRef idx="0">
-              <a:schemeClr val="accent1"/>
-            </a:fillRef>
-            <a:effectRef idx="1">
-              <a:schemeClr val="accent1"/>
-            </a:effectRef>
-            <a:fontRef idx="minor">
-              <a:schemeClr val="tx1"/>
-            </a:fontRef>
-          </p:style>
-        </p:cxnSp>
-        <p:cxnSp>
-          <p:nvCxnSpPr>
-            <p:cNvPr id="38" name="Straight Arrow Connector 5"/>
-            <p:cNvCxnSpPr>
-              <a:cxnSpLocks/>
-            </p:cNvCxnSpPr>
-            <p:nvPr/>
-          </p:nvCxnSpPr>
-          <p:spPr>
-            <a:xfrm flipV="1">
-              <a:off x="2249000" y="1566880"/>
-              <a:ext cx="2846644" cy="578944"/>
-            </a:xfrm>
-            <a:prstGeom prst="bentConnector3">
-              <a:avLst>
-                <a:gd name="adj1" fmla="val 203"/>
-              </a:avLst>
-            </a:prstGeom>
-            <a:ln>
-              <a:solidFill>
-                <a:srgbClr val="FF0000"/>
-              </a:solidFill>
-              <a:headEnd type="none"/>
-              <a:tailEnd type="none"/>
-            </a:ln>
-            <a:effectLst/>
-          </p:spPr>
-          <p:style>
-            <a:lnRef idx="2">
-              <a:schemeClr val="accent1"/>
-            </a:lnRef>
-            <a:fillRef idx="0">
-              <a:schemeClr val="accent1"/>
-            </a:fillRef>
-            <a:effectRef idx="1">
-              <a:schemeClr val="accent1"/>
-            </a:effectRef>
-            <a:fontRef idx="minor">
-              <a:schemeClr val="tx1"/>
-            </a:fontRef>
-          </p:style>
-        </p:cxnSp>
-        <p:cxnSp>
-          <p:nvCxnSpPr>
-            <p:cNvPr id="39" name="Straight Connector 38"/>
-            <p:cNvCxnSpPr/>
-            <p:nvPr/>
-          </p:nvCxnSpPr>
-          <p:spPr>
-            <a:xfrm>
-              <a:off x="6439400" y="1797802"/>
-              <a:ext cx="190500" cy="0"/>
-            </a:xfrm>
-            <a:prstGeom prst="line">
-              <a:avLst/>
-            </a:prstGeom>
-            <a:ln>
-              <a:solidFill>
-                <a:srgbClr val="FF0000"/>
-              </a:solidFill>
-            </a:ln>
-            <a:effectLst/>
-          </p:spPr>
-          <p:style>
-            <a:lnRef idx="2">
-              <a:schemeClr val="accent1"/>
-            </a:lnRef>
-            <a:fillRef idx="0">
-              <a:schemeClr val="accent1"/>
-            </a:fillRef>
-            <a:effectRef idx="1">
-              <a:schemeClr val="accent1"/>
-            </a:effectRef>
-            <a:fontRef idx="minor">
-              <a:schemeClr val="tx1"/>
-            </a:fontRef>
-          </p:style>
-        </p:cxnSp>
-        <p:grpSp>
-          <p:nvGrpSpPr>
-            <p:cNvPr id="2" name="Group 1">
-              <a:extLst>
-                <a:ext uri="{FF2B5EF4-FFF2-40B4-BE49-F238E27FC236}">
-                  <a16:creationId xmlns:a16="http://schemas.microsoft.com/office/drawing/2014/main" id="{651CB433-FCA4-2142-9F1D-11A6AF7DF91D}"/>
-                </a:ext>
-              </a:extLst>
-            </p:cNvPr>
-            <p:cNvGrpSpPr/>
-            <p:nvPr/>
-          </p:nvGrpSpPr>
-          <p:grpSpPr>
-            <a:xfrm>
-              <a:off x="451212" y="1796957"/>
-              <a:ext cx="8416471" cy="657557"/>
-              <a:chOff x="139700" y="1207886"/>
-              <a:chExt cx="12901942" cy="1007995"/>
-            </a:xfrm>
-          </p:grpSpPr>
-          <p:grpSp>
-            <p:nvGrpSpPr>
-              <p:cNvPr id="60" name="Group 59"/>
-              <p:cNvGrpSpPr/>
-              <p:nvPr/>
-            </p:nvGrpSpPr>
-            <p:grpSpPr>
-              <a:xfrm>
-                <a:off x="139700" y="1212336"/>
-                <a:ext cx="4196538" cy="1003545"/>
-                <a:chOff x="2569133" y="413397"/>
-                <a:chExt cx="4196538" cy="1003545"/>
-              </a:xfrm>
-            </p:grpSpPr>
-            <p:cxnSp>
-              <p:nvCxnSpPr>
-                <p:cNvPr id="64" name="Straight Connector 63"/>
-                <p:cNvCxnSpPr/>
-                <p:nvPr/>
-              </p:nvCxnSpPr>
-              <p:spPr>
-                <a:xfrm>
-                  <a:off x="2569133" y="1140336"/>
-                  <a:ext cx="4191000" cy="0"/>
-                </a:xfrm>
-                <a:prstGeom prst="line">
-                  <a:avLst/>
-                </a:prstGeom>
-                <a:ln w="38100" cap="flat" cmpd="sng" algn="ctr">
-                  <a:solidFill>
-                    <a:srgbClr val="000000"/>
-                  </a:solidFill>
-                  <a:prstDash val="solid"/>
-                  <a:round/>
-                  <a:headEnd type="none" w="med" len="med"/>
-                  <a:tailEnd type="none" w="med" len="med"/>
-                </a:ln>
-                <a:effectLst/>
-              </p:spPr>
-              <p:style>
-                <a:lnRef idx="2">
-                  <a:schemeClr val="accent1"/>
-                </a:lnRef>
-                <a:fillRef idx="0">
-                  <a:schemeClr val="accent1"/>
-                </a:fillRef>
-                <a:effectRef idx="1">
-                  <a:schemeClr val="accent1"/>
-                </a:effectRef>
-                <a:fontRef idx="minor">
-                  <a:schemeClr val="tx1"/>
-                </a:fontRef>
-              </p:style>
-            </p:cxnSp>
-            <p:sp>
-              <p:nvSpPr>
-                <p:cNvPr id="65" name="Right Arrow 64"/>
-                <p:cNvSpPr/>
-                <p:nvPr/>
-              </p:nvSpPr>
-              <p:spPr>
-                <a:xfrm>
-                  <a:off x="4740833" y="949836"/>
-                  <a:ext cx="1168400" cy="350140"/>
-                </a:xfrm>
-                <a:prstGeom prst="rightArrow">
-                  <a:avLst>
-                    <a:gd name="adj1" fmla="val 100000"/>
-                    <a:gd name="adj2" fmla="val 52194"/>
-                  </a:avLst>
-                </a:prstGeom>
-                <a:solidFill>
-                  <a:schemeClr val="accent2"/>
-                </a:solidFill>
-                <a:ln w="38100" cap="flat" cmpd="sng" algn="ctr">
-                  <a:solidFill>
-                    <a:srgbClr val="000000"/>
-                  </a:solidFill>
-                  <a:prstDash val="solid"/>
-                  <a:round/>
-                  <a:headEnd type="none" w="med" len="med"/>
-                  <a:tailEnd type="none" w="med" len="med"/>
-                </a:ln>
-                <a:effectLst/>
-              </p:spPr>
-              <p:style>
-                <a:lnRef idx="1">
-                  <a:schemeClr val="accent1"/>
-                </a:lnRef>
-                <a:fillRef idx="3">
-                  <a:schemeClr val="accent1"/>
-                </a:fillRef>
-                <a:effectRef idx="2">
-                  <a:schemeClr val="accent1"/>
-                </a:effectRef>
-                <a:fontRef idx="minor">
-                  <a:schemeClr val="lt1"/>
-                </a:fontRef>
-              </p:style>
-              <p:txBody>
-                <a:bodyPr rtlCol="0" anchor="ctr"/>
-                <a:lstStyle/>
-                <a:p>
-                  <a:pPr algn="ctr"/>
-                  <a:endParaRPr lang="en-US" i="1" dirty="0">
-                    <a:solidFill>
-                      <a:schemeClr val="tx1"/>
-                    </a:solidFill>
-                  </a:endParaRPr>
-                </a:p>
-              </p:txBody>
-            </p:sp>
-            <p:sp>
-              <p:nvSpPr>
-                <p:cNvPr id="68" name="Chord 67"/>
-                <p:cNvSpPr/>
-                <p:nvPr/>
-              </p:nvSpPr>
-              <p:spPr>
-                <a:xfrm>
-                  <a:off x="3734347" y="784736"/>
-                  <a:ext cx="632206" cy="632206"/>
-                </a:xfrm>
-                <a:prstGeom prst="chord">
-                  <a:avLst>
-                    <a:gd name="adj1" fmla="val 10506229"/>
-                    <a:gd name="adj2" fmla="val 301460"/>
-                  </a:avLst>
-                </a:prstGeom>
-                <a:solidFill>
-                  <a:schemeClr val="accent4">
-                    <a:lumMod val="60000"/>
-                    <a:lumOff val="40000"/>
-                  </a:schemeClr>
-                </a:solidFill>
-                <a:ln w="38100" cap="flat" cmpd="sng" algn="ctr">
-                  <a:solidFill>
-                    <a:srgbClr val="000000"/>
-                  </a:solidFill>
-                  <a:prstDash val="solid"/>
-                  <a:round/>
-                  <a:headEnd type="none" w="med" len="med"/>
-                  <a:tailEnd type="none" w="med" len="med"/>
-                </a:ln>
-                <a:effectLst/>
-              </p:spPr>
-              <p:style>
-                <a:lnRef idx="1">
-                  <a:schemeClr val="accent1"/>
-                </a:lnRef>
-                <a:fillRef idx="3">
-                  <a:schemeClr val="accent1"/>
-                </a:fillRef>
-                <a:effectRef idx="2">
-                  <a:schemeClr val="accent1"/>
-                </a:effectRef>
-                <a:fontRef idx="minor">
-                  <a:schemeClr val="lt1"/>
-                </a:fontRef>
-              </p:style>
-              <p:txBody>
-                <a:bodyPr rtlCol="0" anchor="ctr"/>
-                <a:lstStyle/>
-                <a:p>
-                  <a:pPr algn="ctr"/>
-                  <a:endParaRPr lang="en-US"/>
-                </a:p>
-              </p:txBody>
-            </p:sp>
-            <p:pic>
-              <p:nvPicPr>
-                <p:cNvPr id="69" name="Picture 68"/>
-                <p:cNvPicPr>
-                  <a:picLocks noChangeAspect="1"/>
-                </p:cNvPicPr>
-                <p:nvPr/>
-              </p:nvPicPr>
-              <p:blipFill>
-                <a:blip r:embed="rId2">
-                  <a:extLst>
-                    <a:ext uri="{28A0092B-C50C-407E-A947-70E740481C1C}">
-                      <a14:useLocalDpi xmlns:a14="http://schemas.microsoft.com/office/drawing/2010/main" val="0"/>
-                    </a:ext>
-                  </a:extLst>
-                </a:blip>
-                <a:stretch>
-                  <a:fillRect/>
-                </a:stretch>
-              </p:blipFill>
-              <p:spPr>
-                <a:xfrm>
-                  <a:off x="2803319" y="413397"/>
-                  <a:ext cx="771908" cy="771908"/>
-                </a:xfrm>
-                <a:prstGeom prst="rect">
-                  <a:avLst/>
-                </a:prstGeom>
-              </p:spPr>
-            </p:pic>
-            <p:pic>
-              <p:nvPicPr>
-                <p:cNvPr id="70" name="Picture 69"/>
-                <p:cNvPicPr>
-                  <a:picLocks noChangeAspect="1"/>
-                </p:cNvPicPr>
-                <p:nvPr/>
-              </p:nvPicPr>
-              <p:blipFill>
-                <a:blip r:embed="rId3">
-                  <a:extLst>
-                    <a:ext uri="{28A0092B-C50C-407E-A947-70E740481C1C}">
-                      <a14:useLocalDpi xmlns:a14="http://schemas.microsoft.com/office/drawing/2010/main" val="0"/>
-                    </a:ext>
-                  </a:extLst>
-                </a:blip>
-                <a:stretch>
-                  <a:fillRect/>
-                </a:stretch>
-              </p:blipFill>
-              <p:spPr>
-                <a:xfrm>
-                  <a:off x="5971536" y="499461"/>
-                  <a:ext cx="794135" cy="794135"/>
-                </a:xfrm>
-                <a:prstGeom prst="rect">
-                  <a:avLst/>
-                </a:prstGeom>
-              </p:spPr>
-            </p:pic>
-          </p:grpSp>
-          <p:grpSp>
-            <p:nvGrpSpPr>
-              <p:cNvPr id="61" name="Group 60">
-                <a:extLst>
-                  <a:ext uri="{FF2B5EF4-FFF2-40B4-BE49-F238E27FC236}">
-                    <a16:creationId xmlns:a16="http://schemas.microsoft.com/office/drawing/2014/main" id="{5F0A003D-F3D5-BE4D-98A5-E28807500151}"/>
-                  </a:ext>
-                </a:extLst>
-              </p:cNvPr>
-              <p:cNvGrpSpPr/>
-              <p:nvPr/>
-            </p:nvGrpSpPr>
-            <p:grpSpPr>
-              <a:xfrm>
-                <a:off x="4489820" y="1207886"/>
-                <a:ext cx="4196538" cy="1003545"/>
-                <a:chOff x="2569133" y="413397"/>
-                <a:chExt cx="4196538" cy="1003545"/>
-              </a:xfrm>
-            </p:grpSpPr>
-            <p:cxnSp>
-              <p:nvCxnSpPr>
-                <p:cNvPr id="62" name="Straight Connector 61">
-                  <a:extLst>
-                    <a:ext uri="{FF2B5EF4-FFF2-40B4-BE49-F238E27FC236}">
-                      <a16:creationId xmlns:a16="http://schemas.microsoft.com/office/drawing/2014/main" id="{0C636ACD-E0DD-D742-BD04-B2971D284046}"/>
-                    </a:ext>
-                  </a:extLst>
-                </p:cNvPr>
-                <p:cNvCxnSpPr/>
-                <p:nvPr/>
-              </p:nvCxnSpPr>
-              <p:spPr>
-                <a:xfrm>
-                  <a:off x="2569133" y="1140336"/>
-                  <a:ext cx="4191000" cy="0"/>
-                </a:xfrm>
-                <a:prstGeom prst="line">
-                  <a:avLst/>
-                </a:prstGeom>
-                <a:ln w="38100" cap="flat" cmpd="sng" algn="ctr">
-                  <a:solidFill>
-                    <a:srgbClr val="000000"/>
-                  </a:solidFill>
-                  <a:prstDash val="solid"/>
-                  <a:round/>
-                  <a:headEnd type="none" w="med" len="med"/>
-                  <a:tailEnd type="none" w="med" len="med"/>
-                </a:ln>
-                <a:effectLst/>
-              </p:spPr>
-              <p:style>
-                <a:lnRef idx="2">
-                  <a:schemeClr val="accent1"/>
-                </a:lnRef>
-                <a:fillRef idx="0">
-                  <a:schemeClr val="accent1"/>
-                </a:fillRef>
-                <a:effectRef idx="1">
-                  <a:schemeClr val="accent1"/>
-                </a:effectRef>
-                <a:fontRef idx="minor">
-                  <a:schemeClr val="tx1"/>
-                </a:fontRef>
-              </p:style>
-            </p:cxnSp>
-            <p:sp>
-              <p:nvSpPr>
-                <p:cNvPr id="89" name="Right Arrow 88">
-                  <a:extLst>
-                    <a:ext uri="{FF2B5EF4-FFF2-40B4-BE49-F238E27FC236}">
-                      <a16:creationId xmlns:a16="http://schemas.microsoft.com/office/drawing/2014/main" id="{FC66DEAD-CBAB-6147-969A-1D54C4F7643B}"/>
-                    </a:ext>
-                  </a:extLst>
-                </p:cNvPr>
-                <p:cNvSpPr/>
-                <p:nvPr/>
-              </p:nvSpPr>
-              <p:spPr>
-                <a:xfrm>
-                  <a:off x="4740833" y="949836"/>
-                  <a:ext cx="1168400" cy="350140"/>
-                </a:xfrm>
-                <a:prstGeom prst="rightArrow">
-                  <a:avLst>
-                    <a:gd name="adj1" fmla="val 100000"/>
-                    <a:gd name="adj2" fmla="val 52194"/>
-                  </a:avLst>
-                </a:prstGeom>
-                <a:solidFill>
-                  <a:schemeClr val="accent2"/>
-                </a:solidFill>
-                <a:ln w="38100" cap="flat" cmpd="sng" algn="ctr">
-                  <a:solidFill>
-                    <a:srgbClr val="000000"/>
-                  </a:solidFill>
-                  <a:prstDash val="solid"/>
-                  <a:round/>
-                  <a:headEnd type="none" w="med" len="med"/>
-                  <a:tailEnd type="none" w="med" len="med"/>
-                </a:ln>
-                <a:effectLst/>
-              </p:spPr>
-              <p:style>
-                <a:lnRef idx="1">
-                  <a:schemeClr val="accent1"/>
-                </a:lnRef>
-                <a:fillRef idx="3">
-                  <a:schemeClr val="accent1"/>
-                </a:fillRef>
-                <a:effectRef idx="2">
-                  <a:schemeClr val="accent1"/>
-                </a:effectRef>
-                <a:fontRef idx="minor">
-                  <a:schemeClr val="lt1"/>
-                </a:fontRef>
-              </p:style>
-              <p:txBody>
-                <a:bodyPr rtlCol="0" anchor="ctr"/>
-                <a:lstStyle/>
-                <a:p>
-                  <a:pPr algn="ctr"/>
-                  <a:endParaRPr lang="en-US" i="1" dirty="0">
-                    <a:solidFill>
-                      <a:schemeClr val="tx1"/>
-                    </a:solidFill>
-                  </a:endParaRPr>
-                </a:p>
-              </p:txBody>
-            </p:sp>
-            <p:sp>
-              <p:nvSpPr>
-                <p:cNvPr id="90" name="Chord 89">
-                  <a:extLst>
-                    <a:ext uri="{FF2B5EF4-FFF2-40B4-BE49-F238E27FC236}">
-                      <a16:creationId xmlns:a16="http://schemas.microsoft.com/office/drawing/2014/main" id="{F8E252DC-2D99-2F4B-B8AD-22AF82DA93BC}"/>
-                    </a:ext>
-                  </a:extLst>
-                </p:cNvPr>
-                <p:cNvSpPr/>
-                <p:nvPr/>
-              </p:nvSpPr>
-              <p:spPr>
-                <a:xfrm>
-                  <a:off x="3734347" y="784736"/>
-                  <a:ext cx="632206" cy="632206"/>
-                </a:xfrm>
-                <a:prstGeom prst="chord">
-                  <a:avLst>
-                    <a:gd name="adj1" fmla="val 10506229"/>
-                    <a:gd name="adj2" fmla="val 301460"/>
-                  </a:avLst>
-                </a:prstGeom>
-                <a:solidFill>
-                  <a:schemeClr val="accent4">
-                    <a:lumMod val="60000"/>
-                    <a:lumOff val="40000"/>
-                  </a:schemeClr>
-                </a:solidFill>
-                <a:ln w="38100" cap="flat" cmpd="sng" algn="ctr">
-                  <a:solidFill>
-                    <a:srgbClr val="000000"/>
-                  </a:solidFill>
-                  <a:prstDash val="solid"/>
-                  <a:round/>
-                  <a:headEnd type="none" w="med" len="med"/>
-                  <a:tailEnd type="none" w="med" len="med"/>
-                </a:ln>
-                <a:effectLst/>
-              </p:spPr>
-              <p:style>
-                <a:lnRef idx="1">
-                  <a:schemeClr val="accent1"/>
-                </a:lnRef>
-                <a:fillRef idx="3">
-                  <a:schemeClr val="accent1"/>
-                </a:fillRef>
-                <a:effectRef idx="2">
-                  <a:schemeClr val="accent1"/>
-                </a:effectRef>
-                <a:fontRef idx="minor">
-                  <a:schemeClr val="lt1"/>
-                </a:fontRef>
-              </p:style>
-              <p:txBody>
-                <a:bodyPr rtlCol="0" anchor="ctr"/>
-                <a:lstStyle/>
-                <a:p>
-                  <a:pPr algn="ctr"/>
-                  <a:endParaRPr lang="en-US"/>
-                </a:p>
-              </p:txBody>
-            </p:sp>
-            <p:pic>
-              <p:nvPicPr>
-                <p:cNvPr id="91" name="Picture 90">
-                  <a:extLst>
-                    <a:ext uri="{FF2B5EF4-FFF2-40B4-BE49-F238E27FC236}">
-                      <a16:creationId xmlns:a16="http://schemas.microsoft.com/office/drawing/2014/main" id="{0DC979EE-EBE8-BD4E-B309-79F868E205FC}"/>
-                    </a:ext>
-                  </a:extLst>
-                </p:cNvPr>
-                <p:cNvPicPr>
-                  <a:picLocks noChangeAspect="1"/>
-                </p:cNvPicPr>
-                <p:nvPr/>
-              </p:nvPicPr>
-              <p:blipFill>
-                <a:blip r:embed="rId2">
-                  <a:extLst>
-                    <a:ext uri="{28A0092B-C50C-407E-A947-70E740481C1C}">
-                      <a14:useLocalDpi xmlns:a14="http://schemas.microsoft.com/office/drawing/2010/main" val="0"/>
-                    </a:ext>
-                  </a:extLst>
-                </a:blip>
-                <a:stretch>
-                  <a:fillRect/>
-                </a:stretch>
-              </p:blipFill>
-              <p:spPr>
-                <a:xfrm>
-                  <a:off x="2803319" y="413397"/>
-                  <a:ext cx="771908" cy="771908"/>
-                </a:xfrm>
-                <a:prstGeom prst="rect">
-                  <a:avLst/>
-                </a:prstGeom>
-              </p:spPr>
-            </p:pic>
-            <p:pic>
-              <p:nvPicPr>
-                <p:cNvPr id="92" name="Picture 91">
-                  <a:extLst>
-                    <a:ext uri="{FF2B5EF4-FFF2-40B4-BE49-F238E27FC236}">
-                      <a16:creationId xmlns:a16="http://schemas.microsoft.com/office/drawing/2014/main" id="{856B719D-280C-694D-BF91-6EF2371F280E}"/>
-                    </a:ext>
-                  </a:extLst>
-                </p:cNvPr>
-                <p:cNvPicPr>
-                  <a:picLocks noChangeAspect="1"/>
-                </p:cNvPicPr>
-                <p:nvPr/>
-              </p:nvPicPr>
-              <p:blipFill>
-                <a:blip r:embed="rId3">
-                  <a:extLst>
-                    <a:ext uri="{28A0092B-C50C-407E-A947-70E740481C1C}">
-                      <a14:useLocalDpi xmlns:a14="http://schemas.microsoft.com/office/drawing/2010/main" val="0"/>
-                    </a:ext>
-                  </a:extLst>
-                </a:blip>
-                <a:stretch>
-                  <a:fillRect/>
-                </a:stretch>
-              </p:blipFill>
-              <p:spPr>
-                <a:xfrm>
-                  <a:off x="5971536" y="499461"/>
-                  <a:ext cx="794135" cy="794135"/>
-                </a:xfrm>
-                <a:prstGeom prst="rect">
-                  <a:avLst/>
-                </a:prstGeom>
-              </p:spPr>
-            </p:pic>
-          </p:grpSp>
-          <p:grpSp>
-            <p:nvGrpSpPr>
-              <p:cNvPr id="93" name="Group 92">
-                <a:extLst>
-                  <a:ext uri="{FF2B5EF4-FFF2-40B4-BE49-F238E27FC236}">
-                    <a16:creationId xmlns:a16="http://schemas.microsoft.com/office/drawing/2014/main" id="{F6D9AAC4-C17D-AA44-8CBA-DF73264BB433}"/>
-                  </a:ext>
-                </a:extLst>
-              </p:cNvPr>
-              <p:cNvGrpSpPr/>
-              <p:nvPr/>
-            </p:nvGrpSpPr>
-            <p:grpSpPr>
-              <a:xfrm>
-                <a:off x="8845104" y="1207886"/>
-                <a:ext cx="4196538" cy="1003545"/>
-                <a:chOff x="2569133" y="413397"/>
-                <a:chExt cx="4196538" cy="1003545"/>
-              </a:xfrm>
-            </p:grpSpPr>
-            <p:cxnSp>
-              <p:nvCxnSpPr>
-                <p:cNvPr id="94" name="Straight Connector 93">
-                  <a:extLst>
-                    <a:ext uri="{FF2B5EF4-FFF2-40B4-BE49-F238E27FC236}">
-                      <a16:creationId xmlns:a16="http://schemas.microsoft.com/office/drawing/2014/main" id="{AC6E8ADE-C851-B34F-B92B-8A7DB23E7D9A}"/>
-                    </a:ext>
-                  </a:extLst>
-                </p:cNvPr>
-                <p:cNvCxnSpPr/>
-                <p:nvPr/>
-              </p:nvCxnSpPr>
-              <p:spPr>
-                <a:xfrm>
-                  <a:off x="2569133" y="1140336"/>
-                  <a:ext cx="4191000" cy="0"/>
-                </a:xfrm>
-                <a:prstGeom prst="line">
-                  <a:avLst/>
-                </a:prstGeom>
-                <a:ln w="38100" cap="flat" cmpd="sng" algn="ctr">
-                  <a:solidFill>
-                    <a:srgbClr val="000000"/>
-                  </a:solidFill>
-                  <a:prstDash val="solid"/>
-                  <a:round/>
-                  <a:headEnd type="none" w="med" len="med"/>
-                  <a:tailEnd type="none" w="med" len="med"/>
-                </a:ln>
-                <a:effectLst/>
-              </p:spPr>
-              <p:style>
-                <a:lnRef idx="2">
-                  <a:schemeClr val="accent1"/>
-                </a:lnRef>
-                <a:fillRef idx="0">
-                  <a:schemeClr val="accent1"/>
-                </a:fillRef>
-                <a:effectRef idx="1">
-                  <a:schemeClr val="accent1"/>
-                </a:effectRef>
-                <a:fontRef idx="minor">
-                  <a:schemeClr val="tx1"/>
-                </a:fontRef>
-              </p:style>
-            </p:cxnSp>
-            <p:sp>
-              <p:nvSpPr>
-                <p:cNvPr id="95" name="Right Arrow 94">
-                  <a:extLst>
-                    <a:ext uri="{FF2B5EF4-FFF2-40B4-BE49-F238E27FC236}">
-                      <a16:creationId xmlns:a16="http://schemas.microsoft.com/office/drawing/2014/main" id="{833F9E49-A69A-AD49-8120-EB62256129F7}"/>
-                    </a:ext>
-                  </a:extLst>
-                </p:cNvPr>
-                <p:cNvSpPr/>
-                <p:nvPr/>
-              </p:nvSpPr>
-              <p:spPr>
-                <a:xfrm>
-                  <a:off x="4740833" y="949836"/>
-                  <a:ext cx="1168400" cy="350140"/>
-                </a:xfrm>
-                <a:prstGeom prst="rightArrow">
-                  <a:avLst>
-                    <a:gd name="adj1" fmla="val 100000"/>
-                    <a:gd name="adj2" fmla="val 52194"/>
-                  </a:avLst>
-                </a:prstGeom>
-                <a:solidFill>
-                  <a:srgbClr val="92D050"/>
-                </a:solidFill>
-                <a:ln w="38100" cap="flat" cmpd="sng" algn="ctr">
-                  <a:solidFill>
-                    <a:srgbClr val="000000"/>
-                  </a:solidFill>
-                  <a:prstDash val="solid"/>
-                  <a:round/>
-                  <a:headEnd type="none" w="med" len="med"/>
-                  <a:tailEnd type="none" w="med" len="med"/>
-                </a:ln>
-                <a:effectLst/>
-              </p:spPr>
-              <p:style>
-                <a:lnRef idx="1">
-                  <a:schemeClr val="accent1"/>
-                </a:lnRef>
-                <a:fillRef idx="3">
-                  <a:schemeClr val="accent1"/>
-                </a:fillRef>
-                <a:effectRef idx="2">
-                  <a:schemeClr val="accent1"/>
-                </a:effectRef>
-                <a:fontRef idx="minor">
-                  <a:schemeClr val="lt1"/>
-                </a:fontRef>
-              </p:style>
-              <p:txBody>
-                <a:bodyPr rtlCol="0" anchor="ctr"/>
-                <a:lstStyle/>
-                <a:p>
-                  <a:pPr algn="ctr"/>
-                  <a:endParaRPr lang="en-US" i="1" dirty="0">
-                    <a:solidFill>
-                      <a:schemeClr val="tx1"/>
-                    </a:solidFill>
-                  </a:endParaRPr>
-                </a:p>
-              </p:txBody>
-            </p:sp>
-            <p:sp>
-              <p:nvSpPr>
-                <p:cNvPr id="96" name="Chord 95">
-                  <a:extLst>
-                    <a:ext uri="{FF2B5EF4-FFF2-40B4-BE49-F238E27FC236}">
-                      <a16:creationId xmlns:a16="http://schemas.microsoft.com/office/drawing/2014/main" id="{6B1CA32C-D843-1144-9420-E4F443DCF975}"/>
-                    </a:ext>
-                  </a:extLst>
-                </p:cNvPr>
-                <p:cNvSpPr/>
-                <p:nvPr/>
-              </p:nvSpPr>
-              <p:spPr>
-                <a:xfrm>
-                  <a:off x="3734347" y="784736"/>
-                  <a:ext cx="632206" cy="632206"/>
-                </a:xfrm>
-                <a:prstGeom prst="chord">
-                  <a:avLst>
-                    <a:gd name="adj1" fmla="val 10506229"/>
-                    <a:gd name="adj2" fmla="val 301460"/>
-                  </a:avLst>
-                </a:prstGeom>
-                <a:solidFill>
-                  <a:schemeClr val="accent4">
-                    <a:lumMod val="60000"/>
-                    <a:lumOff val="40000"/>
-                  </a:schemeClr>
-                </a:solidFill>
-                <a:ln w="38100" cap="flat" cmpd="sng" algn="ctr">
-                  <a:solidFill>
-                    <a:srgbClr val="000000"/>
-                  </a:solidFill>
-                  <a:prstDash val="solid"/>
-                  <a:round/>
-                  <a:headEnd type="none" w="med" len="med"/>
-                  <a:tailEnd type="none" w="med" len="med"/>
-                </a:ln>
-                <a:effectLst/>
-              </p:spPr>
-              <p:style>
-                <a:lnRef idx="1">
-                  <a:schemeClr val="accent1"/>
-                </a:lnRef>
-                <a:fillRef idx="3">
-                  <a:schemeClr val="accent1"/>
-                </a:fillRef>
-                <a:effectRef idx="2">
-                  <a:schemeClr val="accent1"/>
-                </a:effectRef>
-                <a:fontRef idx="minor">
-                  <a:schemeClr val="lt1"/>
-                </a:fontRef>
-              </p:style>
-              <p:txBody>
-                <a:bodyPr rtlCol="0" anchor="ctr"/>
-                <a:lstStyle/>
-                <a:p>
-                  <a:pPr algn="ctr"/>
-                  <a:endParaRPr lang="en-US"/>
-                </a:p>
-              </p:txBody>
-            </p:sp>
-            <p:pic>
-              <p:nvPicPr>
-                <p:cNvPr id="97" name="Picture 96">
-                  <a:extLst>
-                    <a:ext uri="{FF2B5EF4-FFF2-40B4-BE49-F238E27FC236}">
-                      <a16:creationId xmlns:a16="http://schemas.microsoft.com/office/drawing/2014/main" id="{8C5AB0E7-D26A-0447-BEF7-384CB5219E43}"/>
-                    </a:ext>
-                  </a:extLst>
-                </p:cNvPr>
-                <p:cNvPicPr>
-                  <a:picLocks noChangeAspect="1"/>
-                </p:cNvPicPr>
-                <p:nvPr/>
-              </p:nvPicPr>
-              <p:blipFill>
-                <a:blip r:embed="rId2">
-                  <a:extLst>
-                    <a:ext uri="{28A0092B-C50C-407E-A947-70E740481C1C}">
-                      <a14:useLocalDpi xmlns:a14="http://schemas.microsoft.com/office/drawing/2010/main" val="0"/>
-                    </a:ext>
-                  </a:extLst>
-                </a:blip>
-                <a:stretch>
-                  <a:fillRect/>
-                </a:stretch>
-              </p:blipFill>
-              <p:spPr>
-                <a:xfrm>
-                  <a:off x="2803319" y="413397"/>
-                  <a:ext cx="771908" cy="771908"/>
-                </a:xfrm>
-                <a:prstGeom prst="rect">
-                  <a:avLst/>
-                </a:prstGeom>
-              </p:spPr>
-            </p:pic>
-            <p:pic>
-              <p:nvPicPr>
-                <p:cNvPr id="98" name="Picture 97">
-                  <a:extLst>
-                    <a:ext uri="{FF2B5EF4-FFF2-40B4-BE49-F238E27FC236}">
-                      <a16:creationId xmlns:a16="http://schemas.microsoft.com/office/drawing/2014/main" id="{90AA2553-9805-624A-991C-B6E0FA5CB9C4}"/>
-                    </a:ext>
-                  </a:extLst>
-                </p:cNvPr>
-                <p:cNvPicPr>
-                  <a:picLocks noChangeAspect="1"/>
-                </p:cNvPicPr>
-                <p:nvPr/>
-              </p:nvPicPr>
-              <p:blipFill>
-                <a:blip r:embed="rId3">
-                  <a:extLst>
-                    <a:ext uri="{28A0092B-C50C-407E-A947-70E740481C1C}">
-                      <a14:useLocalDpi xmlns:a14="http://schemas.microsoft.com/office/drawing/2010/main" val="0"/>
-                    </a:ext>
-                  </a:extLst>
-                </a:blip>
-                <a:stretch>
-                  <a:fillRect/>
-                </a:stretch>
-              </p:blipFill>
-              <p:spPr>
-                <a:xfrm>
-                  <a:off x="5971536" y="499461"/>
-                  <a:ext cx="794135" cy="794135"/>
-                </a:xfrm>
-                <a:prstGeom prst="rect">
-                  <a:avLst/>
-                </a:prstGeom>
-              </p:spPr>
-            </p:pic>
-          </p:grpSp>
-        </p:grpSp>
-        <p:sp>
-          <p:nvSpPr>
-            <p:cNvPr id="124" name="Oval 123">
-              <a:extLst>
-                <a:ext uri="{FF2B5EF4-FFF2-40B4-BE49-F238E27FC236}">
-                  <a16:creationId xmlns:a16="http://schemas.microsoft.com/office/drawing/2014/main" id="{19DB127A-99CE-9641-858D-41CAD8A97CFE}"/>
-                </a:ext>
-              </a:extLst>
-            </p:cNvPr>
-            <p:cNvSpPr/>
-            <p:nvPr/>
-          </p:nvSpPr>
-          <p:spPr>
-            <a:xfrm>
-              <a:off x="5712308" y="1449183"/>
-              <a:ext cx="234913" cy="234913"/>
-            </a:xfrm>
-            <a:prstGeom prst="ellipse">
-              <a:avLst/>
-            </a:prstGeom>
-            <a:solidFill>
-              <a:srgbClr val="FF0000"/>
-            </a:solidFill>
-            <a:ln>
-              <a:solidFill>
-                <a:srgbClr val="FF0000"/>
-              </a:solidFill>
-            </a:ln>
-          </p:spPr>
-          <p:style>
-            <a:lnRef idx="2">
-              <a:schemeClr val="dk1">
-                <a:shade val="50000"/>
-              </a:schemeClr>
-            </a:lnRef>
-            <a:fillRef idx="1">
-              <a:schemeClr val="dk1"/>
-            </a:fillRef>
-            <a:effectRef idx="0">
-              <a:schemeClr val="dk1"/>
-            </a:effectRef>
-            <a:fontRef idx="minor">
-              <a:schemeClr val="lt1"/>
-            </a:fontRef>
-          </p:style>
-          <p:txBody>
-            <a:bodyPr rtlCol="0" anchor="ctr"/>
-            <a:lstStyle/>
-            <a:p>
-              <a:pPr algn="ctr"/>
-              <a:endParaRPr lang="en-US"/>
-            </a:p>
-          </p:txBody>
-        </p:sp>
-        <p:cxnSp>
-          <p:nvCxnSpPr>
-            <p:cNvPr id="129" name="Straight Connector 128">
-              <a:extLst>
-                <a:ext uri="{FF2B5EF4-FFF2-40B4-BE49-F238E27FC236}">
-                  <a16:creationId xmlns:a16="http://schemas.microsoft.com/office/drawing/2014/main" id="{70A397AA-2DC9-334C-A69F-5C077046FC0E}"/>
-                </a:ext>
-              </a:extLst>
-            </p:cNvPr>
-            <p:cNvCxnSpPr>
-              <a:cxnSpLocks/>
-            </p:cNvCxnSpPr>
-            <p:nvPr/>
-          </p:nvCxnSpPr>
-          <p:spPr>
-            <a:xfrm>
-              <a:off x="5829763" y="1094022"/>
-              <a:ext cx="0" cy="355161"/>
-            </a:xfrm>
-            <a:prstGeom prst="line">
-              <a:avLst/>
-            </a:prstGeom>
-            <a:ln w="28575">
-              <a:solidFill>
-                <a:srgbClr val="00B050"/>
-              </a:solidFill>
-              <a:headEnd type="none" w="med" len="med"/>
-              <a:tailEnd type="triangle" w="lg" len="lg"/>
-            </a:ln>
-            <a:effectLst/>
-          </p:spPr>
-          <p:style>
-            <a:lnRef idx="2">
-              <a:schemeClr val="accent1"/>
-            </a:lnRef>
-            <a:fillRef idx="0">
-              <a:schemeClr val="accent1"/>
-            </a:fillRef>
-            <a:effectRef idx="1">
-              <a:schemeClr val="accent1"/>
-            </a:effectRef>
-            <a:fontRef idx="minor">
-              <a:schemeClr val="tx1"/>
-            </a:fontRef>
-          </p:style>
-        </p:cxnSp>
-        <p:pic>
-          <p:nvPicPr>
-            <p:cNvPr id="72" name="Picture 71">
-              <a:extLst>
-                <a:ext uri="{FF2B5EF4-FFF2-40B4-BE49-F238E27FC236}">
-                  <a16:creationId xmlns:a16="http://schemas.microsoft.com/office/drawing/2014/main" id="{7D36C71F-8757-A140-BFAB-C610F7147B73}"/>
-                </a:ext>
-              </a:extLst>
-            </p:cNvPr>
-            <p:cNvPicPr>
-              <a:picLocks noChangeAspect="1"/>
-            </p:cNvPicPr>
-            <p:nvPr/>
-          </p:nvPicPr>
-          <p:blipFill>
-            <a:blip r:embed="rId4"/>
-            <a:stretch>
-              <a:fillRect/>
-            </a:stretch>
-          </p:blipFill>
-          <p:spPr>
-            <a:xfrm>
-              <a:off x="5367295" y="534432"/>
-              <a:ext cx="881743" cy="881743"/>
-            </a:xfrm>
-            <a:prstGeom prst="rect">
-              <a:avLst/>
-            </a:prstGeom>
-          </p:spPr>
-        </p:pic>
-        <p:sp>
-          <p:nvSpPr>
-            <p:cNvPr id="29" name="Triangle 28">
-              <a:extLst>
-                <a:ext uri="{FF2B5EF4-FFF2-40B4-BE49-F238E27FC236}">
-                  <a16:creationId xmlns:a16="http://schemas.microsoft.com/office/drawing/2014/main" id="{63213269-2DB2-AB42-89FE-B445202BBA4F}"/>
-                </a:ext>
-              </a:extLst>
-            </p:cNvPr>
-            <p:cNvSpPr/>
-            <p:nvPr/>
-          </p:nvSpPr>
-          <p:spPr>
-            <a:xfrm rot="10800000">
-              <a:off x="5791663" y="1338240"/>
-              <a:ext cx="76201" cy="67196"/>
-            </a:xfrm>
-            <a:prstGeom prst="triangle">
-              <a:avLst/>
-            </a:prstGeom>
-            <a:solidFill>
-              <a:schemeClr val="bg1"/>
-            </a:solidFill>
-            <a:ln>
-              <a:noFill/>
-            </a:ln>
-            <a:effectLst/>
-          </p:spPr>
-          <p:style>
-            <a:lnRef idx="1">
-              <a:schemeClr val="accent1"/>
-            </a:lnRef>
-            <a:fillRef idx="3">
-              <a:schemeClr val="accent1"/>
-            </a:fillRef>
-            <a:effectRef idx="2">
-              <a:schemeClr val="accent1"/>
-            </a:effectRef>
-            <a:fontRef idx="minor">
-              <a:schemeClr val="lt1"/>
-            </a:fontRef>
-          </p:style>
-          <p:txBody>
-            <a:bodyPr rtlCol="0" anchor="ctr"/>
-            <a:lstStyle/>
-            <a:p>
-              <a:pPr algn="ctr"/>
-              <a:endParaRPr lang="en-US"/>
-            </a:p>
-          </p:txBody>
-        </p:sp>
-      </p:grpSp>
-      <p:grpSp>
-        <p:nvGrpSpPr>
           <p:cNvPr id="31" name="Group 30">
             <a:extLst>
               <a:ext uri="{FF2B5EF4-FFF2-40B4-BE49-F238E27FC236}">
@@ -15005,6 +13892,1138 @@
             </a:fillRef>
             <a:effectRef idx="2">
               <a:schemeClr val="accent1"/>
+            </a:effectRef>
+            <a:fontRef idx="minor">
+              <a:schemeClr val="lt1"/>
+            </a:fontRef>
+          </p:style>
+          <p:txBody>
+            <a:bodyPr rtlCol="0" anchor="ctr"/>
+            <a:lstStyle/>
+            <a:p>
+              <a:pPr algn="ctr"/>
+              <a:endParaRPr lang="en-US"/>
+            </a:p>
+          </p:txBody>
+        </p:sp>
+      </p:grpSp>
+      <p:grpSp>
+        <p:nvGrpSpPr>
+          <p:cNvPr id="5" name="Group 4">
+            <a:extLst>
+              <a:ext uri="{FF2B5EF4-FFF2-40B4-BE49-F238E27FC236}">
+                <a16:creationId xmlns:a16="http://schemas.microsoft.com/office/drawing/2014/main" id="{F5A96FDC-7F4A-4848-95F6-ED5577812C4D}"/>
+              </a:ext>
+            </a:extLst>
+          </p:cNvPr>
+          <p:cNvGrpSpPr/>
+          <p:nvPr/>
+        </p:nvGrpSpPr>
+        <p:grpSpPr>
+          <a:xfrm>
+            <a:off x="451212" y="1259352"/>
+            <a:ext cx="8416471" cy="1920082"/>
+            <a:chOff x="451212" y="1259352"/>
+            <a:chExt cx="8416471" cy="1920082"/>
+          </a:xfrm>
+        </p:grpSpPr>
+        <p:grpSp>
+          <p:nvGrpSpPr>
+            <p:cNvPr id="3" name="Group 2">
+              <a:extLst>
+                <a:ext uri="{FF2B5EF4-FFF2-40B4-BE49-F238E27FC236}">
+                  <a16:creationId xmlns:a16="http://schemas.microsoft.com/office/drawing/2014/main" id="{01A052B2-298B-9C40-8C96-ADD836CAFCE1}"/>
+                </a:ext>
+              </a:extLst>
+            </p:cNvPr>
+            <p:cNvGrpSpPr/>
+            <p:nvPr/>
+          </p:nvGrpSpPr>
+          <p:grpSpPr>
+            <a:xfrm>
+              <a:off x="451212" y="1259352"/>
+              <a:ext cx="8416471" cy="1920082"/>
+              <a:chOff x="451212" y="534432"/>
+              <a:chExt cx="8416471" cy="1920082"/>
+            </a:xfrm>
+          </p:grpSpPr>
+          <p:cxnSp>
+            <p:nvCxnSpPr>
+              <p:cNvPr id="99" name="Straight Arrow Connector 5">
+                <a:extLst>
+                  <a:ext uri="{FF2B5EF4-FFF2-40B4-BE49-F238E27FC236}">
+                    <a16:creationId xmlns:a16="http://schemas.microsoft.com/office/drawing/2014/main" id="{AC10A760-BF4D-DB4A-9E3F-70C1A6C16040}"/>
+                  </a:ext>
+                </a:extLst>
+              </p:cNvPr>
+              <p:cNvCxnSpPr>
+                <a:cxnSpLocks/>
+                <a:endCxn id="97" idx="0"/>
+              </p:cNvCxnSpPr>
+              <p:nvPr/>
+            </p:nvCxnSpPr>
+            <p:spPr>
+              <a:xfrm flipV="1">
+                <a:off x="5095644" y="1796957"/>
+                <a:ext cx="1439006" cy="343873"/>
+              </a:xfrm>
+              <a:prstGeom prst="bentConnector4">
+                <a:avLst>
+                  <a:gd name="adj1" fmla="val 20"/>
+                  <a:gd name="adj2" fmla="val 166478"/>
+                </a:avLst>
+              </a:prstGeom>
+              <a:ln>
+                <a:solidFill>
+                  <a:srgbClr val="FF0000"/>
+                </a:solidFill>
+                <a:headEnd type="none"/>
+                <a:tailEnd type="none"/>
+              </a:ln>
+              <a:effectLst/>
+            </p:spPr>
+            <p:style>
+              <a:lnRef idx="2">
+                <a:schemeClr val="accent1"/>
+              </a:lnRef>
+              <a:fillRef idx="0">
+                <a:schemeClr val="accent1"/>
+              </a:fillRef>
+              <a:effectRef idx="1">
+                <a:schemeClr val="accent1"/>
+              </a:effectRef>
+              <a:fontRef idx="minor">
+                <a:schemeClr val="tx1"/>
+              </a:fontRef>
+            </p:style>
+          </p:cxnSp>
+          <p:cxnSp>
+            <p:nvCxnSpPr>
+              <p:cNvPr id="38" name="Straight Arrow Connector 5"/>
+              <p:cNvCxnSpPr>
+                <a:cxnSpLocks/>
+              </p:cNvCxnSpPr>
+              <p:nvPr/>
+            </p:nvCxnSpPr>
+            <p:spPr>
+              <a:xfrm flipV="1">
+                <a:off x="2249000" y="1566880"/>
+                <a:ext cx="2846644" cy="578944"/>
+              </a:xfrm>
+              <a:prstGeom prst="bentConnector3">
+                <a:avLst>
+                  <a:gd name="adj1" fmla="val 203"/>
+                </a:avLst>
+              </a:prstGeom>
+              <a:ln>
+                <a:solidFill>
+                  <a:srgbClr val="FF0000"/>
+                </a:solidFill>
+                <a:headEnd type="none"/>
+                <a:tailEnd type="none"/>
+              </a:ln>
+              <a:effectLst/>
+            </p:spPr>
+            <p:style>
+              <a:lnRef idx="2">
+                <a:schemeClr val="accent1"/>
+              </a:lnRef>
+              <a:fillRef idx="0">
+                <a:schemeClr val="accent1"/>
+              </a:fillRef>
+              <a:effectRef idx="1">
+                <a:schemeClr val="accent1"/>
+              </a:effectRef>
+              <a:fontRef idx="minor">
+                <a:schemeClr val="tx1"/>
+              </a:fontRef>
+            </p:style>
+          </p:cxnSp>
+          <p:cxnSp>
+            <p:nvCxnSpPr>
+              <p:cNvPr id="39" name="Straight Connector 38"/>
+              <p:cNvCxnSpPr/>
+              <p:nvPr/>
+            </p:nvCxnSpPr>
+            <p:spPr>
+              <a:xfrm>
+                <a:off x="6439400" y="1797802"/>
+                <a:ext cx="190500" cy="0"/>
+              </a:xfrm>
+              <a:prstGeom prst="line">
+                <a:avLst/>
+              </a:prstGeom>
+              <a:ln>
+                <a:solidFill>
+                  <a:srgbClr val="FF0000"/>
+                </a:solidFill>
+              </a:ln>
+              <a:effectLst/>
+            </p:spPr>
+            <p:style>
+              <a:lnRef idx="2">
+                <a:schemeClr val="accent1"/>
+              </a:lnRef>
+              <a:fillRef idx="0">
+                <a:schemeClr val="accent1"/>
+              </a:fillRef>
+              <a:effectRef idx="1">
+                <a:schemeClr val="accent1"/>
+              </a:effectRef>
+              <a:fontRef idx="minor">
+                <a:schemeClr val="tx1"/>
+              </a:fontRef>
+            </p:style>
+          </p:cxnSp>
+          <p:grpSp>
+            <p:nvGrpSpPr>
+              <p:cNvPr id="2" name="Group 1">
+                <a:extLst>
+                  <a:ext uri="{FF2B5EF4-FFF2-40B4-BE49-F238E27FC236}">
+                    <a16:creationId xmlns:a16="http://schemas.microsoft.com/office/drawing/2014/main" id="{651CB433-FCA4-2142-9F1D-11A6AF7DF91D}"/>
+                  </a:ext>
+                </a:extLst>
+              </p:cNvPr>
+              <p:cNvGrpSpPr/>
+              <p:nvPr/>
+            </p:nvGrpSpPr>
+            <p:grpSpPr>
+              <a:xfrm>
+                <a:off x="451212" y="1796957"/>
+                <a:ext cx="8416471" cy="657557"/>
+                <a:chOff x="139700" y="1207886"/>
+                <a:chExt cx="12901942" cy="1007995"/>
+              </a:xfrm>
+            </p:grpSpPr>
+            <p:grpSp>
+              <p:nvGrpSpPr>
+                <p:cNvPr id="60" name="Group 59"/>
+                <p:cNvGrpSpPr/>
+                <p:nvPr/>
+              </p:nvGrpSpPr>
+              <p:grpSpPr>
+                <a:xfrm>
+                  <a:off x="139700" y="1212336"/>
+                  <a:ext cx="4196538" cy="1003545"/>
+                  <a:chOff x="2569133" y="413397"/>
+                  <a:chExt cx="4196538" cy="1003545"/>
+                </a:xfrm>
+              </p:grpSpPr>
+              <p:cxnSp>
+                <p:nvCxnSpPr>
+                  <p:cNvPr id="64" name="Straight Connector 63"/>
+                  <p:cNvCxnSpPr/>
+                  <p:nvPr/>
+                </p:nvCxnSpPr>
+                <p:spPr>
+                  <a:xfrm>
+                    <a:off x="2569133" y="1140336"/>
+                    <a:ext cx="4191000" cy="0"/>
+                  </a:xfrm>
+                  <a:prstGeom prst="line">
+                    <a:avLst/>
+                  </a:prstGeom>
+                  <a:ln w="38100" cap="flat" cmpd="sng" algn="ctr">
+                    <a:solidFill>
+                      <a:srgbClr val="000000"/>
+                    </a:solidFill>
+                    <a:prstDash val="solid"/>
+                    <a:round/>
+                    <a:headEnd type="none" w="med" len="med"/>
+                    <a:tailEnd type="none" w="med" len="med"/>
+                  </a:ln>
+                  <a:effectLst/>
+                </p:spPr>
+                <p:style>
+                  <a:lnRef idx="2">
+                    <a:schemeClr val="accent1"/>
+                  </a:lnRef>
+                  <a:fillRef idx="0">
+                    <a:schemeClr val="accent1"/>
+                  </a:fillRef>
+                  <a:effectRef idx="1">
+                    <a:schemeClr val="accent1"/>
+                  </a:effectRef>
+                  <a:fontRef idx="minor">
+                    <a:schemeClr val="tx1"/>
+                  </a:fontRef>
+                </p:style>
+              </p:cxnSp>
+              <p:sp>
+                <p:nvSpPr>
+                  <p:cNvPr id="65" name="Right Arrow 64"/>
+                  <p:cNvSpPr/>
+                  <p:nvPr/>
+                </p:nvSpPr>
+                <p:spPr>
+                  <a:xfrm>
+                    <a:off x="4740833" y="949836"/>
+                    <a:ext cx="1168400" cy="350140"/>
+                  </a:xfrm>
+                  <a:prstGeom prst="rightArrow">
+                    <a:avLst>
+                      <a:gd name="adj1" fmla="val 100000"/>
+                      <a:gd name="adj2" fmla="val 52194"/>
+                    </a:avLst>
+                  </a:prstGeom>
+                  <a:solidFill>
+                    <a:schemeClr val="accent2"/>
+                  </a:solidFill>
+                  <a:ln w="38100" cap="flat" cmpd="sng" algn="ctr">
+                    <a:solidFill>
+                      <a:srgbClr val="000000"/>
+                    </a:solidFill>
+                    <a:prstDash val="solid"/>
+                    <a:round/>
+                    <a:headEnd type="none" w="med" len="med"/>
+                    <a:tailEnd type="none" w="med" len="med"/>
+                  </a:ln>
+                  <a:effectLst/>
+                </p:spPr>
+                <p:style>
+                  <a:lnRef idx="1">
+                    <a:schemeClr val="accent1"/>
+                  </a:lnRef>
+                  <a:fillRef idx="3">
+                    <a:schemeClr val="accent1"/>
+                  </a:fillRef>
+                  <a:effectRef idx="2">
+                    <a:schemeClr val="accent1"/>
+                  </a:effectRef>
+                  <a:fontRef idx="minor">
+                    <a:schemeClr val="lt1"/>
+                  </a:fontRef>
+                </p:style>
+                <p:txBody>
+                  <a:bodyPr rtlCol="0" anchor="ctr"/>
+                  <a:lstStyle/>
+                  <a:p>
+                    <a:pPr algn="ctr"/>
+                    <a:endParaRPr lang="en-US" i="1" dirty="0">
+                      <a:solidFill>
+                        <a:schemeClr val="tx1"/>
+                      </a:solidFill>
+                    </a:endParaRPr>
+                  </a:p>
+                </p:txBody>
+              </p:sp>
+              <p:sp>
+                <p:nvSpPr>
+                  <p:cNvPr id="68" name="Chord 67"/>
+                  <p:cNvSpPr/>
+                  <p:nvPr/>
+                </p:nvSpPr>
+                <p:spPr>
+                  <a:xfrm>
+                    <a:off x="3734347" y="784736"/>
+                    <a:ext cx="632206" cy="632206"/>
+                  </a:xfrm>
+                  <a:prstGeom prst="chord">
+                    <a:avLst>
+                      <a:gd name="adj1" fmla="val 10506229"/>
+                      <a:gd name="adj2" fmla="val 301460"/>
+                    </a:avLst>
+                  </a:prstGeom>
+                  <a:solidFill>
+                    <a:schemeClr val="accent4">
+                      <a:lumMod val="60000"/>
+                      <a:lumOff val="40000"/>
+                    </a:schemeClr>
+                  </a:solidFill>
+                  <a:ln w="38100" cap="flat" cmpd="sng" algn="ctr">
+                    <a:solidFill>
+                      <a:srgbClr val="000000"/>
+                    </a:solidFill>
+                    <a:prstDash val="solid"/>
+                    <a:round/>
+                    <a:headEnd type="none" w="med" len="med"/>
+                    <a:tailEnd type="none" w="med" len="med"/>
+                  </a:ln>
+                  <a:effectLst/>
+                </p:spPr>
+                <p:style>
+                  <a:lnRef idx="1">
+                    <a:schemeClr val="accent1"/>
+                  </a:lnRef>
+                  <a:fillRef idx="3">
+                    <a:schemeClr val="accent1"/>
+                  </a:fillRef>
+                  <a:effectRef idx="2">
+                    <a:schemeClr val="accent1"/>
+                  </a:effectRef>
+                  <a:fontRef idx="minor">
+                    <a:schemeClr val="lt1"/>
+                  </a:fontRef>
+                </p:style>
+                <p:txBody>
+                  <a:bodyPr rtlCol="0" anchor="ctr"/>
+                  <a:lstStyle/>
+                  <a:p>
+                    <a:pPr algn="ctr"/>
+                    <a:endParaRPr lang="en-US"/>
+                  </a:p>
+                </p:txBody>
+              </p:sp>
+              <p:pic>
+                <p:nvPicPr>
+                  <p:cNvPr id="69" name="Picture 68"/>
+                  <p:cNvPicPr>
+                    <a:picLocks noChangeAspect="1"/>
+                  </p:cNvPicPr>
+                  <p:nvPr/>
+                </p:nvPicPr>
+                <p:blipFill>
+                  <a:blip r:embed="rId2">
+                    <a:extLst>
+                      <a:ext uri="{28A0092B-C50C-407E-A947-70E740481C1C}">
+                        <a14:useLocalDpi xmlns:a14="http://schemas.microsoft.com/office/drawing/2010/main" val="0"/>
+                      </a:ext>
+                    </a:extLst>
+                  </a:blip>
+                  <a:stretch>
+                    <a:fillRect/>
+                  </a:stretch>
+                </p:blipFill>
+                <p:spPr>
+                  <a:xfrm>
+                    <a:off x="2803319" y="413397"/>
+                    <a:ext cx="771908" cy="771908"/>
+                  </a:xfrm>
+                  <a:prstGeom prst="rect">
+                    <a:avLst/>
+                  </a:prstGeom>
+                </p:spPr>
+              </p:pic>
+              <p:pic>
+                <p:nvPicPr>
+                  <p:cNvPr id="70" name="Picture 69"/>
+                  <p:cNvPicPr>
+                    <a:picLocks noChangeAspect="1"/>
+                  </p:cNvPicPr>
+                  <p:nvPr/>
+                </p:nvPicPr>
+                <p:blipFill>
+                  <a:blip r:embed="rId3">
+                    <a:extLst>
+                      <a:ext uri="{28A0092B-C50C-407E-A947-70E740481C1C}">
+                        <a14:useLocalDpi xmlns:a14="http://schemas.microsoft.com/office/drawing/2010/main" val="0"/>
+                      </a:ext>
+                    </a:extLst>
+                  </a:blip>
+                  <a:stretch>
+                    <a:fillRect/>
+                  </a:stretch>
+                </p:blipFill>
+                <p:spPr>
+                  <a:xfrm>
+                    <a:off x="5971536" y="499461"/>
+                    <a:ext cx="794135" cy="794135"/>
+                  </a:xfrm>
+                  <a:prstGeom prst="rect">
+                    <a:avLst/>
+                  </a:prstGeom>
+                </p:spPr>
+              </p:pic>
+            </p:grpSp>
+            <p:grpSp>
+              <p:nvGrpSpPr>
+                <p:cNvPr id="61" name="Group 60">
+                  <a:extLst>
+                    <a:ext uri="{FF2B5EF4-FFF2-40B4-BE49-F238E27FC236}">
+                      <a16:creationId xmlns:a16="http://schemas.microsoft.com/office/drawing/2014/main" id="{5F0A003D-F3D5-BE4D-98A5-E28807500151}"/>
+                    </a:ext>
+                  </a:extLst>
+                </p:cNvPr>
+                <p:cNvGrpSpPr/>
+                <p:nvPr/>
+              </p:nvGrpSpPr>
+              <p:grpSpPr>
+                <a:xfrm>
+                  <a:off x="4489820" y="1207886"/>
+                  <a:ext cx="4196538" cy="1003545"/>
+                  <a:chOff x="2569133" y="413397"/>
+                  <a:chExt cx="4196538" cy="1003545"/>
+                </a:xfrm>
+              </p:grpSpPr>
+              <p:cxnSp>
+                <p:nvCxnSpPr>
+                  <p:cNvPr id="62" name="Straight Connector 61">
+                    <a:extLst>
+                      <a:ext uri="{FF2B5EF4-FFF2-40B4-BE49-F238E27FC236}">
+                        <a16:creationId xmlns:a16="http://schemas.microsoft.com/office/drawing/2014/main" id="{0C636ACD-E0DD-D742-BD04-B2971D284046}"/>
+                      </a:ext>
+                    </a:extLst>
+                  </p:cNvPr>
+                  <p:cNvCxnSpPr/>
+                  <p:nvPr/>
+                </p:nvCxnSpPr>
+                <p:spPr>
+                  <a:xfrm>
+                    <a:off x="2569133" y="1140336"/>
+                    <a:ext cx="4191000" cy="0"/>
+                  </a:xfrm>
+                  <a:prstGeom prst="line">
+                    <a:avLst/>
+                  </a:prstGeom>
+                  <a:ln w="38100" cap="flat" cmpd="sng" algn="ctr">
+                    <a:solidFill>
+                      <a:srgbClr val="000000"/>
+                    </a:solidFill>
+                    <a:prstDash val="solid"/>
+                    <a:round/>
+                    <a:headEnd type="none" w="med" len="med"/>
+                    <a:tailEnd type="none" w="med" len="med"/>
+                  </a:ln>
+                  <a:effectLst/>
+                </p:spPr>
+                <p:style>
+                  <a:lnRef idx="2">
+                    <a:schemeClr val="accent1"/>
+                  </a:lnRef>
+                  <a:fillRef idx="0">
+                    <a:schemeClr val="accent1"/>
+                  </a:fillRef>
+                  <a:effectRef idx="1">
+                    <a:schemeClr val="accent1"/>
+                  </a:effectRef>
+                  <a:fontRef idx="minor">
+                    <a:schemeClr val="tx1"/>
+                  </a:fontRef>
+                </p:style>
+              </p:cxnSp>
+              <p:sp>
+                <p:nvSpPr>
+                  <p:cNvPr id="89" name="Right Arrow 88">
+                    <a:extLst>
+                      <a:ext uri="{FF2B5EF4-FFF2-40B4-BE49-F238E27FC236}">
+                        <a16:creationId xmlns:a16="http://schemas.microsoft.com/office/drawing/2014/main" id="{FC66DEAD-CBAB-6147-969A-1D54C4F7643B}"/>
+                      </a:ext>
+                    </a:extLst>
+                  </p:cNvPr>
+                  <p:cNvSpPr/>
+                  <p:nvPr/>
+                </p:nvSpPr>
+                <p:spPr>
+                  <a:xfrm>
+                    <a:off x="4740833" y="949836"/>
+                    <a:ext cx="1168400" cy="350140"/>
+                  </a:xfrm>
+                  <a:prstGeom prst="rightArrow">
+                    <a:avLst>
+                      <a:gd name="adj1" fmla="val 100000"/>
+                      <a:gd name="adj2" fmla="val 52194"/>
+                    </a:avLst>
+                  </a:prstGeom>
+                  <a:solidFill>
+                    <a:schemeClr val="accent2"/>
+                  </a:solidFill>
+                  <a:ln w="38100" cap="flat" cmpd="sng" algn="ctr">
+                    <a:solidFill>
+                      <a:srgbClr val="000000"/>
+                    </a:solidFill>
+                    <a:prstDash val="solid"/>
+                    <a:round/>
+                    <a:headEnd type="none" w="med" len="med"/>
+                    <a:tailEnd type="none" w="med" len="med"/>
+                  </a:ln>
+                  <a:effectLst/>
+                </p:spPr>
+                <p:style>
+                  <a:lnRef idx="1">
+                    <a:schemeClr val="accent1"/>
+                  </a:lnRef>
+                  <a:fillRef idx="3">
+                    <a:schemeClr val="accent1"/>
+                  </a:fillRef>
+                  <a:effectRef idx="2">
+                    <a:schemeClr val="accent1"/>
+                  </a:effectRef>
+                  <a:fontRef idx="minor">
+                    <a:schemeClr val="lt1"/>
+                  </a:fontRef>
+                </p:style>
+                <p:txBody>
+                  <a:bodyPr rtlCol="0" anchor="ctr"/>
+                  <a:lstStyle/>
+                  <a:p>
+                    <a:pPr algn="ctr"/>
+                    <a:endParaRPr lang="en-US" i="1" dirty="0">
+                      <a:solidFill>
+                        <a:schemeClr val="tx1"/>
+                      </a:solidFill>
+                    </a:endParaRPr>
+                  </a:p>
+                </p:txBody>
+              </p:sp>
+              <p:sp>
+                <p:nvSpPr>
+                  <p:cNvPr id="90" name="Chord 89">
+                    <a:extLst>
+                      <a:ext uri="{FF2B5EF4-FFF2-40B4-BE49-F238E27FC236}">
+                        <a16:creationId xmlns:a16="http://schemas.microsoft.com/office/drawing/2014/main" id="{F8E252DC-2D99-2F4B-B8AD-22AF82DA93BC}"/>
+                      </a:ext>
+                    </a:extLst>
+                  </p:cNvPr>
+                  <p:cNvSpPr/>
+                  <p:nvPr/>
+                </p:nvSpPr>
+                <p:spPr>
+                  <a:xfrm>
+                    <a:off x="3734347" y="784736"/>
+                    <a:ext cx="632206" cy="632206"/>
+                  </a:xfrm>
+                  <a:prstGeom prst="chord">
+                    <a:avLst>
+                      <a:gd name="adj1" fmla="val 10506229"/>
+                      <a:gd name="adj2" fmla="val 301460"/>
+                    </a:avLst>
+                  </a:prstGeom>
+                  <a:solidFill>
+                    <a:schemeClr val="accent4">
+                      <a:lumMod val="60000"/>
+                      <a:lumOff val="40000"/>
+                    </a:schemeClr>
+                  </a:solidFill>
+                  <a:ln w="38100" cap="flat" cmpd="sng" algn="ctr">
+                    <a:solidFill>
+                      <a:srgbClr val="000000"/>
+                    </a:solidFill>
+                    <a:prstDash val="solid"/>
+                    <a:round/>
+                    <a:headEnd type="none" w="med" len="med"/>
+                    <a:tailEnd type="none" w="med" len="med"/>
+                  </a:ln>
+                  <a:effectLst/>
+                </p:spPr>
+                <p:style>
+                  <a:lnRef idx="1">
+                    <a:schemeClr val="accent1"/>
+                  </a:lnRef>
+                  <a:fillRef idx="3">
+                    <a:schemeClr val="accent1"/>
+                  </a:fillRef>
+                  <a:effectRef idx="2">
+                    <a:schemeClr val="accent1"/>
+                  </a:effectRef>
+                  <a:fontRef idx="minor">
+                    <a:schemeClr val="lt1"/>
+                  </a:fontRef>
+                </p:style>
+                <p:txBody>
+                  <a:bodyPr rtlCol="0" anchor="ctr"/>
+                  <a:lstStyle/>
+                  <a:p>
+                    <a:pPr algn="ctr"/>
+                    <a:endParaRPr lang="en-US"/>
+                  </a:p>
+                </p:txBody>
+              </p:sp>
+              <p:pic>
+                <p:nvPicPr>
+                  <p:cNvPr id="91" name="Picture 90">
+                    <a:extLst>
+                      <a:ext uri="{FF2B5EF4-FFF2-40B4-BE49-F238E27FC236}">
+                        <a16:creationId xmlns:a16="http://schemas.microsoft.com/office/drawing/2014/main" id="{0DC979EE-EBE8-BD4E-B309-79F868E205FC}"/>
+                      </a:ext>
+                    </a:extLst>
+                  </p:cNvPr>
+                  <p:cNvPicPr>
+                    <a:picLocks noChangeAspect="1"/>
+                  </p:cNvPicPr>
+                  <p:nvPr/>
+                </p:nvPicPr>
+                <p:blipFill>
+                  <a:blip r:embed="rId2">
+                    <a:extLst>
+                      <a:ext uri="{28A0092B-C50C-407E-A947-70E740481C1C}">
+                        <a14:useLocalDpi xmlns:a14="http://schemas.microsoft.com/office/drawing/2010/main" val="0"/>
+                      </a:ext>
+                    </a:extLst>
+                  </a:blip>
+                  <a:stretch>
+                    <a:fillRect/>
+                  </a:stretch>
+                </p:blipFill>
+                <p:spPr>
+                  <a:xfrm>
+                    <a:off x="2803319" y="413397"/>
+                    <a:ext cx="771908" cy="771908"/>
+                  </a:xfrm>
+                  <a:prstGeom prst="rect">
+                    <a:avLst/>
+                  </a:prstGeom>
+                </p:spPr>
+              </p:pic>
+              <p:pic>
+                <p:nvPicPr>
+                  <p:cNvPr id="92" name="Picture 91">
+                    <a:extLst>
+                      <a:ext uri="{FF2B5EF4-FFF2-40B4-BE49-F238E27FC236}">
+                        <a16:creationId xmlns:a16="http://schemas.microsoft.com/office/drawing/2014/main" id="{856B719D-280C-694D-BF91-6EF2371F280E}"/>
+                      </a:ext>
+                    </a:extLst>
+                  </p:cNvPr>
+                  <p:cNvPicPr>
+                    <a:picLocks noChangeAspect="1"/>
+                  </p:cNvPicPr>
+                  <p:nvPr/>
+                </p:nvPicPr>
+                <p:blipFill>
+                  <a:blip r:embed="rId3">
+                    <a:extLst>
+                      <a:ext uri="{28A0092B-C50C-407E-A947-70E740481C1C}">
+                        <a14:useLocalDpi xmlns:a14="http://schemas.microsoft.com/office/drawing/2010/main" val="0"/>
+                      </a:ext>
+                    </a:extLst>
+                  </a:blip>
+                  <a:stretch>
+                    <a:fillRect/>
+                  </a:stretch>
+                </p:blipFill>
+                <p:spPr>
+                  <a:xfrm>
+                    <a:off x="5971536" y="499461"/>
+                    <a:ext cx="794135" cy="794135"/>
+                  </a:xfrm>
+                  <a:prstGeom prst="rect">
+                    <a:avLst/>
+                  </a:prstGeom>
+                </p:spPr>
+              </p:pic>
+            </p:grpSp>
+            <p:grpSp>
+              <p:nvGrpSpPr>
+                <p:cNvPr id="93" name="Group 92">
+                  <a:extLst>
+                    <a:ext uri="{FF2B5EF4-FFF2-40B4-BE49-F238E27FC236}">
+                      <a16:creationId xmlns:a16="http://schemas.microsoft.com/office/drawing/2014/main" id="{F6D9AAC4-C17D-AA44-8CBA-DF73264BB433}"/>
+                    </a:ext>
+                  </a:extLst>
+                </p:cNvPr>
+                <p:cNvGrpSpPr/>
+                <p:nvPr/>
+              </p:nvGrpSpPr>
+              <p:grpSpPr>
+                <a:xfrm>
+                  <a:off x="8845104" y="1207886"/>
+                  <a:ext cx="4196538" cy="1003545"/>
+                  <a:chOff x="2569133" y="413397"/>
+                  <a:chExt cx="4196538" cy="1003545"/>
+                </a:xfrm>
+              </p:grpSpPr>
+              <p:cxnSp>
+                <p:nvCxnSpPr>
+                  <p:cNvPr id="94" name="Straight Connector 93">
+                    <a:extLst>
+                      <a:ext uri="{FF2B5EF4-FFF2-40B4-BE49-F238E27FC236}">
+                        <a16:creationId xmlns:a16="http://schemas.microsoft.com/office/drawing/2014/main" id="{AC6E8ADE-C851-B34F-B92B-8A7DB23E7D9A}"/>
+                      </a:ext>
+                    </a:extLst>
+                  </p:cNvPr>
+                  <p:cNvCxnSpPr/>
+                  <p:nvPr/>
+                </p:nvCxnSpPr>
+                <p:spPr>
+                  <a:xfrm>
+                    <a:off x="2569133" y="1140336"/>
+                    <a:ext cx="4191000" cy="0"/>
+                  </a:xfrm>
+                  <a:prstGeom prst="line">
+                    <a:avLst/>
+                  </a:prstGeom>
+                  <a:ln w="38100" cap="flat" cmpd="sng" algn="ctr">
+                    <a:solidFill>
+                      <a:srgbClr val="000000"/>
+                    </a:solidFill>
+                    <a:prstDash val="solid"/>
+                    <a:round/>
+                    <a:headEnd type="none" w="med" len="med"/>
+                    <a:tailEnd type="none" w="med" len="med"/>
+                  </a:ln>
+                  <a:effectLst/>
+                </p:spPr>
+                <p:style>
+                  <a:lnRef idx="2">
+                    <a:schemeClr val="accent1"/>
+                  </a:lnRef>
+                  <a:fillRef idx="0">
+                    <a:schemeClr val="accent1"/>
+                  </a:fillRef>
+                  <a:effectRef idx="1">
+                    <a:schemeClr val="accent1"/>
+                  </a:effectRef>
+                  <a:fontRef idx="minor">
+                    <a:schemeClr val="tx1"/>
+                  </a:fontRef>
+                </p:style>
+              </p:cxnSp>
+              <p:sp>
+                <p:nvSpPr>
+                  <p:cNvPr id="95" name="Right Arrow 94">
+                    <a:extLst>
+                      <a:ext uri="{FF2B5EF4-FFF2-40B4-BE49-F238E27FC236}">
+                        <a16:creationId xmlns:a16="http://schemas.microsoft.com/office/drawing/2014/main" id="{833F9E49-A69A-AD49-8120-EB62256129F7}"/>
+                      </a:ext>
+                    </a:extLst>
+                  </p:cNvPr>
+                  <p:cNvSpPr/>
+                  <p:nvPr/>
+                </p:nvSpPr>
+                <p:spPr>
+                  <a:xfrm>
+                    <a:off x="4740833" y="949836"/>
+                    <a:ext cx="1168400" cy="350140"/>
+                  </a:xfrm>
+                  <a:prstGeom prst="rightArrow">
+                    <a:avLst>
+                      <a:gd name="adj1" fmla="val 100000"/>
+                      <a:gd name="adj2" fmla="val 52194"/>
+                    </a:avLst>
+                  </a:prstGeom>
+                  <a:solidFill>
+                    <a:srgbClr val="92D050"/>
+                  </a:solidFill>
+                  <a:ln w="38100" cap="flat" cmpd="sng" algn="ctr">
+                    <a:solidFill>
+                      <a:srgbClr val="000000"/>
+                    </a:solidFill>
+                    <a:prstDash val="solid"/>
+                    <a:round/>
+                    <a:headEnd type="none" w="med" len="med"/>
+                    <a:tailEnd type="none" w="med" len="med"/>
+                  </a:ln>
+                  <a:effectLst/>
+                </p:spPr>
+                <p:style>
+                  <a:lnRef idx="1">
+                    <a:schemeClr val="accent1"/>
+                  </a:lnRef>
+                  <a:fillRef idx="3">
+                    <a:schemeClr val="accent1"/>
+                  </a:fillRef>
+                  <a:effectRef idx="2">
+                    <a:schemeClr val="accent1"/>
+                  </a:effectRef>
+                  <a:fontRef idx="minor">
+                    <a:schemeClr val="lt1"/>
+                  </a:fontRef>
+                </p:style>
+                <p:txBody>
+                  <a:bodyPr rtlCol="0" anchor="ctr"/>
+                  <a:lstStyle/>
+                  <a:p>
+                    <a:pPr algn="ctr"/>
+                    <a:endParaRPr lang="en-US" i="1" dirty="0">
+                      <a:solidFill>
+                        <a:schemeClr val="tx1"/>
+                      </a:solidFill>
+                    </a:endParaRPr>
+                  </a:p>
+                </p:txBody>
+              </p:sp>
+              <p:sp>
+                <p:nvSpPr>
+                  <p:cNvPr id="96" name="Chord 95">
+                    <a:extLst>
+                      <a:ext uri="{FF2B5EF4-FFF2-40B4-BE49-F238E27FC236}">
+                        <a16:creationId xmlns:a16="http://schemas.microsoft.com/office/drawing/2014/main" id="{6B1CA32C-D843-1144-9420-E4F443DCF975}"/>
+                      </a:ext>
+                    </a:extLst>
+                  </p:cNvPr>
+                  <p:cNvSpPr/>
+                  <p:nvPr/>
+                </p:nvSpPr>
+                <p:spPr>
+                  <a:xfrm>
+                    <a:off x="3734347" y="784736"/>
+                    <a:ext cx="632206" cy="632206"/>
+                  </a:xfrm>
+                  <a:prstGeom prst="chord">
+                    <a:avLst>
+                      <a:gd name="adj1" fmla="val 10506229"/>
+                      <a:gd name="adj2" fmla="val 301460"/>
+                    </a:avLst>
+                  </a:prstGeom>
+                  <a:solidFill>
+                    <a:schemeClr val="accent4">
+                      <a:lumMod val="60000"/>
+                      <a:lumOff val="40000"/>
+                    </a:schemeClr>
+                  </a:solidFill>
+                  <a:ln w="38100" cap="flat" cmpd="sng" algn="ctr">
+                    <a:solidFill>
+                      <a:srgbClr val="000000"/>
+                    </a:solidFill>
+                    <a:prstDash val="solid"/>
+                    <a:round/>
+                    <a:headEnd type="none" w="med" len="med"/>
+                    <a:tailEnd type="none" w="med" len="med"/>
+                  </a:ln>
+                  <a:effectLst/>
+                </p:spPr>
+                <p:style>
+                  <a:lnRef idx="1">
+                    <a:schemeClr val="accent1"/>
+                  </a:lnRef>
+                  <a:fillRef idx="3">
+                    <a:schemeClr val="accent1"/>
+                  </a:fillRef>
+                  <a:effectRef idx="2">
+                    <a:schemeClr val="accent1"/>
+                  </a:effectRef>
+                  <a:fontRef idx="minor">
+                    <a:schemeClr val="lt1"/>
+                  </a:fontRef>
+                </p:style>
+                <p:txBody>
+                  <a:bodyPr rtlCol="0" anchor="ctr"/>
+                  <a:lstStyle/>
+                  <a:p>
+                    <a:pPr algn="ctr"/>
+                    <a:endParaRPr lang="en-US"/>
+                  </a:p>
+                </p:txBody>
+              </p:sp>
+              <p:pic>
+                <p:nvPicPr>
+                  <p:cNvPr id="97" name="Picture 96">
+                    <a:extLst>
+                      <a:ext uri="{FF2B5EF4-FFF2-40B4-BE49-F238E27FC236}">
+                        <a16:creationId xmlns:a16="http://schemas.microsoft.com/office/drawing/2014/main" id="{8C5AB0E7-D26A-0447-BEF7-384CB5219E43}"/>
+                      </a:ext>
+                    </a:extLst>
+                  </p:cNvPr>
+                  <p:cNvPicPr>
+                    <a:picLocks noChangeAspect="1"/>
+                  </p:cNvPicPr>
+                  <p:nvPr/>
+                </p:nvPicPr>
+                <p:blipFill>
+                  <a:blip r:embed="rId2">
+                    <a:extLst>
+                      <a:ext uri="{28A0092B-C50C-407E-A947-70E740481C1C}">
+                        <a14:useLocalDpi xmlns:a14="http://schemas.microsoft.com/office/drawing/2010/main" val="0"/>
+                      </a:ext>
+                    </a:extLst>
+                  </a:blip>
+                  <a:stretch>
+                    <a:fillRect/>
+                  </a:stretch>
+                </p:blipFill>
+                <p:spPr>
+                  <a:xfrm>
+                    <a:off x="2803319" y="413397"/>
+                    <a:ext cx="771908" cy="771908"/>
+                  </a:xfrm>
+                  <a:prstGeom prst="rect">
+                    <a:avLst/>
+                  </a:prstGeom>
+                </p:spPr>
+              </p:pic>
+              <p:pic>
+                <p:nvPicPr>
+                  <p:cNvPr id="98" name="Picture 97">
+                    <a:extLst>
+                      <a:ext uri="{FF2B5EF4-FFF2-40B4-BE49-F238E27FC236}">
+                        <a16:creationId xmlns:a16="http://schemas.microsoft.com/office/drawing/2014/main" id="{90AA2553-9805-624A-991C-B6E0FA5CB9C4}"/>
+                      </a:ext>
+                    </a:extLst>
+                  </p:cNvPr>
+                  <p:cNvPicPr>
+                    <a:picLocks noChangeAspect="1"/>
+                  </p:cNvPicPr>
+                  <p:nvPr/>
+                </p:nvPicPr>
+                <p:blipFill>
+                  <a:blip r:embed="rId3">
+                    <a:extLst>
+                      <a:ext uri="{28A0092B-C50C-407E-A947-70E740481C1C}">
+                        <a14:useLocalDpi xmlns:a14="http://schemas.microsoft.com/office/drawing/2010/main" val="0"/>
+                      </a:ext>
+                    </a:extLst>
+                  </a:blip>
+                  <a:stretch>
+                    <a:fillRect/>
+                  </a:stretch>
+                </p:blipFill>
+                <p:spPr>
+                  <a:xfrm>
+                    <a:off x="5971536" y="499461"/>
+                    <a:ext cx="794135" cy="794135"/>
+                  </a:xfrm>
+                  <a:prstGeom prst="rect">
+                    <a:avLst/>
+                  </a:prstGeom>
+                </p:spPr>
+              </p:pic>
+            </p:grpSp>
+          </p:grpSp>
+          <p:cxnSp>
+            <p:nvCxnSpPr>
+              <p:cNvPr id="129" name="Straight Connector 128">
+                <a:extLst>
+                  <a:ext uri="{FF2B5EF4-FFF2-40B4-BE49-F238E27FC236}">
+                    <a16:creationId xmlns:a16="http://schemas.microsoft.com/office/drawing/2014/main" id="{70A397AA-2DC9-334C-A69F-5C077046FC0E}"/>
+                  </a:ext>
+                </a:extLst>
+              </p:cNvPr>
+              <p:cNvCxnSpPr>
+                <a:cxnSpLocks/>
+              </p:cNvCxnSpPr>
+              <p:nvPr/>
+            </p:nvCxnSpPr>
+            <p:spPr>
+              <a:xfrm>
+                <a:off x="5829763" y="1094022"/>
+                <a:ext cx="0" cy="355161"/>
+              </a:xfrm>
+              <a:prstGeom prst="line">
+                <a:avLst/>
+              </a:prstGeom>
+              <a:ln w="28575">
+                <a:solidFill>
+                  <a:srgbClr val="00B050"/>
+                </a:solidFill>
+                <a:headEnd type="none" w="med" len="med"/>
+                <a:tailEnd type="triangle" w="lg" len="lg"/>
+              </a:ln>
+              <a:effectLst/>
+            </p:spPr>
+            <p:style>
+              <a:lnRef idx="2">
+                <a:schemeClr val="accent1"/>
+              </a:lnRef>
+              <a:fillRef idx="0">
+                <a:schemeClr val="accent1"/>
+              </a:fillRef>
+              <a:effectRef idx="1">
+                <a:schemeClr val="accent1"/>
+              </a:effectRef>
+              <a:fontRef idx="minor">
+                <a:schemeClr val="tx1"/>
+              </a:fontRef>
+            </p:style>
+          </p:cxnSp>
+          <p:pic>
+            <p:nvPicPr>
+              <p:cNvPr id="72" name="Picture 71">
+                <a:extLst>
+                  <a:ext uri="{FF2B5EF4-FFF2-40B4-BE49-F238E27FC236}">
+                    <a16:creationId xmlns:a16="http://schemas.microsoft.com/office/drawing/2014/main" id="{7D36C71F-8757-A140-BFAB-C610F7147B73}"/>
+                  </a:ext>
+                </a:extLst>
+              </p:cNvPr>
+              <p:cNvPicPr>
+                <a:picLocks noChangeAspect="1"/>
+              </p:cNvPicPr>
+              <p:nvPr/>
+            </p:nvPicPr>
+            <p:blipFill>
+              <a:blip r:embed="rId4"/>
+              <a:stretch>
+                <a:fillRect/>
+              </a:stretch>
+            </p:blipFill>
+            <p:spPr>
+              <a:xfrm>
+                <a:off x="5367295" y="534432"/>
+                <a:ext cx="881743" cy="881743"/>
+              </a:xfrm>
+              <a:prstGeom prst="rect">
+                <a:avLst/>
+              </a:prstGeom>
+            </p:spPr>
+          </p:pic>
+          <p:sp>
+            <p:nvSpPr>
+              <p:cNvPr id="29" name="Triangle 28">
+                <a:extLst>
+                  <a:ext uri="{FF2B5EF4-FFF2-40B4-BE49-F238E27FC236}">
+                    <a16:creationId xmlns:a16="http://schemas.microsoft.com/office/drawing/2014/main" id="{63213269-2DB2-AB42-89FE-B445202BBA4F}"/>
+                  </a:ext>
+                </a:extLst>
+              </p:cNvPr>
+              <p:cNvSpPr/>
+              <p:nvPr/>
+            </p:nvSpPr>
+            <p:spPr>
+              <a:xfrm rot="10800000">
+                <a:off x="5791663" y="1338240"/>
+                <a:ext cx="76201" cy="67196"/>
+              </a:xfrm>
+              <a:prstGeom prst="triangle">
+                <a:avLst/>
+              </a:prstGeom>
+              <a:solidFill>
+                <a:schemeClr val="bg1"/>
+              </a:solidFill>
+              <a:ln>
+                <a:noFill/>
+              </a:ln>
+              <a:effectLst/>
+            </p:spPr>
+            <p:style>
+              <a:lnRef idx="1">
+                <a:schemeClr val="accent1"/>
+              </a:lnRef>
+              <a:fillRef idx="3">
+                <a:schemeClr val="accent1"/>
+              </a:fillRef>
+              <a:effectRef idx="2">
+                <a:schemeClr val="accent1"/>
+              </a:effectRef>
+              <a:fontRef idx="minor">
+                <a:schemeClr val="lt1"/>
+              </a:fontRef>
+            </p:style>
+            <p:txBody>
+              <a:bodyPr rtlCol="0" anchor="ctr"/>
+              <a:lstStyle/>
+              <a:p>
+                <a:pPr algn="ctr"/>
+                <a:endParaRPr lang="en-US"/>
+              </a:p>
+            </p:txBody>
+          </p:sp>
+        </p:grpSp>
+        <p:sp>
+          <p:nvSpPr>
+            <p:cNvPr id="4" name="Rectangle 3">
+              <a:extLst>
+                <a:ext uri="{FF2B5EF4-FFF2-40B4-BE49-F238E27FC236}">
+                  <a16:creationId xmlns:a16="http://schemas.microsoft.com/office/drawing/2014/main" id="{1DDF0C63-33C5-634A-A47B-C8218B57759E}"/>
+                </a:ext>
+              </a:extLst>
+            </p:cNvPr>
+            <p:cNvSpPr/>
+            <p:nvPr/>
+          </p:nvSpPr>
+          <p:spPr>
+            <a:xfrm>
+              <a:off x="5715655" y="2156724"/>
+              <a:ext cx="238356" cy="238356"/>
+            </a:xfrm>
+            <a:prstGeom prst="rect">
+              <a:avLst/>
+            </a:prstGeom>
+            <a:solidFill>
+              <a:srgbClr val="FF0000"/>
+            </a:solidFill>
+            <a:ln>
+              <a:noFill/>
+            </a:ln>
+          </p:spPr>
+          <p:style>
+            <a:lnRef idx="2">
+              <a:schemeClr val="accent2">
+                <a:shade val="50000"/>
+              </a:schemeClr>
+            </a:lnRef>
+            <a:fillRef idx="1">
+              <a:schemeClr val="accent2"/>
+            </a:fillRef>
+            <a:effectRef idx="0">
+              <a:schemeClr val="accent2"/>
             </a:effectRef>
             <a:fontRef idx="minor">
               <a:schemeClr val="lt1"/>

</xml_diff>

<commit_message>
tweaks to improve wording and examples
</commit_message>
<xml_diff>
--- a/specification/imgsrc/4.pptx
+++ b/specification/imgsrc/4.pptx
@@ -218,7 +218,7 @@
           <a:p>
             <a:fld id="{9E808448-E5C1-6044-9A1D-E68767CBF56D}" type="datetimeFigureOut">
               <a:rPr lang="en-US" smtClean="0"/>
-              <a:t>9/25/20</a:t>
+              <a:t>9/29/20</a:t>
             </a:fld>
             <a:endParaRPr lang="en-US"/>
           </a:p>
@@ -748,7 +748,7 @@
           <a:p>
             <a:fld id="{EBC7FFC8-011D-1246-B320-9C4FD100F423}" type="datetimeFigureOut">
               <a:rPr lang="en-US" smtClean="0"/>
-              <a:t>9/25/20</a:t>
+              <a:t>9/29/20</a:t>
             </a:fld>
             <a:endParaRPr lang="en-US"/>
           </a:p>
@@ -916,7 +916,7 @@
           <a:p>
             <a:fld id="{EBC7FFC8-011D-1246-B320-9C4FD100F423}" type="datetimeFigureOut">
               <a:rPr lang="en-US" smtClean="0"/>
-              <a:t>9/25/20</a:t>
+              <a:t>9/29/20</a:t>
             </a:fld>
             <a:endParaRPr lang="en-US"/>
           </a:p>
@@ -1094,7 +1094,7 @@
           <a:p>
             <a:fld id="{EBC7FFC8-011D-1246-B320-9C4FD100F423}" type="datetimeFigureOut">
               <a:rPr lang="en-US" smtClean="0"/>
-              <a:t>9/25/20</a:t>
+              <a:t>9/29/20</a:t>
             </a:fld>
             <a:endParaRPr lang="en-US"/>
           </a:p>
@@ -1262,7 +1262,7 @@
           <a:p>
             <a:fld id="{EBC7FFC8-011D-1246-B320-9C4FD100F423}" type="datetimeFigureOut">
               <a:rPr lang="en-US" smtClean="0"/>
-              <a:t>9/25/20</a:t>
+              <a:t>9/29/20</a:t>
             </a:fld>
             <a:endParaRPr lang="en-US"/>
           </a:p>
@@ -1507,7 +1507,7 @@
           <a:p>
             <a:fld id="{EBC7FFC8-011D-1246-B320-9C4FD100F423}" type="datetimeFigureOut">
               <a:rPr lang="en-US" smtClean="0"/>
-              <a:t>9/25/20</a:t>
+              <a:t>9/29/20</a:t>
             </a:fld>
             <a:endParaRPr lang="en-US"/>
           </a:p>
@@ -1792,7 +1792,7 @@
           <a:p>
             <a:fld id="{EBC7FFC8-011D-1246-B320-9C4FD100F423}" type="datetimeFigureOut">
               <a:rPr lang="en-US" smtClean="0"/>
-              <a:t>9/25/20</a:t>
+              <a:t>9/29/20</a:t>
             </a:fld>
             <a:endParaRPr lang="en-US"/>
           </a:p>
@@ -2211,7 +2211,7 @@
           <a:p>
             <a:fld id="{EBC7FFC8-011D-1246-B320-9C4FD100F423}" type="datetimeFigureOut">
               <a:rPr lang="en-US" smtClean="0"/>
-              <a:t>9/25/20</a:t>
+              <a:t>9/29/20</a:t>
             </a:fld>
             <a:endParaRPr lang="en-US"/>
           </a:p>
@@ -2328,7 +2328,7 @@
           <a:p>
             <a:fld id="{EBC7FFC8-011D-1246-B320-9C4FD100F423}" type="datetimeFigureOut">
               <a:rPr lang="en-US" smtClean="0"/>
-              <a:t>9/25/20</a:t>
+              <a:t>9/29/20</a:t>
             </a:fld>
             <a:endParaRPr lang="en-US"/>
           </a:p>
@@ -2423,7 +2423,7 @@
           <a:p>
             <a:fld id="{EBC7FFC8-011D-1246-B320-9C4FD100F423}" type="datetimeFigureOut">
               <a:rPr lang="en-US" smtClean="0"/>
-              <a:t>9/25/20</a:t>
+              <a:t>9/29/20</a:t>
             </a:fld>
             <a:endParaRPr lang="en-US"/>
           </a:p>
@@ -2698,7 +2698,7 @@
           <a:p>
             <a:fld id="{EBC7FFC8-011D-1246-B320-9C4FD100F423}" type="datetimeFigureOut">
               <a:rPr lang="en-US" smtClean="0"/>
-              <a:t>9/25/20</a:t>
+              <a:t>9/29/20</a:t>
             </a:fld>
             <a:endParaRPr lang="en-US"/>
           </a:p>
@@ -2950,7 +2950,7 @@
           <a:p>
             <a:fld id="{EBC7FFC8-011D-1246-B320-9C4FD100F423}" type="datetimeFigureOut">
               <a:rPr lang="en-US" smtClean="0"/>
-              <a:t>9/25/20</a:t>
+              <a:t>9/29/20</a:t>
             </a:fld>
             <a:endParaRPr lang="en-US"/>
           </a:p>
@@ -3161,7 +3161,7 @@
           <a:p>
             <a:fld id="{EBC7FFC8-011D-1246-B320-9C4FD100F423}" type="datetimeFigureOut">
               <a:rPr lang="en-US" smtClean="0"/>
-              <a:t>9/25/20</a:t>
+              <a:t>9/29/20</a:t>
             </a:fld>
             <a:endParaRPr lang="en-US"/>
           </a:p>
@@ -16285,56 +16285,6 @@
           <a:chExt cx="0" cy="0"/>
         </a:xfrm>
       </p:grpSpPr>
-      <p:cxnSp>
-        <p:nvCxnSpPr>
-          <p:cNvPr id="99" name="Straight Arrow Connector 5">
-            <a:extLst>
-              <a:ext uri="{FF2B5EF4-FFF2-40B4-BE49-F238E27FC236}">
-                <a16:creationId xmlns:a16="http://schemas.microsoft.com/office/drawing/2014/main" id="{AC10A760-BF4D-DB4A-9E3F-70C1A6C16040}"/>
-              </a:ext>
-            </a:extLst>
-          </p:cNvPr>
-          <p:cNvCxnSpPr>
-            <a:cxnSpLocks/>
-            <a:endCxn id="97" idx="0"/>
-          </p:cNvCxnSpPr>
-          <p:nvPr/>
-        </p:nvCxnSpPr>
-        <p:spPr>
-          <a:xfrm flipV="1">
-            <a:off x="5095644" y="3002241"/>
-            <a:ext cx="1439006" cy="343873"/>
-          </a:xfrm>
-          <a:prstGeom prst="bentConnector4">
-            <a:avLst>
-              <a:gd name="adj1" fmla="val 20"/>
-              <a:gd name="adj2" fmla="val 166478"/>
-            </a:avLst>
-          </a:prstGeom>
-          <a:ln>
-            <a:solidFill>
-              <a:srgbClr val="FF0000"/>
-            </a:solidFill>
-            <a:headEnd type="none"/>
-            <a:tailEnd type="none"/>
-          </a:ln>
-          <a:effectLst/>
-        </p:spPr>
-        <p:style>
-          <a:lnRef idx="2">
-            <a:schemeClr val="accent1"/>
-          </a:lnRef>
-          <a:fillRef idx="0">
-            <a:schemeClr val="accent1"/>
-          </a:fillRef>
-          <a:effectRef idx="1">
-            <a:schemeClr val="accent1"/>
-          </a:effectRef>
-          <a:fontRef idx="minor">
-            <a:schemeClr val="tx1"/>
-          </a:fontRef>
-        </p:style>
-      </p:cxnSp>
       <p:sp>
         <p:nvSpPr>
           <p:cNvPr id="67" name="TextBox 66"/>
@@ -16364,84 +16314,6 @@
           </a:p>
         </p:txBody>
       </p:sp>
-      <p:cxnSp>
-        <p:nvCxnSpPr>
-          <p:cNvPr id="38" name="Straight Arrow Connector 5"/>
-          <p:cNvCxnSpPr>
-            <a:cxnSpLocks/>
-          </p:cNvCxnSpPr>
-          <p:nvPr/>
-        </p:nvCxnSpPr>
-        <p:spPr>
-          <a:xfrm flipV="1">
-            <a:off x="2249000" y="2772164"/>
-            <a:ext cx="2846644" cy="578944"/>
-          </a:xfrm>
-          <a:prstGeom prst="bentConnector3">
-            <a:avLst>
-              <a:gd name="adj1" fmla="val 203"/>
-            </a:avLst>
-          </a:prstGeom>
-          <a:ln>
-            <a:solidFill>
-              <a:srgbClr val="FF0000"/>
-            </a:solidFill>
-            <a:headEnd type="none"/>
-            <a:tailEnd type="none"/>
-          </a:ln>
-          <a:effectLst/>
-        </p:spPr>
-        <p:style>
-          <a:lnRef idx="2">
-            <a:schemeClr val="accent1"/>
-          </a:lnRef>
-          <a:fillRef idx="0">
-            <a:schemeClr val="accent1"/>
-          </a:fillRef>
-          <a:effectRef idx="1">
-            <a:schemeClr val="accent1"/>
-          </a:effectRef>
-          <a:fontRef idx="minor">
-            <a:schemeClr val="tx1"/>
-          </a:fontRef>
-        </p:style>
-      </p:cxnSp>
-      <p:cxnSp>
-        <p:nvCxnSpPr>
-          <p:cNvPr id="39" name="Straight Connector 38"/>
-          <p:cNvCxnSpPr/>
-          <p:nvPr/>
-        </p:nvCxnSpPr>
-        <p:spPr>
-          <a:xfrm>
-            <a:off x="6439400" y="3003086"/>
-            <a:ext cx="190500" cy="0"/>
-          </a:xfrm>
-          <a:prstGeom prst="line">
-            <a:avLst/>
-          </a:prstGeom>
-          <a:ln>
-            <a:solidFill>
-              <a:srgbClr val="FF0000"/>
-            </a:solidFill>
-          </a:ln>
-          <a:effectLst/>
-        </p:spPr>
-        <p:style>
-          <a:lnRef idx="2">
-            <a:schemeClr val="accent1"/>
-          </a:lnRef>
-          <a:fillRef idx="0">
-            <a:schemeClr val="accent1"/>
-          </a:fillRef>
-          <a:effectRef idx="1">
-            <a:schemeClr val="accent1"/>
-          </a:effectRef>
-          <a:fontRef idx="minor">
-            <a:schemeClr val="tx1"/>
-          </a:fontRef>
-        </p:style>
-      </p:cxnSp>
       <p:sp>
         <p:nvSpPr>
           <p:cNvPr id="43" name="TextBox 42"/>
@@ -16473,10 +16345,10 @@
       </p:sp>
       <p:grpSp>
         <p:nvGrpSpPr>
-          <p:cNvPr id="2" name="Group 1">
+          <p:cNvPr id="4" name="Group 3">
             <a:extLst>
               <a:ext uri="{FF2B5EF4-FFF2-40B4-BE49-F238E27FC236}">
-                <a16:creationId xmlns:a16="http://schemas.microsoft.com/office/drawing/2014/main" id="{651CB433-FCA4-2142-9F1D-11A6AF7DF91D}"/>
+                <a16:creationId xmlns:a16="http://schemas.microsoft.com/office/drawing/2014/main" id="{649520B6-A9AE-8940-8E4F-4FF47B06BF06}"/>
               </a:ext>
             </a:extLst>
           </p:cNvPr>
@@ -16485,248 +16357,104 @@
         </p:nvGrpSpPr>
         <p:grpSpPr>
           <a:xfrm>
-            <a:off x="451212" y="3002241"/>
-            <a:ext cx="8416471" cy="657557"/>
-            <a:chOff x="139700" y="1207886"/>
-            <a:chExt cx="12901942" cy="1007995"/>
+            <a:off x="3288975" y="1739716"/>
+            <a:ext cx="5578708" cy="1917179"/>
+            <a:chOff x="3288975" y="1739716"/>
+            <a:chExt cx="5578708" cy="1917179"/>
           </a:xfrm>
         </p:grpSpPr>
+        <p:cxnSp>
+          <p:nvCxnSpPr>
+            <p:cNvPr id="99" name="Straight Arrow Connector 5">
+              <a:extLst>
+                <a:ext uri="{FF2B5EF4-FFF2-40B4-BE49-F238E27FC236}">
+                  <a16:creationId xmlns:a16="http://schemas.microsoft.com/office/drawing/2014/main" id="{AC10A760-BF4D-DB4A-9E3F-70C1A6C16040}"/>
+                </a:ext>
+              </a:extLst>
+            </p:cNvPr>
+            <p:cNvCxnSpPr>
+              <a:cxnSpLocks/>
+              <a:endCxn id="97" idx="0"/>
+            </p:cNvCxnSpPr>
+            <p:nvPr/>
+          </p:nvCxnSpPr>
+          <p:spPr>
+            <a:xfrm flipV="1">
+              <a:off x="5095644" y="3002241"/>
+              <a:ext cx="1439006" cy="343873"/>
+            </a:xfrm>
+            <a:prstGeom prst="bentConnector4">
+              <a:avLst>
+                <a:gd name="adj1" fmla="val 20"/>
+                <a:gd name="adj2" fmla="val 166478"/>
+              </a:avLst>
+            </a:prstGeom>
+            <a:ln>
+              <a:solidFill>
+                <a:srgbClr val="FF0000"/>
+              </a:solidFill>
+              <a:headEnd type="none"/>
+              <a:tailEnd type="none"/>
+            </a:ln>
+            <a:effectLst/>
+          </p:spPr>
+          <p:style>
+            <a:lnRef idx="2">
+              <a:schemeClr val="accent1"/>
+            </a:lnRef>
+            <a:fillRef idx="0">
+              <a:schemeClr val="accent1"/>
+            </a:fillRef>
+            <a:effectRef idx="1">
+              <a:schemeClr val="accent1"/>
+            </a:effectRef>
+            <a:fontRef idx="minor">
+              <a:schemeClr val="tx1"/>
+            </a:fontRef>
+          </p:style>
+        </p:cxnSp>
+        <p:cxnSp>
+          <p:nvCxnSpPr>
+            <p:cNvPr id="39" name="Straight Connector 38"/>
+            <p:cNvCxnSpPr/>
+            <p:nvPr/>
+          </p:nvCxnSpPr>
+          <p:spPr>
+            <a:xfrm>
+              <a:off x="6439400" y="3003086"/>
+              <a:ext cx="190500" cy="0"/>
+            </a:xfrm>
+            <a:prstGeom prst="line">
+              <a:avLst/>
+            </a:prstGeom>
+            <a:ln>
+              <a:solidFill>
+                <a:srgbClr val="FF0000"/>
+              </a:solidFill>
+            </a:ln>
+            <a:effectLst/>
+          </p:spPr>
+          <p:style>
+            <a:lnRef idx="2">
+              <a:schemeClr val="accent1"/>
+            </a:lnRef>
+            <a:fillRef idx="0">
+              <a:schemeClr val="accent1"/>
+            </a:fillRef>
+            <a:effectRef idx="1">
+              <a:schemeClr val="accent1"/>
+            </a:effectRef>
+            <a:fontRef idx="minor">
+              <a:schemeClr val="tx1"/>
+            </a:fontRef>
+          </p:style>
+        </p:cxnSp>
         <p:grpSp>
           <p:nvGrpSpPr>
-            <p:cNvPr id="60" name="Group 59"/>
-            <p:cNvGrpSpPr/>
-            <p:nvPr/>
-          </p:nvGrpSpPr>
-          <p:grpSpPr>
-            <a:xfrm>
-              <a:off x="139700" y="1212336"/>
-              <a:ext cx="4196538" cy="1003545"/>
-              <a:chOff x="2569133" y="413397"/>
-              <a:chExt cx="4196538" cy="1003545"/>
-            </a:xfrm>
-          </p:grpSpPr>
-          <p:cxnSp>
-            <p:nvCxnSpPr>
-              <p:cNvPr id="64" name="Straight Connector 63"/>
-              <p:cNvCxnSpPr/>
-              <p:nvPr/>
-            </p:nvCxnSpPr>
-            <p:spPr>
-              <a:xfrm>
-                <a:off x="2569133" y="1140336"/>
-                <a:ext cx="4191000" cy="0"/>
-              </a:xfrm>
-              <a:prstGeom prst="line">
-                <a:avLst/>
-              </a:prstGeom>
-              <a:ln w="38100" cap="flat" cmpd="sng" algn="ctr">
-                <a:solidFill>
-                  <a:srgbClr val="000000"/>
-                </a:solidFill>
-                <a:prstDash val="solid"/>
-                <a:round/>
-                <a:headEnd type="none" w="med" len="med"/>
-                <a:tailEnd type="none" w="med" len="med"/>
-              </a:ln>
-              <a:effectLst/>
-            </p:spPr>
-            <p:style>
-              <a:lnRef idx="2">
-                <a:schemeClr val="accent1"/>
-              </a:lnRef>
-              <a:fillRef idx="0">
-                <a:schemeClr val="accent1"/>
-              </a:fillRef>
-              <a:effectRef idx="1">
-                <a:schemeClr val="accent1"/>
-              </a:effectRef>
-              <a:fontRef idx="minor">
-                <a:schemeClr val="tx1"/>
-              </a:fontRef>
-            </p:style>
-          </p:cxnSp>
-          <p:sp>
-            <p:nvSpPr>
-              <p:cNvPr id="65" name="Right Arrow 64"/>
-              <p:cNvSpPr/>
-              <p:nvPr/>
-            </p:nvSpPr>
-            <p:spPr>
-              <a:xfrm>
-                <a:off x="4740833" y="949836"/>
-                <a:ext cx="1168400" cy="350140"/>
-              </a:xfrm>
-              <a:prstGeom prst="rightArrow">
-                <a:avLst>
-                  <a:gd name="adj1" fmla="val 100000"/>
-                  <a:gd name="adj2" fmla="val 52194"/>
-                </a:avLst>
-              </a:prstGeom>
-              <a:solidFill>
-                <a:schemeClr val="accent2"/>
-              </a:solidFill>
-              <a:ln w="38100" cap="flat" cmpd="sng" algn="ctr">
-                <a:solidFill>
-                  <a:srgbClr val="000000"/>
-                </a:solidFill>
-                <a:prstDash val="solid"/>
-                <a:round/>
-                <a:headEnd type="none" w="med" len="med"/>
-                <a:tailEnd type="none" w="med" len="med"/>
-              </a:ln>
-              <a:effectLst/>
-            </p:spPr>
-            <p:style>
-              <a:lnRef idx="1">
-                <a:schemeClr val="accent1"/>
-              </a:lnRef>
-              <a:fillRef idx="3">
-                <a:schemeClr val="accent1"/>
-              </a:fillRef>
-              <a:effectRef idx="2">
-                <a:schemeClr val="accent1"/>
-              </a:effectRef>
-              <a:fontRef idx="minor">
-                <a:schemeClr val="lt1"/>
-              </a:fontRef>
-            </p:style>
-            <p:txBody>
-              <a:bodyPr rtlCol="0" anchor="ctr"/>
-              <a:lstStyle/>
-              <a:p>
-                <a:pPr algn="ctr"/>
-                <a:endParaRPr lang="en-US" i="1" dirty="0">
-                  <a:solidFill>
-                    <a:schemeClr val="tx1"/>
-                  </a:solidFill>
-                </a:endParaRPr>
-              </a:p>
-            </p:txBody>
-          </p:sp>
-          <p:sp>
-            <p:nvSpPr>
-              <p:cNvPr id="68" name="Chord 67"/>
-              <p:cNvSpPr/>
-              <p:nvPr/>
-            </p:nvSpPr>
-            <p:spPr>
-              <a:xfrm>
-                <a:off x="3734347" y="784736"/>
-                <a:ext cx="632206" cy="632206"/>
-              </a:xfrm>
-              <a:prstGeom prst="chord">
-                <a:avLst>
-                  <a:gd name="adj1" fmla="val 10506229"/>
-                  <a:gd name="adj2" fmla="val 301460"/>
-                </a:avLst>
-              </a:prstGeom>
-              <a:solidFill>
-                <a:schemeClr val="accent4">
-                  <a:lumMod val="60000"/>
-                  <a:lumOff val="40000"/>
-                </a:schemeClr>
-              </a:solidFill>
-              <a:ln w="38100" cap="flat" cmpd="sng" algn="ctr">
-                <a:solidFill>
-                  <a:srgbClr val="000000"/>
-                </a:solidFill>
-                <a:prstDash val="solid"/>
-                <a:round/>
-                <a:headEnd type="none" w="med" len="med"/>
-                <a:tailEnd type="none" w="med" len="med"/>
-              </a:ln>
-              <a:effectLst/>
-            </p:spPr>
-            <p:style>
-              <a:lnRef idx="1">
-                <a:schemeClr val="accent1"/>
-              </a:lnRef>
-              <a:fillRef idx="3">
-                <a:schemeClr val="accent1"/>
-              </a:fillRef>
-              <a:effectRef idx="2">
-                <a:schemeClr val="accent1"/>
-              </a:effectRef>
-              <a:fontRef idx="minor">
-                <a:schemeClr val="lt1"/>
-              </a:fontRef>
-            </p:style>
-            <p:txBody>
-              <a:bodyPr rtlCol="0" anchor="ctr"/>
-              <a:lstStyle/>
-              <a:p>
-                <a:pPr algn="ctr"/>
-                <a:endParaRPr lang="en-US"/>
-              </a:p>
-            </p:txBody>
-          </p:sp>
-          <p:pic>
-            <p:nvPicPr>
-              <p:cNvPr id="69" name="Picture 68"/>
-              <p:cNvPicPr>
-                <a:picLocks noChangeAspect="1"/>
-              </p:cNvPicPr>
-              <p:nvPr/>
-            </p:nvPicPr>
-            <p:blipFill>
-              <a:blip r:embed="rId2">
-                <a:extLst>
-                  <a:ext uri="{28A0092B-C50C-407E-A947-70E740481C1C}">
-                    <a14:useLocalDpi xmlns:a14="http://schemas.microsoft.com/office/drawing/2010/main" val="0"/>
-                  </a:ext>
-                </a:extLst>
-              </a:blip>
-              <a:stretch>
-                <a:fillRect/>
-              </a:stretch>
-            </p:blipFill>
-            <p:spPr>
-              <a:xfrm>
-                <a:off x="2803319" y="413397"/>
-                <a:ext cx="771908" cy="771908"/>
-              </a:xfrm>
-              <a:prstGeom prst="rect">
-                <a:avLst/>
-              </a:prstGeom>
-            </p:spPr>
-          </p:pic>
-          <p:pic>
-            <p:nvPicPr>
-              <p:cNvPr id="70" name="Picture 69"/>
-              <p:cNvPicPr>
-                <a:picLocks noChangeAspect="1"/>
-              </p:cNvPicPr>
-              <p:nvPr/>
-            </p:nvPicPr>
-            <p:blipFill>
-              <a:blip r:embed="rId3">
-                <a:extLst>
-                  <a:ext uri="{28A0092B-C50C-407E-A947-70E740481C1C}">
-                    <a14:useLocalDpi xmlns:a14="http://schemas.microsoft.com/office/drawing/2010/main" val="0"/>
-                  </a:ext>
-                </a:extLst>
-              </a:blip>
-              <a:stretch>
-                <a:fillRect/>
-              </a:stretch>
-            </p:blipFill>
-            <p:spPr>
-              <a:xfrm>
-                <a:off x="5971536" y="499461"/>
-                <a:ext cx="794135" cy="794135"/>
-              </a:xfrm>
-              <a:prstGeom prst="rect">
-                <a:avLst/>
-              </a:prstGeom>
-            </p:spPr>
-          </p:pic>
-        </p:grpSp>
-        <p:grpSp>
-          <p:nvGrpSpPr>
-            <p:cNvPr id="61" name="Group 60">
+            <p:cNvPr id="2" name="Group 1">
               <a:extLst>
                 <a:ext uri="{FF2B5EF4-FFF2-40B4-BE49-F238E27FC236}">
-                  <a16:creationId xmlns:a16="http://schemas.microsoft.com/office/drawing/2014/main" id="{5F0A003D-F3D5-BE4D-98A5-E28807500151}"/>
+                  <a16:creationId xmlns:a16="http://schemas.microsoft.com/office/drawing/2014/main" id="{651CB433-FCA4-2142-9F1D-11A6AF7DF91D}"/>
                 </a:ext>
               </a:extLst>
             </p:cNvPr>
@@ -16735,264 +16463,841 @@
           </p:nvGrpSpPr>
           <p:grpSpPr>
             <a:xfrm>
-              <a:off x="4489820" y="1207886"/>
-              <a:ext cx="4196538" cy="1003545"/>
-              <a:chOff x="2569133" y="413397"/>
-              <a:chExt cx="4196538" cy="1003545"/>
+              <a:off x="3288975" y="3002241"/>
+              <a:ext cx="5578708" cy="654654"/>
+              <a:chOff x="4489820" y="1207886"/>
+              <a:chExt cx="8551822" cy="1003545"/>
             </a:xfrm>
           </p:grpSpPr>
-          <p:cxnSp>
-            <p:nvCxnSpPr>
-              <p:cNvPr id="62" name="Straight Connector 61">
+          <p:grpSp>
+            <p:nvGrpSpPr>
+              <p:cNvPr id="61" name="Group 60">
                 <a:extLst>
                   <a:ext uri="{FF2B5EF4-FFF2-40B4-BE49-F238E27FC236}">
-                    <a16:creationId xmlns:a16="http://schemas.microsoft.com/office/drawing/2014/main" id="{0C636ACD-E0DD-D742-BD04-B2971D284046}"/>
+                    <a16:creationId xmlns:a16="http://schemas.microsoft.com/office/drawing/2014/main" id="{5F0A003D-F3D5-BE4D-98A5-E28807500151}"/>
                   </a:ext>
                 </a:extLst>
               </p:cNvPr>
-              <p:cNvCxnSpPr/>
+              <p:cNvGrpSpPr/>
               <p:nvPr/>
-            </p:nvCxnSpPr>
-            <p:spPr>
+            </p:nvGrpSpPr>
+            <p:grpSpPr>
               <a:xfrm>
-                <a:off x="2569133" y="1140336"/>
-                <a:ext cx="4191000" cy="0"/>
+                <a:off x="4489820" y="1207886"/>
+                <a:ext cx="4196538" cy="1003545"/>
+                <a:chOff x="2569133" y="413397"/>
+                <a:chExt cx="4196538" cy="1003545"/>
               </a:xfrm>
-              <a:prstGeom prst="line">
-                <a:avLst/>
-              </a:prstGeom>
-              <a:ln w="38100" cap="flat" cmpd="sng" algn="ctr">
+            </p:grpSpPr>
+            <p:cxnSp>
+              <p:nvCxnSpPr>
+                <p:cNvPr id="62" name="Straight Connector 61">
+                  <a:extLst>
+                    <a:ext uri="{FF2B5EF4-FFF2-40B4-BE49-F238E27FC236}">
+                      <a16:creationId xmlns:a16="http://schemas.microsoft.com/office/drawing/2014/main" id="{0C636ACD-E0DD-D742-BD04-B2971D284046}"/>
+                    </a:ext>
+                  </a:extLst>
+                </p:cNvPr>
+                <p:cNvCxnSpPr/>
+                <p:nvPr/>
+              </p:nvCxnSpPr>
+              <p:spPr>
+                <a:xfrm>
+                  <a:off x="2569133" y="1140336"/>
+                  <a:ext cx="4191000" cy="0"/>
+                </a:xfrm>
+                <a:prstGeom prst="line">
+                  <a:avLst/>
+                </a:prstGeom>
+                <a:ln w="38100" cap="flat" cmpd="sng" algn="ctr">
+                  <a:solidFill>
+                    <a:srgbClr val="000000"/>
+                  </a:solidFill>
+                  <a:prstDash val="solid"/>
+                  <a:round/>
+                  <a:headEnd type="none" w="med" len="med"/>
+                  <a:tailEnd type="none" w="med" len="med"/>
+                </a:ln>
+                <a:effectLst/>
+              </p:spPr>
+              <p:style>
+                <a:lnRef idx="2">
+                  <a:schemeClr val="accent1"/>
+                </a:lnRef>
+                <a:fillRef idx="0">
+                  <a:schemeClr val="accent1"/>
+                </a:fillRef>
+                <a:effectRef idx="1">
+                  <a:schemeClr val="accent1"/>
+                </a:effectRef>
+                <a:fontRef idx="minor">
+                  <a:schemeClr val="tx1"/>
+                </a:fontRef>
+              </p:style>
+            </p:cxnSp>
+            <p:sp>
+              <p:nvSpPr>
+                <p:cNvPr id="89" name="Right Arrow 88">
+                  <a:extLst>
+                    <a:ext uri="{FF2B5EF4-FFF2-40B4-BE49-F238E27FC236}">
+                      <a16:creationId xmlns:a16="http://schemas.microsoft.com/office/drawing/2014/main" id="{FC66DEAD-CBAB-6147-969A-1D54C4F7643B}"/>
+                    </a:ext>
+                  </a:extLst>
+                </p:cNvPr>
+                <p:cNvSpPr/>
+                <p:nvPr/>
+              </p:nvSpPr>
+              <p:spPr>
+                <a:xfrm>
+                  <a:off x="4740833" y="949836"/>
+                  <a:ext cx="1168400" cy="350140"/>
+                </a:xfrm>
+                <a:prstGeom prst="rightArrow">
+                  <a:avLst>
+                    <a:gd name="adj1" fmla="val 100000"/>
+                    <a:gd name="adj2" fmla="val 52194"/>
+                  </a:avLst>
+                </a:prstGeom>
                 <a:solidFill>
-                  <a:srgbClr val="000000"/>
+                  <a:schemeClr val="accent2"/>
                 </a:solidFill>
-                <a:prstDash val="solid"/>
-                <a:round/>
-                <a:headEnd type="none" w="med" len="med"/>
-                <a:tailEnd type="none" w="med" len="med"/>
-              </a:ln>
-              <a:effectLst/>
-            </p:spPr>
-            <p:style>
-              <a:lnRef idx="2">
-                <a:schemeClr val="accent1"/>
-              </a:lnRef>
-              <a:fillRef idx="0">
-                <a:schemeClr val="accent1"/>
-              </a:fillRef>
-              <a:effectRef idx="1">
-                <a:schemeClr val="accent1"/>
-              </a:effectRef>
-              <a:fontRef idx="minor">
-                <a:schemeClr val="tx1"/>
-              </a:fontRef>
-            </p:style>
-          </p:cxnSp>
-          <p:sp>
-            <p:nvSpPr>
-              <p:cNvPr id="89" name="Right Arrow 88">
+                <a:ln w="38100" cap="flat" cmpd="sng" algn="ctr">
+                  <a:solidFill>
+                    <a:srgbClr val="000000"/>
+                  </a:solidFill>
+                  <a:prstDash val="solid"/>
+                  <a:round/>
+                  <a:headEnd type="none" w="med" len="med"/>
+                  <a:tailEnd type="none" w="med" len="med"/>
+                </a:ln>
+                <a:effectLst/>
+              </p:spPr>
+              <p:style>
+                <a:lnRef idx="1">
+                  <a:schemeClr val="accent1"/>
+                </a:lnRef>
+                <a:fillRef idx="3">
+                  <a:schemeClr val="accent1"/>
+                </a:fillRef>
+                <a:effectRef idx="2">
+                  <a:schemeClr val="accent1"/>
+                </a:effectRef>
+                <a:fontRef idx="minor">
+                  <a:schemeClr val="lt1"/>
+                </a:fontRef>
+              </p:style>
+              <p:txBody>
+                <a:bodyPr rtlCol="0" anchor="ctr"/>
+                <a:lstStyle/>
+                <a:p>
+                  <a:pPr algn="ctr"/>
+                  <a:endParaRPr lang="en-US" i="1" dirty="0">
+                    <a:solidFill>
+                      <a:schemeClr val="tx1"/>
+                    </a:solidFill>
+                  </a:endParaRPr>
+                </a:p>
+              </p:txBody>
+            </p:sp>
+            <p:sp>
+              <p:nvSpPr>
+                <p:cNvPr id="90" name="Chord 89">
+                  <a:extLst>
+                    <a:ext uri="{FF2B5EF4-FFF2-40B4-BE49-F238E27FC236}">
+                      <a16:creationId xmlns:a16="http://schemas.microsoft.com/office/drawing/2014/main" id="{F8E252DC-2D99-2F4B-B8AD-22AF82DA93BC}"/>
+                    </a:ext>
+                  </a:extLst>
+                </p:cNvPr>
+                <p:cNvSpPr/>
+                <p:nvPr/>
+              </p:nvSpPr>
+              <p:spPr>
+                <a:xfrm>
+                  <a:off x="3734347" y="784736"/>
+                  <a:ext cx="632206" cy="632206"/>
+                </a:xfrm>
+                <a:prstGeom prst="chord">
+                  <a:avLst>
+                    <a:gd name="adj1" fmla="val 10506229"/>
+                    <a:gd name="adj2" fmla="val 301460"/>
+                  </a:avLst>
+                </a:prstGeom>
+                <a:solidFill>
+                  <a:schemeClr val="accent4">
+                    <a:lumMod val="60000"/>
+                    <a:lumOff val="40000"/>
+                  </a:schemeClr>
+                </a:solidFill>
+                <a:ln w="38100" cap="flat" cmpd="sng" algn="ctr">
+                  <a:solidFill>
+                    <a:srgbClr val="000000"/>
+                  </a:solidFill>
+                  <a:prstDash val="solid"/>
+                  <a:round/>
+                  <a:headEnd type="none" w="med" len="med"/>
+                  <a:tailEnd type="none" w="med" len="med"/>
+                </a:ln>
+                <a:effectLst/>
+              </p:spPr>
+              <p:style>
+                <a:lnRef idx="1">
+                  <a:schemeClr val="accent1"/>
+                </a:lnRef>
+                <a:fillRef idx="3">
+                  <a:schemeClr val="accent1"/>
+                </a:fillRef>
+                <a:effectRef idx="2">
+                  <a:schemeClr val="accent1"/>
+                </a:effectRef>
+                <a:fontRef idx="minor">
+                  <a:schemeClr val="lt1"/>
+                </a:fontRef>
+              </p:style>
+              <p:txBody>
+                <a:bodyPr rtlCol="0" anchor="ctr"/>
+                <a:lstStyle/>
+                <a:p>
+                  <a:pPr algn="ctr"/>
+                  <a:endParaRPr lang="en-US"/>
+                </a:p>
+              </p:txBody>
+            </p:sp>
+            <p:pic>
+              <p:nvPicPr>
+                <p:cNvPr id="91" name="Picture 90">
+                  <a:extLst>
+                    <a:ext uri="{FF2B5EF4-FFF2-40B4-BE49-F238E27FC236}">
+                      <a16:creationId xmlns:a16="http://schemas.microsoft.com/office/drawing/2014/main" id="{0DC979EE-EBE8-BD4E-B309-79F868E205FC}"/>
+                    </a:ext>
+                  </a:extLst>
+                </p:cNvPr>
+                <p:cNvPicPr>
+                  <a:picLocks noChangeAspect="1"/>
+                </p:cNvPicPr>
+                <p:nvPr/>
+              </p:nvPicPr>
+              <p:blipFill>
+                <a:blip r:embed="rId2">
+                  <a:extLst>
+                    <a:ext uri="{28A0092B-C50C-407E-A947-70E740481C1C}">
+                      <a14:useLocalDpi xmlns:a14="http://schemas.microsoft.com/office/drawing/2010/main" val="0"/>
+                    </a:ext>
+                  </a:extLst>
+                </a:blip>
+                <a:stretch>
+                  <a:fillRect/>
+                </a:stretch>
+              </p:blipFill>
+              <p:spPr>
+                <a:xfrm>
+                  <a:off x="2803319" y="413397"/>
+                  <a:ext cx="771908" cy="771908"/>
+                </a:xfrm>
+                <a:prstGeom prst="rect">
+                  <a:avLst/>
+                </a:prstGeom>
+              </p:spPr>
+            </p:pic>
+            <p:pic>
+              <p:nvPicPr>
+                <p:cNvPr id="92" name="Picture 91">
+                  <a:extLst>
+                    <a:ext uri="{FF2B5EF4-FFF2-40B4-BE49-F238E27FC236}">
+                      <a16:creationId xmlns:a16="http://schemas.microsoft.com/office/drawing/2014/main" id="{856B719D-280C-694D-BF91-6EF2371F280E}"/>
+                    </a:ext>
+                  </a:extLst>
+                </p:cNvPr>
+                <p:cNvPicPr>
+                  <a:picLocks noChangeAspect="1"/>
+                </p:cNvPicPr>
+                <p:nvPr/>
+              </p:nvPicPr>
+              <p:blipFill>
+                <a:blip r:embed="rId3">
+                  <a:extLst>
+                    <a:ext uri="{28A0092B-C50C-407E-A947-70E740481C1C}">
+                      <a14:useLocalDpi xmlns:a14="http://schemas.microsoft.com/office/drawing/2010/main" val="0"/>
+                    </a:ext>
+                  </a:extLst>
+                </a:blip>
+                <a:stretch>
+                  <a:fillRect/>
+                </a:stretch>
+              </p:blipFill>
+              <p:spPr>
+                <a:xfrm>
+                  <a:off x="5971536" y="499461"/>
+                  <a:ext cx="794135" cy="794135"/>
+                </a:xfrm>
+                <a:prstGeom prst="rect">
+                  <a:avLst/>
+                </a:prstGeom>
+              </p:spPr>
+            </p:pic>
+          </p:grpSp>
+          <p:grpSp>
+            <p:nvGrpSpPr>
+              <p:cNvPr id="93" name="Group 92">
                 <a:extLst>
                   <a:ext uri="{FF2B5EF4-FFF2-40B4-BE49-F238E27FC236}">
-                    <a16:creationId xmlns:a16="http://schemas.microsoft.com/office/drawing/2014/main" id="{FC66DEAD-CBAB-6147-969A-1D54C4F7643B}"/>
+                    <a16:creationId xmlns:a16="http://schemas.microsoft.com/office/drawing/2014/main" id="{F6D9AAC4-C17D-AA44-8CBA-DF73264BB433}"/>
                   </a:ext>
                 </a:extLst>
               </p:cNvPr>
-              <p:cNvSpPr/>
+              <p:cNvGrpSpPr/>
               <p:nvPr/>
-            </p:nvSpPr>
-            <p:spPr>
+            </p:nvGrpSpPr>
+            <p:grpSpPr>
               <a:xfrm>
-                <a:off x="4740833" y="949836"/>
-                <a:ext cx="1168400" cy="350140"/>
+                <a:off x="8845104" y="1207886"/>
+                <a:ext cx="4196538" cy="1003545"/>
+                <a:chOff x="2569133" y="413397"/>
+                <a:chExt cx="4196538" cy="1003545"/>
               </a:xfrm>
-              <a:prstGeom prst="rightArrow">
-                <a:avLst>
-                  <a:gd name="adj1" fmla="val 100000"/>
-                  <a:gd name="adj2" fmla="val 52194"/>
-                </a:avLst>
-              </a:prstGeom>
+            </p:grpSpPr>
+            <p:cxnSp>
+              <p:nvCxnSpPr>
+                <p:cNvPr id="94" name="Straight Connector 93">
+                  <a:extLst>
+                    <a:ext uri="{FF2B5EF4-FFF2-40B4-BE49-F238E27FC236}">
+                      <a16:creationId xmlns:a16="http://schemas.microsoft.com/office/drawing/2014/main" id="{AC6E8ADE-C851-B34F-B92B-8A7DB23E7D9A}"/>
+                    </a:ext>
+                  </a:extLst>
+                </p:cNvPr>
+                <p:cNvCxnSpPr/>
+                <p:nvPr/>
+              </p:nvCxnSpPr>
+              <p:spPr>
+                <a:xfrm>
+                  <a:off x="2569133" y="1140336"/>
+                  <a:ext cx="4191000" cy="0"/>
+                </a:xfrm>
+                <a:prstGeom prst="line">
+                  <a:avLst/>
+                </a:prstGeom>
+                <a:ln w="38100" cap="flat" cmpd="sng" algn="ctr">
+                  <a:solidFill>
+                    <a:srgbClr val="000000"/>
+                  </a:solidFill>
+                  <a:prstDash val="solid"/>
+                  <a:round/>
+                  <a:headEnd type="none" w="med" len="med"/>
+                  <a:tailEnd type="none" w="med" len="med"/>
+                </a:ln>
+                <a:effectLst/>
+              </p:spPr>
+              <p:style>
+                <a:lnRef idx="2">
+                  <a:schemeClr val="accent1"/>
+                </a:lnRef>
+                <a:fillRef idx="0">
+                  <a:schemeClr val="accent1"/>
+                </a:fillRef>
+                <a:effectRef idx="1">
+                  <a:schemeClr val="accent1"/>
+                </a:effectRef>
+                <a:fontRef idx="minor">
+                  <a:schemeClr val="tx1"/>
+                </a:fontRef>
+              </p:style>
+            </p:cxnSp>
+            <p:sp>
+              <p:nvSpPr>
+                <p:cNvPr id="95" name="Right Arrow 94">
+                  <a:extLst>
+                    <a:ext uri="{FF2B5EF4-FFF2-40B4-BE49-F238E27FC236}">
+                      <a16:creationId xmlns:a16="http://schemas.microsoft.com/office/drawing/2014/main" id="{833F9E49-A69A-AD49-8120-EB62256129F7}"/>
+                    </a:ext>
+                  </a:extLst>
+                </p:cNvPr>
+                <p:cNvSpPr/>
+                <p:nvPr/>
+              </p:nvSpPr>
+              <p:spPr>
+                <a:xfrm>
+                  <a:off x="4740833" y="949836"/>
+                  <a:ext cx="1168400" cy="350140"/>
+                </a:xfrm>
+                <a:prstGeom prst="rightArrow">
+                  <a:avLst>
+                    <a:gd name="adj1" fmla="val 100000"/>
+                    <a:gd name="adj2" fmla="val 52194"/>
+                  </a:avLst>
+                </a:prstGeom>
+                <a:solidFill>
+                  <a:srgbClr val="92D050"/>
+                </a:solidFill>
+                <a:ln w="38100" cap="flat" cmpd="sng" algn="ctr">
+                  <a:solidFill>
+                    <a:srgbClr val="000000"/>
+                  </a:solidFill>
+                  <a:prstDash val="solid"/>
+                  <a:round/>
+                  <a:headEnd type="none" w="med" len="med"/>
+                  <a:tailEnd type="none" w="med" len="med"/>
+                </a:ln>
+                <a:effectLst/>
+              </p:spPr>
+              <p:style>
+                <a:lnRef idx="1">
+                  <a:schemeClr val="accent1"/>
+                </a:lnRef>
+                <a:fillRef idx="3">
+                  <a:schemeClr val="accent1"/>
+                </a:fillRef>
+                <a:effectRef idx="2">
+                  <a:schemeClr val="accent1"/>
+                </a:effectRef>
+                <a:fontRef idx="minor">
+                  <a:schemeClr val="lt1"/>
+                </a:fontRef>
+              </p:style>
+              <p:txBody>
+                <a:bodyPr rtlCol="0" anchor="ctr"/>
+                <a:lstStyle/>
+                <a:p>
+                  <a:pPr algn="ctr"/>
+                  <a:endParaRPr lang="en-US" i="1" dirty="0">
+                    <a:solidFill>
+                      <a:schemeClr val="tx1"/>
+                    </a:solidFill>
+                  </a:endParaRPr>
+                </a:p>
+              </p:txBody>
+            </p:sp>
+            <p:sp>
+              <p:nvSpPr>
+                <p:cNvPr id="96" name="Chord 95">
+                  <a:extLst>
+                    <a:ext uri="{FF2B5EF4-FFF2-40B4-BE49-F238E27FC236}">
+                      <a16:creationId xmlns:a16="http://schemas.microsoft.com/office/drawing/2014/main" id="{6B1CA32C-D843-1144-9420-E4F443DCF975}"/>
+                    </a:ext>
+                  </a:extLst>
+                </p:cNvPr>
+                <p:cNvSpPr/>
+                <p:nvPr/>
+              </p:nvSpPr>
+              <p:spPr>
+                <a:xfrm>
+                  <a:off x="3734347" y="784736"/>
+                  <a:ext cx="632206" cy="632206"/>
+                </a:xfrm>
+                <a:prstGeom prst="chord">
+                  <a:avLst>
+                    <a:gd name="adj1" fmla="val 10506229"/>
+                    <a:gd name="adj2" fmla="val 301460"/>
+                  </a:avLst>
+                </a:prstGeom>
+                <a:solidFill>
+                  <a:schemeClr val="accent4">
+                    <a:lumMod val="60000"/>
+                    <a:lumOff val="40000"/>
+                  </a:schemeClr>
+                </a:solidFill>
+                <a:ln w="38100" cap="flat" cmpd="sng" algn="ctr">
+                  <a:solidFill>
+                    <a:srgbClr val="000000"/>
+                  </a:solidFill>
+                  <a:prstDash val="solid"/>
+                  <a:round/>
+                  <a:headEnd type="none" w="med" len="med"/>
+                  <a:tailEnd type="none" w="med" len="med"/>
+                </a:ln>
+                <a:effectLst/>
+              </p:spPr>
+              <p:style>
+                <a:lnRef idx="1">
+                  <a:schemeClr val="accent1"/>
+                </a:lnRef>
+                <a:fillRef idx="3">
+                  <a:schemeClr val="accent1"/>
+                </a:fillRef>
+                <a:effectRef idx="2">
+                  <a:schemeClr val="accent1"/>
+                </a:effectRef>
+                <a:fontRef idx="minor">
+                  <a:schemeClr val="lt1"/>
+                </a:fontRef>
+              </p:style>
+              <p:txBody>
+                <a:bodyPr rtlCol="0" anchor="ctr"/>
+                <a:lstStyle/>
+                <a:p>
+                  <a:pPr algn="ctr"/>
+                  <a:endParaRPr lang="en-US"/>
+                </a:p>
+              </p:txBody>
+            </p:sp>
+            <p:pic>
+              <p:nvPicPr>
+                <p:cNvPr id="97" name="Picture 96">
+                  <a:extLst>
+                    <a:ext uri="{FF2B5EF4-FFF2-40B4-BE49-F238E27FC236}">
+                      <a16:creationId xmlns:a16="http://schemas.microsoft.com/office/drawing/2014/main" id="{8C5AB0E7-D26A-0447-BEF7-384CB5219E43}"/>
+                    </a:ext>
+                  </a:extLst>
+                </p:cNvPr>
+                <p:cNvPicPr>
+                  <a:picLocks noChangeAspect="1"/>
+                </p:cNvPicPr>
+                <p:nvPr/>
+              </p:nvPicPr>
+              <p:blipFill>
+                <a:blip r:embed="rId2">
+                  <a:extLst>
+                    <a:ext uri="{28A0092B-C50C-407E-A947-70E740481C1C}">
+                      <a14:useLocalDpi xmlns:a14="http://schemas.microsoft.com/office/drawing/2010/main" val="0"/>
+                    </a:ext>
+                  </a:extLst>
+                </a:blip>
+                <a:stretch>
+                  <a:fillRect/>
+                </a:stretch>
+              </p:blipFill>
+              <p:spPr>
+                <a:xfrm>
+                  <a:off x="2803319" y="413397"/>
+                  <a:ext cx="771908" cy="771908"/>
+                </a:xfrm>
+                <a:prstGeom prst="rect">
+                  <a:avLst/>
+                </a:prstGeom>
+              </p:spPr>
+            </p:pic>
+            <p:pic>
+              <p:nvPicPr>
+                <p:cNvPr id="98" name="Picture 97">
+                  <a:extLst>
+                    <a:ext uri="{FF2B5EF4-FFF2-40B4-BE49-F238E27FC236}">
+                      <a16:creationId xmlns:a16="http://schemas.microsoft.com/office/drawing/2014/main" id="{90AA2553-9805-624A-991C-B6E0FA5CB9C4}"/>
+                    </a:ext>
+                  </a:extLst>
+                </p:cNvPr>
+                <p:cNvPicPr>
+                  <a:picLocks noChangeAspect="1"/>
+                </p:cNvPicPr>
+                <p:nvPr/>
+              </p:nvPicPr>
+              <p:blipFill>
+                <a:blip r:embed="rId3">
+                  <a:extLst>
+                    <a:ext uri="{28A0092B-C50C-407E-A947-70E740481C1C}">
+                      <a14:useLocalDpi xmlns:a14="http://schemas.microsoft.com/office/drawing/2010/main" val="0"/>
+                    </a:ext>
+                  </a:extLst>
+                </a:blip>
+                <a:stretch>
+                  <a:fillRect/>
+                </a:stretch>
+              </p:blipFill>
+              <p:spPr>
+                <a:xfrm>
+                  <a:off x="5971536" y="499461"/>
+                  <a:ext cx="794135" cy="794135"/>
+                </a:xfrm>
+                <a:prstGeom prst="rect">
+                  <a:avLst/>
+                </a:prstGeom>
+              </p:spPr>
+            </p:pic>
+          </p:grpSp>
+        </p:grpSp>
+        <p:sp>
+          <p:nvSpPr>
+            <p:cNvPr id="124" name="Oval 123">
+              <a:extLst>
+                <a:ext uri="{FF2B5EF4-FFF2-40B4-BE49-F238E27FC236}">
+                  <a16:creationId xmlns:a16="http://schemas.microsoft.com/office/drawing/2014/main" id="{19DB127A-99CE-9641-858D-41CAD8A97CFE}"/>
+                </a:ext>
+              </a:extLst>
+            </p:cNvPr>
+            <p:cNvSpPr/>
+            <p:nvPr/>
+          </p:nvSpPr>
+          <p:spPr>
+            <a:xfrm>
+              <a:off x="5712308" y="2654467"/>
+              <a:ext cx="234913" cy="234913"/>
+            </a:xfrm>
+            <a:prstGeom prst="ellipse">
+              <a:avLst/>
+            </a:prstGeom>
+            <a:solidFill>
+              <a:srgbClr val="FF0000"/>
+            </a:solidFill>
+            <a:ln>
               <a:solidFill>
-                <a:schemeClr val="accent2"/>
+                <a:srgbClr val="FF0000"/>
               </a:solidFill>
-              <a:ln w="38100" cap="flat" cmpd="sng" algn="ctr">
-                <a:solidFill>
-                  <a:srgbClr val="000000"/>
-                </a:solidFill>
-                <a:prstDash val="solid"/>
-                <a:round/>
-                <a:headEnd type="none" w="med" len="med"/>
-                <a:tailEnd type="none" w="med" len="med"/>
-              </a:ln>
-              <a:effectLst/>
-            </p:spPr>
-            <p:style>
-              <a:lnRef idx="1">
-                <a:schemeClr val="accent1"/>
-              </a:lnRef>
-              <a:fillRef idx="3">
-                <a:schemeClr val="accent1"/>
-              </a:fillRef>
-              <a:effectRef idx="2">
-                <a:schemeClr val="accent1"/>
-              </a:effectRef>
-              <a:fontRef idx="minor">
-                <a:schemeClr val="lt1"/>
-              </a:fontRef>
-            </p:style>
-            <p:txBody>
-              <a:bodyPr rtlCol="0" anchor="ctr"/>
-              <a:lstStyle/>
-              <a:p>
-                <a:pPr algn="ctr"/>
-                <a:endParaRPr lang="en-US" i="1" dirty="0">
-                  <a:solidFill>
-                    <a:schemeClr val="tx1"/>
-                  </a:solidFill>
-                </a:endParaRPr>
-              </a:p>
-            </p:txBody>
-          </p:sp>
-          <p:sp>
-            <p:nvSpPr>
-              <p:cNvPr id="90" name="Chord 89">
-                <a:extLst>
-                  <a:ext uri="{FF2B5EF4-FFF2-40B4-BE49-F238E27FC236}">
-                    <a16:creationId xmlns:a16="http://schemas.microsoft.com/office/drawing/2014/main" id="{F8E252DC-2D99-2F4B-B8AD-22AF82DA93BC}"/>
-                  </a:ext>
-                </a:extLst>
-              </p:cNvPr>
-              <p:cNvSpPr/>
-              <p:nvPr/>
-            </p:nvSpPr>
-            <p:spPr>
-              <a:xfrm>
-                <a:off x="3734347" y="784736"/>
-                <a:ext cx="632206" cy="632206"/>
-              </a:xfrm>
-              <a:prstGeom prst="chord">
-                <a:avLst>
-                  <a:gd name="adj1" fmla="val 10506229"/>
-                  <a:gd name="adj2" fmla="val 301460"/>
-                </a:avLst>
-              </a:prstGeom>
+            </a:ln>
+          </p:spPr>
+          <p:style>
+            <a:lnRef idx="2">
+              <a:schemeClr val="dk1">
+                <a:shade val="50000"/>
+              </a:schemeClr>
+            </a:lnRef>
+            <a:fillRef idx="1">
+              <a:schemeClr val="dk1"/>
+            </a:fillRef>
+            <a:effectRef idx="0">
+              <a:schemeClr val="dk1"/>
+            </a:effectRef>
+            <a:fontRef idx="minor">
+              <a:schemeClr val="lt1"/>
+            </a:fontRef>
+          </p:style>
+          <p:txBody>
+            <a:bodyPr rtlCol="0" anchor="ctr"/>
+            <a:lstStyle/>
+            <a:p>
+              <a:pPr algn="ctr"/>
+              <a:endParaRPr lang="en-US"/>
+            </a:p>
+          </p:txBody>
+        </p:sp>
+        <p:cxnSp>
+          <p:nvCxnSpPr>
+            <p:cNvPr id="129" name="Straight Connector 128">
+              <a:extLst>
+                <a:ext uri="{FF2B5EF4-FFF2-40B4-BE49-F238E27FC236}">
+                  <a16:creationId xmlns:a16="http://schemas.microsoft.com/office/drawing/2014/main" id="{70A397AA-2DC9-334C-A69F-5C077046FC0E}"/>
+                </a:ext>
+              </a:extLst>
+            </p:cNvPr>
+            <p:cNvCxnSpPr>
+              <a:cxnSpLocks/>
+              <a:endCxn id="124" idx="0"/>
+            </p:cNvCxnSpPr>
+            <p:nvPr/>
+          </p:nvCxnSpPr>
+          <p:spPr>
+            <a:xfrm>
+              <a:off x="5829765" y="2299306"/>
+              <a:ext cx="0" cy="355161"/>
+            </a:xfrm>
+            <a:prstGeom prst="line">
+              <a:avLst/>
+            </a:prstGeom>
+            <a:ln w="28575">
               <a:solidFill>
-                <a:schemeClr val="accent4">
-                  <a:lumMod val="60000"/>
-                  <a:lumOff val="40000"/>
-                </a:schemeClr>
+                <a:srgbClr val="FF0000"/>
               </a:solidFill>
-              <a:ln w="38100" cap="flat" cmpd="sng" algn="ctr">
-                <a:solidFill>
-                  <a:srgbClr val="000000"/>
-                </a:solidFill>
-                <a:prstDash val="solid"/>
-                <a:round/>
-                <a:headEnd type="none" w="med" len="med"/>
-                <a:tailEnd type="none" w="med" len="med"/>
-              </a:ln>
-              <a:effectLst/>
-            </p:spPr>
-            <p:style>
-              <a:lnRef idx="1">
-                <a:schemeClr val="accent1"/>
-              </a:lnRef>
-              <a:fillRef idx="3">
-                <a:schemeClr val="accent1"/>
-              </a:fillRef>
-              <a:effectRef idx="2">
-                <a:schemeClr val="accent1"/>
-              </a:effectRef>
-              <a:fontRef idx="minor">
-                <a:schemeClr val="lt1"/>
-              </a:fontRef>
-            </p:style>
-            <p:txBody>
-              <a:bodyPr rtlCol="0" anchor="ctr"/>
-              <a:lstStyle/>
-              <a:p>
-                <a:pPr algn="ctr"/>
-                <a:endParaRPr lang="en-US"/>
-              </a:p>
-            </p:txBody>
-          </p:sp>
-          <p:pic>
-            <p:nvPicPr>
-              <p:cNvPr id="91" name="Picture 90">
-                <a:extLst>
-                  <a:ext uri="{FF2B5EF4-FFF2-40B4-BE49-F238E27FC236}">
-                    <a16:creationId xmlns:a16="http://schemas.microsoft.com/office/drawing/2014/main" id="{0DC979EE-EBE8-BD4E-B309-79F868E205FC}"/>
-                  </a:ext>
-                </a:extLst>
-              </p:cNvPr>
-              <p:cNvPicPr>
-                <a:picLocks noChangeAspect="1"/>
-              </p:cNvPicPr>
-              <p:nvPr/>
-            </p:nvPicPr>
-            <p:blipFill>
-              <a:blip r:embed="rId2">
-                <a:extLst>
-                  <a:ext uri="{28A0092B-C50C-407E-A947-70E740481C1C}">
-                    <a14:useLocalDpi xmlns:a14="http://schemas.microsoft.com/office/drawing/2010/main" val="0"/>
-                  </a:ext>
-                </a:extLst>
-              </a:blip>
-              <a:stretch>
-                <a:fillRect/>
-              </a:stretch>
-            </p:blipFill>
-            <p:spPr>
-              <a:xfrm>
-                <a:off x="2803319" y="413397"/>
-                <a:ext cx="771908" cy="771908"/>
-              </a:xfrm>
-              <a:prstGeom prst="rect">
-                <a:avLst/>
-              </a:prstGeom>
-            </p:spPr>
-          </p:pic>
-          <p:pic>
-            <p:nvPicPr>
-              <p:cNvPr id="92" name="Picture 91">
-                <a:extLst>
-                  <a:ext uri="{FF2B5EF4-FFF2-40B4-BE49-F238E27FC236}">
-                    <a16:creationId xmlns:a16="http://schemas.microsoft.com/office/drawing/2014/main" id="{856B719D-280C-694D-BF91-6EF2371F280E}"/>
-                  </a:ext>
-                </a:extLst>
-              </p:cNvPr>
-              <p:cNvPicPr>
-                <a:picLocks noChangeAspect="1"/>
-              </p:cNvPicPr>
-              <p:nvPr/>
-            </p:nvPicPr>
-            <p:blipFill>
-              <a:blip r:embed="rId3">
-                <a:extLst>
-                  <a:ext uri="{28A0092B-C50C-407E-A947-70E740481C1C}">
-                    <a14:useLocalDpi xmlns:a14="http://schemas.microsoft.com/office/drawing/2010/main" val="0"/>
-                  </a:ext>
-                </a:extLst>
-              </a:blip>
-              <a:stretch>
-                <a:fillRect/>
-              </a:stretch>
-            </p:blipFill>
-            <p:spPr>
-              <a:xfrm>
-                <a:off x="5971536" y="499461"/>
-                <a:ext cx="794135" cy="794135"/>
-              </a:xfrm>
-              <a:prstGeom prst="rect">
-                <a:avLst/>
-              </a:prstGeom>
-            </p:spPr>
-          </p:pic>
-        </p:grpSp>
+            </a:ln>
+            <a:effectLst/>
+          </p:spPr>
+          <p:style>
+            <a:lnRef idx="2">
+              <a:schemeClr val="accent1"/>
+            </a:lnRef>
+            <a:fillRef idx="0">
+              <a:schemeClr val="accent1"/>
+            </a:fillRef>
+            <a:effectRef idx="1">
+              <a:schemeClr val="accent1"/>
+            </a:effectRef>
+            <a:fontRef idx="minor">
+              <a:schemeClr val="tx1"/>
+            </a:fontRef>
+          </p:style>
+        </p:cxnSp>
+        <p:pic>
+          <p:nvPicPr>
+            <p:cNvPr id="72" name="Picture 71">
+              <a:extLst>
+                <a:ext uri="{FF2B5EF4-FFF2-40B4-BE49-F238E27FC236}">
+                  <a16:creationId xmlns:a16="http://schemas.microsoft.com/office/drawing/2014/main" id="{7D36C71F-8757-A140-BFAB-C610F7147B73}"/>
+                </a:ext>
+              </a:extLst>
+            </p:cNvPr>
+            <p:cNvPicPr>
+              <a:picLocks noChangeAspect="1"/>
+            </p:cNvPicPr>
+            <p:nvPr/>
+          </p:nvPicPr>
+          <p:blipFill>
+            <a:blip r:embed="rId4"/>
+            <a:stretch>
+              <a:fillRect/>
+            </a:stretch>
+          </p:blipFill>
+          <p:spPr>
+            <a:xfrm>
+              <a:off x="5367295" y="1739716"/>
+              <a:ext cx="881743" cy="881743"/>
+            </a:xfrm>
+            <a:prstGeom prst="rect">
+              <a:avLst/>
+            </a:prstGeom>
+          </p:spPr>
+        </p:pic>
+      </p:grpSp>
+      <p:grpSp>
+        <p:nvGrpSpPr>
+          <p:cNvPr id="30" name="Group 29">
+            <a:extLst>
+              <a:ext uri="{FF2B5EF4-FFF2-40B4-BE49-F238E27FC236}">
+                <a16:creationId xmlns:a16="http://schemas.microsoft.com/office/drawing/2014/main" id="{08248830-F1D8-C644-A965-96CD11F45C5E}"/>
+              </a:ext>
+            </a:extLst>
+          </p:cNvPr>
+          <p:cNvGrpSpPr/>
+          <p:nvPr/>
+        </p:nvGrpSpPr>
+        <p:grpSpPr>
+          <a:xfrm>
+            <a:off x="447599" y="4275720"/>
+            <a:ext cx="8416471" cy="1920082"/>
+            <a:chOff x="451212" y="1739716"/>
+            <a:chExt cx="8416471" cy="1920082"/>
+          </a:xfrm>
+        </p:grpSpPr>
+        <p:cxnSp>
+          <p:nvCxnSpPr>
+            <p:cNvPr id="31" name="Straight Arrow Connector 5">
+              <a:extLst>
+                <a:ext uri="{FF2B5EF4-FFF2-40B4-BE49-F238E27FC236}">
+                  <a16:creationId xmlns:a16="http://schemas.microsoft.com/office/drawing/2014/main" id="{61253406-C7E3-B149-A173-ECD3E2177750}"/>
+                </a:ext>
+              </a:extLst>
+            </p:cNvPr>
+            <p:cNvCxnSpPr>
+              <a:cxnSpLocks/>
+              <a:endCxn id="47" idx="0"/>
+            </p:cNvCxnSpPr>
+            <p:nvPr/>
+          </p:nvCxnSpPr>
+          <p:spPr>
+            <a:xfrm flipV="1">
+              <a:off x="5095644" y="3002241"/>
+              <a:ext cx="1439006" cy="343873"/>
+            </a:xfrm>
+            <a:prstGeom prst="bentConnector4">
+              <a:avLst>
+                <a:gd name="adj1" fmla="val 20"/>
+                <a:gd name="adj2" fmla="val 166478"/>
+              </a:avLst>
+            </a:prstGeom>
+            <a:ln>
+              <a:solidFill>
+                <a:srgbClr val="FF0000"/>
+              </a:solidFill>
+              <a:headEnd type="none"/>
+              <a:tailEnd type="none"/>
+            </a:ln>
+            <a:effectLst/>
+          </p:spPr>
+          <p:style>
+            <a:lnRef idx="2">
+              <a:schemeClr val="accent1"/>
+            </a:lnRef>
+            <a:fillRef idx="0">
+              <a:schemeClr val="accent1"/>
+            </a:fillRef>
+            <a:effectRef idx="1">
+              <a:schemeClr val="accent1"/>
+            </a:effectRef>
+            <a:fontRef idx="minor">
+              <a:schemeClr val="tx1"/>
+            </a:fontRef>
+          </p:style>
+        </p:cxnSp>
+        <p:cxnSp>
+          <p:nvCxnSpPr>
+            <p:cNvPr id="32" name="Straight Arrow Connector 5">
+              <a:extLst>
+                <a:ext uri="{FF2B5EF4-FFF2-40B4-BE49-F238E27FC236}">
+                  <a16:creationId xmlns:a16="http://schemas.microsoft.com/office/drawing/2014/main" id="{830F5BB0-01EF-B645-B8D1-03E8436093D5}"/>
+                </a:ext>
+              </a:extLst>
+            </p:cNvPr>
+            <p:cNvCxnSpPr>
+              <a:cxnSpLocks/>
+            </p:cNvCxnSpPr>
+            <p:nvPr/>
+          </p:nvCxnSpPr>
+          <p:spPr>
+            <a:xfrm flipV="1">
+              <a:off x="2249000" y="2772164"/>
+              <a:ext cx="2846644" cy="578944"/>
+            </a:xfrm>
+            <a:prstGeom prst="bentConnector3">
+              <a:avLst>
+                <a:gd name="adj1" fmla="val 203"/>
+              </a:avLst>
+            </a:prstGeom>
+            <a:ln>
+              <a:solidFill>
+                <a:srgbClr val="FF0000"/>
+              </a:solidFill>
+              <a:headEnd type="none"/>
+              <a:tailEnd type="none"/>
+            </a:ln>
+            <a:effectLst/>
+          </p:spPr>
+          <p:style>
+            <a:lnRef idx="2">
+              <a:schemeClr val="accent1"/>
+            </a:lnRef>
+            <a:fillRef idx="0">
+              <a:schemeClr val="accent1"/>
+            </a:fillRef>
+            <a:effectRef idx="1">
+              <a:schemeClr val="accent1"/>
+            </a:effectRef>
+            <a:fontRef idx="minor">
+              <a:schemeClr val="tx1"/>
+            </a:fontRef>
+          </p:style>
+        </p:cxnSp>
+        <p:cxnSp>
+          <p:nvCxnSpPr>
+            <p:cNvPr id="33" name="Straight Connector 32">
+              <a:extLst>
+                <a:ext uri="{FF2B5EF4-FFF2-40B4-BE49-F238E27FC236}">
+                  <a16:creationId xmlns:a16="http://schemas.microsoft.com/office/drawing/2014/main" id="{62D6905B-10F3-CE42-ABCB-92C2FC336B42}"/>
+                </a:ext>
+              </a:extLst>
+            </p:cNvPr>
+            <p:cNvCxnSpPr/>
+            <p:nvPr/>
+          </p:nvCxnSpPr>
+          <p:spPr>
+            <a:xfrm>
+              <a:off x="6439400" y="3003086"/>
+              <a:ext cx="190500" cy="0"/>
+            </a:xfrm>
+            <a:prstGeom prst="line">
+              <a:avLst/>
+            </a:prstGeom>
+            <a:ln>
+              <a:solidFill>
+                <a:srgbClr val="FF0000"/>
+              </a:solidFill>
+            </a:ln>
+            <a:effectLst/>
+          </p:spPr>
+          <p:style>
+            <a:lnRef idx="2">
+              <a:schemeClr val="accent1"/>
+            </a:lnRef>
+            <a:fillRef idx="0">
+              <a:schemeClr val="accent1"/>
+            </a:fillRef>
+            <a:effectRef idx="1">
+              <a:schemeClr val="accent1"/>
+            </a:effectRef>
+            <a:fontRef idx="minor">
+              <a:schemeClr val="tx1"/>
+            </a:fontRef>
+          </p:style>
+        </p:cxnSp>
         <p:grpSp>
           <p:nvGrpSpPr>
-            <p:cNvPr id="93" name="Group 92">
+            <p:cNvPr id="34" name="Group 33">
               <a:extLst>
                 <a:ext uri="{FF2B5EF4-FFF2-40B4-BE49-F238E27FC236}">
-                  <a16:creationId xmlns:a16="http://schemas.microsoft.com/office/drawing/2014/main" id="{F6D9AAC4-C17D-AA44-8CBA-DF73264BB433}"/>
+                  <a16:creationId xmlns:a16="http://schemas.microsoft.com/office/drawing/2014/main" id="{463AA3B9-FF26-0C41-9BBA-D9348CA65191}"/>
                 </a:ext>
               </a:extLst>
             </p:cNvPr>
@@ -17001,388 +17306,941 @@
           </p:nvGrpSpPr>
           <p:grpSpPr>
             <a:xfrm>
-              <a:off x="8845104" y="1207886"/>
-              <a:ext cx="4196538" cy="1003545"/>
-              <a:chOff x="2569133" y="413397"/>
-              <a:chExt cx="4196538" cy="1003545"/>
+              <a:off x="451212" y="3002241"/>
+              <a:ext cx="8416471" cy="657557"/>
+              <a:chOff x="139700" y="1207886"/>
+              <a:chExt cx="12901942" cy="1007995"/>
             </a:xfrm>
           </p:grpSpPr>
-          <p:cxnSp>
-            <p:nvCxnSpPr>
-              <p:cNvPr id="94" name="Straight Connector 93">
+          <p:grpSp>
+            <p:nvGrpSpPr>
+              <p:cNvPr id="40" name="Group 39">
                 <a:extLst>
                   <a:ext uri="{FF2B5EF4-FFF2-40B4-BE49-F238E27FC236}">
-                    <a16:creationId xmlns:a16="http://schemas.microsoft.com/office/drawing/2014/main" id="{AC6E8ADE-C851-B34F-B92B-8A7DB23E7D9A}"/>
+                    <a16:creationId xmlns:a16="http://schemas.microsoft.com/office/drawing/2014/main" id="{5294A812-B701-434E-BADC-2BDE5C531232}"/>
                   </a:ext>
                 </a:extLst>
               </p:cNvPr>
-              <p:cNvCxnSpPr/>
+              <p:cNvGrpSpPr/>
               <p:nvPr/>
-            </p:nvCxnSpPr>
-            <p:spPr>
+            </p:nvGrpSpPr>
+            <p:grpSpPr>
               <a:xfrm>
-                <a:off x="2569133" y="1140336"/>
-                <a:ext cx="4191000" cy="0"/>
+                <a:off x="139700" y="1212336"/>
+                <a:ext cx="4196538" cy="1003545"/>
+                <a:chOff x="2569133" y="413397"/>
+                <a:chExt cx="4196538" cy="1003545"/>
               </a:xfrm>
-              <a:prstGeom prst="line">
-                <a:avLst/>
-              </a:prstGeom>
-              <a:ln w="38100" cap="flat" cmpd="sng" algn="ctr">
+            </p:grpSpPr>
+            <p:cxnSp>
+              <p:nvCxnSpPr>
+                <p:cNvPr id="54" name="Straight Connector 53">
+                  <a:extLst>
+                    <a:ext uri="{FF2B5EF4-FFF2-40B4-BE49-F238E27FC236}">
+                      <a16:creationId xmlns:a16="http://schemas.microsoft.com/office/drawing/2014/main" id="{A7CD89A9-1D90-9F4D-95E8-38B468D124E5}"/>
+                    </a:ext>
+                  </a:extLst>
+                </p:cNvPr>
+                <p:cNvCxnSpPr/>
+                <p:nvPr/>
+              </p:nvCxnSpPr>
+              <p:spPr>
+                <a:xfrm>
+                  <a:off x="2569133" y="1140336"/>
+                  <a:ext cx="4191000" cy="0"/>
+                </a:xfrm>
+                <a:prstGeom prst="line">
+                  <a:avLst/>
+                </a:prstGeom>
+                <a:ln w="38100" cap="flat" cmpd="sng" algn="ctr">
+                  <a:solidFill>
+                    <a:srgbClr val="000000"/>
+                  </a:solidFill>
+                  <a:prstDash val="solid"/>
+                  <a:round/>
+                  <a:headEnd type="none" w="med" len="med"/>
+                  <a:tailEnd type="none" w="med" len="med"/>
+                </a:ln>
+                <a:effectLst/>
+              </p:spPr>
+              <p:style>
+                <a:lnRef idx="2">
+                  <a:schemeClr val="accent1"/>
+                </a:lnRef>
+                <a:fillRef idx="0">
+                  <a:schemeClr val="accent1"/>
+                </a:fillRef>
+                <a:effectRef idx="1">
+                  <a:schemeClr val="accent1"/>
+                </a:effectRef>
+                <a:fontRef idx="minor">
+                  <a:schemeClr val="tx1"/>
+                </a:fontRef>
+              </p:style>
+            </p:cxnSp>
+            <p:sp>
+              <p:nvSpPr>
+                <p:cNvPr id="55" name="Right Arrow 54">
+                  <a:extLst>
+                    <a:ext uri="{FF2B5EF4-FFF2-40B4-BE49-F238E27FC236}">
+                      <a16:creationId xmlns:a16="http://schemas.microsoft.com/office/drawing/2014/main" id="{8FD3683C-0D18-DA48-AE08-5E5DF556F5BC}"/>
+                    </a:ext>
+                  </a:extLst>
+                </p:cNvPr>
+                <p:cNvSpPr/>
+                <p:nvPr/>
+              </p:nvSpPr>
+              <p:spPr>
+                <a:xfrm>
+                  <a:off x="4740833" y="949836"/>
+                  <a:ext cx="1168400" cy="350140"/>
+                </a:xfrm>
+                <a:prstGeom prst="rightArrow">
+                  <a:avLst>
+                    <a:gd name="adj1" fmla="val 100000"/>
+                    <a:gd name="adj2" fmla="val 52194"/>
+                  </a:avLst>
+                </a:prstGeom>
                 <a:solidFill>
-                  <a:srgbClr val="000000"/>
+                  <a:schemeClr val="accent2"/>
                 </a:solidFill>
-                <a:prstDash val="solid"/>
-                <a:round/>
-                <a:headEnd type="none" w="med" len="med"/>
-                <a:tailEnd type="none" w="med" len="med"/>
-              </a:ln>
-              <a:effectLst/>
-            </p:spPr>
-            <p:style>
-              <a:lnRef idx="2">
-                <a:schemeClr val="accent1"/>
-              </a:lnRef>
-              <a:fillRef idx="0">
-                <a:schemeClr val="accent1"/>
-              </a:fillRef>
-              <a:effectRef idx="1">
-                <a:schemeClr val="accent1"/>
-              </a:effectRef>
-              <a:fontRef idx="minor">
-                <a:schemeClr val="tx1"/>
-              </a:fontRef>
-            </p:style>
-          </p:cxnSp>
-          <p:sp>
-            <p:nvSpPr>
-              <p:cNvPr id="95" name="Right Arrow 94">
+                <a:ln w="38100" cap="flat" cmpd="sng" algn="ctr">
+                  <a:solidFill>
+                    <a:srgbClr val="000000"/>
+                  </a:solidFill>
+                  <a:prstDash val="solid"/>
+                  <a:round/>
+                  <a:headEnd type="none" w="med" len="med"/>
+                  <a:tailEnd type="none" w="med" len="med"/>
+                </a:ln>
+                <a:effectLst/>
+              </p:spPr>
+              <p:style>
+                <a:lnRef idx="1">
+                  <a:schemeClr val="accent1"/>
+                </a:lnRef>
+                <a:fillRef idx="3">
+                  <a:schemeClr val="accent1"/>
+                </a:fillRef>
+                <a:effectRef idx="2">
+                  <a:schemeClr val="accent1"/>
+                </a:effectRef>
+                <a:fontRef idx="minor">
+                  <a:schemeClr val="lt1"/>
+                </a:fontRef>
+              </p:style>
+              <p:txBody>
+                <a:bodyPr rtlCol="0" anchor="ctr"/>
+                <a:lstStyle/>
+                <a:p>
+                  <a:pPr algn="ctr"/>
+                  <a:endParaRPr lang="en-US" i="1" dirty="0">
+                    <a:solidFill>
+                      <a:schemeClr val="tx1"/>
+                    </a:solidFill>
+                  </a:endParaRPr>
+                </a:p>
+              </p:txBody>
+            </p:sp>
+            <p:sp>
+              <p:nvSpPr>
+                <p:cNvPr id="56" name="Chord 55">
+                  <a:extLst>
+                    <a:ext uri="{FF2B5EF4-FFF2-40B4-BE49-F238E27FC236}">
+                      <a16:creationId xmlns:a16="http://schemas.microsoft.com/office/drawing/2014/main" id="{7D6E90CB-A9CD-5D40-B837-066F5E5E7167}"/>
+                    </a:ext>
+                  </a:extLst>
+                </p:cNvPr>
+                <p:cNvSpPr/>
+                <p:nvPr/>
+              </p:nvSpPr>
+              <p:spPr>
+                <a:xfrm>
+                  <a:off x="3734347" y="784736"/>
+                  <a:ext cx="632206" cy="632206"/>
+                </a:xfrm>
+                <a:prstGeom prst="chord">
+                  <a:avLst>
+                    <a:gd name="adj1" fmla="val 10506229"/>
+                    <a:gd name="adj2" fmla="val 301460"/>
+                  </a:avLst>
+                </a:prstGeom>
+                <a:solidFill>
+                  <a:schemeClr val="accent4">
+                    <a:lumMod val="60000"/>
+                    <a:lumOff val="40000"/>
+                  </a:schemeClr>
+                </a:solidFill>
+                <a:ln w="38100" cap="flat" cmpd="sng" algn="ctr">
+                  <a:solidFill>
+                    <a:srgbClr val="000000"/>
+                  </a:solidFill>
+                  <a:prstDash val="solid"/>
+                  <a:round/>
+                  <a:headEnd type="none" w="med" len="med"/>
+                  <a:tailEnd type="none" w="med" len="med"/>
+                </a:ln>
+                <a:effectLst/>
+              </p:spPr>
+              <p:style>
+                <a:lnRef idx="1">
+                  <a:schemeClr val="accent1"/>
+                </a:lnRef>
+                <a:fillRef idx="3">
+                  <a:schemeClr val="accent1"/>
+                </a:fillRef>
+                <a:effectRef idx="2">
+                  <a:schemeClr val="accent1"/>
+                </a:effectRef>
+                <a:fontRef idx="minor">
+                  <a:schemeClr val="lt1"/>
+                </a:fontRef>
+              </p:style>
+              <p:txBody>
+                <a:bodyPr rtlCol="0" anchor="ctr"/>
+                <a:lstStyle/>
+                <a:p>
+                  <a:pPr algn="ctr"/>
+                  <a:endParaRPr lang="en-US"/>
+                </a:p>
+              </p:txBody>
+            </p:sp>
+            <p:pic>
+              <p:nvPicPr>
+                <p:cNvPr id="57" name="Picture 56">
+                  <a:extLst>
+                    <a:ext uri="{FF2B5EF4-FFF2-40B4-BE49-F238E27FC236}">
+                      <a16:creationId xmlns:a16="http://schemas.microsoft.com/office/drawing/2014/main" id="{26A84592-6C94-CE43-BA1E-FE5F468DFBE8}"/>
+                    </a:ext>
+                  </a:extLst>
+                </p:cNvPr>
+                <p:cNvPicPr>
+                  <a:picLocks noChangeAspect="1"/>
+                </p:cNvPicPr>
+                <p:nvPr/>
+              </p:nvPicPr>
+              <p:blipFill>
+                <a:blip r:embed="rId2">
+                  <a:extLst>
+                    <a:ext uri="{28A0092B-C50C-407E-A947-70E740481C1C}">
+                      <a14:useLocalDpi xmlns:a14="http://schemas.microsoft.com/office/drawing/2010/main" val="0"/>
+                    </a:ext>
+                  </a:extLst>
+                </a:blip>
+                <a:stretch>
+                  <a:fillRect/>
+                </a:stretch>
+              </p:blipFill>
+              <p:spPr>
+                <a:xfrm>
+                  <a:off x="2803319" y="413397"/>
+                  <a:ext cx="771908" cy="771908"/>
+                </a:xfrm>
+                <a:prstGeom prst="rect">
+                  <a:avLst/>
+                </a:prstGeom>
+              </p:spPr>
+            </p:pic>
+            <p:pic>
+              <p:nvPicPr>
+                <p:cNvPr id="58" name="Picture 57">
+                  <a:extLst>
+                    <a:ext uri="{FF2B5EF4-FFF2-40B4-BE49-F238E27FC236}">
+                      <a16:creationId xmlns:a16="http://schemas.microsoft.com/office/drawing/2014/main" id="{3F358BBA-5482-AA45-8492-896EC0247273}"/>
+                    </a:ext>
+                  </a:extLst>
+                </p:cNvPr>
+                <p:cNvPicPr>
+                  <a:picLocks noChangeAspect="1"/>
+                </p:cNvPicPr>
+                <p:nvPr/>
+              </p:nvPicPr>
+              <p:blipFill>
+                <a:blip r:embed="rId3">
+                  <a:extLst>
+                    <a:ext uri="{28A0092B-C50C-407E-A947-70E740481C1C}">
+                      <a14:useLocalDpi xmlns:a14="http://schemas.microsoft.com/office/drawing/2010/main" val="0"/>
+                    </a:ext>
+                  </a:extLst>
+                </a:blip>
+                <a:stretch>
+                  <a:fillRect/>
+                </a:stretch>
+              </p:blipFill>
+              <p:spPr>
+                <a:xfrm>
+                  <a:off x="5971536" y="499461"/>
+                  <a:ext cx="794135" cy="794135"/>
+                </a:xfrm>
+                <a:prstGeom prst="rect">
+                  <a:avLst/>
+                </a:prstGeom>
+              </p:spPr>
+            </p:pic>
+          </p:grpSp>
+          <p:grpSp>
+            <p:nvGrpSpPr>
+              <p:cNvPr id="41" name="Group 40">
                 <a:extLst>
                   <a:ext uri="{FF2B5EF4-FFF2-40B4-BE49-F238E27FC236}">
-                    <a16:creationId xmlns:a16="http://schemas.microsoft.com/office/drawing/2014/main" id="{833F9E49-A69A-AD49-8120-EB62256129F7}"/>
+                    <a16:creationId xmlns:a16="http://schemas.microsoft.com/office/drawing/2014/main" id="{53F635F5-DBB4-264A-8619-04B6201ED61C}"/>
                   </a:ext>
                 </a:extLst>
               </p:cNvPr>
-              <p:cNvSpPr/>
+              <p:cNvGrpSpPr/>
               <p:nvPr/>
-            </p:nvSpPr>
-            <p:spPr>
+            </p:nvGrpSpPr>
+            <p:grpSpPr>
               <a:xfrm>
-                <a:off x="4740833" y="949836"/>
-                <a:ext cx="1168400" cy="350140"/>
+                <a:off x="4489820" y="1207886"/>
+                <a:ext cx="4196538" cy="1003545"/>
+                <a:chOff x="2569133" y="413397"/>
+                <a:chExt cx="4196538" cy="1003545"/>
               </a:xfrm>
-              <a:prstGeom prst="rightArrow">
-                <a:avLst>
-                  <a:gd name="adj1" fmla="val 100000"/>
-                  <a:gd name="adj2" fmla="val 52194"/>
-                </a:avLst>
-              </a:prstGeom>
-              <a:solidFill>
-                <a:srgbClr val="92D050"/>
-              </a:solidFill>
-              <a:ln w="38100" cap="flat" cmpd="sng" algn="ctr">
+            </p:grpSpPr>
+            <p:cxnSp>
+              <p:nvCxnSpPr>
+                <p:cNvPr id="49" name="Straight Connector 48">
+                  <a:extLst>
+                    <a:ext uri="{FF2B5EF4-FFF2-40B4-BE49-F238E27FC236}">
+                      <a16:creationId xmlns:a16="http://schemas.microsoft.com/office/drawing/2014/main" id="{2149F24A-F83D-2440-984B-ACD8907D1B04}"/>
+                    </a:ext>
+                  </a:extLst>
+                </p:cNvPr>
+                <p:cNvCxnSpPr/>
+                <p:nvPr/>
+              </p:nvCxnSpPr>
+              <p:spPr>
+                <a:xfrm>
+                  <a:off x="2569133" y="1140336"/>
+                  <a:ext cx="4191000" cy="0"/>
+                </a:xfrm>
+                <a:prstGeom prst="line">
+                  <a:avLst/>
+                </a:prstGeom>
+                <a:ln w="38100" cap="flat" cmpd="sng" algn="ctr">
+                  <a:solidFill>
+                    <a:srgbClr val="000000"/>
+                  </a:solidFill>
+                  <a:prstDash val="solid"/>
+                  <a:round/>
+                  <a:headEnd type="none" w="med" len="med"/>
+                  <a:tailEnd type="none" w="med" len="med"/>
+                </a:ln>
+                <a:effectLst/>
+              </p:spPr>
+              <p:style>
+                <a:lnRef idx="2">
+                  <a:schemeClr val="accent1"/>
+                </a:lnRef>
+                <a:fillRef idx="0">
+                  <a:schemeClr val="accent1"/>
+                </a:fillRef>
+                <a:effectRef idx="1">
+                  <a:schemeClr val="accent1"/>
+                </a:effectRef>
+                <a:fontRef idx="minor">
+                  <a:schemeClr val="tx1"/>
+                </a:fontRef>
+              </p:style>
+            </p:cxnSp>
+            <p:sp>
+              <p:nvSpPr>
+                <p:cNvPr id="50" name="Right Arrow 49">
+                  <a:extLst>
+                    <a:ext uri="{FF2B5EF4-FFF2-40B4-BE49-F238E27FC236}">
+                      <a16:creationId xmlns:a16="http://schemas.microsoft.com/office/drawing/2014/main" id="{FB39F8FB-7256-284D-BA4A-BB374926825A}"/>
+                    </a:ext>
+                  </a:extLst>
+                </p:cNvPr>
+                <p:cNvSpPr/>
+                <p:nvPr/>
+              </p:nvSpPr>
+              <p:spPr>
+                <a:xfrm>
+                  <a:off x="4740833" y="949836"/>
+                  <a:ext cx="1168400" cy="350140"/>
+                </a:xfrm>
+                <a:prstGeom prst="rightArrow">
+                  <a:avLst>
+                    <a:gd name="adj1" fmla="val 100000"/>
+                    <a:gd name="adj2" fmla="val 52194"/>
+                  </a:avLst>
+                </a:prstGeom>
                 <a:solidFill>
-                  <a:srgbClr val="000000"/>
+                  <a:schemeClr val="accent2"/>
                 </a:solidFill>
-                <a:prstDash val="solid"/>
-                <a:round/>
-                <a:headEnd type="none" w="med" len="med"/>
-                <a:tailEnd type="none" w="med" len="med"/>
-              </a:ln>
-              <a:effectLst/>
-            </p:spPr>
-            <p:style>
-              <a:lnRef idx="1">
-                <a:schemeClr val="accent1"/>
-              </a:lnRef>
-              <a:fillRef idx="3">
-                <a:schemeClr val="accent1"/>
-              </a:fillRef>
-              <a:effectRef idx="2">
-                <a:schemeClr val="accent1"/>
-              </a:effectRef>
-              <a:fontRef idx="minor">
-                <a:schemeClr val="lt1"/>
-              </a:fontRef>
-            </p:style>
-            <p:txBody>
-              <a:bodyPr rtlCol="0" anchor="ctr"/>
-              <a:lstStyle/>
-              <a:p>
-                <a:pPr algn="ctr"/>
-                <a:endParaRPr lang="en-US" i="1" dirty="0">
+                <a:ln w="38100" cap="flat" cmpd="sng" algn="ctr">
                   <a:solidFill>
-                    <a:schemeClr val="tx1"/>
+                    <a:srgbClr val="000000"/>
                   </a:solidFill>
-                </a:endParaRPr>
-              </a:p>
-            </p:txBody>
-          </p:sp>
-          <p:sp>
-            <p:nvSpPr>
-              <p:cNvPr id="96" name="Chord 95">
+                  <a:prstDash val="solid"/>
+                  <a:round/>
+                  <a:headEnd type="none" w="med" len="med"/>
+                  <a:tailEnd type="none" w="med" len="med"/>
+                </a:ln>
+                <a:effectLst/>
+              </p:spPr>
+              <p:style>
+                <a:lnRef idx="1">
+                  <a:schemeClr val="accent1"/>
+                </a:lnRef>
+                <a:fillRef idx="3">
+                  <a:schemeClr val="accent1"/>
+                </a:fillRef>
+                <a:effectRef idx="2">
+                  <a:schemeClr val="accent1"/>
+                </a:effectRef>
+                <a:fontRef idx="minor">
+                  <a:schemeClr val="lt1"/>
+                </a:fontRef>
+              </p:style>
+              <p:txBody>
+                <a:bodyPr rtlCol="0" anchor="ctr"/>
+                <a:lstStyle/>
+                <a:p>
+                  <a:pPr algn="ctr"/>
+                  <a:endParaRPr lang="en-US" i="1" dirty="0">
+                    <a:solidFill>
+                      <a:schemeClr val="tx1"/>
+                    </a:solidFill>
+                  </a:endParaRPr>
+                </a:p>
+              </p:txBody>
+            </p:sp>
+            <p:sp>
+              <p:nvSpPr>
+                <p:cNvPr id="51" name="Chord 50">
+                  <a:extLst>
+                    <a:ext uri="{FF2B5EF4-FFF2-40B4-BE49-F238E27FC236}">
+                      <a16:creationId xmlns:a16="http://schemas.microsoft.com/office/drawing/2014/main" id="{01F1CF75-7D8B-0C4D-A06F-4C142279D0F6}"/>
+                    </a:ext>
+                  </a:extLst>
+                </p:cNvPr>
+                <p:cNvSpPr/>
+                <p:nvPr/>
+              </p:nvSpPr>
+              <p:spPr>
+                <a:xfrm>
+                  <a:off x="3734347" y="784736"/>
+                  <a:ext cx="632206" cy="632206"/>
+                </a:xfrm>
+                <a:prstGeom prst="chord">
+                  <a:avLst>
+                    <a:gd name="adj1" fmla="val 10506229"/>
+                    <a:gd name="adj2" fmla="val 301460"/>
+                  </a:avLst>
+                </a:prstGeom>
+                <a:solidFill>
+                  <a:schemeClr val="accent4">
+                    <a:lumMod val="60000"/>
+                    <a:lumOff val="40000"/>
+                  </a:schemeClr>
+                </a:solidFill>
+                <a:ln w="38100" cap="flat" cmpd="sng" algn="ctr">
+                  <a:solidFill>
+                    <a:srgbClr val="000000"/>
+                  </a:solidFill>
+                  <a:prstDash val="solid"/>
+                  <a:round/>
+                  <a:headEnd type="none" w="med" len="med"/>
+                  <a:tailEnd type="none" w="med" len="med"/>
+                </a:ln>
+                <a:effectLst/>
+              </p:spPr>
+              <p:style>
+                <a:lnRef idx="1">
+                  <a:schemeClr val="accent1"/>
+                </a:lnRef>
+                <a:fillRef idx="3">
+                  <a:schemeClr val="accent1"/>
+                </a:fillRef>
+                <a:effectRef idx="2">
+                  <a:schemeClr val="accent1"/>
+                </a:effectRef>
+                <a:fontRef idx="minor">
+                  <a:schemeClr val="lt1"/>
+                </a:fontRef>
+              </p:style>
+              <p:txBody>
+                <a:bodyPr rtlCol="0" anchor="ctr"/>
+                <a:lstStyle/>
+                <a:p>
+                  <a:pPr algn="ctr"/>
+                  <a:endParaRPr lang="en-US"/>
+                </a:p>
+              </p:txBody>
+            </p:sp>
+            <p:pic>
+              <p:nvPicPr>
+                <p:cNvPr id="52" name="Picture 51">
+                  <a:extLst>
+                    <a:ext uri="{FF2B5EF4-FFF2-40B4-BE49-F238E27FC236}">
+                      <a16:creationId xmlns:a16="http://schemas.microsoft.com/office/drawing/2014/main" id="{83CFA7A6-4C89-BC47-BE6B-138B3D110D62}"/>
+                    </a:ext>
+                  </a:extLst>
+                </p:cNvPr>
+                <p:cNvPicPr>
+                  <a:picLocks noChangeAspect="1"/>
+                </p:cNvPicPr>
+                <p:nvPr/>
+              </p:nvPicPr>
+              <p:blipFill>
+                <a:blip r:embed="rId2">
+                  <a:extLst>
+                    <a:ext uri="{28A0092B-C50C-407E-A947-70E740481C1C}">
+                      <a14:useLocalDpi xmlns:a14="http://schemas.microsoft.com/office/drawing/2010/main" val="0"/>
+                    </a:ext>
+                  </a:extLst>
+                </a:blip>
+                <a:stretch>
+                  <a:fillRect/>
+                </a:stretch>
+              </p:blipFill>
+              <p:spPr>
+                <a:xfrm>
+                  <a:off x="2803319" y="413397"/>
+                  <a:ext cx="771908" cy="771908"/>
+                </a:xfrm>
+                <a:prstGeom prst="rect">
+                  <a:avLst/>
+                </a:prstGeom>
+              </p:spPr>
+            </p:pic>
+            <p:pic>
+              <p:nvPicPr>
+                <p:cNvPr id="53" name="Picture 52">
+                  <a:extLst>
+                    <a:ext uri="{FF2B5EF4-FFF2-40B4-BE49-F238E27FC236}">
+                      <a16:creationId xmlns:a16="http://schemas.microsoft.com/office/drawing/2014/main" id="{191EF95B-7FDD-7045-BD9F-D55BDB5CC996}"/>
+                    </a:ext>
+                  </a:extLst>
+                </p:cNvPr>
+                <p:cNvPicPr>
+                  <a:picLocks noChangeAspect="1"/>
+                </p:cNvPicPr>
+                <p:nvPr/>
+              </p:nvPicPr>
+              <p:blipFill>
+                <a:blip r:embed="rId3">
+                  <a:extLst>
+                    <a:ext uri="{28A0092B-C50C-407E-A947-70E740481C1C}">
+                      <a14:useLocalDpi xmlns:a14="http://schemas.microsoft.com/office/drawing/2010/main" val="0"/>
+                    </a:ext>
+                  </a:extLst>
+                </a:blip>
+                <a:stretch>
+                  <a:fillRect/>
+                </a:stretch>
+              </p:blipFill>
+              <p:spPr>
+                <a:xfrm>
+                  <a:off x="5971536" y="499461"/>
+                  <a:ext cx="794135" cy="794135"/>
+                </a:xfrm>
+                <a:prstGeom prst="rect">
+                  <a:avLst/>
+                </a:prstGeom>
+              </p:spPr>
+            </p:pic>
+          </p:grpSp>
+          <p:grpSp>
+            <p:nvGrpSpPr>
+              <p:cNvPr id="42" name="Group 41">
                 <a:extLst>
                   <a:ext uri="{FF2B5EF4-FFF2-40B4-BE49-F238E27FC236}">
-                    <a16:creationId xmlns:a16="http://schemas.microsoft.com/office/drawing/2014/main" id="{6B1CA32C-D843-1144-9420-E4F443DCF975}"/>
+                    <a16:creationId xmlns:a16="http://schemas.microsoft.com/office/drawing/2014/main" id="{735A5634-D1B5-FE4B-918A-390F9ED0DAF4}"/>
                   </a:ext>
                 </a:extLst>
               </p:cNvPr>
-              <p:cNvSpPr/>
+              <p:cNvGrpSpPr/>
               <p:nvPr/>
-            </p:nvSpPr>
-            <p:spPr>
+            </p:nvGrpSpPr>
+            <p:grpSpPr>
               <a:xfrm>
-                <a:off x="3734347" y="784736"/>
-                <a:ext cx="632206" cy="632206"/>
+                <a:off x="8845104" y="1207886"/>
+                <a:ext cx="4196538" cy="1003545"/>
+                <a:chOff x="2569133" y="413397"/>
+                <a:chExt cx="4196538" cy="1003545"/>
               </a:xfrm>
-              <a:prstGeom prst="chord">
-                <a:avLst>
-                  <a:gd name="adj1" fmla="val 10506229"/>
-                  <a:gd name="adj2" fmla="val 301460"/>
-                </a:avLst>
-              </a:prstGeom>
-              <a:solidFill>
-                <a:schemeClr val="accent4">
-                  <a:lumMod val="60000"/>
-                  <a:lumOff val="40000"/>
-                </a:schemeClr>
-              </a:solidFill>
-              <a:ln w="38100" cap="flat" cmpd="sng" algn="ctr">
+            </p:grpSpPr>
+            <p:cxnSp>
+              <p:nvCxnSpPr>
+                <p:cNvPr id="44" name="Straight Connector 43">
+                  <a:extLst>
+                    <a:ext uri="{FF2B5EF4-FFF2-40B4-BE49-F238E27FC236}">
+                      <a16:creationId xmlns:a16="http://schemas.microsoft.com/office/drawing/2014/main" id="{0CDACA8F-E4CE-8842-935F-88EA96C35DFA}"/>
+                    </a:ext>
+                  </a:extLst>
+                </p:cNvPr>
+                <p:cNvCxnSpPr/>
+                <p:nvPr/>
+              </p:nvCxnSpPr>
+              <p:spPr>
+                <a:xfrm>
+                  <a:off x="2569133" y="1140336"/>
+                  <a:ext cx="4191000" cy="0"/>
+                </a:xfrm>
+                <a:prstGeom prst="line">
+                  <a:avLst/>
+                </a:prstGeom>
+                <a:ln w="38100" cap="flat" cmpd="sng" algn="ctr">
+                  <a:solidFill>
+                    <a:srgbClr val="000000"/>
+                  </a:solidFill>
+                  <a:prstDash val="solid"/>
+                  <a:round/>
+                  <a:headEnd type="none" w="med" len="med"/>
+                  <a:tailEnd type="none" w="med" len="med"/>
+                </a:ln>
+                <a:effectLst/>
+              </p:spPr>
+              <p:style>
+                <a:lnRef idx="2">
+                  <a:schemeClr val="accent1"/>
+                </a:lnRef>
+                <a:fillRef idx="0">
+                  <a:schemeClr val="accent1"/>
+                </a:fillRef>
+                <a:effectRef idx="1">
+                  <a:schemeClr val="accent1"/>
+                </a:effectRef>
+                <a:fontRef idx="minor">
+                  <a:schemeClr val="tx1"/>
+                </a:fontRef>
+              </p:style>
+            </p:cxnSp>
+            <p:sp>
+              <p:nvSpPr>
+                <p:cNvPr id="45" name="Right Arrow 44">
+                  <a:extLst>
+                    <a:ext uri="{FF2B5EF4-FFF2-40B4-BE49-F238E27FC236}">
+                      <a16:creationId xmlns:a16="http://schemas.microsoft.com/office/drawing/2014/main" id="{0D4340BD-3736-F040-875D-23050DE64AB7}"/>
+                    </a:ext>
+                  </a:extLst>
+                </p:cNvPr>
+                <p:cNvSpPr/>
+                <p:nvPr/>
+              </p:nvSpPr>
+              <p:spPr>
+                <a:xfrm>
+                  <a:off x="4740833" y="949836"/>
+                  <a:ext cx="1168400" cy="350140"/>
+                </a:xfrm>
+                <a:prstGeom prst="rightArrow">
+                  <a:avLst>
+                    <a:gd name="adj1" fmla="val 100000"/>
+                    <a:gd name="adj2" fmla="val 52194"/>
+                  </a:avLst>
+                </a:prstGeom>
                 <a:solidFill>
-                  <a:srgbClr val="000000"/>
+                  <a:srgbClr val="92D050"/>
                 </a:solidFill>
-                <a:prstDash val="solid"/>
-                <a:round/>
-                <a:headEnd type="none" w="med" len="med"/>
-                <a:tailEnd type="none" w="med" len="med"/>
-              </a:ln>
-              <a:effectLst/>
-            </p:spPr>
-            <p:style>
-              <a:lnRef idx="1">
-                <a:schemeClr val="accent1"/>
-              </a:lnRef>
-              <a:fillRef idx="3">
-                <a:schemeClr val="accent1"/>
-              </a:fillRef>
-              <a:effectRef idx="2">
-                <a:schemeClr val="accent1"/>
-              </a:effectRef>
-              <a:fontRef idx="minor">
-                <a:schemeClr val="lt1"/>
-              </a:fontRef>
-            </p:style>
-            <p:txBody>
-              <a:bodyPr rtlCol="0" anchor="ctr"/>
-              <a:lstStyle/>
-              <a:p>
-                <a:pPr algn="ctr"/>
-                <a:endParaRPr lang="en-US"/>
-              </a:p>
-            </p:txBody>
-          </p:sp>
-          <p:pic>
-            <p:nvPicPr>
-              <p:cNvPr id="97" name="Picture 96">
-                <a:extLst>
-                  <a:ext uri="{FF2B5EF4-FFF2-40B4-BE49-F238E27FC236}">
-                    <a16:creationId xmlns:a16="http://schemas.microsoft.com/office/drawing/2014/main" id="{8C5AB0E7-D26A-0447-BEF7-384CB5219E43}"/>
-                  </a:ext>
-                </a:extLst>
-              </p:cNvPr>
-              <p:cNvPicPr>
-                <a:picLocks noChangeAspect="1"/>
-              </p:cNvPicPr>
-              <p:nvPr/>
-            </p:nvPicPr>
-            <p:blipFill>
-              <a:blip r:embed="rId2">
-                <a:extLst>
-                  <a:ext uri="{28A0092B-C50C-407E-A947-70E740481C1C}">
-                    <a14:useLocalDpi xmlns:a14="http://schemas.microsoft.com/office/drawing/2010/main" val="0"/>
-                  </a:ext>
-                </a:extLst>
-              </a:blip>
-              <a:stretch>
-                <a:fillRect/>
-              </a:stretch>
-            </p:blipFill>
-            <p:spPr>
-              <a:xfrm>
-                <a:off x="2803319" y="413397"/>
-                <a:ext cx="771908" cy="771908"/>
-              </a:xfrm>
-              <a:prstGeom prst="rect">
-                <a:avLst/>
-              </a:prstGeom>
-            </p:spPr>
-          </p:pic>
-          <p:pic>
-            <p:nvPicPr>
-              <p:cNvPr id="98" name="Picture 97">
-                <a:extLst>
-                  <a:ext uri="{FF2B5EF4-FFF2-40B4-BE49-F238E27FC236}">
-                    <a16:creationId xmlns:a16="http://schemas.microsoft.com/office/drawing/2014/main" id="{90AA2553-9805-624A-991C-B6E0FA5CB9C4}"/>
-                  </a:ext>
-                </a:extLst>
-              </p:cNvPr>
-              <p:cNvPicPr>
-                <a:picLocks noChangeAspect="1"/>
-              </p:cNvPicPr>
-              <p:nvPr/>
-            </p:nvPicPr>
-            <p:blipFill>
-              <a:blip r:embed="rId3">
-                <a:extLst>
-                  <a:ext uri="{28A0092B-C50C-407E-A947-70E740481C1C}">
-                    <a14:useLocalDpi xmlns:a14="http://schemas.microsoft.com/office/drawing/2010/main" val="0"/>
-                  </a:ext>
-                </a:extLst>
-              </a:blip>
-              <a:stretch>
-                <a:fillRect/>
-              </a:stretch>
-            </p:blipFill>
-            <p:spPr>
-              <a:xfrm>
-                <a:off x="5971536" y="499461"/>
-                <a:ext cx="794135" cy="794135"/>
-              </a:xfrm>
-              <a:prstGeom prst="rect">
-                <a:avLst/>
-              </a:prstGeom>
-            </p:spPr>
-          </p:pic>
+                <a:ln w="38100" cap="flat" cmpd="sng" algn="ctr">
+                  <a:solidFill>
+                    <a:srgbClr val="000000"/>
+                  </a:solidFill>
+                  <a:prstDash val="solid"/>
+                  <a:round/>
+                  <a:headEnd type="none" w="med" len="med"/>
+                  <a:tailEnd type="none" w="med" len="med"/>
+                </a:ln>
+                <a:effectLst/>
+              </p:spPr>
+              <p:style>
+                <a:lnRef idx="1">
+                  <a:schemeClr val="accent1"/>
+                </a:lnRef>
+                <a:fillRef idx="3">
+                  <a:schemeClr val="accent1"/>
+                </a:fillRef>
+                <a:effectRef idx="2">
+                  <a:schemeClr val="accent1"/>
+                </a:effectRef>
+                <a:fontRef idx="minor">
+                  <a:schemeClr val="lt1"/>
+                </a:fontRef>
+              </p:style>
+              <p:txBody>
+                <a:bodyPr rtlCol="0" anchor="ctr"/>
+                <a:lstStyle/>
+                <a:p>
+                  <a:pPr algn="ctr"/>
+                  <a:endParaRPr lang="en-US" i="1" dirty="0">
+                    <a:solidFill>
+                      <a:schemeClr val="tx1"/>
+                    </a:solidFill>
+                  </a:endParaRPr>
+                </a:p>
+              </p:txBody>
+            </p:sp>
+            <p:sp>
+              <p:nvSpPr>
+                <p:cNvPr id="46" name="Chord 45">
+                  <a:extLst>
+                    <a:ext uri="{FF2B5EF4-FFF2-40B4-BE49-F238E27FC236}">
+                      <a16:creationId xmlns:a16="http://schemas.microsoft.com/office/drawing/2014/main" id="{89D5860A-0E12-7049-82F7-64A662F4EF86}"/>
+                    </a:ext>
+                  </a:extLst>
+                </p:cNvPr>
+                <p:cNvSpPr/>
+                <p:nvPr/>
+              </p:nvSpPr>
+              <p:spPr>
+                <a:xfrm>
+                  <a:off x="3734347" y="784736"/>
+                  <a:ext cx="632206" cy="632206"/>
+                </a:xfrm>
+                <a:prstGeom prst="chord">
+                  <a:avLst>
+                    <a:gd name="adj1" fmla="val 10506229"/>
+                    <a:gd name="adj2" fmla="val 301460"/>
+                  </a:avLst>
+                </a:prstGeom>
+                <a:solidFill>
+                  <a:schemeClr val="accent4">
+                    <a:lumMod val="60000"/>
+                    <a:lumOff val="40000"/>
+                  </a:schemeClr>
+                </a:solidFill>
+                <a:ln w="38100" cap="flat" cmpd="sng" algn="ctr">
+                  <a:solidFill>
+                    <a:srgbClr val="000000"/>
+                  </a:solidFill>
+                  <a:prstDash val="solid"/>
+                  <a:round/>
+                  <a:headEnd type="none" w="med" len="med"/>
+                  <a:tailEnd type="none" w="med" len="med"/>
+                </a:ln>
+                <a:effectLst/>
+              </p:spPr>
+              <p:style>
+                <a:lnRef idx="1">
+                  <a:schemeClr val="accent1"/>
+                </a:lnRef>
+                <a:fillRef idx="3">
+                  <a:schemeClr val="accent1"/>
+                </a:fillRef>
+                <a:effectRef idx="2">
+                  <a:schemeClr val="accent1"/>
+                </a:effectRef>
+                <a:fontRef idx="minor">
+                  <a:schemeClr val="lt1"/>
+                </a:fontRef>
+              </p:style>
+              <p:txBody>
+                <a:bodyPr rtlCol="0" anchor="ctr"/>
+                <a:lstStyle/>
+                <a:p>
+                  <a:pPr algn="ctr"/>
+                  <a:endParaRPr lang="en-US"/>
+                </a:p>
+              </p:txBody>
+            </p:sp>
+            <p:pic>
+              <p:nvPicPr>
+                <p:cNvPr id="47" name="Picture 46">
+                  <a:extLst>
+                    <a:ext uri="{FF2B5EF4-FFF2-40B4-BE49-F238E27FC236}">
+                      <a16:creationId xmlns:a16="http://schemas.microsoft.com/office/drawing/2014/main" id="{FD841974-6BC6-874D-8D0A-B8DAB25C7C18}"/>
+                    </a:ext>
+                  </a:extLst>
+                </p:cNvPr>
+                <p:cNvPicPr>
+                  <a:picLocks noChangeAspect="1"/>
+                </p:cNvPicPr>
+                <p:nvPr/>
+              </p:nvPicPr>
+              <p:blipFill>
+                <a:blip r:embed="rId2">
+                  <a:extLst>
+                    <a:ext uri="{28A0092B-C50C-407E-A947-70E740481C1C}">
+                      <a14:useLocalDpi xmlns:a14="http://schemas.microsoft.com/office/drawing/2010/main" val="0"/>
+                    </a:ext>
+                  </a:extLst>
+                </a:blip>
+                <a:stretch>
+                  <a:fillRect/>
+                </a:stretch>
+              </p:blipFill>
+              <p:spPr>
+                <a:xfrm>
+                  <a:off x="2803319" y="413397"/>
+                  <a:ext cx="771908" cy="771908"/>
+                </a:xfrm>
+                <a:prstGeom prst="rect">
+                  <a:avLst/>
+                </a:prstGeom>
+              </p:spPr>
+            </p:pic>
+            <p:pic>
+              <p:nvPicPr>
+                <p:cNvPr id="48" name="Picture 47">
+                  <a:extLst>
+                    <a:ext uri="{FF2B5EF4-FFF2-40B4-BE49-F238E27FC236}">
+                      <a16:creationId xmlns:a16="http://schemas.microsoft.com/office/drawing/2014/main" id="{AF5688F2-D860-F741-9701-0C58BB811EFC}"/>
+                    </a:ext>
+                  </a:extLst>
+                </p:cNvPr>
+                <p:cNvPicPr>
+                  <a:picLocks noChangeAspect="1"/>
+                </p:cNvPicPr>
+                <p:nvPr/>
+              </p:nvPicPr>
+              <p:blipFill>
+                <a:blip r:embed="rId3">
+                  <a:extLst>
+                    <a:ext uri="{28A0092B-C50C-407E-A947-70E740481C1C}">
+                      <a14:useLocalDpi xmlns:a14="http://schemas.microsoft.com/office/drawing/2010/main" val="0"/>
+                    </a:ext>
+                  </a:extLst>
+                </a:blip>
+                <a:stretch>
+                  <a:fillRect/>
+                </a:stretch>
+              </p:blipFill>
+              <p:spPr>
+                <a:xfrm>
+                  <a:off x="5971536" y="499461"/>
+                  <a:ext cx="794135" cy="794135"/>
+                </a:xfrm>
+                <a:prstGeom prst="rect">
+                  <a:avLst/>
+                </a:prstGeom>
+              </p:spPr>
+            </p:pic>
+          </p:grpSp>
         </p:grpSp>
-      </p:grpSp>
-      <p:sp>
-        <p:nvSpPr>
-          <p:cNvPr id="124" name="Oval 123">
-            <a:extLst>
-              <a:ext uri="{FF2B5EF4-FFF2-40B4-BE49-F238E27FC236}">
-                <a16:creationId xmlns:a16="http://schemas.microsoft.com/office/drawing/2014/main" id="{19DB127A-99CE-9641-858D-41CAD8A97CFE}"/>
-              </a:ext>
-            </a:extLst>
-          </p:cNvPr>
-          <p:cNvSpPr/>
-          <p:nvPr/>
-        </p:nvSpPr>
-        <p:spPr>
-          <a:xfrm>
-            <a:off x="5712308" y="2654467"/>
-            <a:ext cx="234913" cy="234913"/>
-          </a:xfrm>
-          <a:prstGeom prst="ellipse">
-            <a:avLst/>
-          </a:prstGeom>
-          <a:solidFill>
-            <a:srgbClr val="FF0000"/>
-          </a:solidFill>
-          <a:ln>
+        <p:sp>
+          <p:nvSpPr>
+            <p:cNvPr id="35" name="Oval 34">
+              <a:extLst>
+                <a:ext uri="{FF2B5EF4-FFF2-40B4-BE49-F238E27FC236}">
+                  <a16:creationId xmlns:a16="http://schemas.microsoft.com/office/drawing/2014/main" id="{6A5BC47A-41FC-DE44-A41C-D94ADE935AF7}"/>
+                </a:ext>
+              </a:extLst>
+            </p:cNvPr>
+            <p:cNvSpPr/>
+            <p:nvPr/>
+          </p:nvSpPr>
+          <p:spPr>
+            <a:xfrm>
+              <a:off x="5712308" y="2654467"/>
+              <a:ext cx="234913" cy="234913"/>
+            </a:xfrm>
+            <a:prstGeom prst="ellipse">
+              <a:avLst/>
+            </a:prstGeom>
             <a:solidFill>
               <a:srgbClr val="FF0000"/>
             </a:solidFill>
-          </a:ln>
-        </p:spPr>
-        <p:style>
-          <a:lnRef idx="2">
-            <a:schemeClr val="dk1">
-              <a:shade val="50000"/>
-            </a:schemeClr>
-          </a:lnRef>
-          <a:fillRef idx="1">
-            <a:schemeClr val="dk1"/>
-          </a:fillRef>
-          <a:effectRef idx="0">
-            <a:schemeClr val="dk1"/>
-          </a:effectRef>
-          <a:fontRef idx="minor">
-            <a:schemeClr val="lt1"/>
-          </a:fontRef>
-        </p:style>
-        <p:txBody>
-          <a:bodyPr rtlCol="0" anchor="ctr"/>
-          <a:lstStyle/>
-          <a:p>
-            <a:pPr algn="ctr"/>
-            <a:endParaRPr lang="en-US"/>
-          </a:p>
-        </p:txBody>
-      </p:sp>
-      <p:cxnSp>
-        <p:nvCxnSpPr>
-          <p:cNvPr id="129" name="Straight Connector 128">
-            <a:extLst>
-              <a:ext uri="{FF2B5EF4-FFF2-40B4-BE49-F238E27FC236}">
-                <a16:creationId xmlns:a16="http://schemas.microsoft.com/office/drawing/2014/main" id="{70A397AA-2DC9-334C-A69F-5C077046FC0E}"/>
-              </a:ext>
-            </a:extLst>
-          </p:cNvPr>
-          <p:cNvCxnSpPr>
-            <a:cxnSpLocks/>
-            <a:endCxn id="124" idx="0"/>
-          </p:cNvCxnSpPr>
-          <p:nvPr/>
-        </p:nvCxnSpPr>
-        <p:spPr>
-          <a:xfrm>
-            <a:off x="5829765" y="2299306"/>
-            <a:ext cx="0" cy="355161"/>
-          </a:xfrm>
-          <a:prstGeom prst="line">
-            <a:avLst/>
-          </a:prstGeom>
-          <a:ln w="28575">
-            <a:solidFill>
-              <a:srgbClr val="FF0000"/>
-            </a:solidFill>
-          </a:ln>
-          <a:effectLst/>
-        </p:spPr>
-        <p:style>
-          <a:lnRef idx="2">
-            <a:schemeClr val="accent1"/>
-          </a:lnRef>
-          <a:fillRef idx="0">
-            <a:schemeClr val="accent1"/>
-          </a:fillRef>
-          <a:effectRef idx="1">
-            <a:schemeClr val="accent1"/>
-          </a:effectRef>
-          <a:fontRef idx="minor">
-            <a:schemeClr val="tx1"/>
-          </a:fontRef>
-        </p:style>
-      </p:cxnSp>
-      <p:pic>
-        <p:nvPicPr>
-          <p:cNvPr id="72" name="Picture 71">
-            <a:extLst>
-              <a:ext uri="{FF2B5EF4-FFF2-40B4-BE49-F238E27FC236}">
-                <a16:creationId xmlns:a16="http://schemas.microsoft.com/office/drawing/2014/main" id="{7D36C71F-8757-A140-BFAB-C610F7147B73}"/>
-              </a:ext>
-            </a:extLst>
-          </p:cNvPr>
-          <p:cNvPicPr>
-            <a:picLocks noChangeAspect="1"/>
-          </p:cNvPicPr>
-          <p:nvPr/>
-        </p:nvPicPr>
-        <p:blipFill>
-          <a:blip r:embed="rId4"/>
-          <a:stretch>
-            <a:fillRect/>
-          </a:stretch>
-        </p:blipFill>
-        <p:spPr>
-          <a:xfrm>
-            <a:off x="5367295" y="1739716"/>
-            <a:ext cx="881743" cy="881743"/>
-          </a:xfrm>
-          <a:prstGeom prst="rect">
-            <a:avLst/>
-          </a:prstGeom>
-        </p:spPr>
-      </p:pic>
+            <a:ln>
+              <a:solidFill>
+                <a:srgbClr val="FF0000"/>
+              </a:solidFill>
+            </a:ln>
+          </p:spPr>
+          <p:style>
+            <a:lnRef idx="2">
+              <a:schemeClr val="dk1">
+                <a:shade val="50000"/>
+              </a:schemeClr>
+            </a:lnRef>
+            <a:fillRef idx="1">
+              <a:schemeClr val="dk1"/>
+            </a:fillRef>
+            <a:effectRef idx="0">
+              <a:schemeClr val="dk1"/>
+            </a:effectRef>
+            <a:fontRef idx="minor">
+              <a:schemeClr val="lt1"/>
+            </a:fontRef>
+          </p:style>
+          <p:txBody>
+            <a:bodyPr rtlCol="0" anchor="ctr"/>
+            <a:lstStyle/>
+            <a:p>
+              <a:pPr algn="ctr"/>
+              <a:endParaRPr lang="en-US"/>
+            </a:p>
+          </p:txBody>
+        </p:sp>
+        <p:cxnSp>
+          <p:nvCxnSpPr>
+            <p:cNvPr id="36" name="Straight Connector 35">
+              <a:extLst>
+                <a:ext uri="{FF2B5EF4-FFF2-40B4-BE49-F238E27FC236}">
+                  <a16:creationId xmlns:a16="http://schemas.microsoft.com/office/drawing/2014/main" id="{EA67A50B-7F4B-5247-B413-7AF278401155}"/>
+                </a:ext>
+              </a:extLst>
+            </p:cNvPr>
+            <p:cNvCxnSpPr>
+              <a:cxnSpLocks/>
+              <a:endCxn id="35" idx="0"/>
+            </p:cNvCxnSpPr>
+            <p:nvPr/>
+          </p:nvCxnSpPr>
+          <p:spPr>
+            <a:xfrm>
+              <a:off x="5829765" y="2299306"/>
+              <a:ext cx="0" cy="355161"/>
+            </a:xfrm>
+            <a:prstGeom prst="line">
+              <a:avLst/>
+            </a:prstGeom>
+            <a:ln w="28575">
+              <a:solidFill>
+                <a:srgbClr val="FF0000"/>
+              </a:solidFill>
+            </a:ln>
+            <a:effectLst/>
+          </p:spPr>
+          <p:style>
+            <a:lnRef idx="2">
+              <a:schemeClr val="accent1"/>
+            </a:lnRef>
+            <a:fillRef idx="0">
+              <a:schemeClr val="accent1"/>
+            </a:fillRef>
+            <a:effectRef idx="1">
+              <a:schemeClr val="accent1"/>
+            </a:effectRef>
+            <a:fontRef idx="minor">
+              <a:schemeClr val="tx1"/>
+            </a:fontRef>
+          </p:style>
+        </p:cxnSp>
+        <p:pic>
+          <p:nvPicPr>
+            <p:cNvPr id="37" name="Picture 36">
+              <a:extLst>
+                <a:ext uri="{FF2B5EF4-FFF2-40B4-BE49-F238E27FC236}">
+                  <a16:creationId xmlns:a16="http://schemas.microsoft.com/office/drawing/2014/main" id="{EDA0106A-433A-8D4C-B3C5-68A6BB186989}"/>
+                </a:ext>
+              </a:extLst>
+            </p:cNvPr>
+            <p:cNvPicPr>
+              <a:picLocks noChangeAspect="1"/>
+            </p:cNvPicPr>
+            <p:nvPr/>
+          </p:nvPicPr>
+          <p:blipFill>
+            <a:blip r:embed="rId4"/>
+            <a:stretch>
+              <a:fillRect/>
+            </a:stretch>
+          </p:blipFill>
+          <p:spPr>
+            <a:xfrm>
+              <a:off x="5367295" y="1739716"/>
+              <a:ext cx="881743" cy="881743"/>
+            </a:xfrm>
+            <a:prstGeom prst="rect">
+              <a:avLst/>
+            </a:prstGeom>
+          </p:spPr>
+        </p:pic>
+      </p:grpSp>
     </p:spTree>
     <p:extLst>
       <p:ext uri="{BB962C8B-B14F-4D97-AF65-F5344CB8AC3E}">

</xml_diff>

<commit_message>
rewrite to use higher-order interactions rather than expansions
</commit_message>
<xml_diff>
--- a/specification/imgsrc/4.pptx
+++ b/specification/imgsrc/4.pptx
@@ -218,7 +218,7 @@
           <a:p>
             <a:fld id="{9E808448-E5C1-6044-9A1D-E68767CBF56D}" type="datetimeFigureOut">
               <a:rPr lang="en-US" smtClean="0"/>
-              <a:t>10/1/20</a:t>
+              <a:t>10/18/20</a:t>
             </a:fld>
             <a:endParaRPr lang="en-US"/>
           </a:p>
@@ -748,7 +748,7 @@
           <a:p>
             <a:fld id="{EBC7FFC8-011D-1246-B320-9C4FD100F423}" type="datetimeFigureOut">
               <a:rPr lang="en-US" smtClean="0"/>
-              <a:t>10/1/20</a:t>
+              <a:t>10/18/20</a:t>
             </a:fld>
             <a:endParaRPr lang="en-US"/>
           </a:p>
@@ -916,7 +916,7 @@
           <a:p>
             <a:fld id="{EBC7FFC8-011D-1246-B320-9C4FD100F423}" type="datetimeFigureOut">
               <a:rPr lang="en-US" smtClean="0"/>
-              <a:t>10/1/20</a:t>
+              <a:t>10/18/20</a:t>
             </a:fld>
             <a:endParaRPr lang="en-US"/>
           </a:p>
@@ -1094,7 +1094,7 @@
           <a:p>
             <a:fld id="{EBC7FFC8-011D-1246-B320-9C4FD100F423}" type="datetimeFigureOut">
               <a:rPr lang="en-US" smtClean="0"/>
-              <a:t>10/1/20</a:t>
+              <a:t>10/18/20</a:t>
             </a:fld>
             <a:endParaRPr lang="en-US"/>
           </a:p>
@@ -1262,7 +1262,7 @@
           <a:p>
             <a:fld id="{EBC7FFC8-011D-1246-B320-9C4FD100F423}" type="datetimeFigureOut">
               <a:rPr lang="en-US" smtClean="0"/>
-              <a:t>10/1/20</a:t>
+              <a:t>10/18/20</a:t>
             </a:fld>
             <a:endParaRPr lang="en-US"/>
           </a:p>
@@ -1507,7 +1507,7 @@
           <a:p>
             <a:fld id="{EBC7FFC8-011D-1246-B320-9C4FD100F423}" type="datetimeFigureOut">
               <a:rPr lang="en-US" smtClean="0"/>
-              <a:t>10/1/20</a:t>
+              <a:t>10/18/20</a:t>
             </a:fld>
             <a:endParaRPr lang="en-US"/>
           </a:p>
@@ -1792,7 +1792,7 @@
           <a:p>
             <a:fld id="{EBC7FFC8-011D-1246-B320-9C4FD100F423}" type="datetimeFigureOut">
               <a:rPr lang="en-US" smtClean="0"/>
-              <a:t>10/1/20</a:t>
+              <a:t>10/18/20</a:t>
             </a:fld>
             <a:endParaRPr lang="en-US"/>
           </a:p>
@@ -2211,7 +2211,7 @@
           <a:p>
             <a:fld id="{EBC7FFC8-011D-1246-B320-9C4FD100F423}" type="datetimeFigureOut">
               <a:rPr lang="en-US" smtClean="0"/>
-              <a:t>10/1/20</a:t>
+              <a:t>10/18/20</a:t>
             </a:fld>
             <a:endParaRPr lang="en-US"/>
           </a:p>
@@ -2328,7 +2328,7 @@
           <a:p>
             <a:fld id="{EBC7FFC8-011D-1246-B320-9C4FD100F423}" type="datetimeFigureOut">
               <a:rPr lang="en-US" smtClean="0"/>
-              <a:t>10/1/20</a:t>
+              <a:t>10/18/20</a:t>
             </a:fld>
             <a:endParaRPr lang="en-US"/>
           </a:p>
@@ -2423,7 +2423,7 @@
           <a:p>
             <a:fld id="{EBC7FFC8-011D-1246-B320-9C4FD100F423}" type="datetimeFigureOut">
               <a:rPr lang="en-US" smtClean="0"/>
-              <a:t>10/1/20</a:t>
+              <a:t>10/18/20</a:t>
             </a:fld>
             <a:endParaRPr lang="en-US"/>
           </a:p>
@@ -2698,7 +2698,7 @@
           <a:p>
             <a:fld id="{EBC7FFC8-011D-1246-B320-9C4FD100F423}" type="datetimeFigureOut">
               <a:rPr lang="en-US" smtClean="0"/>
-              <a:t>10/1/20</a:t>
+              <a:t>10/18/20</a:t>
             </a:fld>
             <a:endParaRPr lang="en-US"/>
           </a:p>
@@ -2950,7 +2950,7 @@
           <a:p>
             <a:fld id="{EBC7FFC8-011D-1246-B320-9C4FD100F423}" type="datetimeFigureOut">
               <a:rPr lang="en-US" smtClean="0"/>
-              <a:t>10/1/20</a:t>
+              <a:t>10/18/20</a:t>
             </a:fld>
             <a:endParaRPr lang="en-US"/>
           </a:p>
@@ -3161,7 +3161,7 @@
           <a:p>
             <a:fld id="{EBC7FFC8-011D-1246-B320-9C4FD100F423}" type="datetimeFigureOut">
               <a:rPr lang="en-US" smtClean="0"/>
-              <a:t>10/1/20</a:t>
+              <a:t>10/18/20</a:t>
             </a:fld>
             <a:endParaRPr lang="en-US"/>
           </a:p>
@@ -4086,7 +4086,7 @@
         <p:spPr>
           <a:xfrm>
             <a:off x="2736937" y="324200"/>
-            <a:ext cx="1205971" cy="369332"/>
+            <a:ext cx="610167" cy="369332"/>
           </a:xfrm>
           <a:prstGeom prst="rect">
             <a:avLst/>
@@ -4101,7 +4101,7 @@
           <a:p>
             <a:r>
               <a:rPr lang="en-US" dirty="0"/>
-              <a:t>MUST NOT</a:t>
+              <a:t>MAY</a:t>
             </a:r>
           </a:p>
         </p:txBody>
@@ -5077,8 +5077,8 @@
         </p:nvSpPr>
         <p:spPr>
           <a:xfrm>
-            <a:off x="1465355" y="3749156"/>
-            <a:ext cx="2206310" cy="369332"/>
+            <a:off x="2282867" y="3910084"/>
+            <a:ext cx="610167" cy="369332"/>
           </a:xfrm>
           <a:prstGeom prst="rect">
             <a:avLst/>
@@ -5093,7 +5093,7 @@
           <a:p>
             <a:r>
               <a:rPr lang="en-US" dirty="0"/>
-              <a:t>NOT RECOMMENDED</a:t>
+              <a:t>MAY</a:t>
             </a:r>
           </a:p>
         </p:txBody>
@@ -6081,7 +6081,7 @@
         <p:spPr>
           <a:xfrm>
             <a:off x="2736937" y="324200"/>
-            <a:ext cx="1205971" cy="369332"/>
+            <a:ext cx="1435201" cy="369332"/>
           </a:xfrm>
           <a:prstGeom prst="rect">
             <a:avLst/>
@@ -6096,7 +6096,7 @@
           <a:p>
             <a:r>
               <a:rPr lang="en-US" dirty="0"/>
-              <a:t>MUST NOT</a:t>
+              <a:t>SHOULD NOT</a:t>
             </a:r>
           </a:p>
         </p:txBody>
@@ -8956,7 +8956,7 @@
         <p:spPr>
           <a:xfrm>
             <a:off x="1465355" y="3749156"/>
-            <a:ext cx="2206310" cy="369332"/>
+            <a:ext cx="2132379" cy="369332"/>
           </a:xfrm>
           <a:prstGeom prst="rect">
             <a:avLst/>
@@ -8971,7 +8971,7 @@
           <a:p>
             <a:r>
               <a:rPr lang="en-US" dirty="0"/>
-              <a:t>NOT RECOMMENDED</a:t>
+              <a:t>MAY (even if bizarre)</a:t>
             </a:r>
           </a:p>
         </p:txBody>
@@ -20049,10 +20049,10 @@
       </p:sp>
       <p:grpSp>
         <p:nvGrpSpPr>
-          <p:cNvPr id="9" name="Group 8">
+          <p:cNvPr id="13" name="Group 12">
             <a:extLst>
               <a:ext uri="{FF2B5EF4-FFF2-40B4-BE49-F238E27FC236}">
-                <a16:creationId xmlns:a16="http://schemas.microsoft.com/office/drawing/2014/main" id="{790285C1-D8C6-174E-AB05-6C665084EF09}"/>
+                <a16:creationId xmlns:a16="http://schemas.microsoft.com/office/drawing/2014/main" id="{3BA42555-9D40-5840-ACF2-486B7CD9CE78}"/>
               </a:ext>
             </a:extLst>
           </p:cNvPr>
@@ -20061,914 +20061,37 @@
         </p:nvGrpSpPr>
         <p:grpSpPr>
           <a:xfrm>
-            <a:off x="3249434" y="3905325"/>
+            <a:off x="1783996" y="2127896"/>
             <a:ext cx="5578708" cy="1573763"/>
             <a:chOff x="3249434" y="3905325"/>
             <a:chExt cx="5578708" cy="1573763"/>
           </a:xfrm>
         </p:grpSpPr>
-        <p:grpSp>
-          <p:nvGrpSpPr>
-            <p:cNvPr id="13" name="Group 12">
+        <p:cxnSp>
+          <p:nvCxnSpPr>
+            <p:cNvPr id="66" name="Straight Arrow Connector 5">
               <a:extLst>
                 <a:ext uri="{FF2B5EF4-FFF2-40B4-BE49-F238E27FC236}">
-                  <a16:creationId xmlns:a16="http://schemas.microsoft.com/office/drawing/2014/main" id="{3BA42555-9D40-5840-ACF2-486B7CD9CE78}"/>
-                </a:ext>
-              </a:extLst>
-            </p:cNvPr>
-            <p:cNvGrpSpPr/>
-            <p:nvPr/>
-          </p:nvGrpSpPr>
-          <p:grpSpPr>
-            <a:xfrm>
-              <a:off x="3249434" y="3905325"/>
-              <a:ext cx="5578708" cy="1573763"/>
-              <a:chOff x="3249434" y="3905325"/>
-              <a:chExt cx="5578708" cy="1573763"/>
-            </a:xfrm>
-          </p:grpSpPr>
-          <p:cxnSp>
-            <p:nvCxnSpPr>
-              <p:cNvPr id="66" name="Straight Arrow Connector 5">
-                <a:extLst>
-                  <a:ext uri="{FF2B5EF4-FFF2-40B4-BE49-F238E27FC236}">
-                    <a16:creationId xmlns:a16="http://schemas.microsoft.com/office/drawing/2014/main" id="{1A5D0C48-FBBB-9847-A312-7FEB2C3A7817}"/>
-                  </a:ext>
-                </a:extLst>
-              </p:cNvPr>
-              <p:cNvCxnSpPr>
-                <a:cxnSpLocks/>
-                <a:endCxn id="83" idx="0"/>
-              </p:cNvCxnSpPr>
-              <p:nvPr/>
-            </p:nvCxnSpPr>
-            <p:spPr>
-              <a:xfrm flipV="1">
-                <a:off x="5056103" y="4824434"/>
-                <a:ext cx="1439006" cy="343873"/>
-              </a:xfrm>
-              <a:prstGeom prst="bentConnector4">
-                <a:avLst>
-                  <a:gd name="adj1" fmla="val 20"/>
-                  <a:gd name="adj2" fmla="val 166478"/>
-                </a:avLst>
-              </a:prstGeom>
-              <a:ln>
-                <a:solidFill>
-                  <a:srgbClr val="FF0000"/>
-                </a:solidFill>
-                <a:headEnd type="none"/>
-                <a:tailEnd type="none"/>
-              </a:ln>
-              <a:effectLst/>
-            </p:spPr>
-            <p:style>
-              <a:lnRef idx="2">
-                <a:schemeClr val="accent1"/>
-              </a:lnRef>
-              <a:fillRef idx="0">
-                <a:schemeClr val="accent1"/>
-              </a:fillRef>
-              <a:effectRef idx="1">
-                <a:schemeClr val="accent1"/>
-              </a:effectRef>
-              <a:fontRef idx="minor">
-                <a:schemeClr val="tx1"/>
-              </a:fontRef>
-            </p:style>
-          </p:cxnSp>
-          <p:cxnSp>
-            <p:nvCxnSpPr>
-              <p:cNvPr id="71" name="Straight Connector 70">
-                <a:extLst>
-                  <a:ext uri="{FF2B5EF4-FFF2-40B4-BE49-F238E27FC236}">
-                    <a16:creationId xmlns:a16="http://schemas.microsoft.com/office/drawing/2014/main" id="{C1C87CE1-47B8-ED49-AAAC-6CD543382B0F}"/>
-                  </a:ext>
-                </a:extLst>
-              </p:cNvPr>
-              <p:cNvCxnSpPr/>
-              <p:nvPr/>
-            </p:nvCxnSpPr>
-            <p:spPr>
-              <a:xfrm>
-                <a:off x="6399859" y="4825279"/>
-                <a:ext cx="190500" cy="0"/>
-              </a:xfrm>
-              <a:prstGeom prst="line">
-                <a:avLst/>
-              </a:prstGeom>
-              <a:ln>
-                <a:solidFill>
-                  <a:srgbClr val="FF0000"/>
-                </a:solidFill>
-              </a:ln>
-              <a:effectLst/>
-            </p:spPr>
-            <p:style>
-              <a:lnRef idx="2">
-                <a:schemeClr val="accent1"/>
-              </a:lnRef>
-              <a:fillRef idx="0">
-                <a:schemeClr val="accent1"/>
-              </a:fillRef>
-              <a:effectRef idx="1">
-                <a:schemeClr val="accent1"/>
-              </a:effectRef>
-              <a:fontRef idx="minor">
-                <a:schemeClr val="tx1"/>
-              </a:fontRef>
-            </p:style>
-          </p:cxnSp>
-          <p:grpSp>
-            <p:nvGrpSpPr>
-              <p:cNvPr id="73" name="Group 72">
-                <a:extLst>
-                  <a:ext uri="{FF2B5EF4-FFF2-40B4-BE49-F238E27FC236}">
-                    <a16:creationId xmlns:a16="http://schemas.microsoft.com/office/drawing/2014/main" id="{BAA87CFC-0B57-E547-88AF-6FB2FE2A2A89}"/>
-                  </a:ext>
-                </a:extLst>
-              </p:cNvPr>
-              <p:cNvGrpSpPr/>
-              <p:nvPr/>
-            </p:nvGrpSpPr>
-            <p:grpSpPr>
-              <a:xfrm>
-                <a:off x="3249434" y="4824434"/>
-                <a:ext cx="2737576" cy="654654"/>
-                <a:chOff x="2569133" y="413397"/>
-                <a:chExt cx="4196538" cy="1003545"/>
-              </a:xfrm>
-            </p:grpSpPr>
-            <p:cxnSp>
-              <p:nvCxnSpPr>
-                <p:cNvPr id="74" name="Straight Connector 73">
-                  <a:extLst>
-                    <a:ext uri="{FF2B5EF4-FFF2-40B4-BE49-F238E27FC236}">
-                      <a16:creationId xmlns:a16="http://schemas.microsoft.com/office/drawing/2014/main" id="{D7E9C9ED-7435-B44D-901D-0207BED45EBA}"/>
-                    </a:ext>
-                  </a:extLst>
-                </p:cNvPr>
-                <p:cNvCxnSpPr/>
-                <p:nvPr/>
-              </p:nvCxnSpPr>
-              <p:spPr>
-                <a:xfrm>
-                  <a:off x="2569133" y="1140336"/>
-                  <a:ext cx="4191000" cy="0"/>
-                </a:xfrm>
-                <a:prstGeom prst="line">
-                  <a:avLst/>
-                </a:prstGeom>
-                <a:ln w="38100" cap="flat" cmpd="sng" algn="ctr">
-                  <a:solidFill>
-                    <a:srgbClr val="000000"/>
-                  </a:solidFill>
-                  <a:prstDash val="solid"/>
-                  <a:round/>
-                  <a:headEnd type="none" w="med" len="med"/>
-                  <a:tailEnd type="none" w="med" len="med"/>
-                </a:ln>
-                <a:effectLst/>
-              </p:spPr>
-              <p:style>
-                <a:lnRef idx="2">
-                  <a:schemeClr val="accent1"/>
-                </a:lnRef>
-                <a:fillRef idx="0">
-                  <a:schemeClr val="accent1"/>
-                </a:fillRef>
-                <a:effectRef idx="1">
-                  <a:schemeClr val="accent1"/>
-                </a:effectRef>
-                <a:fontRef idx="minor">
-                  <a:schemeClr val="tx1"/>
-                </a:fontRef>
-              </p:style>
-            </p:cxnSp>
-            <p:sp>
-              <p:nvSpPr>
-                <p:cNvPr id="75" name="Right Arrow 74">
-                  <a:extLst>
-                    <a:ext uri="{FF2B5EF4-FFF2-40B4-BE49-F238E27FC236}">
-                      <a16:creationId xmlns:a16="http://schemas.microsoft.com/office/drawing/2014/main" id="{BDF705F0-4AE4-DC47-AF01-18358E2322D8}"/>
-                    </a:ext>
-                  </a:extLst>
-                </p:cNvPr>
-                <p:cNvSpPr/>
-                <p:nvPr/>
-              </p:nvSpPr>
-              <p:spPr>
-                <a:xfrm>
-                  <a:off x="4740833" y="949836"/>
-                  <a:ext cx="1168400" cy="350140"/>
-                </a:xfrm>
-                <a:prstGeom prst="rightArrow">
-                  <a:avLst>
-                    <a:gd name="adj1" fmla="val 100000"/>
-                    <a:gd name="adj2" fmla="val 52194"/>
-                  </a:avLst>
-                </a:prstGeom>
-                <a:solidFill>
-                  <a:schemeClr val="accent2"/>
-                </a:solidFill>
-                <a:ln w="38100" cap="flat" cmpd="sng" algn="ctr">
-                  <a:solidFill>
-                    <a:srgbClr val="000000"/>
-                  </a:solidFill>
-                  <a:prstDash val="solid"/>
-                  <a:round/>
-                  <a:headEnd type="none" w="med" len="med"/>
-                  <a:tailEnd type="none" w="med" len="med"/>
-                </a:ln>
-                <a:effectLst/>
-              </p:spPr>
-              <p:style>
-                <a:lnRef idx="1">
-                  <a:schemeClr val="accent1"/>
-                </a:lnRef>
-                <a:fillRef idx="3">
-                  <a:schemeClr val="accent1"/>
-                </a:fillRef>
-                <a:effectRef idx="2">
-                  <a:schemeClr val="accent1"/>
-                </a:effectRef>
-                <a:fontRef idx="minor">
-                  <a:schemeClr val="lt1"/>
-                </a:fontRef>
-              </p:style>
-              <p:txBody>
-                <a:bodyPr rtlCol="0" anchor="ctr"/>
-                <a:lstStyle/>
-                <a:p>
-                  <a:pPr algn="ctr"/>
-                  <a:endParaRPr lang="en-US" i="1" dirty="0">
-                    <a:solidFill>
-                      <a:schemeClr val="tx1"/>
-                    </a:solidFill>
-                  </a:endParaRPr>
-                </a:p>
-              </p:txBody>
-            </p:sp>
-            <p:sp>
-              <p:nvSpPr>
-                <p:cNvPr id="76" name="Chord 75">
-                  <a:extLst>
-                    <a:ext uri="{FF2B5EF4-FFF2-40B4-BE49-F238E27FC236}">
-                      <a16:creationId xmlns:a16="http://schemas.microsoft.com/office/drawing/2014/main" id="{7CCE3348-9577-1C4E-9E62-4F514D613258}"/>
-                    </a:ext>
-                  </a:extLst>
-                </p:cNvPr>
-                <p:cNvSpPr/>
-                <p:nvPr/>
-              </p:nvSpPr>
-              <p:spPr>
-                <a:xfrm>
-                  <a:off x="3734347" y="784736"/>
-                  <a:ext cx="632206" cy="632206"/>
-                </a:xfrm>
-                <a:prstGeom prst="chord">
-                  <a:avLst>
-                    <a:gd name="adj1" fmla="val 10506229"/>
-                    <a:gd name="adj2" fmla="val 301460"/>
-                  </a:avLst>
-                </a:prstGeom>
-                <a:solidFill>
-                  <a:schemeClr val="accent4">
-                    <a:lumMod val="60000"/>
-                    <a:lumOff val="40000"/>
-                  </a:schemeClr>
-                </a:solidFill>
-                <a:ln w="38100" cap="flat" cmpd="sng" algn="ctr">
-                  <a:solidFill>
-                    <a:srgbClr val="000000"/>
-                  </a:solidFill>
-                  <a:prstDash val="solid"/>
-                  <a:round/>
-                  <a:headEnd type="none" w="med" len="med"/>
-                  <a:tailEnd type="none" w="med" len="med"/>
-                </a:ln>
-                <a:effectLst/>
-              </p:spPr>
-              <p:style>
-                <a:lnRef idx="1">
-                  <a:schemeClr val="accent1"/>
-                </a:lnRef>
-                <a:fillRef idx="3">
-                  <a:schemeClr val="accent1"/>
-                </a:fillRef>
-                <a:effectRef idx="2">
-                  <a:schemeClr val="accent1"/>
-                </a:effectRef>
-                <a:fontRef idx="minor">
-                  <a:schemeClr val="lt1"/>
-                </a:fontRef>
-              </p:style>
-              <p:txBody>
-                <a:bodyPr rtlCol="0" anchor="ctr"/>
-                <a:lstStyle/>
-                <a:p>
-                  <a:pPr algn="ctr"/>
-                  <a:endParaRPr lang="en-US"/>
-                </a:p>
-              </p:txBody>
-            </p:sp>
-            <p:pic>
-              <p:nvPicPr>
-                <p:cNvPr id="77" name="Picture 76">
-                  <a:extLst>
-                    <a:ext uri="{FF2B5EF4-FFF2-40B4-BE49-F238E27FC236}">
-                      <a16:creationId xmlns:a16="http://schemas.microsoft.com/office/drawing/2014/main" id="{9698B44C-1E37-C141-AB23-3711765F5713}"/>
-                    </a:ext>
-                  </a:extLst>
-                </p:cNvPr>
-                <p:cNvPicPr>
-                  <a:picLocks noChangeAspect="1"/>
-                </p:cNvPicPr>
-                <p:nvPr/>
-              </p:nvPicPr>
-              <p:blipFill>
-                <a:blip r:embed="rId2">
-                  <a:extLst>
-                    <a:ext uri="{28A0092B-C50C-407E-A947-70E740481C1C}">
-                      <a14:useLocalDpi xmlns:a14="http://schemas.microsoft.com/office/drawing/2010/main" val="0"/>
-                    </a:ext>
-                  </a:extLst>
-                </a:blip>
-                <a:stretch>
-                  <a:fillRect/>
-                </a:stretch>
-              </p:blipFill>
-              <p:spPr>
-                <a:xfrm>
-                  <a:off x="2803319" y="413397"/>
-                  <a:ext cx="771908" cy="771908"/>
-                </a:xfrm>
-                <a:prstGeom prst="rect">
-                  <a:avLst/>
-                </a:prstGeom>
-              </p:spPr>
-            </p:pic>
-            <p:pic>
-              <p:nvPicPr>
-                <p:cNvPr id="78" name="Picture 77">
-                  <a:extLst>
-                    <a:ext uri="{FF2B5EF4-FFF2-40B4-BE49-F238E27FC236}">
-                      <a16:creationId xmlns:a16="http://schemas.microsoft.com/office/drawing/2014/main" id="{1941A220-31CD-4948-99CD-D71F4248CF8D}"/>
-                    </a:ext>
-                  </a:extLst>
-                </p:cNvPr>
-                <p:cNvPicPr>
-                  <a:picLocks noChangeAspect="1"/>
-                </p:cNvPicPr>
-                <p:nvPr/>
-              </p:nvPicPr>
-              <p:blipFill>
-                <a:blip r:embed="rId3">
-                  <a:extLst>
-                    <a:ext uri="{28A0092B-C50C-407E-A947-70E740481C1C}">
-                      <a14:useLocalDpi xmlns:a14="http://schemas.microsoft.com/office/drawing/2010/main" val="0"/>
-                    </a:ext>
-                  </a:extLst>
-                </a:blip>
-                <a:stretch>
-                  <a:fillRect/>
-                </a:stretch>
-              </p:blipFill>
-              <p:spPr>
-                <a:xfrm>
-                  <a:off x="5971536" y="499461"/>
-                  <a:ext cx="794135" cy="794135"/>
-                </a:xfrm>
-                <a:prstGeom prst="rect">
-                  <a:avLst/>
-                </a:prstGeom>
-              </p:spPr>
-            </p:pic>
-          </p:grpSp>
-          <p:grpSp>
-            <p:nvGrpSpPr>
-              <p:cNvPr id="79" name="Group 78">
-                <a:extLst>
-                  <a:ext uri="{FF2B5EF4-FFF2-40B4-BE49-F238E27FC236}">
-                    <a16:creationId xmlns:a16="http://schemas.microsoft.com/office/drawing/2014/main" id="{2DDE1AF2-9806-7E46-BFBB-00AAEED17DAD}"/>
-                  </a:ext>
-                </a:extLst>
-              </p:cNvPr>
-              <p:cNvGrpSpPr/>
-              <p:nvPr/>
-            </p:nvGrpSpPr>
-            <p:grpSpPr>
-              <a:xfrm>
-                <a:off x="6090566" y="4824434"/>
-                <a:ext cx="2737576" cy="654654"/>
-                <a:chOff x="2569133" y="413397"/>
-                <a:chExt cx="4196538" cy="1003545"/>
-              </a:xfrm>
-            </p:grpSpPr>
-            <p:cxnSp>
-              <p:nvCxnSpPr>
-                <p:cNvPr id="80" name="Straight Connector 79">
-                  <a:extLst>
-                    <a:ext uri="{FF2B5EF4-FFF2-40B4-BE49-F238E27FC236}">
-                      <a16:creationId xmlns:a16="http://schemas.microsoft.com/office/drawing/2014/main" id="{BD60FA1D-1B3C-AA49-BA54-1D501F72ABAE}"/>
-                    </a:ext>
-                  </a:extLst>
-                </p:cNvPr>
-                <p:cNvCxnSpPr/>
-                <p:nvPr/>
-              </p:nvCxnSpPr>
-              <p:spPr>
-                <a:xfrm>
-                  <a:off x="2569133" y="1140336"/>
-                  <a:ext cx="4191000" cy="0"/>
-                </a:xfrm>
-                <a:prstGeom prst="line">
-                  <a:avLst/>
-                </a:prstGeom>
-                <a:ln w="38100" cap="flat" cmpd="sng" algn="ctr">
-                  <a:solidFill>
-                    <a:srgbClr val="000000"/>
-                  </a:solidFill>
-                  <a:prstDash val="solid"/>
-                  <a:round/>
-                  <a:headEnd type="none" w="med" len="med"/>
-                  <a:tailEnd type="none" w="med" len="med"/>
-                </a:ln>
-                <a:effectLst/>
-              </p:spPr>
-              <p:style>
-                <a:lnRef idx="2">
-                  <a:schemeClr val="accent1"/>
-                </a:lnRef>
-                <a:fillRef idx="0">
-                  <a:schemeClr val="accent1"/>
-                </a:fillRef>
-                <a:effectRef idx="1">
-                  <a:schemeClr val="accent1"/>
-                </a:effectRef>
-                <a:fontRef idx="minor">
-                  <a:schemeClr val="tx1"/>
-                </a:fontRef>
-              </p:style>
-            </p:cxnSp>
-            <p:sp>
-              <p:nvSpPr>
-                <p:cNvPr id="81" name="Right Arrow 80">
-                  <a:extLst>
-                    <a:ext uri="{FF2B5EF4-FFF2-40B4-BE49-F238E27FC236}">
-                      <a16:creationId xmlns:a16="http://schemas.microsoft.com/office/drawing/2014/main" id="{2B940532-E581-C74E-9CE5-F7F3680AC657}"/>
-                    </a:ext>
-                  </a:extLst>
-                </p:cNvPr>
-                <p:cNvSpPr/>
-                <p:nvPr/>
-              </p:nvSpPr>
-              <p:spPr>
-                <a:xfrm>
-                  <a:off x="4740833" y="949836"/>
-                  <a:ext cx="1168400" cy="350140"/>
-                </a:xfrm>
-                <a:prstGeom prst="rightArrow">
-                  <a:avLst>
-                    <a:gd name="adj1" fmla="val 100000"/>
-                    <a:gd name="adj2" fmla="val 52194"/>
-                  </a:avLst>
-                </a:prstGeom>
-                <a:solidFill>
-                  <a:srgbClr val="92D050"/>
-                </a:solidFill>
-                <a:ln w="38100" cap="flat" cmpd="sng" algn="ctr">
-                  <a:solidFill>
-                    <a:srgbClr val="000000"/>
-                  </a:solidFill>
-                  <a:prstDash val="solid"/>
-                  <a:round/>
-                  <a:headEnd type="none" w="med" len="med"/>
-                  <a:tailEnd type="none" w="med" len="med"/>
-                </a:ln>
-                <a:effectLst/>
-              </p:spPr>
-              <p:style>
-                <a:lnRef idx="1">
-                  <a:schemeClr val="accent1"/>
-                </a:lnRef>
-                <a:fillRef idx="3">
-                  <a:schemeClr val="accent1"/>
-                </a:fillRef>
-                <a:effectRef idx="2">
-                  <a:schemeClr val="accent1"/>
-                </a:effectRef>
-                <a:fontRef idx="minor">
-                  <a:schemeClr val="lt1"/>
-                </a:fontRef>
-              </p:style>
-              <p:txBody>
-                <a:bodyPr rtlCol="0" anchor="ctr"/>
-                <a:lstStyle/>
-                <a:p>
-                  <a:pPr algn="ctr"/>
-                  <a:endParaRPr lang="en-US" i="1" dirty="0">
-                    <a:solidFill>
-                      <a:schemeClr val="tx1"/>
-                    </a:solidFill>
-                  </a:endParaRPr>
-                </a:p>
-              </p:txBody>
-            </p:sp>
-            <p:sp>
-              <p:nvSpPr>
-                <p:cNvPr id="82" name="Chord 81">
-                  <a:extLst>
-                    <a:ext uri="{FF2B5EF4-FFF2-40B4-BE49-F238E27FC236}">
-                      <a16:creationId xmlns:a16="http://schemas.microsoft.com/office/drawing/2014/main" id="{6AACAC5A-D73E-9746-B87C-1A286AECB728}"/>
-                    </a:ext>
-                  </a:extLst>
-                </p:cNvPr>
-                <p:cNvSpPr/>
-                <p:nvPr/>
-              </p:nvSpPr>
-              <p:spPr>
-                <a:xfrm>
-                  <a:off x="3734347" y="784736"/>
-                  <a:ext cx="632206" cy="632206"/>
-                </a:xfrm>
-                <a:prstGeom prst="chord">
-                  <a:avLst>
-                    <a:gd name="adj1" fmla="val 10506229"/>
-                    <a:gd name="adj2" fmla="val 301460"/>
-                  </a:avLst>
-                </a:prstGeom>
-                <a:solidFill>
-                  <a:schemeClr val="accent4">
-                    <a:lumMod val="60000"/>
-                    <a:lumOff val="40000"/>
-                  </a:schemeClr>
-                </a:solidFill>
-                <a:ln w="38100" cap="flat" cmpd="sng" algn="ctr">
-                  <a:solidFill>
-                    <a:srgbClr val="000000"/>
-                  </a:solidFill>
-                  <a:prstDash val="solid"/>
-                  <a:round/>
-                  <a:headEnd type="none" w="med" len="med"/>
-                  <a:tailEnd type="none" w="med" len="med"/>
-                </a:ln>
-                <a:effectLst/>
-              </p:spPr>
-              <p:style>
-                <a:lnRef idx="1">
-                  <a:schemeClr val="accent1"/>
-                </a:lnRef>
-                <a:fillRef idx="3">
-                  <a:schemeClr val="accent1"/>
-                </a:fillRef>
-                <a:effectRef idx="2">
-                  <a:schemeClr val="accent1"/>
-                </a:effectRef>
-                <a:fontRef idx="minor">
-                  <a:schemeClr val="lt1"/>
-                </a:fontRef>
-              </p:style>
-              <p:txBody>
-                <a:bodyPr rtlCol="0" anchor="ctr"/>
-                <a:lstStyle/>
-                <a:p>
-                  <a:pPr algn="ctr"/>
-                  <a:endParaRPr lang="en-US"/>
-                </a:p>
-              </p:txBody>
-            </p:sp>
-            <p:pic>
-              <p:nvPicPr>
-                <p:cNvPr id="83" name="Picture 82">
-                  <a:extLst>
-                    <a:ext uri="{FF2B5EF4-FFF2-40B4-BE49-F238E27FC236}">
-                      <a16:creationId xmlns:a16="http://schemas.microsoft.com/office/drawing/2014/main" id="{60D12CB5-5EDE-BE4A-9237-087769FDD24A}"/>
-                    </a:ext>
-                  </a:extLst>
-                </p:cNvPr>
-                <p:cNvPicPr>
-                  <a:picLocks noChangeAspect="1"/>
-                </p:cNvPicPr>
-                <p:nvPr/>
-              </p:nvPicPr>
-              <p:blipFill>
-                <a:blip r:embed="rId2">
-                  <a:extLst>
-                    <a:ext uri="{28A0092B-C50C-407E-A947-70E740481C1C}">
-                      <a14:useLocalDpi xmlns:a14="http://schemas.microsoft.com/office/drawing/2010/main" val="0"/>
-                    </a:ext>
-                  </a:extLst>
-                </a:blip>
-                <a:stretch>
-                  <a:fillRect/>
-                </a:stretch>
-              </p:blipFill>
-              <p:spPr>
-                <a:xfrm>
-                  <a:off x="2803319" y="413397"/>
-                  <a:ext cx="771908" cy="771908"/>
-                </a:xfrm>
-                <a:prstGeom prst="rect">
-                  <a:avLst/>
-                </a:prstGeom>
-              </p:spPr>
-            </p:pic>
-            <p:pic>
-              <p:nvPicPr>
-                <p:cNvPr id="84" name="Picture 83">
-                  <a:extLst>
-                    <a:ext uri="{FF2B5EF4-FFF2-40B4-BE49-F238E27FC236}">
-                      <a16:creationId xmlns:a16="http://schemas.microsoft.com/office/drawing/2014/main" id="{9A1B1092-C54A-ED4F-B615-8A848BC4257F}"/>
-                    </a:ext>
-                  </a:extLst>
-                </p:cNvPr>
-                <p:cNvPicPr>
-                  <a:picLocks noChangeAspect="1"/>
-                </p:cNvPicPr>
-                <p:nvPr/>
-              </p:nvPicPr>
-              <p:blipFill>
-                <a:blip r:embed="rId3">
-                  <a:extLst>
-                    <a:ext uri="{28A0092B-C50C-407E-A947-70E740481C1C}">
-                      <a14:useLocalDpi xmlns:a14="http://schemas.microsoft.com/office/drawing/2010/main" val="0"/>
-                    </a:ext>
-                  </a:extLst>
-                </a:blip>
-                <a:stretch>
-                  <a:fillRect/>
-                </a:stretch>
-              </p:blipFill>
-              <p:spPr>
-                <a:xfrm>
-                  <a:off x="5971536" y="499461"/>
-                  <a:ext cx="794135" cy="794135"/>
-                </a:xfrm>
-                <a:prstGeom prst="rect">
-                  <a:avLst/>
-                </a:prstGeom>
-              </p:spPr>
-            </p:pic>
-          </p:grpSp>
-          <p:sp>
-            <p:nvSpPr>
-              <p:cNvPr id="88" name="Oval 87">
-                <a:extLst>
-                  <a:ext uri="{FF2B5EF4-FFF2-40B4-BE49-F238E27FC236}">
-                    <a16:creationId xmlns:a16="http://schemas.microsoft.com/office/drawing/2014/main" id="{F7D99580-F1FD-8A41-9B7A-5099649EC14D}"/>
-                  </a:ext>
-                </a:extLst>
-              </p:cNvPr>
-              <p:cNvSpPr/>
-              <p:nvPr/>
-            </p:nvSpPr>
-            <p:spPr>
-              <a:xfrm>
-                <a:off x="5655566" y="3905325"/>
-                <a:ext cx="267544" cy="267544"/>
-              </a:xfrm>
-              <a:prstGeom prst="ellipse">
-                <a:avLst/>
-              </a:prstGeom>
-              <a:ln>
-                <a:solidFill>
-                  <a:schemeClr val="tx1"/>
-                </a:solidFill>
-              </a:ln>
-            </p:spPr>
-            <p:style>
-              <a:lnRef idx="2">
-                <a:schemeClr val="accent5"/>
-              </a:lnRef>
-              <a:fillRef idx="1">
-                <a:schemeClr val="lt1"/>
-              </a:fillRef>
-              <a:effectRef idx="0">
-                <a:schemeClr val="accent5"/>
-              </a:effectRef>
-              <a:fontRef idx="minor">
-                <a:schemeClr val="dk1"/>
-              </a:fontRef>
-            </p:style>
-            <p:txBody>
-              <a:bodyPr rtlCol="0" anchor="ctr"/>
-              <a:lstStyle/>
-              <a:p>
-                <a:pPr algn="ctr"/>
-                <a:endParaRPr lang="en-US"/>
-              </a:p>
-            </p:txBody>
-          </p:sp>
-          <p:cxnSp>
-            <p:nvCxnSpPr>
-              <p:cNvPr id="103" name="Straight Connector 102">
-                <a:extLst>
-                  <a:ext uri="{FF2B5EF4-FFF2-40B4-BE49-F238E27FC236}">
-                    <a16:creationId xmlns:a16="http://schemas.microsoft.com/office/drawing/2014/main" id="{D4F878BF-EB4B-054F-B897-9B341D431630}"/>
-                  </a:ext>
-                </a:extLst>
-              </p:cNvPr>
-              <p:cNvCxnSpPr/>
-              <p:nvPr/>
-            </p:nvCxnSpPr>
-            <p:spPr>
-              <a:xfrm>
-                <a:off x="5692992" y="4527978"/>
-                <a:ext cx="190500" cy="0"/>
-              </a:xfrm>
-              <a:prstGeom prst="line">
-                <a:avLst/>
-              </a:prstGeom>
-              <a:ln>
-                <a:solidFill>
-                  <a:srgbClr val="FF0000"/>
-                </a:solidFill>
-              </a:ln>
-              <a:effectLst/>
-            </p:spPr>
-            <p:style>
-              <a:lnRef idx="2">
-                <a:schemeClr val="accent1"/>
-              </a:lnRef>
-              <a:fillRef idx="0">
-                <a:schemeClr val="accent1"/>
-              </a:fillRef>
-              <a:effectRef idx="1">
-                <a:schemeClr val="accent1"/>
-              </a:effectRef>
-              <a:fontRef idx="minor">
-                <a:schemeClr val="tx1"/>
-              </a:fontRef>
-            </p:style>
-          </p:cxnSp>
-          <p:cxnSp>
-            <p:nvCxnSpPr>
-              <p:cNvPr id="104" name="Straight Connector 103">
-                <a:extLst>
-                  <a:ext uri="{FF2B5EF4-FFF2-40B4-BE49-F238E27FC236}">
-                    <a16:creationId xmlns:a16="http://schemas.microsoft.com/office/drawing/2014/main" id="{E51B134A-D585-5843-B4DF-D1F9B6E31581}"/>
-                  </a:ext>
-                </a:extLst>
-              </p:cNvPr>
-              <p:cNvCxnSpPr>
-                <a:cxnSpLocks/>
-              </p:cNvCxnSpPr>
-              <p:nvPr/>
-            </p:nvCxnSpPr>
-            <p:spPr>
-              <a:xfrm flipV="1">
-                <a:off x="5789261" y="4189053"/>
-                <a:ext cx="0" cy="338925"/>
-              </a:xfrm>
-              <a:prstGeom prst="line">
-                <a:avLst/>
-              </a:prstGeom>
-              <a:ln>
-                <a:solidFill>
-                  <a:srgbClr val="FF0000"/>
-                </a:solidFill>
-              </a:ln>
-              <a:effectLst/>
-            </p:spPr>
-            <p:style>
-              <a:lnRef idx="2">
-                <a:schemeClr val="accent1"/>
-              </a:lnRef>
-              <a:fillRef idx="0">
-                <a:schemeClr val="accent1"/>
-              </a:fillRef>
-              <a:effectRef idx="1">
-                <a:schemeClr val="accent1"/>
-              </a:effectRef>
-              <a:fontRef idx="minor">
-                <a:schemeClr val="tx1"/>
-              </a:fontRef>
-            </p:style>
-          </p:cxnSp>
-        </p:grpSp>
-        <p:sp>
-          <p:nvSpPr>
-            <p:cNvPr id="7" name="TextBox 6">
-              <a:extLst>
-                <a:ext uri="{FF2B5EF4-FFF2-40B4-BE49-F238E27FC236}">
-                  <a16:creationId xmlns:a16="http://schemas.microsoft.com/office/drawing/2014/main" id="{D0A5E6CD-3801-E14E-9594-D0DF47C96191}"/>
-                </a:ext>
-              </a:extLst>
-            </p:cNvPr>
-            <p:cNvSpPr txBox="1"/>
-            <p:nvPr/>
-          </p:nvSpPr>
-          <p:spPr>
-            <a:xfrm>
-              <a:off x="5775606" y="4117545"/>
-              <a:ext cx="375424" cy="369332"/>
-            </a:xfrm>
-            <a:prstGeom prst="rect">
-              <a:avLst/>
-            </a:prstGeom>
-            <a:noFill/>
-          </p:spPr>
-          <p:txBody>
-            <a:bodyPr wrap="none" rtlCol="0">
-              <a:spAutoFit/>
-            </a:bodyPr>
-            <a:lstStyle/>
-            <a:p>
-              <a:r>
-                <a:rPr lang="en-US" i="1" dirty="0"/>
-                <a:t>E</a:t>
-              </a:r>
-              <a:r>
-                <a:rPr lang="en-US" i="1" baseline="-25000" dirty="0"/>
-                <a:t>1</a:t>
-              </a:r>
-            </a:p>
-          </p:txBody>
-        </p:sp>
-        <p:sp>
-          <p:nvSpPr>
-            <p:cNvPr id="47" name="TextBox 46">
-              <a:extLst>
-                <a:ext uri="{FF2B5EF4-FFF2-40B4-BE49-F238E27FC236}">
-                  <a16:creationId xmlns:a16="http://schemas.microsoft.com/office/drawing/2014/main" id="{30639A7A-7763-4D4E-9173-31BF7D08022B}"/>
-                </a:ext>
-              </a:extLst>
-            </p:cNvPr>
-            <p:cNvSpPr txBox="1"/>
-            <p:nvPr/>
-          </p:nvSpPr>
-          <p:spPr>
-            <a:xfrm>
-              <a:off x="5026856" y="4256694"/>
-              <a:ext cx="375424" cy="369332"/>
-            </a:xfrm>
-            <a:prstGeom prst="rect">
-              <a:avLst/>
-            </a:prstGeom>
-            <a:noFill/>
-          </p:spPr>
-          <p:txBody>
-            <a:bodyPr wrap="none" rtlCol="0">
-              <a:spAutoFit/>
-            </a:bodyPr>
-            <a:lstStyle/>
-            <a:p>
-              <a:r>
-                <a:rPr lang="en-US" i="1" dirty="0"/>
-                <a:t>E</a:t>
-              </a:r>
-              <a:r>
-                <a:rPr lang="en-US" i="1" baseline="-25000" dirty="0"/>
-                <a:t>2</a:t>
-              </a:r>
-            </a:p>
-          </p:txBody>
-        </p:sp>
-      </p:grpSp>
-      <p:grpSp>
-        <p:nvGrpSpPr>
-          <p:cNvPr id="8" name="Group 7">
-            <a:extLst>
-              <a:ext uri="{FF2B5EF4-FFF2-40B4-BE49-F238E27FC236}">
-                <a16:creationId xmlns:a16="http://schemas.microsoft.com/office/drawing/2014/main" id="{94C230F7-7495-9745-A832-E7649A863BED}"/>
-              </a:ext>
-            </a:extLst>
-          </p:cNvPr>
-          <p:cNvGrpSpPr/>
-          <p:nvPr/>
-        </p:nvGrpSpPr>
-        <p:grpSpPr>
-          <a:xfrm>
-            <a:off x="3288975" y="1510302"/>
-            <a:ext cx="5578708" cy="1666229"/>
-            <a:chOff x="3288975" y="1510302"/>
-            <a:chExt cx="5578708" cy="1666229"/>
-          </a:xfrm>
-        </p:grpSpPr>
-        <p:cxnSp>
-          <p:nvCxnSpPr>
-            <p:cNvPr id="99" name="Straight Arrow Connector 5">
-              <a:extLst>
-                <a:ext uri="{FF2B5EF4-FFF2-40B4-BE49-F238E27FC236}">
-                  <a16:creationId xmlns:a16="http://schemas.microsoft.com/office/drawing/2014/main" id="{AC10A760-BF4D-DB4A-9E3F-70C1A6C16040}"/>
+                  <a16:creationId xmlns:a16="http://schemas.microsoft.com/office/drawing/2014/main" id="{1A5D0C48-FBBB-9847-A312-7FEB2C3A7817}"/>
                 </a:ext>
               </a:extLst>
             </p:cNvPr>
             <p:cNvCxnSpPr>
               <a:cxnSpLocks/>
-              <a:stCxn id="41" idx="6"/>
-              <a:endCxn id="97" idx="0"/>
+              <a:endCxn id="83" idx="0"/>
             </p:cNvCxnSpPr>
             <p:nvPr/>
           </p:nvCxnSpPr>
           <p:spPr>
-            <a:xfrm>
-              <a:off x="6077314" y="2305175"/>
-              <a:ext cx="457336" cy="216702"/>
+            <a:xfrm flipV="1">
+              <a:off x="5056103" y="4824434"/>
+              <a:ext cx="1439006" cy="343873"/>
             </a:xfrm>
-            <a:prstGeom prst="bentConnector2">
-              <a:avLst/>
+            <a:prstGeom prst="bentConnector4">
+              <a:avLst>
+                <a:gd name="adj1" fmla="val 20"/>
+                <a:gd name="adj2" fmla="val 166478"/>
+              </a:avLst>
             </a:prstGeom>
             <a:ln>
               <a:solidFill>
@@ -20996,13 +20119,19 @@
         </p:cxnSp>
         <p:cxnSp>
           <p:nvCxnSpPr>
-            <p:cNvPr id="39" name="Straight Connector 38"/>
+            <p:cNvPr id="71" name="Straight Connector 70">
+              <a:extLst>
+                <a:ext uri="{FF2B5EF4-FFF2-40B4-BE49-F238E27FC236}">
+                  <a16:creationId xmlns:a16="http://schemas.microsoft.com/office/drawing/2014/main" id="{C1C87CE1-47B8-ED49-AAAC-6CD543382B0F}"/>
+                </a:ext>
+              </a:extLst>
+            </p:cNvPr>
             <p:cNvCxnSpPr/>
             <p:nvPr/>
           </p:nvCxnSpPr>
           <p:spPr>
             <a:xfrm>
-              <a:off x="6439400" y="2522722"/>
+              <a:off x="6399859" y="4825279"/>
               <a:ext cx="190500" cy="0"/>
             </a:xfrm>
             <a:prstGeom prst="line">
@@ -21032,10 +20161,10 @@
         </p:cxnSp>
         <p:grpSp>
           <p:nvGrpSpPr>
-            <p:cNvPr id="61" name="Group 60">
+            <p:cNvPr id="73" name="Group 72">
               <a:extLst>
                 <a:ext uri="{FF2B5EF4-FFF2-40B4-BE49-F238E27FC236}">
-                  <a16:creationId xmlns:a16="http://schemas.microsoft.com/office/drawing/2014/main" id="{5F0A003D-F3D5-BE4D-98A5-E28807500151}"/>
+                  <a16:creationId xmlns:a16="http://schemas.microsoft.com/office/drawing/2014/main" id="{BAA87CFC-0B57-E547-88AF-6FB2FE2A2A89}"/>
                 </a:ext>
               </a:extLst>
             </p:cNvPr>
@@ -21044,7 +20173,7 @@
           </p:nvGrpSpPr>
           <p:grpSpPr>
             <a:xfrm>
-              <a:off x="3288975" y="2521877"/>
+              <a:off x="3249434" y="4824434"/>
               <a:ext cx="2737576" cy="654654"/>
               <a:chOff x="2569133" y="413397"/>
               <a:chExt cx="4196538" cy="1003545"/>
@@ -21052,10 +20181,10 @@
           </p:grpSpPr>
           <p:cxnSp>
             <p:nvCxnSpPr>
-              <p:cNvPr id="62" name="Straight Connector 61">
+              <p:cNvPr id="74" name="Straight Connector 73">
                 <a:extLst>
                   <a:ext uri="{FF2B5EF4-FFF2-40B4-BE49-F238E27FC236}">
-                    <a16:creationId xmlns:a16="http://schemas.microsoft.com/office/drawing/2014/main" id="{0C636ACD-E0DD-D742-BD04-B2971D284046}"/>
+                    <a16:creationId xmlns:a16="http://schemas.microsoft.com/office/drawing/2014/main" id="{D7E9C9ED-7435-B44D-901D-0207BED45EBA}"/>
                   </a:ext>
                 </a:extLst>
               </p:cNvPr>
@@ -21098,10 +20227,10 @@
           </p:cxnSp>
           <p:sp>
             <p:nvSpPr>
-              <p:cNvPr id="89" name="Right Arrow 88">
+              <p:cNvPr id="75" name="Right Arrow 74">
                 <a:extLst>
                   <a:ext uri="{FF2B5EF4-FFF2-40B4-BE49-F238E27FC236}">
-                    <a16:creationId xmlns:a16="http://schemas.microsoft.com/office/drawing/2014/main" id="{FC66DEAD-CBAB-6147-969A-1D54C4F7643B}"/>
+                    <a16:creationId xmlns:a16="http://schemas.microsoft.com/office/drawing/2014/main" id="{BDF705F0-4AE4-DC47-AF01-18358E2322D8}"/>
                   </a:ext>
                 </a:extLst>
               </p:cNvPr>
@@ -21162,10 +20291,10 @@
           </p:sp>
           <p:sp>
             <p:nvSpPr>
-              <p:cNvPr id="90" name="Chord 89">
+              <p:cNvPr id="76" name="Chord 75">
                 <a:extLst>
                   <a:ext uri="{FF2B5EF4-FFF2-40B4-BE49-F238E27FC236}">
-                    <a16:creationId xmlns:a16="http://schemas.microsoft.com/office/drawing/2014/main" id="{F8E252DC-2D99-2F4B-B8AD-22AF82DA93BC}"/>
+                    <a16:creationId xmlns:a16="http://schemas.microsoft.com/office/drawing/2014/main" id="{7CCE3348-9577-1C4E-9E62-4F514D613258}"/>
                   </a:ext>
                 </a:extLst>
               </p:cNvPr>
@@ -21225,10 +20354,10 @@
           </p:sp>
           <p:pic>
             <p:nvPicPr>
-              <p:cNvPr id="91" name="Picture 90">
+              <p:cNvPr id="77" name="Picture 76">
                 <a:extLst>
                   <a:ext uri="{FF2B5EF4-FFF2-40B4-BE49-F238E27FC236}">
-                    <a16:creationId xmlns:a16="http://schemas.microsoft.com/office/drawing/2014/main" id="{0DC979EE-EBE8-BD4E-B309-79F868E205FC}"/>
+                    <a16:creationId xmlns:a16="http://schemas.microsoft.com/office/drawing/2014/main" id="{9698B44C-1E37-C141-AB23-3711765F5713}"/>
                   </a:ext>
                 </a:extLst>
               </p:cNvPr>
@@ -21261,10 +20390,10 @@
           </p:pic>
           <p:pic>
             <p:nvPicPr>
-              <p:cNvPr id="92" name="Picture 91">
+              <p:cNvPr id="78" name="Picture 77">
                 <a:extLst>
                   <a:ext uri="{FF2B5EF4-FFF2-40B4-BE49-F238E27FC236}">
-                    <a16:creationId xmlns:a16="http://schemas.microsoft.com/office/drawing/2014/main" id="{856B719D-280C-694D-BF91-6EF2371F280E}"/>
+                    <a16:creationId xmlns:a16="http://schemas.microsoft.com/office/drawing/2014/main" id="{1941A220-31CD-4948-99CD-D71F4248CF8D}"/>
                   </a:ext>
                 </a:extLst>
               </p:cNvPr>
@@ -21298,10 +20427,10 @@
         </p:grpSp>
         <p:grpSp>
           <p:nvGrpSpPr>
-            <p:cNvPr id="93" name="Group 92">
+            <p:cNvPr id="79" name="Group 78">
               <a:extLst>
                 <a:ext uri="{FF2B5EF4-FFF2-40B4-BE49-F238E27FC236}">
-                  <a16:creationId xmlns:a16="http://schemas.microsoft.com/office/drawing/2014/main" id="{F6D9AAC4-C17D-AA44-8CBA-DF73264BB433}"/>
+                  <a16:creationId xmlns:a16="http://schemas.microsoft.com/office/drawing/2014/main" id="{2DDE1AF2-9806-7E46-BFBB-00AAEED17DAD}"/>
                 </a:ext>
               </a:extLst>
             </p:cNvPr>
@@ -21310,7 +20439,7 @@
           </p:nvGrpSpPr>
           <p:grpSpPr>
             <a:xfrm>
-              <a:off x="6130107" y="2521877"/>
+              <a:off x="6090566" y="4824434"/>
               <a:ext cx="2737576" cy="654654"/>
               <a:chOff x="2569133" y="413397"/>
               <a:chExt cx="4196538" cy="1003545"/>
@@ -21318,10 +20447,10 @@
           </p:grpSpPr>
           <p:cxnSp>
             <p:nvCxnSpPr>
-              <p:cNvPr id="94" name="Straight Connector 93">
+              <p:cNvPr id="80" name="Straight Connector 79">
                 <a:extLst>
                   <a:ext uri="{FF2B5EF4-FFF2-40B4-BE49-F238E27FC236}">
-                    <a16:creationId xmlns:a16="http://schemas.microsoft.com/office/drawing/2014/main" id="{AC6E8ADE-C851-B34F-B92B-8A7DB23E7D9A}"/>
+                    <a16:creationId xmlns:a16="http://schemas.microsoft.com/office/drawing/2014/main" id="{BD60FA1D-1B3C-AA49-BA54-1D501F72ABAE}"/>
                   </a:ext>
                 </a:extLst>
               </p:cNvPr>
@@ -21364,10 +20493,10 @@
           </p:cxnSp>
           <p:sp>
             <p:nvSpPr>
-              <p:cNvPr id="95" name="Right Arrow 94">
+              <p:cNvPr id="81" name="Right Arrow 80">
                 <a:extLst>
                   <a:ext uri="{FF2B5EF4-FFF2-40B4-BE49-F238E27FC236}">
-                    <a16:creationId xmlns:a16="http://schemas.microsoft.com/office/drawing/2014/main" id="{833F9E49-A69A-AD49-8120-EB62256129F7}"/>
+                    <a16:creationId xmlns:a16="http://schemas.microsoft.com/office/drawing/2014/main" id="{2B940532-E581-C74E-9CE5-F7F3680AC657}"/>
                   </a:ext>
                 </a:extLst>
               </p:cNvPr>
@@ -21428,10 +20557,10 @@
           </p:sp>
           <p:sp>
             <p:nvSpPr>
-              <p:cNvPr id="96" name="Chord 95">
+              <p:cNvPr id="82" name="Chord 81">
                 <a:extLst>
                   <a:ext uri="{FF2B5EF4-FFF2-40B4-BE49-F238E27FC236}">
-                    <a16:creationId xmlns:a16="http://schemas.microsoft.com/office/drawing/2014/main" id="{6B1CA32C-D843-1144-9420-E4F443DCF975}"/>
+                    <a16:creationId xmlns:a16="http://schemas.microsoft.com/office/drawing/2014/main" id="{6AACAC5A-D73E-9746-B87C-1A286AECB728}"/>
                   </a:ext>
                 </a:extLst>
               </p:cNvPr>
@@ -21491,10 +20620,10 @@
           </p:sp>
           <p:pic>
             <p:nvPicPr>
-              <p:cNvPr id="97" name="Picture 96">
+              <p:cNvPr id="83" name="Picture 82">
                 <a:extLst>
                   <a:ext uri="{FF2B5EF4-FFF2-40B4-BE49-F238E27FC236}">
-                    <a16:creationId xmlns:a16="http://schemas.microsoft.com/office/drawing/2014/main" id="{8C5AB0E7-D26A-0447-BEF7-384CB5219E43}"/>
+                    <a16:creationId xmlns:a16="http://schemas.microsoft.com/office/drawing/2014/main" id="{60D12CB5-5EDE-BE4A-9237-087769FDD24A}"/>
                   </a:ext>
                 </a:extLst>
               </p:cNvPr>
@@ -21527,10 +20656,10 @@
           </p:pic>
           <p:pic>
             <p:nvPicPr>
-              <p:cNvPr id="98" name="Picture 97">
+              <p:cNvPr id="84" name="Picture 83">
                 <a:extLst>
                   <a:ext uri="{FF2B5EF4-FFF2-40B4-BE49-F238E27FC236}">
-                    <a16:creationId xmlns:a16="http://schemas.microsoft.com/office/drawing/2014/main" id="{90AA2553-9805-624A-991C-B6E0FA5CB9C4}"/>
+                    <a16:creationId xmlns:a16="http://schemas.microsoft.com/office/drawing/2014/main" id="{9A1B1092-C54A-ED4F-B615-8A848BC4257F}"/>
                   </a:ext>
                 </a:extLst>
               </p:cNvPr>
@@ -21562,99 +20691,12 @@
             </p:spPr>
           </p:pic>
         </p:grpSp>
-        <p:cxnSp>
-          <p:nvCxnSpPr>
-            <p:cNvPr id="101" name="Straight Connector 100">
+        <p:sp>
+          <p:nvSpPr>
+            <p:cNvPr id="88" name="Oval 87">
               <a:extLst>
                 <a:ext uri="{FF2B5EF4-FFF2-40B4-BE49-F238E27FC236}">
-                  <a16:creationId xmlns:a16="http://schemas.microsoft.com/office/drawing/2014/main" id="{89BFA907-19F1-D146-8C17-5F145C3D6AEF}"/>
-                </a:ext>
-              </a:extLst>
-            </p:cNvPr>
-            <p:cNvCxnSpPr/>
-            <p:nvPr/>
-          </p:nvCxnSpPr>
-          <p:spPr>
-            <a:xfrm>
-              <a:off x="5732610" y="2116771"/>
-              <a:ext cx="190500" cy="0"/>
-            </a:xfrm>
-            <a:prstGeom prst="line">
-              <a:avLst/>
-            </a:prstGeom>
-            <a:ln>
-              <a:solidFill>
-                <a:srgbClr val="FF0000"/>
-              </a:solidFill>
-            </a:ln>
-            <a:effectLst/>
-          </p:spPr>
-          <p:style>
-            <a:lnRef idx="2">
-              <a:schemeClr val="accent1"/>
-            </a:lnRef>
-            <a:fillRef idx="0">
-              <a:schemeClr val="accent1"/>
-            </a:fillRef>
-            <a:effectRef idx="1">
-              <a:schemeClr val="accent1"/>
-            </a:effectRef>
-            <a:fontRef idx="minor">
-              <a:schemeClr val="tx1"/>
-            </a:fontRef>
-          </p:style>
-        </p:cxnSp>
-        <p:cxnSp>
-          <p:nvCxnSpPr>
-            <p:cNvPr id="102" name="Straight Connector 101">
-              <a:extLst>
-                <a:ext uri="{FF2B5EF4-FFF2-40B4-BE49-F238E27FC236}">
-                  <a16:creationId xmlns:a16="http://schemas.microsoft.com/office/drawing/2014/main" id="{007166F7-A8B7-974F-9C9B-DD2A93123A14}"/>
-                </a:ext>
-              </a:extLst>
-            </p:cNvPr>
-            <p:cNvCxnSpPr>
-              <a:cxnSpLocks/>
-              <a:endCxn id="6" idx="4"/>
-            </p:cNvCxnSpPr>
-            <p:nvPr/>
-          </p:nvCxnSpPr>
-          <p:spPr>
-            <a:xfrm flipV="1">
-              <a:off x="5828879" y="1777846"/>
-              <a:ext cx="0" cy="338925"/>
-            </a:xfrm>
-            <a:prstGeom prst="line">
-              <a:avLst/>
-            </a:prstGeom>
-            <a:ln>
-              <a:solidFill>
-                <a:srgbClr val="FF0000"/>
-              </a:solidFill>
-            </a:ln>
-            <a:effectLst/>
-          </p:spPr>
-          <p:style>
-            <a:lnRef idx="2">
-              <a:schemeClr val="accent1"/>
-            </a:lnRef>
-            <a:fillRef idx="0">
-              <a:schemeClr val="accent1"/>
-            </a:fillRef>
-            <a:effectRef idx="1">
-              <a:schemeClr val="accent1"/>
-            </a:effectRef>
-            <a:fontRef idx="minor">
-              <a:schemeClr val="tx1"/>
-            </a:fontRef>
-          </p:style>
-        </p:cxnSp>
-        <p:sp>
-          <p:nvSpPr>
-            <p:cNvPr id="6" name="Oval 5">
-              <a:extLst>
-                <a:ext uri="{FF2B5EF4-FFF2-40B4-BE49-F238E27FC236}">
-                  <a16:creationId xmlns:a16="http://schemas.microsoft.com/office/drawing/2014/main" id="{8701D4BB-511F-8345-A217-D91C581EB75D}"/>
+                  <a16:creationId xmlns:a16="http://schemas.microsoft.com/office/drawing/2014/main" id="{F7D99580-F1FD-8A41-9B7A-5099649EC14D}"/>
                 </a:ext>
               </a:extLst>
             </p:cNvPr>
@@ -21663,57 +20705,8 @@
           </p:nvSpPr>
           <p:spPr>
             <a:xfrm>
-              <a:off x="5695107" y="1510302"/>
+              <a:off x="5655566" y="3905325"/>
               <a:ext cx="267544" cy="267544"/>
-            </a:xfrm>
-            <a:prstGeom prst="ellipse">
-              <a:avLst/>
-            </a:prstGeom>
-            <a:ln>
-              <a:solidFill>
-                <a:schemeClr val="tx1"/>
-              </a:solidFill>
-            </a:ln>
-          </p:spPr>
-          <p:style>
-            <a:lnRef idx="2">
-              <a:schemeClr val="accent5"/>
-            </a:lnRef>
-            <a:fillRef idx="1">
-              <a:schemeClr val="lt1"/>
-            </a:fillRef>
-            <a:effectRef idx="0">
-              <a:schemeClr val="accent5"/>
-            </a:effectRef>
-            <a:fontRef idx="minor">
-              <a:schemeClr val="dk1"/>
-            </a:fontRef>
-          </p:style>
-          <p:txBody>
-            <a:bodyPr rtlCol="0" anchor="ctr"/>
-            <a:lstStyle/>
-            <a:p>
-              <a:pPr algn="ctr"/>
-              <a:endParaRPr lang="en-US"/>
-            </a:p>
-          </p:txBody>
-        </p:sp>
-        <p:sp>
-          <p:nvSpPr>
-            <p:cNvPr id="41" name="Oval 40">
-              <a:extLst>
-                <a:ext uri="{FF2B5EF4-FFF2-40B4-BE49-F238E27FC236}">
-                  <a16:creationId xmlns:a16="http://schemas.microsoft.com/office/drawing/2014/main" id="{A7236B26-82F0-4C49-8638-77391EC30AD4}"/>
-                </a:ext>
-              </a:extLst>
-            </p:cNvPr>
-            <p:cNvSpPr/>
-            <p:nvPr/>
-          </p:nvSpPr>
-          <p:spPr>
-            <a:xfrm>
-              <a:off x="5580962" y="2180941"/>
-              <a:ext cx="496352" cy="248467"/>
             </a:xfrm>
             <a:prstGeom prst="ellipse">
               <a:avLst/>
@@ -21749,33 +20742,28 @@
         </p:sp>
         <p:cxnSp>
           <p:nvCxnSpPr>
-            <p:cNvPr id="42" name="Straight Arrow Connector 5">
+            <p:cNvPr id="103" name="Straight Connector 102">
               <a:extLst>
                 <a:ext uri="{FF2B5EF4-FFF2-40B4-BE49-F238E27FC236}">
-                  <a16:creationId xmlns:a16="http://schemas.microsoft.com/office/drawing/2014/main" id="{77C0FED8-8512-324B-81F4-6A5D648F80DB}"/>
+                  <a16:creationId xmlns:a16="http://schemas.microsoft.com/office/drawing/2014/main" id="{D4F878BF-EB4B-054F-B897-9B341D431630}"/>
                 </a:ext>
               </a:extLst>
             </p:cNvPr>
-            <p:cNvCxnSpPr>
-              <a:cxnSpLocks/>
-              <a:endCxn id="41" idx="2"/>
-            </p:cNvCxnSpPr>
+            <p:cNvCxnSpPr/>
             <p:nvPr/>
           </p:nvCxnSpPr>
           <p:spPr>
-            <a:xfrm rot="5400000" flipH="1" flipV="1">
-              <a:off x="5058015" y="2349433"/>
-              <a:ext cx="567204" cy="478689"/>
+            <a:xfrm>
+              <a:off x="5692992" y="4527978"/>
+              <a:ext cx="190500" cy="0"/>
             </a:xfrm>
-            <a:prstGeom prst="bentConnector2">
+            <a:prstGeom prst="line">
               <a:avLst/>
             </a:prstGeom>
             <a:ln>
               <a:solidFill>
                 <a:srgbClr val="FF0000"/>
               </a:solidFill>
-              <a:headEnd type="none" w="med" len="med"/>
-              <a:tailEnd type="triangle" w="lg" len="lg"/>
             </a:ln>
             <a:effectLst/>
           </p:spPr>
@@ -21794,120 +20782,50 @@
             </a:fontRef>
           </p:style>
         </p:cxnSp>
-        <p:sp>
-          <p:nvSpPr>
-            <p:cNvPr id="48" name="TextBox 47">
+        <p:cxnSp>
+          <p:nvCxnSpPr>
+            <p:cNvPr id="104" name="Straight Connector 103">
               <a:extLst>
                 <a:ext uri="{FF2B5EF4-FFF2-40B4-BE49-F238E27FC236}">
-                  <a16:creationId xmlns:a16="http://schemas.microsoft.com/office/drawing/2014/main" id="{2DFA6018-5035-7445-8E68-C41245712B8B}"/>
+                  <a16:creationId xmlns:a16="http://schemas.microsoft.com/office/drawing/2014/main" id="{E51B134A-D585-5843-B4DF-D1F9B6E31581}"/>
                 </a:ext>
               </a:extLst>
             </p:cNvPr>
-            <p:cNvSpPr txBox="1"/>
+            <p:cNvCxnSpPr>
+              <a:cxnSpLocks/>
+            </p:cNvCxnSpPr>
             <p:nvPr/>
-          </p:nvSpPr>
+          </p:nvCxnSpPr>
           <p:spPr>
-            <a:xfrm>
-              <a:off x="5808738" y="1765282"/>
-              <a:ext cx="375424" cy="369332"/>
+            <a:xfrm flipV="1">
+              <a:off x="5789261" y="4189053"/>
+              <a:ext cx="0" cy="338925"/>
             </a:xfrm>
-            <a:prstGeom prst="rect">
+            <a:prstGeom prst="line">
               <a:avLst/>
             </a:prstGeom>
-            <a:noFill/>
+            <a:ln>
+              <a:solidFill>
+                <a:srgbClr val="FF0000"/>
+              </a:solidFill>
+            </a:ln>
+            <a:effectLst/>
           </p:spPr>
-          <p:txBody>
-            <a:bodyPr wrap="none" rtlCol="0">
-              <a:spAutoFit/>
-            </a:bodyPr>
-            <a:lstStyle/>
-            <a:p>
-              <a:r>
-                <a:rPr lang="en-US" i="1" dirty="0"/>
-                <a:t>E</a:t>
-              </a:r>
-              <a:r>
-                <a:rPr lang="en-US" i="1" baseline="-25000" dirty="0"/>
-                <a:t>1</a:t>
-              </a:r>
-            </a:p>
-          </p:txBody>
-        </p:sp>
-        <p:sp>
-          <p:nvSpPr>
-            <p:cNvPr id="49" name="TextBox 48">
-              <a:extLst>
-                <a:ext uri="{FF2B5EF4-FFF2-40B4-BE49-F238E27FC236}">
-                  <a16:creationId xmlns:a16="http://schemas.microsoft.com/office/drawing/2014/main" id="{272BCDC9-49BD-4243-AE4E-0CD5559CEB6D}"/>
-                </a:ext>
-              </a:extLst>
-            </p:cNvPr>
-            <p:cNvSpPr txBox="1"/>
-            <p:nvPr/>
-          </p:nvSpPr>
-          <p:spPr>
-            <a:xfrm>
-              <a:off x="6226180" y="1970691"/>
-              <a:ext cx="375424" cy="369332"/>
-            </a:xfrm>
-            <a:prstGeom prst="rect">
-              <a:avLst/>
-            </a:prstGeom>
-            <a:noFill/>
-          </p:spPr>
-          <p:txBody>
-            <a:bodyPr wrap="none" rtlCol="0">
-              <a:spAutoFit/>
-            </a:bodyPr>
-            <a:lstStyle/>
-            <a:p>
-              <a:r>
-                <a:rPr lang="en-US" i="1" dirty="0"/>
-                <a:t>E</a:t>
-              </a:r>
-              <a:r>
-                <a:rPr lang="en-US" i="1" baseline="-25000" dirty="0"/>
-                <a:t>2</a:t>
-              </a:r>
-            </a:p>
-          </p:txBody>
-        </p:sp>
-        <p:sp>
-          <p:nvSpPr>
-            <p:cNvPr id="50" name="TextBox 49">
-              <a:extLst>
-                <a:ext uri="{FF2B5EF4-FFF2-40B4-BE49-F238E27FC236}">
-                  <a16:creationId xmlns:a16="http://schemas.microsoft.com/office/drawing/2014/main" id="{9DB68E14-6FAB-0B4A-A806-0AEAE09197E3}"/>
-                </a:ext>
-              </a:extLst>
-            </p:cNvPr>
-            <p:cNvSpPr txBox="1"/>
-            <p:nvPr/>
-          </p:nvSpPr>
-          <p:spPr>
-            <a:xfrm>
-              <a:off x="5689467" y="2123091"/>
-              <a:ext cx="288862" cy="369332"/>
-            </a:xfrm>
-            <a:prstGeom prst="rect">
-              <a:avLst/>
-            </a:prstGeom>
-            <a:noFill/>
-          </p:spPr>
-          <p:txBody>
-            <a:bodyPr wrap="none" rtlCol="0">
-              <a:spAutoFit/>
-            </a:bodyPr>
-            <a:lstStyle/>
-            <a:p>
-              <a:r>
-                <a:rPr lang="en-US" i="1" dirty="0"/>
-                <a:t>S</a:t>
-              </a:r>
-              <a:endParaRPr lang="en-US" i="1" baseline="-25000" dirty="0"/>
-            </a:p>
-          </p:txBody>
-        </p:sp>
+          <p:style>
+            <a:lnRef idx="2">
+              <a:schemeClr val="accent1"/>
+            </a:lnRef>
+            <a:fillRef idx="0">
+              <a:schemeClr val="accent1"/>
+            </a:fillRef>
+            <a:effectRef idx="1">
+              <a:schemeClr val="accent1"/>
+            </a:effectRef>
+            <a:fontRef idx="minor">
+              <a:schemeClr val="tx1"/>
+            </a:fontRef>
+          </p:style>
+        </p:cxnSp>
       </p:grpSp>
     </p:spTree>
     <p:extLst>
@@ -23785,6 +22703,41 @@
         <p:spPr>
           <a:xfrm>
             <a:off x="2762520" y="2628780"/>
+            <a:ext cx="1435201" cy="369332"/>
+          </a:xfrm>
+          <a:prstGeom prst="rect">
+            <a:avLst/>
+          </a:prstGeom>
+          <a:noFill/>
+        </p:spPr>
+        <p:txBody>
+          <a:bodyPr wrap="none" rtlCol="0">
+            <a:spAutoFit/>
+          </a:bodyPr>
+          <a:lstStyle/>
+          <a:p>
+            <a:r>
+              <a:rPr lang="en-US" dirty="0"/>
+              <a:t>SHOULD NOT</a:t>
+            </a:r>
+          </a:p>
+        </p:txBody>
+      </p:sp>
+      <p:sp>
+        <p:nvSpPr>
+          <p:cNvPr id="76" name="TextBox 75">
+            <a:extLst>
+              <a:ext uri="{FF2B5EF4-FFF2-40B4-BE49-F238E27FC236}">
+                <a16:creationId xmlns:a16="http://schemas.microsoft.com/office/drawing/2014/main" id="{2C9CF026-84D5-AC4D-9706-4DA86EE4B51A}"/>
+              </a:ext>
+            </a:extLst>
+          </p:cNvPr>
+          <p:cNvSpPr txBox="1"/>
+          <p:nvPr/>
+        </p:nvSpPr>
+        <p:spPr>
+          <a:xfrm>
+            <a:off x="4713638" y="5214312"/>
             <a:ext cx="1205971" cy="369332"/>
           </a:xfrm>
           <a:prstGeom prst="rect">
@@ -23807,10 +22760,10 @@
       </p:sp>
       <p:grpSp>
         <p:nvGrpSpPr>
-          <p:cNvPr id="52" name="Group 51">
+          <p:cNvPr id="3" name="Group 2">
             <a:extLst>
               <a:ext uri="{FF2B5EF4-FFF2-40B4-BE49-F238E27FC236}">
-                <a16:creationId xmlns:a16="http://schemas.microsoft.com/office/drawing/2014/main" id="{84C67AD8-5ECE-E240-9BD9-431826604B6B}"/>
+                <a16:creationId xmlns:a16="http://schemas.microsoft.com/office/drawing/2014/main" id="{FA500B66-F15B-6A47-8A80-D4D890C16B78}"/>
               </a:ext>
             </a:extLst>
           </p:cNvPr>
@@ -23819,18 +22772,18 @@
         </p:nvGrpSpPr>
         <p:grpSpPr>
           <a:xfrm>
-            <a:off x="259310" y="712144"/>
-            <a:ext cx="8416471" cy="1573247"/>
-            <a:chOff x="197324" y="1299380"/>
-            <a:chExt cx="8416471" cy="1573247"/>
+            <a:off x="360151" y="882134"/>
+            <a:ext cx="8416471" cy="1579872"/>
+            <a:chOff x="197324" y="1292755"/>
+            <a:chExt cx="8416471" cy="1579872"/>
           </a:xfrm>
         </p:grpSpPr>
         <p:grpSp>
           <p:nvGrpSpPr>
-            <p:cNvPr id="53" name="Group 52">
+            <p:cNvPr id="77" name="Group 76">
               <a:extLst>
                 <a:ext uri="{FF2B5EF4-FFF2-40B4-BE49-F238E27FC236}">
-                  <a16:creationId xmlns:a16="http://schemas.microsoft.com/office/drawing/2014/main" id="{9272A282-85CF-7644-AEC1-39085A9C7155}"/>
+                  <a16:creationId xmlns:a16="http://schemas.microsoft.com/office/drawing/2014/main" id="{F4FC2F32-7685-554C-BC3C-1813DDC17040}"/>
                 </a:ext>
               </a:extLst>
             </p:cNvPr>
@@ -23847,16 +22800,16 @@
           </p:grpSpPr>
           <p:cxnSp>
             <p:nvCxnSpPr>
-              <p:cNvPr id="57" name="Straight Arrow Connector 5">
+              <p:cNvPr id="99" name="Straight Arrow Connector 5">
                 <a:extLst>
                   <a:ext uri="{FF2B5EF4-FFF2-40B4-BE49-F238E27FC236}">
-                    <a16:creationId xmlns:a16="http://schemas.microsoft.com/office/drawing/2014/main" id="{6727F7B7-8F5D-2842-8C53-E4E693547B99}"/>
+                    <a16:creationId xmlns:a16="http://schemas.microsoft.com/office/drawing/2014/main" id="{916FB3E1-FF07-3147-8941-0F1CBB6AF958}"/>
                   </a:ext>
                 </a:extLst>
               </p:cNvPr>
               <p:cNvCxnSpPr>
                 <a:cxnSpLocks/>
-                <a:endCxn id="70" idx="0"/>
+                <a:endCxn id="128" idx="0"/>
               </p:cNvCxnSpPr>
               <p:nvPr/>
             </p:nvCxnSpPr>
@@ -23897,10 +22850,10 @@
           </p:cxnSp>
           <p:cxnSp>
             <p:nvCxnSpPr>
-              <p:cNvPr id="58" name="Straight Arrow Connector 5">
+              <p:cNvPr id="110" name="Straight Arrow Connector 5">
                 <a:extLst>
                   <a:ext uri="{FF2B5EF4-FFF2-40B4-BE49-F238E27FC236}">
-                    <a16:creationId xmlns:a16="http://schemas.microsoft.com/office/drawing/2014/main" id="{209D7B67-3CD0-504A-A12F-88996096B490}"/>
+                    <a16:creationId xmlns:a16="http://schemas.microsoft.com/office/drawing/2014/main" id="{48A4903F-A841-BF41-BC8C-CD4791267CB9}"/>
                   </a:ext>
                 </a:extLst>
               </p:cNvPr>
@@ -23945,10 +22898,10 @@
           </p:cxnSp>
           <p:cxnSp>
             <p:nvCxnSpPr>
-              <p:cNvPr id="59" name="Straight Connector 58">
+              <p:cNvPr id="112" name="Straight Connector 111">
                 <a:extLst>
                   <a:ext uri="{FF2B5EF4-FFF2-40B4-BE49-F238E27FC236}">
-                    <a16:creationId xmlns:a16="http://schemas.microsoft.com/office/drawing/2014/main" id="{E50B9CB1-92C9-D043-86AB-BB96C5F235C2}"/>
+                    <a16:creationId xmlns:a16="http://schemas.microsoft.com/office/drawing/2014/main" id="{A278828C-B00D-C944-A919-771BC607B6FB}"/>
                   </a:ext>
                 </a:extLst>
               </p:cNvPr>
@@ -23987,10 +22940,10 @@
           </p:cxnSp>
           <p:grpSp>
             <p:nvGrpSpPr>
-              <p:cNvPr id="60" name="Group 59">
+              <p:cNvPr id="113" name="Group 112">
                 <a:extLst>
                   <a:ext uri="{FF2B5EF4-FFF2-40B4-BE49-F238E27FC236}">
-                    <a16:creationId xmlns:a16="http://schemas.microsoft.com/office/drawing/2014/main" id="{56935DAD-148B-9F44-8DB3-F4E87B545B6C}"/>
+                    <a16:creationId xmlns:a16="http://schemas.microsoft.com/office/drawing/2014/main" id="{E224DE70-AD2D-AD41-BD92-3F32102FD842}"/>
                   </a:ext>
                 </a:extLst>
               </p:cNvPr>
@@ -24007,10 +22960,10 @@
             </p:grpSpPr>
             <p:grpSp>
               <p:nvGrpSpPr>
-                <p:cNvPr id="62" name="Group 61">
+                <p:cNvPr id="116" name="Group 115">
                   <a:extLst>
                     <a:ext uri="{FF2B5EF4-FFF2-40B4-BE49-F238E27FC236}">
-                      <a16:creationId xmlns:a16="http://schemas.microsoft.com/office/drawing/2014/main" id="{A24FC7E4-D654-D94B-88E7-31480E40044C}"/>
+                      <a16:creationId xmlns:a16="http://schemas.microsoft.com/office/drawing/2014/main" id="{DB8D7A37-0861-324D-AE99-E08E56E54531}"/>
                     </a:ext>
                   </a:extLst>
                 </p:cNvPr>
@@ -24027,10 +22980,10 @@
               </p:grpSpPr>
               <p:cxnSp>
                 <p:nvCxnSpPr>
-                  <p:cNvPr id="94" name="Straight Connector 93">
+                  <p:cNvPr id="135" name="Straight Connector 134">
                     <a:extLst>
                       <a:ext uri="{FF2B5EF4-FFF2-40B4-BE49-F238E27FC236}">
-                        <a16:creationId xmlns:a16="http://schemas.microsoft.com/office/drawing/2014/main" id="{6355D763-4B6D-E849-A06F-7FB60F39E603}"/>
+                        <a16:creationId xmlns:a16="http://schemas.microsoft.com/office/drawing/2014/main" id="{8DF2CBE9-2B83-A94C-8664-D581862B981A}"/>
                       </a:ext>
                     </a:extLst>
                   </p:cNvPr>
@@ -24073,10 +23026,10 @@
               </p:cxnSp>
               <p:sp>
                 <p:nvSpPr>
-                  <p:cNvPr id="95" name="Right Arrow 94">
+                  <p:cNvPr id="136" name="Right Arrow 135">
                     <a:extLst>
                       <a:ext uri="{FF2B5EF4-FFF2-40B4-BE49-F238E27FC236}">
-                        <a16:creationId xmlns:a16="http://schemas.microsoft.com/office/drawing/2014/main" id="{C0B6EFEF-37EF-8144-87E1-66AC6A039372}"/>
+                        <a16:creationId xmlns:a16="http://schemas.microsoft.com/office/drawing/2014/main" id="{2F942966-6CF3-8346-A917-406306F32239}"/>
                       </a:ext>
                     </a:extLst>
                   </p:cNvPr>
@@ -24137,10 +23090,10 @@
               </p:sp>
               <p:sp>
                 <p:nvSpPr>
-                  <p:cNvPr id="96" name="Chord 95">
+                  <p:cNvPr id="137" name="Chord 136">
                     <a:extLst>
                       <a:ext uri="{FF2B5EF4-FFF2-40B4-BE49-F238E27FC236}">
-                        <a16:creationId xmlns:a16="http://schemas.microsoft.com/office/drawing/2014/main" id="{4C86E316-1881-484A-8BF4-7F8720E5746B}"/>
+                        <a16:creationId xmlns:a16="http://schemas.microsoft.com/office/drawing/2014/main" id="{66C38679-A2F0-1749-9402-48AA4F285405}"/>
                       </a:ext>
                     </a:extLst>
                   </p:cNvPr>
@@ -24200,10 +23153,10 @@
               </p:sp>
               <p:pic>
                 <p:nvPicPr>
-                  <p:cNvPr id="97" name="Picture 96">
+                  <p:cNvPr id="138" name="Picture 137">
                     <a:extLst>
                       <a:ext uri="{FF2B5EF4-FFF2-40B4-BE49-F238E27FC236}">
-                        <a16:creationId xmlns:a16="http://schemas.microsoft.com/office/drawing/2014/main" id="{40B3036A-B609-944A-ABD6-2F740E18528B}"/>
+                        <a16:creationId xmlns:a16="http://schemas.microsoft.com/office/drawing/2014/main" id="{23D0BA81-BD56-4F42-BF99-CD1F8AD874BD}"/>
                       </a:ext>
                     </a:extLst>
                   </p:cNvPr>
@@ -24236,10 +23189,10 @@
               </p:pic>
               <p:pic>
                 <p:nvPicPr>
-                  <p:cNvPr id="98" name="Picture 97">
+                  <p:cNvPr id="139" name="Picture 138">
                     <a:extLst>
                       <a:ext uri="{FF2B5EF4-FFF2-40B4-BE49-F238E27FC236}">
-                        <a16:creationId xmlns:a16="http://schemas.microsoft.com/office/drawing/2014/main" id="{33A1255F-046B-5143-9B4D-A7E1EE6102DE}"/>
+                        <a16:creationId xmlns:a16="http://schemas.microsoft.com/office/drawing/2014/main" id="{31D1040F-4514-CF47-AF0D-49C566D81B7E}"/>
                       </a:ext>
                     </a:extLst>
                   </p:cNvPr>
@@ -24273,10 +23226,10 @@
             </p:grpSp>
             <p:grpSp>
               <p:nvGrpSpPr>
-                <p:cNvPr id="63" name="Group 62">
+                <p:cNvPr id="117" name="Group 116">
                   <a:extLst>
                     <a:ext uri="{FF2B5EF4-FFF2-40B4-BE49-F238E27FC236}">
-                      <a16:creationId xmlns:a16="http://schemas.microsoft.com/office/drawing/2014/main" id="{C1816AA9-178B-D64F-9C53-586336BB36E5}"/>
+                      <a16:creationId xmlns:a16="http://schemas.microsoft.com/office/drawing/2014/main" id="{6C3A85FE-AFB9-F247-BA6C-0FC2A828ECC8}"/>
                     </a:ext>
                   </a:extLst>
                 </p:cNvPr>
@@ -24293,10 +23246,10 @@
               </p:grpSpPr>
               <p:cxnSp>
                 <p:nvCxnSpPr>
-                  <p:cNvPr id="89" name="Straight Connector 88">
+                  <p:cNvPr id="130" name="Straight Connector 129">
                     <a:extLst>
                       <a:ext uri="{FF2B5EF4-FFF2-40B4-BE49-F238E27FC236}">
-                        <a16:creationId xmlns:a16="http://schemas.microsoft.com/office/drawing/2014/main" id="{793DD74D-59E5-A447-A808-FE3FB0090ADE}"/>
+                        <a16:creationId xmlns:a16="http://schemas.microsoft.com/office/drawing/2014/main" id="{2FEE1342-27E5-1142-B370-90131AE7C936}"/>
                       </a:ext>
                     </a:extLst>
                   </p:cNvPr>
@@ -24339,10 +23292,10 @@
               </p:cxnSp>
               <p:sp>
                 <p:nvSpPr>
-                  <p:cNvPr id="90" name="Right Arrow 89">
+                  <p:cNvPr id="131" name="Right Arrow 130">
                     <a:extLst>
                       <a:ext uri="{FF2B5EF4-FFF2-40B4-BE49-F238E27FC236}">
-                        <a16:creationId xmlns:a16="http://schemas.microsoft.com/office/drawing/2014/main" id="{0B062176-ECF5-8E45-A7B1-0D3FF9476A3B}"/>
+                        <a16:creationId xmlns:a16="http://schemas.microsoft.com/office/drawing/2014/main" id="{5807BA71-BB9E-6D41-8C8B-65B49B68ED6D}"/>
                       </a:ext>
                     </a:extLst>
                   </p:cNvPr>
@@ -24403,10 +23356,10 @@
               </p:sp>
               <p:sp>
                 <p:nvSpPr>
-                  <p:cNvPr id="91" name="Chord 90">
+                  <p:cNvPr id="132" name="Chord 131">
                     <a:extLst>
                       <a:ext uri="{FF2B5EF4-FFF2-40B4-BE49-F238E27FC236}">
-                        <a16:creationId xmlns:a16="http://schemas.microsoft.com/office/drawing/2014/main" id="{72408A4F-080A-9E44-9568-B6AB591972EF}"/>
+                        <a16:creationId xmlns:a16="http://schemas.microsoft.com/office/drawing/2014/main" id="{A800E92F-4D01-994D-A2B6-ACF419331257}"/>
                       </a:ext>
                     </a:extLst>
                   </p:cNvPr>
@@ -24466,10 +23419,10 @@
               </p:sp>
               <p:pic>
                 <p:nvPicPr>
-                  <p:cNvPr id="92" name="Picture 91">
+                  <p:cNvPr id="133" name="Picture 132">
                     <a:extLst>
                       <a:ext uri="{FF2B5EF4-FFF2-40B4-BE49-F238E27FC236}">
-                        <a16:creationId xmlns:a16="http://schemas.microsoft.com/office/drawing/2014/main" id="{181B7FAA-0522-474B-A404-1550B636FA90}"/>
+                        <a16:creationId xmlns:a16="http://schemas.microsoft.com/office/drawing/2014/main" id="{E69B9861-1A39-D042-A546-047B9874EE04}"/>
                       </a:ext>
                     </a:extLst>
                   </p:cNvPr>
@@ -24502,10 +23455,10 @@
               </p:pic>
               <p:pic>
                 <p:nvPicPr>
-                  <p:cNvPr id="93" name="Picture 92">
+                  <p:cNvPr id="134" name="Picture 133">
                     <a:extLst>
                       <a:ext uri="{FF2B5EF4-FFF2-40B4-BE49-F238E27FC236}">
-                        <a16:creationId xmlns:a16="http://schemas.microsoft.com/office/drawing/2014/main" id="{18CB2F19-592E-2043-8B74-8A17330448E8}"/>
+                        <a16:creationId xmlns:a16="http://schemas.microsoft.com/office/drawing/2014/main" id="{AC5A77BF-9153-C046-B3E1-7BED79FE7B8F}"/>
                       </a:ext>
                     </a:extLst>
                   </p:cNvPr>
@@ -24539,10 +23492,10 @@
             </p:grpSp>
             <p:grpSp>
               <p:nvGrpSpPr>
-                <p:cNvPr id="64" name="Group 63">
+                <p:cNvPr id="124" name="Group 123">
                   <a:extLst>
                     <a:ext uri="{FF2B5EF4-FFF2-40B4-BE49-F238E27FC236}">
-                      <a16:creationId xmlns:a16="http://schemas.microsoft.com/office/drawing/2014/main" id="{B3757E4F-F0BD-9D42-A5A9-439CBD63325B}"/>
+                      <a16:creationId xmlns:a16="http://schemas.microsoft.com/office/drawing/2014/main" id="{5656F60C-8CA3-0142-80A6-CB487035F668}"/>
                     </a:ext>
                   </a:extLst>
                 </p:cNvPr>
@@ -24559,10 +23512,10 @@
               </p:grpSpPr>
               <p:cxnSp>
                 <p:nvCxnSpPr>
-                  <p:cNvPr id="65" name="Straight Connector 64">
+                  <p:cNvPr id="125" name="Straight Connector 124">
                     <a:extLst>
                       <a:ext uri="{FF2B5EF4-FFF2-40B4-BE49-F238E27FC236}">
-                        <a16:creationId xmlns:a16="http://schemas.microsoft.com/office/drawing/2014/main" id="{4B997451-E217-704A-8085-9A2F296538F6}"/>
+                        <a16:creationId xmlns:a16="http://schemas.microsoft.com/office/drawing/2014/main" id="{9842755A-A2BD-E944-8A46-A2A0B3AE1293}"/>
                       </a:ext>
                     </a:extLst>
                   </p:cNvPr>
@@ -24605,10 +23558,10 @@
               </p:cxnSp>
               <p:sp>
                 <p:nvSpPr>
-                  <p:cNvPr id="68" name="Right Arrow 67">
+                  <p:cNvPr id="126" name="Right Arrow 125">
                     <a:extLst>
                       <a:ext uri="{FF2B5EF4-FFF2-40B4-BE49-F238E27FC236}">
-                        <a16:creationId xmlns:a16="http://schemas.microsoft.com/office/drawing/2014/main" id="{D7353383-7ADA-E743-B23D-2B904BF5979A}"/>
+                        <a16:creationId xmlns:a16="http://schemas.microsoft.com/office/drawing/2014/main" id="{5BD12653-7B82-2A4F-A729-AAA441E7FCAA}"/>
                       </a:ext>
                     </a:extLst>
                   </p:cNvPr>
@@ -24669,10 +23622,10 @@
               </p:sp>
               <p:sp>
                 <p:nvSpPr>
-                  <p:cNvPr id="69" name="Chord 68">
+                  <p:cNvPr id="127" name="Chord 126">
                     <a:extLst>
                       <a:ext uri="{FF2B5EF4-FFF2-40B4-BE49-F238E27FC236}">
-                        <a16:creationId xmlns:a16="http://schemas.microsoft.com/office/drawing/2014/main" id="{298775FF-6E94-BB49-B6CE-760580531FF4}"/>
+                        <a16:creationId xmlns:a16="http://schemas.microsoft.com/office/drawing/2014/main" id="{DA6A7F1F-7E46-4F42-9599-FAC0443FF234}"/>
                       </a:ext>
                     </a:extLst>
                   </p:cNvPr>
@@ -24732,10 +23685,10 @@
               </p:sp>
               <p:pic>
                 <p:nvPicPr>
-                  <p:cNvPr id="70" name="Picture 69">
+                  <p:cNvPr id="128" name="Picture 127">
                     <a:extLst>
                       <a:ext uri="{FF2B5EF4-FFF2-40B4-BE49-F238E27FC236}">
-                        <a16:creationId xmlns:a16="http://schemas.microsoft.com/office/drawing/2014/main" id="{F36CB5B1-F722-4E4B-AD1F-DED11CADA754}"/>
+                        <a16:creationId xmlns:a16="http://schemas.microsoft.com/office/drawing/2014/main" id="{7464BB8E-9E1D-1844-997E-8461B750A3E6}"/>
                       </a:ext>
                     </a:extLst>
                   </p:cNvPr>
@@ -24768,10 +23721,10 @@
               </p:pic>
               <p:pic>
                 <p:nvPicPr>
-                  <p:cNvPr id="72" name="Picture 71">
+                  <p:cNvPr id="129" name="Picture 128">
                     <a:extLst>
                       <a:ext uri="{FF2B5EF4-FFF2-40B4-BE49-F238E27FC236}">
-                        <a16:creationId xmlns:a16="http://schemas.microsoft.com/office/drawing/2014/main" id="{F4F90D6D-D179-8747-A636-031C7BEEF812}"/>
+                        <a16:creationId xmlns:a16="http://schemas.microsoft.com/office/drawing/2014/main" id="{CF93444F-A725-5A42-99DE-3F08E0B624C6}"/>
                       </a:ext>
                     </a:extLst>
                   </p:cNvPr>
@@ -24806,10 +23759,10 @@
           </p:grpSp>
           <p:sp>
             <p:nvSpPr>
-              <p:cNvPr id="61" name="Triangle 60">
+              <p:cNvPr id="114" name="Triangle 113">
                 <a:extLst>
                   <a:ext uri="{FF2B5EF4-FFF2-40B4-BE49-F238E27FC236}">
-                    <a16:creationId xmlns:a16="http://schemas.microsoft.com/office/drawing/2014/main" id="{A42FC42F-997F-C24B-9476-B5B557DA70FC}"/>
+                    <a16:creationId xmlns:a16="http://schemas.microsoft.com/office/drawing/2014/main" id="{C97BCB2E-90A4-A648-885D-AB220DBABFA5}"/>
                   </a:ext>
                 </a:extLst>
               </p:cNvPr>
@@ -24858,10 +23811,10 @@
         </p:grpSp>
         <p:sp>
           <p:nvSpPr>
-            <p:cNvPr id="54" name="Oval 53">
+            <p:cNvPr id="140" name="Oval 139">
               <a:extLst>
                 <a:ext uri="{FF2B5EF4-FFF2-40B4-BE49-F238E27FC236}">
-                  <a16:creationId xmlns:a16="http://schemas.microsoft.com/office/drawing/2014/main" id="{9F9ADCE8-1E8A-4C40-9ABE-71F61DDAF251}"/>
+                  <a16:creationId xmlns:a16="http://schemas.microsoft.com/office/drawing/2014/main" id="{D3F8907A-292B-1B4F-A013-51CDD3F114E2}"/>
                 </a:ext>
               </a:extLst>
             </p:cNvPr>
@@ -24870,7 +23823,7 @@
           </p:nvSpPr>
           <p:spPr>
             <a:xfrm>
-              <a:off x="5369253" y="1299380"/>
+              <a:off x="5198318" y="1299380"/>
               <a:ext cx="267544" cy="267544"/>
             </a:xfrm>
             <a:prstGeom prst="ellipse">
@@ -24907,10 +23860,10 @@
         </p:sp>
         <p:cxnSp>
           <p:nvCxnSpPr>
-            <p:cNvPr id="55" name="Straight Connector 54">
+            <p:cNvPr id="141" name="Straight Connector 140">
               <a:extLst>
                 <a:ext uri="{FF2B5EF4-FFF2-40B4-BE49-F238E27FC236}">
-                  <a16:creationId xmlns:a16="http://schemas.microsoft.com/office/drawing/2014/main" id="{52BBB165-4A55-134C-9394-7646C622394F}"/>
+                  <a16:creationId xmlns:a16="http://schemas.microsoft.com/office/drawing/2014/main" id="{EF409DCB-A9C4-9B4D-9A27-97790488D64F}"/>
                 </a:ext>
               </a:extLst>
             </p:cNvPr>
@@ -24919,7 +23872,7 @@
           </p:nvCxnSpPr>
           <p:spPr>
             <a:xfrm>
-              <a:off x="5406679" y="1922033"/>
+              <a:off x="5235744" y="1922033"/>
               <a:ext cx="190500" cy="0"/>
             </a:xfrm>
             <a:prstGeom prst="line">
@@ -24949,10 +23902,10 @@
         </p:cxnSp>
         <p:cxnSp>
           <p:nvCxnSpPr>
-            <p:cNvPr id="56" name="Straight Connector 55">
+            <p:cNvPr id="142" name="Straight Connector 141">
               <a:extLst>
                 <a:ext uri="{FF2B5EF4-FFF2-40B4-BE49-F238E27FC236}">
-                  <a16:creationId xmlns:a16="http://schemas.microsoft.com/office/drawing/2014/main" id="{35225A39-8AA1-D943-927E-95002A592C81}"/>
+                  <a16:creationId xmlns:a16="http://schemas.microsoft.com/office/drawing/2014/main" id="{1205A550-FEC6-5A4A-B7A8-BCAE87B260C5}"/>
                 </a:ext>
               </a:extLst>
             </p:cNvPr>
@@ -24963,7 +23916,142 @@
           </p:nvCxnSpPr>
           <p:spPr>
             <a:xfrm flipV="1">
-              <a:off x="5502948" y="1583108"/>
+              <a:off x="5332013" y="1583108"/>
+              <a:ext cx="0" cy="338925"/>
+            </a:xfrm>
+            <a:prstGeom prst="line">
+              <a:avLst/>
+            </a:prstGeom>
+            <a:ln>
+              <a:solidFill>
+                <a:srgbClr val="FF0000"/>
+              </a:solidFill>
+            </a:ln>
+            <a:effectLst/>
+          </p:spPr>
+          <p:style>
+            <a:lnRef idx="2">
+              <a:schemeClr val="accent1"/>
+            </a:lnRef>
+            <a:fillRef idx="0">
+              <a:schemeClr val="accent1"/>
+            </a:fillRef>
+            <a:effectRef idx="1">
+              <a:schemeClr val="accent1"/>
+            </a:effectRef>
+            <a:fontRef idx="minor">
+              <a:schemeClr val="tx1"/>
+            </a:fontRef>
+          </p:style>
+        </p:cxnSp>
+        <p:sp>
+          <p:nvSpPr>
+            <p:cNvPr id="146" name="Oval 145">
+              <a:extLst>
+                <a:ext uri="{FF2B5EF4-FFF2-40B4-BE49-F238E27FC236}">
+                  <a16:creationId xmlns:a16="http://schemas.microsoft.com/office/drawing/2014/main" id="{71B9B101-1E24-9A40-B6E9-70F58EA083E3}"/>
+                </a:ext>
+              </a:extLst>
+            </p:cNvPr>
+            <p:cNvSpPr/>
+            <p:nvPr/>
+          </p:nvSpPr>
+          <p:spPr>
+            <a:xfrm>
+              <a:off x="5708528" y="1292755"/>
+              <a:ext cx="267544" cy="267544"/>
+            </a:xfrm>
+            <a:prstGeom prst="ellipse">
+              <a:avLst/>
+            </a:prstGeom>
+            <a:ln>
+              <a:solidFill>
+                <a:schemeClr val="tx1"/>
+              </a:solidFill>
+            </a:ln>
+          </p:spPr>
+          <p:style>
+            <a:lnRef idx="2">
+              <a:schemeClr val="accent5"/>
+            </a:lnRef>
+            <a:fillRef idx="1">
+              <a:schemeClr val="lt1"/>
+            </a:fillRef>
+            <a:effectRef idx="0">
+              <a:schemeClr val="accent5"/>
+            </a:effectRef>
+            <a:fontRef idx="minor">
+              <a:schemeClr val="dk1"/>
+            </a:fontRef>
+          </p:style>
+          <p:txBody>
+            <a:bodyPr rtlCol="0" anchor="ctr"/>
+            <a:lstStyle/>
+            <a:p>
+              <a:pPr algn="ctr"/>
+              <a:endParaRPr lang="en-US"/>
+            </a:p>
+          </p:txBody>
+        </p:sp>
+        <p:cxnSp>
+          <p:nvCxnSpPr>
+            <p:cNvPr id="147" name="Straight Connector 146">
+              <a:extLst>
+                <a:ext uri="{FF2B5EF4-FFF2-40B4-BE49-F238E27FC236}">
+                  <a16:creationId xmlns:a16="http://schemas.microsoft.com/office/drawing/2014/main" id="{245D64C2-FD18-7D43-81F2-C8FCC55F27EA}"/>
+                </a:ext>
+              </a:extLst>
+            </p:cNvPr>
+            <p:cNvCxnSpPr/>
+            <p:nvPr/>
+          </p:nvCxnSpPr>
+          <p:spPr>
+            <a:xfrm>
+              <a:off x="5745954" y="1915408"/>
+              <a:ext cx="190500" cy="0"/>
+            </a:xfrm>
+            <a:prstGeom prst="line">
+              <a:avLst/>
+            </a:prstGeom>
+            <a:ln>
+              <a:solidFill>
+                <a:srgbClr val="FF0000"/>
+              </a:solidFill>
+            </a:ln>
+            <a:effectLst/>
+          </p:spPr>
+          <p:style>
+            <a:lnRef idx="2">
+              <a:schemeClr val="accent1"/>
+            </a:lnRef>
+            <a:fillRef idx="0">
+              <a:schemeClr val="accent1"/>
+            </a:fillRef>
+            <a:effectRef idx="1">
+              <a:schemeClr val="accent1"/>
+            </a:effectRef>
+            <a:fontRef idx="minor">
+              <a:schemeClr val="tx1"/>
+            </a:fontRef>
+          </p:style>
+        </p:cxnSp>
+        <p:cxnSp>
+          <p:nvCxnSpPr>
+            <p:cNvPr id="148" name="Straight Connector 147">
+              <a:extLst>
+                <a:ext uri="{FF2B5EF4-FFF2-40B4-BE49-F238E27FC236}">
+                  <a16:creationId xmlns:a16="http://schemas.microsoft.com/office/drawing/2014/main" id="{83334751-2B91-2E47-8E74-8D723CD15AB8}"/>
+                </a:ext>
+              </a:extLst>
+            </p:cNvPr>
+            <p:cNvCxnSpPr>
+              <a:cxnSpLocks/>
+            </p:cNvCxnSpPr>
+            <p:nvPr/>
+          </p:nvCxnSpPr>
+          <p:spPr>
+            <a:xfrm flipV="1">
+              <a:off x="5842223" y="1576483"/>
               <a:ext cx="0" cy="338925"/>
             </a:xfrm>
             <a:prstGeom prst="line">

</xml_diff>

<commit_message>
no more shmoos in examples
</commit_message>
<xml_diff>
--- a/specification/imgsrc/4.pptx
+++ b/specification/imgsrc/4.pptx
@@ -218,7 +218,7 @@
           <a:p>
             <a:fld id="{9E808448-E5C1-6044-9A1D-E68767CBF56D}" type="datetimeFigureOut">
               <a:rPr lang="en-US" smtClean="0"/>
-              <a:t>10/18/20</a:t>
+              <a:t>3/25/21</a:t>
             </a:fld>
             <a:endParaRPr lang="en-US"/>
           </a:p>
@@ -748,7 +748,7 @@
           <a:p>
             <a:fld id="{EBC7FFC8-011D-1246-B320-9C4FD100F423}" type="datetimeFigureOut">
               <a:rPr lang="en-US" smtClean="0"/>
-              <a:t>10/18/20</a:t>
+              <a:t>3/25/21</a:t>
             </a:fld>
             <a:endParaRPr lang="en-US"/>
           </a:p>
@@ -916,7 +916,7 @@
           <a:p>
             <a:fld id="{EBC7FFC8-011D-1246-B320-9C4FD100F423}" type="datetimeFigureOut">
               <a:rPr lang="en-US" smtClean="0"/>
-              <a:t>10/18/20</a:t>
+              <a:t>3/25/21</a:t>
             </a:fld>
             <a:endParaRPr lang="en-US"/>
           </a:p>
@@ -1094,7 +1094,7 @@
           <a:p>
             <a:fld id="{EBC7FFC8-011D-1246-B320-9C4FD100F423}" type="datetimeFigureOut">
               <a:rPr lang="en-US" smtClean="0"/>
-              <a:t>10/18/20</a:t>
+              <a:t>3/25/21</a:t>
             </a:fld>
             <a:endParaRPr lang="en-US"/>
           </a:p>
@@ -1262,7 +1262,7 @@
           <a:p>
             <a:fld id="{EBC7FFC8-011D-1246-B320-9C4FD100F423}" type="datetimeFigureOut">
               <a:rPr lang="en-US" smtClean="0"/>
-              <a:t>10/18/20</a:t>
+              <a:t>3/25/21</a:t>
             </a:fld>
             <a:endParaRPr lang="en-US"/>
           </a:p>
@@ -1507,7 +1507,7 @@
           <a:p>
             <a:fld id="{EBC7FFC8-011D-1246-B320-9C4FD100F423}" type="datetimeFigureOut">
               <a:rPr lang="en-US" smtClean="0"/>
-              <a:t>10/18/20</a:t>
+              <a:t>3/25/21</a:t>
             </a:fld>
             <a:endParaRPr lang="en-US"/>
           </a:p>
@@ -1792,7 +1792,7 @@
           <a:p>
             <a:fld id="{EBC7FFC8-011D-1246-B320-9C4FD100F423}" type="datetimeFigureOut">
               <a:rPr lang="en-US" smtClean="0"/>
-              <a:t>10/18/20</a:t>
+              <a:t>3/25/21</a:t>
             </a:fld>
             <a:endParaRPr lang="en-US"/>
           </a:p>
@@ -2211,7 +2211,7 @@
           <a:p>
             <a:fld id="{EBC7FFC8-011D-1246-B320-9C4FD100F423}" type="datetimeFigureOut">
               <a:rPr lang="en-US" smtClean="0"/>
-              <a:t>10/18/20</a:t>
+              <a:t>3/25/21</a:t>
             </a:fld>
             <a:endParaRPr lang="en-US"/>
           </a:p>
@@ -2328,7 +2328,7 @@
           <a:p>
             <a:fld id="{EBC7FFC8-011D-1246-B320-9C4FD100F423}" type="datetimeFigureOut">
               <a:rPr lang="en-US" smtClean="0"/>
-              <a:t>10/18/20</a:t>
+              <a:t>3/25/21</a:t>
             </a:fld>
             <a:endParaRPr lang="en-US"/>
           </a:p>
@@ -2423,7 +2423,7 @@
           <a:p>
             <a:fld id="{EBC7FFC8-011D-1246-B320-9C4FD100F423}" type="datetimeFigureOut">
               <a:rPr lang="en-US" smtClean="0"/>
-              <a:t>10/18/20</a:t>
+              <a:t>3/25/21</a:t>
             </a:fld>
             <a:endParaRPr lang="en-US"/>
           </a:p>
@@ -2698,7 +2698,7 @@
           <a:p>
             <a:fld id="{EBC7FFC8-011D-1246-B320-9C4FD100F423}" type="datetimeFigureOut">
               <a:rPr lang="en-US" smtClean="0"/>
-              <a:t>10/18/20</a:t>
+              <a:t>3/25/21</a:t>
             </a:fld>
             <a:endParaRPr lang="en-US"/>
           </a:p>
@@ -2950,7 +2950,7 @@
           <a:p>
             <a:fld id="{EBC7FFC8-011D-1246-B320-9C4FD100F423}" type="datetimeFigureOut">
               <a:rPr lang="en-US" smtClean="0"/>
-              <a:t>10/18/20</a:t>
+              <a:t>3/25/21</a:t>
             </a:fld>
             <a:endParaRPr lang="en-US"/>
           </a:p>
@@ -3161,7 +3161,7 @@
           <a:p>
             <a:fld id="{EBC7FFC8-011D-1246-B320-9C4FD100F423}" type="datetimeFigureOut">
               <a:rPr lang="en-US" smtClean="0"/>
-              <a:t>10/18/20</a:t>
+              <a:t>3/25/21</a:t>
             </a:fld>
             <a:endParaRPr lang="en-US"/>
           </a:p>
@@ -15003,6 +15003,36 @@
           <a:chExt cx="0" cy="0"/>
         </a:xfrm>
       </p:grpSpPr>
+      <p:pic>
+        <p:nvPicPr>
+          <p:cNvPr id="40" name="Picture 39">
+            <a:extLst>
+              <a:ext uri="{FF2B5EF4-FFF2-40B4-BE49-F238E27FC236}">
+                <a16:creationId xmlns:a16="http://schemas.microsoft.com/office/drawing/2014/main" id="{E3530BC8-3AD2-0548-9E12-66AFD8ACEF2E}"/>
+              </a:ext>
+            </a:extLst>
+          </p:cNvPr>
+          <p:cNvPicPr>
+            <a:picLocks noChangeAspect="1"/>
+          </p:cNvPicPr>
+          <p:nvPr/>
+        </p:nvPicPr>
+        <p:blipFill>
+          <a:blip r:embed="rId2"/>
+          <a:stretch>
+            <a:fillRect/>
+          </a:stretch>
+        </p:blipFill>
+        <p:spPr>
+          <a:xfrm>
+            <a:off x="3670393" y="2308494"/>
+            <a:ext cx="881743" cy="881743"/>
+          </a:xfrm>
+          <a:prstGeom prst="rect">
+            <a:avLst/>
+          </a:prstGeom>
+        </p:spPr>
+      </p:pic>
       <p:sp>
         <p:nvSpPr>
           <p:cNvPr id="67" name="TextBox 66"/>
@@ -15063,35 +15093,6 @@
       </p:sp>
       <p:pic>
         <p:nvPicPr>
-          <p:cNvPr id="45" name="Picture 44">
-            <a:extLst>
-              <a:ext uri="{FF2B5EF4-FFF2-40B4-BE49-F238E27FC236}">
-                <a16:creationId xmlns:a16="http://schemas.microsoft.com/office/drawing/2014/main" id="{49680121-DA54-CB43-8878-D9E17BB6C432}"/>
-              </a:ext>
-            </a:extLst>
-          </p:cNvPr>
-          <p:cNvPicPr>
-            <a:picLocks noChangeAspect="1"/>
-          </p:cNvPicPr>
-          <p:nvPr/>
-        </p:nvPicPr>
-        <p:blipFill rotWithShape="1">
-          <a:blip r:embed="rId2"/>
-          <a:srcRect/>
-          <a:stretch/>
-        </p:blipFill>
-        <p:spPr>
-          <a:xfrm>
-            <a:off x="1682084" y="1720607"/>
-            <a:ext cx="951389" cy="951389"/>
-          </a:xfrm>
-          <a:prstGeom prst="rect">
-            <a:avLst/>
-          </a:prstGeom>
-        </p:spPr>
-      </p:pic>
-      <p:pic>
-        <p:nvPicPr>
           <p:cNvPr id="123" name="Picture 122">
             <a:extLst>
               <a:ext uri="{FF2B5EF4-FFF2-40B4-BE49-F238E27FC236}">
@@ -15105,7 +15106,7 @@
           <p:nvPr/>
         </p:nvPicPr>
         <p:blipFill>
-          <a:blip r:embed="rId3"/>
+          <a:blip r:embed="rId2"/>
           <a:stretch>
             <a:fillRect/>
           </a:stretch>
@@ -15174,86 +15175,6 @@
           </a:p>
         </p:txBody>
       </p:sp>
-      <p:grpSp>
-        <p:nvGrpSpPr>
-          <p:cNvPr id="127" name="Group 126">
-            <a:extLst>
-              <a:ext uri="{FF2B5EF4-FFF2-40B4-BE49-F238E27FC236}">
-                <a16:creationId xmlns:a16="http://schemas.microsoft.com/office/drawing/2014/main" id="{65ABCA0A-8BD9-1B43-BDB1-F8ADDD6B9DD6}"/>
-              </a:ext>
-            </a:extLst>
-          </p:cNvPr>
-          <p:cNvGrpSpPr/>
-          <p:nvPr/>
-        </p:nvGrpSpPr>
-        <p:grpSpPr>
-          <a:xfrm>
-            <a:off x="3708059" y="2274210"/>
-            <a:ext cx="951389" cy="951389"/>
-            <a:chOff x="3677842" y="4194807"/>
-            <a:chExt cx="951389" cy="951389"/>
-          </a:xfrm>
-        </p:grpSpPr>
-        <p:pic>
-          <p:nvPicPr>
-            <p:cNvPr id="125" name="Picture 124">
-              <a:extLst>
-                <a:ext uri="{FF2B5EF4-FFF2-40B4-BE49-F238E27FC236}">
-                  <a16:creationId xmlns:a16="http://schemas.microsoft.com/office/drawing/2014/main" id="{D7F085B7-6C0B-DA4B-AC9B-D1ACA26D393E}"/>
-                </a:ext>
-              </a:extLst>
-            </p:cNvPr>
-            <p:cNvPicPr>
-              <a:picLocks noChangeAspect="1"/>
-            </p:cNvPicPr>
-            <p:nvPr/>
-          </p:nvPicPr>
-          <p:blipFill rotWithShape="1">
-            <a:blip r:embed="rId2"/>
-            <a:srcRect/>
-            <a:stretch/>
-          </p:blipFill>
-          <p:spPr>
-            <a:xfrm>
-              <a:off x="3677842" y="4194807"/>
-              <a:ext cx="951389" cy="951389"/>
-            </a:xfrm>
-            <a:prstGeom prst="rect">
-              <a:avLst/>
-            </a:prstGeom>
-          </p:spPr>
-        </p:pic>
-        <p:pic>
-          <p:nvPicPr>
-            <p:cNvPr id="126" name="Picture 125">
-              <a:extLst>
-                <a:ext uri="{FF2B5EF4-FFF2-40B4-BE49-F238E27FC236}">
-                  <a16:creationId xmlns:a16="http://schemas.microsoft.com/office/drawing/2014/main" id="{F8F00EC9-A535-1E43-BA3F-A27E5FDB59D6}"/>
-                </a:ext>
-              </a:extLst>
-            </p:cNvPr>
-            <p:cNvPicPr>
-              <a:picLocks noChangeAspect="1"/>
-            </p:cNvPicPr>
-            <p:nvPr/>
-          </p:nvPicPr>
-          <p:blipFill>
-            <a:blip r:embed="rId3"/>
-            <a:stretch>
-              <a:fillRect/>
-            </a:stretch>
-          </p:blipFill>
-          <p:spPr>
-            <a:xfrm>
-              <a:off x="3689599" y="4220909"/>
-              <a:ext cx="881743" cy="881743"/>
-            </a:xfrm>
-            <a:prstGeom prst="rect">
-              <a:avLst/>
-            </a:prstGeom>
-          </p:spPr>
-        </p:pic>
-      </p:grpSp>
       <p:cxnSp>
         <p:nvCxnSpPr>
           <p:cNvPr id="129" name="Straight Connector 128">
@@ -15355,7 +15276,6 @@
           </p:cNvPr>
           <p:cNvCxnSpPr>
             <a:cxnSpLocks/>
-            <a:stCxn id="126" idx="1"/>
             <a:endCxn id="124" idx="6"/>
           </p:cNvCxnSpPr>
           <p:nvPr/>
@@ -15394,35 +15314,6 @@
       </p:cxnSp>
       <p:pic>
         <p:nvPicPr>
-          <p:cNvPr id="140" name="Picture 139">
-            <a:extLst>
-              <a:ext uri="{FF2B5EF4-FFF2-40B4-BE49-F238E27FC236}">
-                <a16:creationId xmlns:a16="http://schemas.microsoft.com/office/drawing/2014/main" id="{F942D285-6BCB-7F4F-B35A-CFBAE3FAEDC3}"/>
-              </a:ext>
-            </a:extLst>
-          </p:cNvPr>
-          <p:cNvPicPr>
-            <a:picLocks noChangeAspect="1"/>
-          </p:cNvPicPr>
-          <p:nvPr/>
-        </p:nvPicPr>
-        <p:blipFill rotWithShape="1">
-          <a:blip r:embed="rId2"/>
-          <a:srcRect/>
-          <a:stretch/>
-        </p:blipFill>
-        <p:spPr>
-          <a:xfrm>
-            <a:off x="7170662" y="1680340"/>
-            <a:ext cx="951389" cy="951389"/>
-          </a:xfrm>
-          <a:prstGeom prst="rect">
-            <a:avLst/>
-          </a:prstGeom>
-        </p:spPr>
-      </p:pic>
-      <p:pic>
-        <p:nvPicPr>
           <p:cNvPr id="141" name="Picture 140">
             <a:extLst>
               <a:ext uri="{FF2B5EF4-FFF2-40B4-BE49-F238E27FC236}">
@@ -15436,7 +15327,7 @@
           <p:nvPr/>
         </p:nvPicPr>
         <p:blipFill>
-          <a:blip r:embed="rId3"/>
+          <a:blip r:embed="rId2"/>
           <a:stretch>
             <a:fillRect/>
           </a:stretch>
@@ -15451,86 +15342,6 @@
           </a:prstGeom>
         </p:spPr>
       </p:pic>
-      <p:grpSp>
-        <p:nvGrpSpPr>
-          <p:cNvPr id="143" name="Group 142">
-            <a:extLst>
-              <a:ext uri="{FF2B5EF4-FFF2-40B4-BE49-F238E27FC236}">
-                <a16:creationId xmlns:a16="http://schemas.microsoft.com/office/drawing/2014/main" id="{D7BAA2FD-E061-B347-8091-0EFD96FAED8E}"/>
-              </a:ext>
-            </a:extLst>
-          </p:cNvPr>
-          <p:cNvGrpSpPr/>
-          <p:nvPr/>
-        </p:nvGrpSpPr>
-        <p:grpSpPr>
-          <a:xfrm>
-            <a:off x="5144687" y="2241552"/>
-            <a:ext cx="951389" cy="951389"/>
-            <a:chOff x="3677842" y="4194807"/>
-            <a:chExt cx="951389" cy="951389"/>
-          </a:xfrm>
-        </p:grpSpPr>
-        <p:pic>
-          <p:nvPicPr>
-            <p:cNvPr id="144" name="Picture 143">
-              <a:extLst>
-                <a:ext uri="{FF2B5EF4-FFF2-40B4-BE49-F238E27FC236}">
-                  <a16:creationId xmlns:a16="http://schemas.microsoft.com/office/drawing/2014/main" id="{23DE0208-C82F-C64C-B3E2-87099ECA99DA}"/>
-                </a:ext>
-              </a:extLst>
-            </p:cNvPr>
-            <p:cNvPicPr>
-              <a:picLocks noChangeAspect="1"/>
-            </p:cNvPicPr>
-            <p:nvPr/>
-          </p:nvPicPr>
-          <p:blipFill rotWithShape="1">
-            <a:blip r:embed="rId2"/>
-            <a:srcRect/>
-            <a:stretch/>
-          </p:blipFill>
-          <p:spPr>
-            <a:xfrm>
-              <a:off x="3677842" y="4194807"/>
-              <a:ext cx="951389" cy="951389"/>
-            </a:xfrm>
-            <a:prstGeom prst="rect">
-              <a:avLst/>
-            </a:prstGeom>
-          </p:spPr>
-        </p:pic>
-        <p:pic>
-          <p:nvPicPr>
-            <p:cNvPr id="145" name="Picture 144">
-              <a:extLst>
-                <a:ext uri="{FF2B5EF4-FFF2-40B4-BE49-F238E27FC236}">
-                  <a16:creationId xmlns:a16="http://schemas.microsoft.com/office/drawing/2014/main" id="{D2F5C57D-70A9-264D-BA36-DCC9E0BA2AEE}"/>
-                </a:ext>
-              </a:extLst>
-            </p:cNvPr>
-            <p:cNvPicPr>
-              <a:picLocks noChangeAspect="1"/>
-            </p:cNvPicPr>
-            <p:nvPr/>
-          </p:nvPicPr>
-          <p:blipFill>
-            <a:blip r:embed="rId3"/>
-            <a:stretch>
-              <a:fillRect/>
-            </a:stretch>
-          </p:blipFill>
-          <p:spPr>
-            <a:xfrm>
-              <a:off x="3689599" y="4220909"/>
-              <a:ext cx="881743" cy="881743"/>
-            </a:xfrm>
-            <a:prstGeom prst="rect">
-              <a:avLst/>
-            </a:prstGeom>
-          </p:spPr>
-        </p:pic>
-      </p:grpSp>
       <p:grpSp>
         <p:nvGrpSpPr>
           <p:cNvPr id="149" name="Group 148">
@@ -15710,7 +15521,6 @@
             </p:cNvPr>
             <p:cNvCxnSpPr>
               <a:cxnSpLocks/>
-              <a:stCxn id="144" idx="3"/>
               <a:endCxn id="142" idx="6"/>
             </p:cNvCxnSpPr>
             <p:nvPr/>
@@ -15804,35 +15614,6 @@
       </p:sp>
       <p:pic>
         <p:nvPicPr>
-          <p:cNvPr id="71" name="Picture 70">
-            <a:extLst>
-              <a:ext uri="{FF2B5EF4-FFF2-40B4-BE49-F238E27FC236}">
-                <a16:creationId xmlns:a16="http://schemas.microsoft.com/office/drawing/2014/main" id="{7C989062-7B01-B54E-8C54-472A69F5FD47}"/>
-              </a:ext>
-            </a:extLst>
-          </p:cNvPr>
-          <p:cNvPicPr>
-            <a:picLocks noChangeAspect="1"/>
-          </p:cNvPicPr>
-          <p:nvPr/>
-        </p:nvPicPr>
-        <p:blipFill rotWithShape="1">
-          <a:blip r:embed="rId2"/>
-          <a:srcRect/>
-          <a:stretch/>
-        </p:blipFill>
-        <p:spPr>
-          <a:xfrm>
-            <a:off x="3686542" y="4206444"/>
-            <a:ext cx="951389" cy="951389"/>
-          </a:xfrm>
-          <a:prstGeom prst="rect">
-            <a:avLst/>
-          </a:prstGeom>
-        </p:spPr>
-      </p:pic>
-      <p:pic>
-        <p:nvPicPr>
           <p:cNvPr id="72" name="Picture 71">
             <a:extLst>
               <a:ext uri="{FF2B5EF4-FFF2-40B4-BE49-F238E27FC236}">
@@ -15846,7 +15627,7 @@
           <p:nvPr/>
         </p:nvPicPr>
         <p:blipFill>
-          <a:blip r:embed="rId3"/>
+          <a:blip r:embed="rId2"/>
           <a:stretch>
             <a:fillRect/>
           </a:stretch>
@@ -15915,86 +15696,6 @@
           </a:p>
         </p:txBody>
       </p:sp>
-      <p:grpSp>
-        <p:nvGrpSpPr>
-          <p:cNvPr id="74" name="Group 73">
-            <a:extLst>
-              <a:ext uri="{FF2B5EF4-FFF2-40B4-BE49-F238E27FC236}">
-                <a16:creationId xmlns:a16="http://schemas.microsoft.com/office/drawing/2014/main" id="{E2321ACD-8472-1448-A49E-D85D2FE7D7F4}"/>
-              </a:ext>
-            </a:extLst>
-          </p:cNvPr>
-          <p:cNvGrpSpPr/>
-          <p:nvPr/>
-        </p:nvGrpSpPr>
-        <p:grpSpPr>
-          <a:xfrm>
-            <a:off x="5712517" y="4760047"/>
-            <a:ext cx="951389" cy="951389"/>
-            <a:chOff x="3677842" y="4194807"/>
-            <a:chExt cx="951389" cy="951389"/>
-          </a:xfrm>
-        </p:grpSpPr>
-        <p:pic>
-          <p:nvPicPr>
-            <p:cNvPr id="75" name="Picture 74">
-              <a:extLst>
-                <a:ext uri="{FF2B5EF4-FFF2-40B4-BE49-F238E27FC236}">
-                  <a16:creationId xmlns:a16="http://schemas.microsoft.com/office/drawing/2014/main" id="{FE6F01EC-5994-E648-B5CD-7FD3BD7008B7}"/>
-                </a:ext>
-              </a:extLst>
-            </p:cNvPr>
-            <p:cNvPicPr>
-              <a:picLocks noChangeAspect="1"/>
-            </p:cNvPicPr>
-            <p:nvPr/>
-          </p:nvPicPr>
-          <p:blipFill rotWithShape="1">
-            <a:blip r:embed="rId2"/>
-            <a:srcRect/>
-            <a:stretch/>
-          </p:blipFill>
-          <p:spPr>
-            <a:xfrm>
-              <a:off x="3677842" y="4194807"/>
-              <a:ext cx="951389" cy="951389"/>
-            </a:xfrm>
-            <a:prstGeom prst="rect">
-              <a:avLst/>
-            </a:prstGeom>
-          </p:spPr>
-        </p:pic>
-        <p:pic>
-          <p:nvPicPr>
-            <p:cNvPr id="76" name="Picture 75">
-              <a:extLst>
-                <a:ext uri="{FF2B5EF4-FFF2-40B4-BE49-F238E27FC236}">
-                  <a16:creationId xmlns:a16="http://schemas.microsoft.com/office/drawing/2014/main" id="{7436F2B5-BBE2-3A4C-A83F-95DA689EC31E}"/>
-                </a:ext>
-              </a:extLst>
-            </p:cNvPr>
-            <p:cNvPicPr>
-              <a:picLocks noChangeAspect="1"/>
-            </p:cNvPicPr>
-            <p:nvPr/>
-          </p:nvPicPr>
-          <p:blipFill>
-            <a:blip r:embed="rId3"/>
-            <a:stretch>
-              <a:fillRect/>
-            </a:stretch>
-          </p:blipFill>
-          <p:spPr>
-            <a:xfrm>
-              <a:off x="3689599" y="4220909"/>
-              <a:ext cx="881743" cy="881743"/>
-            </a:xfrm>
-            <a:prstGeom prst="rect">
-              <a:avLst/>
-            </a:prstGeom>
-          </p:spPr>
-        </p:pic>
-      </p:grpSp>
       <p:cxnSp>
         <p:nvCxnSpPr>
           <p:cNvPr id="77" name="Straight Connector 76">
@@ -16096,7 +15797,6 @@
           </p:cNvPr>
           <p:cNvCxnSpPr>
             <a:cxnSpLocks/>
-            <a:stCxn id="76" idx="1"/>
             <a:endCxn id="73" idx="6"/>
           </p:cNvCxnSpPr>
           <p:nvPr/>
@@ -16234,10 +15934,10 @@
           <p:nvPr/>
         </p:nvPicPr>
         <p:blipFill>
-          <a:blip r:embed="rId4">
+          <a:blip r:embed="rId3">
             <a:extLst>
               <a:ext uri="{96DAC541-7B7A-43D3-8B79-37D633B846F1}">
-                <asvg:svgBlip xmlns:asvg="http://schemas.microsoft.com/office/drawing/2016/SVG/main" r:embed="rId5"/>
+                <asvg:svgBlip xmlns:asvg="http://schemas.microsoft.com/office/drawing/2016/SVG/main" r:embed="rId4"/>
               </a:ext>
             </a:extLst>
           </a:blip>
@@ -16255,6 +15955,434 @@
           </a:prstGeom>
         </p:spPr>
       </p:pic>
+      <p:sp>
+        <p:nvSpPr>
+          <p:cNvPr id="36" name="Rounded Rectangle 35">
+            <a:extLst>
+              <a:ext uri="{FF2B5EF4-FFF2-40B4-BE49-F238E27FC236}">
+                <a16:creationId xmlns:a16="http://schemas.microsoft.com/office/drawing/2014/main" id="{46C4377B-65A0-DC46-BDD4-646F9F1E53C3}"/>
+              </a:ext>
+            </a:extLst>
+          </p:cNvPr>
+          <p:cNvSpPr>
+            <a:spLocks/>
+          </p:cNvSpPr>
+          <p:nvPr/>
+        </p:nvSpPr>
+        <p:spPr>
+          <a:xfrm>
+            <a:off x="1769019" y="2078955"/>
+            <a:ext cx="576072" cy="320040"/>
+          </a:xfrm>
+          <a:prstGeom prst="roundRect">
+            <a:avLst>
+              <a:gd name="adj" fmla="val 50000"/>
+            </a:avLst>
+          </a:prstGeom>
+          <a:solidFill>
+            <a:schemeClr val="bg1"/>
+          </a:solidFill>
+          <a:ln w="19050">
+            <a:solidFill>
+              <a:schemeClr val="tx1"/>
+            </a:solidFill>
+          </a:ln>
+          <a:effectLst/>
+        </p:spPr>
+        <p:style>
+          <a:lnRef idx="1">
+            <a:schemeClr val="accent1"/>
+          </a:lnRef>
+          <a:fillRef idx="3">
+            <a:schemeClr val="accent1"/>
+          </a:fillRef>
+          <a:effectRef idx="2">
+            <a:schemeClr val="accent1"/>
+          </a:effectRef>
+          <a:fontRef idx="minor">
+            <a:schemeClr val="lt1"/>
+          </a:fontRef>
+        </p:style>
+        <p:txBody>
+          <a:bodyPr rtlCol="0" anchor="ctr"/>
+          <a:lstStyle/>
+          <a:p>
+            <a:pPr algn="ctr"/>
+            <a:endParaRPr lang="en-US"/>
+          </a:p>
+        </p:txBody>
+      </p:sp>
+      <p:sp>
+        <p:nvSpPr>
+          <p:cNvPr id="37" name="Rounded Rectangle 36">
+            <a:extLst>
+              <a:ext uri="{FF2B5EF4-FFF2-40B4-BE49-F238E27FC236}">
+                <a16:creationId xmlns:a16="http://schemas.microsoft.com/office/drawing/2014/main" id="{C9231FF2-7A72-134F-A404-DF93E46C5D58}"/>
+              </a:ext>
+            </a:extLst>
+          </p:cNvPr>
+          <p:cNvSpPr/>
+          <p:nvPr/>
+        </p:nvSpPr>
+        <p:spPr>
+          <a:xfrm>
+            <a:off x="3792385" y="4561838"/>
+            <a:ext cx="576072" cy="320040"/>
+          </a:xfrm>
+          <a:prstGeom prst="roundRect">
+            <a:avLst>
+              <a:gd name="adj" fmla="val 50000"/>
+            </a:avLst>
+          </a:prstGeom>
+          <a:solidFill>
+            <a:schemeClr val="bg1"/>
+          </a:solidFill>
+          <a:ln w="19050">
+            <a:solidFill>
+              <a:schemeClr val="tx1"/>
+            </a:solidFill>
+          </a:ln>
+          <a:effectLst/>
+        </p:spPr>
+        <p:style>
+          <a:lnRef idx="1">
+            <a:schemeClr val="accent1"/>
+          </a:lnRef>
+          <a:fillRef idx="3">
+            <a:schemeClr val="accent1"/>
+          </a:fillRef>
+          <a:effectRef idx="2">
+            <a:schemeClr val="accent1"/>
+          </a:effectRef>
+          <a:fontRef idx="minor">
+            <a:schemeClr val="lt1"/>
+          </a:fontRef>
+        </p:style>
+        <p:txBody>
+          <a:bodyPr rtlCol="0" anchor="ctr"/>
+          <a:lstStyle/>
+          <a:p>
+            <a:pPr algn="ctr"/>
+            <a:endParaRPr lang="en-US"/>
+          </a:p>
+        </p:txBody>
+      </p:sp>
+      <p:sp>
+        <p:nvSpPr>
+          <p:cNvPr id="38" name="Rounded Rectangle 37">
+            <a:extLst>
+              <a:ext uri="{FF2B5EF4-FFF2-40B4-BE49-F238E27FC236}">
+                <a16:creationId xmlns:a16="http://schemas.microsoft.com/office/drawing/2014/main" id="{07D0A110-D2E8-0E47-846E-20A78DDADC8D}"/>
+              </a:ext>
+            </a:extLst>
+          </p:cNvPr>
+          <p:cNvSpPr/>
+          <p:nvPr/>
+        </p:nvSpPr>
+        <p:spPr>
+          <a:xfrm>
+            <a:off x="7384491" y="2030414"/>
+            <a:ext cx="576072" cy="320040"/>
+          </a:xfrm>
+          <a:prstGeom prst="roundRect">
+            <a:avLst>
+              <a:gd name="adj" fmla="val 50000"/>
+            </a:avLst>
+          </a:prstGeom>
+          <a:solidFill>
+            <a:schemeClr val="bg1"/>
+          </a:solidFill>
+          <a:ln w="19050">
+            <a:solidFill>
+              <a:schemeClr val="tx1"/>
+            </a:solidFill>
+          </a:ln>
+          <a:effectLst/>
+        </p:spPr>
+        <p:style>
+          <a:lnRef idx="1">
+            <a:schemeClr val="accent1"/>
+          </a:lnRef>
+          <a:fillRef idx="3">
+            <a:schemeClr val="accent1"/>
+          </a:fillRef>
+          <a:effectRef idx="2">
+            <a:schemeClr val="accent1"/>
+          </a:effectRef>
+          <a:fontRef idx="minor">
+            <a:schemeClr val="lt1"/>
+          </a:fontRef>
+        </p:style>
+        <p:txBody>
+          <a:bodyPr rtlCol="0" anchor="ctr"/>
+          <a:lstStyle/>
+          <a:p>
+            <a:pPr algn="ctr"/>
+            <a:endParaRPr lang="en-US"/>
+          </a:p>
+        </p:txBody>
+      </p:sp>
+      <p:sp>
+        <p:nvSpPr>
+          <p:cNvPr id="39" name="Rounded Rectangle 38">
+            <a:extLst>
+              <a:ext uri="{FF2B5EF4-FFF2-40B4-BE49-F238E27FC236}">
+                <a16:creationId xmlns:a16="http://schemas.microsoft.com/office/drawing/2014/main" id="{4426FEB7-E6F2-9F4C-B73C-6856935F4DDC}"/>
+              </a:ext>
+            </a:extLst>
+          </p:cNvPr>
+          <p:cNvSpPr/>
+          <p:nvPr/>
+        </p:nvSpPr>
+        <p:spPr>
+          <a:xfrm>
+            <a:off x="3818801" y="2583365"/>
+            <a:ext cx="575914" cy="315637"/>
+          </a:xfrm>
+          <a:prstGeom prst="roundRect">
+            <a:avLst>
+              <a:gd name="adj" fmla="val 50000"/>
+            </a:avLst>
+          </a:prstGeom>
+          <a:noFill/>
+          <a:ln w="19050">
+            <a:solidFill>
+              <a:schemeClr val="tx1"/>
+            </a:solidFill>
+          </a:ln>
+          <a:effectLst/>
+        </p:spPr>
+        <p:style>
+          <a:lnRef idx="1">
+            <a:schemeClr val="accent1"/>
+          </a:lnRef>
+          <a:fillRef idx="3">
+            <a:schemeClr val="accent1"/>
+          </a:fillRef>
+          <a:effectRef idx="2">
+            <a:schemeClr val="accent1"/>
+          </a:effectRef>
+          <a:fontRef idx="minor">
+            <a:schemeClr val="lt1"/>
+          </a:fontRef>
+        </p:style>
+        <p:txBody>
+          <a:bodyPr rtlCol="0" anchor="ctr"/>
+          <a:lstStyle/>
+          <a:p>
+            <a:pPr algn="ctr"/>
+            <a:endParaRPr lang="en-US"/>
+          </a:p>
+        </p:txBody>
+      </p:sp>
+      <p:grpSp>
+        <p:nvGrpSpPr>
+          <p:cNvPr id="2" name="Group 1">
+            <a:extLst>
+              <a:ext uri="{FF2B5EF4-FFF2-40B4-BE49-F238E27FC236}">
+                <a16:creationId xmlns:a16="http://schemas.microsoft.com/office/drawing/2014/main" id="{3ECC78A6-7A47-9A4E-B794-96874C1D933D}"/>
+              </a:ext>
+            </a:extLst>
+          </p:cNvPr>
+          <p:cNvGrpSpPr/>
+          <p:nvPr/>
+        </p:nvGrpSpPr>
+        <p:grpSpPr>
+          <a:xfrm>
+            <a:off x="5245372" y="2283141"/>
+            <a:ext cx="881743" cy="881743"/>
+            <a:chOff x="3822793" y="2460894"/>
+            <a:chExt cx="881743" cy="881743"/>
+          </a:xfrm>
+        </p:grpSpPr>
+        <p:pic>
+          <p:nvPicPr>
+            <p:cNvPr id="41" name="Picture 40">
+              <a:extLst>
+                <a:ext uri="{FF2B5EF4-FFF2-40B4-BE49-F238E27FC236}">
+                  <a16:creationId xmlns:a16="http://schemas.microsoft.com/office/drawing/2014/main" id="{D79D3CAC-A4DC-2544-93EA-C3D2473FF585}"/>
+                </a:ext>
+              </a:extLst>
+            </p:cNvPr>
+            <p:cNvPicPr>
+              <a:picLocks noChangeAspect="1"/>
+            </p:cNvPicPr>
+            <p:nvPr/>
+          </p:nvPicPr>
+          <p:blipFill>
+            <a:blip r:embed="rId2"/>
+            <a:stretch>
+              <a:fillRect/>
+            </a:stretch>
+          </p:blipFill>
+          <p:spPr>
+            <a:xfrm>
+              <a:off x="3822793" y="2460894"/>
+              <a:ext cx="881743" cy="881743"/>
+            </a:xfrm>
+            <a:prstGeom prst="rect">
+              <a:avLst/>
+            </a:prstGeom>
+          </p:spPr>
+        </p:pic>
+        <p:sp>
+          <p:nvSpPr>
+            <p:cNvPr id="42" name="Rounded Rectangle 41">
+              <a:extLst>
+                <a:ext uri="{FF2B5EF4-FFF2-40B4-BE49-F238E27FC236}">
+                  <a16:creationId xmlns:a16="http://schemas.microsoft.com/office/drawing/2014/main" id="{876CB60B-FEDD-524C-900B-ACF5DF0D7AE3}"/>
+                </a:ext>
+              </a:extLst>
+            </p:cNvPr>
+            <p:cNvSpPr/>
+            <p:nvPr/>
+          </p:nvSpPr>
+          <p:spPr>
+            <a:xfrm>
+              <a:off x="3971201" y="2735765"/>
+              <a:ext cx="575914" cy="315637"/>
+            </a:xfrm>
+            <a:prstGeom prst="roundRect">
+              <a:avLst>
+                <a:gd name="adj" fmla="val 50000"/>
+              </a:avLst>
+            </a:prstGeom>
+            <a:noFill/>
+            <a:ln w="19050">
+              <a:solidFill>
+                <a:schemeClr val="tx1"/>
+              </a:solidFill>
+            </a:ln>
+            <a:effectLst/>
+          </p:spPr>
+          <p:style>
+            <a:lnRef idx="1">
+              <a:schemeClr val="accent1"/>
+            </a:lnRef>
+            <a:fillRef idx="3">
+              <a:schemeClr val="accent1"/>
+            </a:fillRef>
+            <a:effectRef idx="2">
+              <a:schemeClr val="accent1"/>
+            </a:effectRef>
+            <a:fontRef idx="minor">
+              <a:schemeClr val="lt1"/>
+            </a:fontRef>
+          </p:style>
+          <p:txBody>
+            <a:bodyPr rtlCol="0" anchor="ctr"/>
+            <a:lstStyle/>
+            <a:p>
+              <a:pPr algn="ctr"/>
+              <a:endParaRPr lang="en-US"/>
+            </a:p>
+          </p:txBody>
+        </p:sp>
+      </p:grpSp>
+      <p:grpSp>
+        <p:nvGrpSpPr>
+          <p:cNvPr id="47" name="Group 46">
+            <a:extLst>
+              <a:ext uri="{FF2B5EF4-FFF2-40B4-BE49-F238E27FC236}">
+                <a16:creationId xmlns:a16="http://schemas.microsoft.com/office/drawing/2014/main" id="{B547BE06-D499-5241-AE16-5182D0FEAFD2}"/>
+              </a:ext>
+            </a:extLst>
+          </p:cNvPr>
+          <p:cNvGrpSpPr/>
+          <p:nvPr/>
+        </p:nvGrpSpPr>
+        <p:grpSpPr>
+          <a:xfrm>
+            <a:off x="5669288" y="4798208"/>
+            <a:ext cx="881743" cy="881743"/>
+            <a:chOff x="3822793" y="2460894"/>
+            <a:chExt cx="881743" cy="881743"/>
+          </a:xfrm>
+        </p:grpSpPr>
+        <p:pic>
+          <p:nvPicPr>
+            <p:cNvPr id="48" name="Picture 47">
+              <a:extLst>
+                <a:ext uri="{FF2B5EF4-FFF2-40B4-BE49-F238E27FC236}">
+                  <a16:creationId xmlns:a16="http://schemas.microsoft.com/office/drawing/2014/main" id="{D613E500-BC0B-164E-BA42-06BFBF556396}"/>
+                </a:ext>
+              </a:extLst>
+            </p:cNvPr>
+            <p:cNvPicPr>
+              <a:picLocks noChangeAspect="1"/>
+            </p:cNvPicPr>
+            <p:nvPr/>
+          </p:nvPicPr>
+          <p:blipFill>
+            <a:blip r:embed="rId2"/>
+            <a:stretch>
+              <a:fillRect/>
+            </a:stretch>
+          </p:blipFill>
+          <p:spPr>
+            <a:xfrm>
+              <a:off x="3822793" y="2460894"/>
+              <a:ext cx="881743" cy="881743"/>
+            </a:xfrm>
+            <a:prstGeom prst="rect">
+              <a:avLst/>
+            </a:prstGeom>
+          </p:spPr>
+        </p:pic>
+        <p:sp>
+          <p:nvSpPr>
+            <p:cNvPr id="49" name="Rounded Rectangle 48">
+              <a:extLst>
+                <a:ext uri="{FF2B5EF4-FFF2-40B4-BE49-F238E27FC236}">
+                  <a16:creationId xmlns:a16="http://schemas.microsoft.com/office/drawing/2014/main" id="{9EB45C12-28A0-A94B-A2D9-4A7D81D49AF8}"/>
+                </a:ext>
+              </a:extLst>
+            </p:cNvPr>
+            <p:cNvSpPr/>
+            <p:nvPr/>
+          </p:nvSpPr>
+          <p:spPr>
+            <a:xfrm>
+              <a:off x="3971201" y="2735765"/>
+              <a:ext cx="575914" cy="315637"/>
+            </a:xfrm>
+            <a:prstGeom prst="roundRect">
+              <a:avLst>
+                <a:gd name="adj" fmla="val 50000"/>
+              </a:avLst>
+            </a:prstGeom>
+            <a:noFill/>
+            <a:ln w="19050">
+              <a:solidFill>
+                <a:schemeClr val="tx1"/>
+              </a:solidFill>
+            </a:ln>
+            <a:effectLst/>
+          </p:spPr>
+          <p:style>
+            <a:lnRef idx="1">
+              <a:schemeClr val="accent1"/>
+            </a:lnRef>
+            <a:fillRef idx="3">
+              <a:schemeClr val="accent1"/>
+            </a:fillRef>
+            <a:effectRef idx="2">
+              <a:schemeClr val="accent1"/>
+            </a:effectRef>
+            <a:fontRef idx="minor">
+              <a:schemeClr val="lt1"/>
+            </a:fontRef>
+          </p:style>
+          <p:txBody>
+            <a:bodyPr rtlCol="0" anchor="ctr"/>
+            <a:lstStyle/>
+            <a:p>
+              <a:pPr algn="ctr"/>
+              <a:endParaRPr lang="en-US"/>
+            </a:p>
+          </p:txBody>
+        </p:sp>
+      </p:grpSp>
     </p:spTree>
     <p:extLst>
       <p:ext uri="{BB962C8B-B14F-4D97-AF65-F5344CB8AC3E}">
@@ -18272,7 +18400,6 @@
             </p:cNvPr>
             <p:cNvCxnSpPr>
               <a:cxnSpLocks/>
-              <a:endCxn id="82" idx="2"/>
             </p:cNvCxnSpPr>
             <p:nvPr/>
           </p:nvCxnSpPr>
@@ -19078,56 +19205,62 @@
             </a:fontRef>
           </p:style>
         </p:cxnSp>
-        <p:sp>
-          <p:nvSpPr>
-            <p:cNvPr id="82" name="Oval 81">
-              <a:extLst>
-                <a:ext uri="{FF2B5EF4-FFF2-40B4-BE49-F238E27FC236}">
-                  <a16:creationId xmlns:a16="http://schemas.microsoft.com/office/drawing/2014/main" id="{F5823AE2-095C-F14F-B26E-7BE8D4982039}"/>
-                </a:ext>
-              </a:extLst>
-            </p:cNvPr>
-            <p:cNvSpPr/>
-            <p:nvPr/>
-          </p:nvSpPr>
-          <p:spPr>
-            <a:xfrm>
-              <a:off x="6289006" y="1502284"/>
-              <a:ext cx="496352" cy="248467"/>
-            </a:xfrm>
-            <a:prstGeom prst="ellipse">
-              <a:avLst/>
-            </a:prstGeom>
-            <a:ln>
-              <a:solidFill>
-                <a:schemeClr val="tx1"/>
-              </a:solidFill>
-            </a:ln>
-          </p:spPr>
-          <p:style>
-            <a:lnRef idx="2">
-              <a:schemeClr val="accent5"/>
-            </a:lnRef>
-            <a:fillRef idx="1">
-              <a:schemeClr val="lt1"/>
-            </a:fillRef>
-            <a:effectRef idx="0">
-              <a:schemeClr val="accent5"/>
-            </a:effectRef>
-            <a:fontRef idx="minor">
-              <a:schemeClr val="dk1"/>
-            </a:fontRef>
-          </p:style>
-          <p:txBody>
-            <a:bodyPr rtlCol="0" anchor="ctr"/>
-            <a:lstStyle/>
-            <a:p>
-              <a:pPr algn="ctr"/>
-              <a:endParaRPr lang="en-US"/>
-            </a:p>
-          </p:txBody>
-        </p:sp>
       </p:grpSp>
+      <p:sp>
+        <p:nvSpPr>
+          <p:cNvPr id="3" name="Rounded Rectangle 2">
+            <a:extLst>
+              <a:ext uri="{FF2B5EF4-FFF2-40B4-BE49-F238E27FC236}">
+                <a16:creationId xmlns:a16="http://schemas.microsoft.com/office/drawing/2014/main" id="{13845E32-4A72-2947-9E45-CF568034359A}"/>
+              </a:ext>
+            </a:extLst>
+          </p:cNvPr>
+          <p:cNvSpPr/>
+          <p:nvPr/>
+        </p:nvSpPr>
+        <p:spPr>
+          <a:xfrm>
+            <a:off x="6273155" y="1351215"/>
+            <a:ext cx="515764" cy="282671"/>
+          </a:xfrm>
+          <a:prstGeom prst="roundRect">
+            <a:avLst>
+              <a:gd name="adj" fmla="val 50000"/>
+            </a:avLst>
+          </a:prstGeom>
+          <a:solidFill>
+            <a:schemeClr val="bg1"/>
+          </a:solidFill>
+          <a:ln w="38100">
+            <a:solidFill>
+              <a:schemeClr val="tx1"/>
+            </a:solidFill>
+          </a:ln>
+          <a:effectLst/>
+        </p:spPr>
+        <p:style>
+          <a:lnRef idx="1">
+            <a:schemeClr val="accent1"/>
+          </a:lnRef>
+          <a:fillRef idx="3">
+            <a:schemeClr val="accent1"/>
+          </a:fillRef>
+          <a:effectRef idx="2">
+            <a:schemeClr val="accent1"/>
+          </a:effectRef>
+          <a:fontRef idx="minor">
+            <a:schemeClr val="lt1"/>
+          </a:fontRef>
+        </p:style>
+        <p:txBody>
+          <a:bodyPr rtlCol="0" anchor="ctr"/>
+          <a:lstStyle/>
+          <a:p>
+            <a:pPr algn="ctr"/>
+            <a:endParaRPr lang="en-US"/>
+          </a:p>
+        </p:txBody>
+      </p:sp>
     </p:spTree>
     <p:extLst>
       <p:ext uri="{BB962C8B-B14F-4D97-AF65-F5344CB8AC3E}">

</xml_diff>

<commit_message>
Revert "SBOL Visual 3"
</commit_message>
<xml_diff>
--- a/specification/imgsrc/4.pptx
+++ b/specification/imgsrc/4.pptx
@@ -218,7 +218,7 @@
           <a:p>
             <a:fld id="{9E808448-E5C1-6044-9A1D-E68767CBF56D}" type="datetimeFigureOut">
               <a:rPr lang="en-US" smtClean="0"/>
-              <a:t>3/25/21</a:t>
+              <a:t>10/18/20</a:t>
             </a:fld>
             <a:endParaRPr lang="en-US"/>
           </a:p>
@@ -748,7 +748,7 @@
           <a:p>
             <a:fld id="{EBC7FFC8-011D-1246-B320-9C4FD100F423}" type="datetimeFigureOut">
               <a:rPr lang="en-US" smtClean="0"/>
-              <a:t>3/25/21</a:t>
+              <a:t>10/18/20</a:t>
             </a:fld>
             <a:endParaRPr lang="en-US"/>
           </a:p>
@@ -916,7 +916,7 @@
           <a:p>
             <a:fld id="{EBC7FFC8-011D-1246-B320-9C4FD100F423}" type="datetimeFigureOut">
               <a:rPr lang="en-US" smtClean="0"/>
-              <a:t>3/25/21</a:t>
+              <a:t>10/18/20</a:t>
             </a:fld>
             <a:endParaRPr lang="en-US"/>
           </a:p>
@@ -1094,7 +1094,7 @@
           <a:p>
             <a:fld id="{EBC7FFC8-011D-1246-B320-9C4FD100F423}" type="datetimeFigureOut">
               <a:rPr lang="en-US" smtClean="0"/>
-              <a:t>3/25/21</a:t>
+              <a:t>10/18/20</a:t>
             </a:fld>
             <a:endParaRPr lang="en-US"/>
           </a:p>
@@ -1262,7 +1262,7 @@
           <a:p>
             <a:fld id="{EBC7FFC8-011D-1246-B320-9C4FD100F423}" type="datetimeFigureOut">
               <a:rPr lang="en-US" smtClean="0"/>
-              <a:t>3/25/21</a:t>
+              <a:t>10/18/20</a:t>
             </a:fld>
             <a:endParaRPr lang="en-US"/>
           </a:p>
@@ -1507,7 +1507,7 @@
           <a:p>
             <a:fld id="{EBC7FFC8-011D-1246-B320-9C4FD100F423}" type="datetimeFigureOut">
               <a:rPr lang="en-US" smtClean="0"/>
-              <a:t>3/25/21</a:t>
+              <a:t>10/18/20</a:t>
             </a:fld>
             <a:endParaRPr lang="en-US"/>
           </a:p>
@@ -1792,7 +1792,7 @@
           <a:p>
             <a:fld id="{EBC7FFC8-011D-1246-B320-9C4FD100F423}" type="datetimeFigureOut">
               <a:rPr lang="en-US" smtClean="0"/>
-              <a:t>3/25/21</a:t>
+              <a:t>10/18/20</a:t>
             </a:fld>
             <a:endParaRPr lang="en-US"/>
           </a:p>
@@ -2211,7 +2211,7 @@
           <a:p>
             <a:fld id="{EBC7FFC8-011D-1246-B320-9C4FD100F423}" type="datetimeFigureOut">
               <a:rPr lang="en-US" smtClean="0"/>
-              <a:t>3/25/21</a:t>
+              <a:t>10/18/20</a:t>
             </a:fld>
             <a:endParaRPr lang="en-US"/>
           </a:p>
@@ -2328,7 +2328,7 @@
           <a:p>
             <a:fld id="{EBC7FFC8-011D-1246-B320-9C4FD100F423}" type="datetimeFigureOut">
               <a:rPr lang="en-US" smtClean="0"/>
-              <a:t>3/25/21</a:t>
+              <a:t>10/18/20</a:t>
             </a:fld>
             <a:endParaRPr lang="en-US"/>
           </a:p>
@@ -2423,7 +2423,7 @@
           <a:p>
             <a:fld id="{EBC7FFC8-011D-1246-B320-9C4FD100F423}" type="datetimeFigureOut">
               <a:rPr lang="en-US" smtClean="0"/>
-              <a:t>3/25/21</a:t>
+              <a:t>10/18/20</a:t>
             </a:fld>
             <a:endParaRPr lang="en-US"/>
           </a:p>
@@ -2698,7 +2698,7 @@
           <a:p>
             <a:fld id="{EBC7FFC8-011D-1246-B320-9C4FD100F423}" type="datetimeFigureOut">
               <a:rPr lang="en-US" smtClean="0"/>
-              <a:t>3/25/21</a:t>
+              <a:t>10/18/20</a:t>
             </a:fld>
             <a:endParaRPr lang="en-US"/>
           </a:p>
@@ -2950,7 +2950,7 @@
           <a:p>
             <a:fld id="{EBC7FFC8-011D-1246-B320-9C4FD100F423}" type="datetimeFigureOut">
               <a:rPr lang="en-US" smtClean="0"/>
-              <a:t>3/25/21</a:t>
+              <a:t>10/18/20</a:t>
             </a:fld>
             <a:endParaRPr lang="en-US"/>
           </a:p>
@@ -3161,7 +3161,7 @@
           <a:p>
             <a:fld id="{EBC7FFC8-011D-1246-B320-9C4FD100F423}" type="datetimeFigureOut">
               <a:rPr lang="en-US" smtClean="0"/>
-              <a:t>3/25/21</a:t>
+              <a:t>10/18/20</a:t>
             </a:fld>
             <a:endParaRPr lang="en-US"/>
           </a:p>
@@ -15003,36 +15003,6 @@
           <a:chExt cx="0" cy="0"/>
         </a:xfrm>
       </p:grpSpPr>
-      <p:pic>
-        <p:nvPicPr>
-          <p:cNvPr id="40" name="Picture 39">
-            <a:extLst>
-              <a:ext uri="{FF2B5EF4-FFF2-40B4-BE49-F238E27FC236}">
-                <a16:creationId xmlns:a16="http://schemas.microsoft.com/office/drawing/2014/main" id="{E3530BC8-3AD2-0548-9E12-66AFD8ACEF2E}"/>
-              </a:ext>
-            </a:extLst>
-          </p:cNvPr>
-          <p:cNvPicPr>
-            <a:picLocks noChangeAspect="1"/>
-          </p:cNvPicPr>
-          <p:nvPr/>
-        </p:nvPicPr>
-        <p:blipFill>
-          <a:blip r:embed="rId2"/>
-          <a:stretch>
-            <a:fillRect/>
-          </a:stretch>
-        </p:blipFill>
-        <p:spPr>
-          <a:xfrm>
-            <a:off x="3670393" y="2308494"/>
-            <a:ext cx="881743" cy="881743"/>
-          </a:xfrm>
-          <a:prstGeom prst="rect">
-            <a:avLst/>
-          </a:prstGeom>
-        </p:spPr>
-      </p:pic>
       <p:sp>
         <p:nvSpPr>
           <p:cNvPr id="67" name="TextBox 66"/>
@@ -15093,6 +15063,35 @@
       </p:sp>
       <p:pic>
         <p:nvPicPr>
+          <p:cNvPr id="45" name="Picture 44">
+            <a:extLst>
+              <a:ext uri="{FF2B5EF4-FFF2-40B4-BE49-F238E27FC236}">
+                <a16:creationId xmlns:a16="http://schemas.microsoft.com/office/drawing/2014/main" id="{49680121-DA54-CB43-8878-D9E17BB6C432}"/>
+              </a:ext>
+            </a:extLst>
+          </p:cNvPr>
+          <p:cNvPicPr>
+            <a:picLocks noChangeAspect="1"/>
+          </p:cNvPicPr>
+          <p:nvPr/>
+        </p:nvPicPr>
+        <p:blipFill rotWithShape="1">
+          <a:blip r:embed="rId2"/>
+          <a:srcRect/>
+          <a:stretch/>
+        </p:blipFill>
+        <p:spPr>
+          <a:xfrm>
+            <a:off x="1682084" y="1720607"/>
+            <a:ext cx="951389" cy="951389"/>
+          </a:xfrm>
+          <a:prstGeom prst="rect">
+            <a:avLst/>
+          </a:prstGeom>
+        </p:spPr>
+      </p:pic>
+      <p:pic>
+        <p:nvPicPr>
           <p:cNvPr id="123" name="Picture 122">
             <a:extLst>
               <a:ext uri="{FF2B5EF4-FFF2-40B4-BE49-F238E27FC236}">
@@ -15106,7 +15105,7 @@
           <p:nvPr/>
         </p:nvPicPr>
         <p:blipFill>
-          <a:blip r:embed="rId2"/>
+          <a:blip r:embed="rId3"/>
           <a:stretch>
             <a:fillRect/>
           </a:stretch>
@@ -15175,6 +15174,86 @@
           </a:p>
         </p:txBody>
       </p:sp>
+      <p:grpSp>
+        <p:nvGrpSpPr>
+          <p:cNvPr id="127" name="Group 126">
+            <a:extLst>
+              <a:ext uri="{FF2B5EF4-FFF2-40B4-BE49-F238E27FC236}">
+                <a16:creationId xmlns:a16="http://schemas.microsoft.com/office/drawing/2014/main" id="{65ABCA0A-8BD9-1B43-BDB1-F8ADDD6B9DD6}"/>
+              </a:ext>
+            </a:extLst>
+          </p:cNvPr>
+          <p:cNvGrpSpPr/>
+          <p:nvPr/>
+        </p:nvGrpSpPr>
+        <p:grpSpPr>
+          <a:xfrm>
+            <a:off x="3708059" y="2274210"/>
+            <a:ext cx="951389" cy="951389"/>
+            <a:chOff x="3677842" y="4194807"/>
+            <a:chExt cx="951389" cy="951389"/>
+          </a:xfrm>
+        </p:grpSpPr>
+        <p:pic>
+          <p:nvPicPr>
+            <p:cNvPr id="125" name="Picture 124">
+              <a:extLst>
+                <a:ext uri="{FF2B5EF4-FFF2-40B4-BE49-F238E27FC236}">
+                  <a16:creationId xmlns:a16="http://schemas.microsoft.com/office/drawing/2014/main" id="{D7F085B7-6C0B-DA4B-AC9B-D1ACA26D393E}"/>
+                </a:ext>
+              </a:extLst>
+            </p:cNvPr>
+            <p:cNvPicPr>
+              <a:picLocks noChangeAspect="1"/>
+            </p:cNvPicPr>
+            <p:nvPr/>
+          </p:nvPicPr>
+          <p:blipFill rotWithShape="1">
+            <a:blip r:embed="rId2"/>
+            <a:srcRect/>
+            <a:stretch/>
+          </p:blipFill>
+          <p:spPr>
+            <a:xfrm>
+              <a:off x="3677842" y="4194807"/>
+              <a:ext cx="951389" cy="951389"/>
+            </a:xfrm>
+            <a:prstGeom prst="rect">
+              <a:avLst/>
+            </a:prstGeom>
+          </p:spPr>
+        </p:pic>
+        <p:pic>
+          <p:nvPicPr>
+            <p:cNvPr id="126" name="Picture 125">
+              <a:extLst>
+                <a:ext uri="{FF2B5EF4-FFF2-40B4-BE49-F238E27FC236}">
+                  <a16:creationId xmlns:a16="http://schemas.microsoft.com/office/drawing/2014/main" id="{F8F00EC9-A535-1E43-BA3F-A27E5FDB59D6}"/>
+                </a:ext>
+              </a:extLst>
+            </p:cNvPr>
+            <p:cNvPicPr>
+              <a:picLocks noChangeAspect="1"/>
+            </p:cNvPicPr>
+            <p:nvPr/>
+          </p:nvPicPr>
+          <p:blipFill>
+            <a:blip r:embed="rId3"/>
+            <a:stretch>
+              <a:fillRect/>
+            </a:stretch>
+          </p:blipFill>
+          <p:spPr>
+            <a:xfrm>
+              <a:off x="3689599" y="4220909"/>
+              <a:ext cx="881743" cy="881743"/>
+            </a:xfrm>
+            <a:prstGeom prst="rect">
+              <a:avLst/>
+            </a:prstGeom>
+          </p:spPr>
+        </p:pic>
+      </p:grpSp>
       <p:cxnSp>
         <p:nvCxnSpPr>
           <p:cNvPr id="129" name="Straight Connector 128">
@@ -15276,6 +15355,7 @@
           </p:cNvPr>
           <p:cNvCxnSpPr>
             <a:cxnSpLocks/>
+            <a:stCxn id="126" idx="1"/>
             <a:endCxn id="124" idx="6"/>
           </p:cNvCxnSpPr>
           <p:nvPr/>
@@ -15314,6 +15394,35 @@
       </p:cxnSp>
       <p:pic>
         <p:nvPicPr>
+          <p:cNvPr id="140" name="Picture 139">
+            <a:extLst>
+              <a:ext uri="{FF2B5EF4-FFF2-40B4-BE49-F238E27FC236}">
+                <a16:creationId xmlns:a16="http://schemas.microsoft.com/office/drawing/2014/main" id="{F942D285-6BCB-7F4F-B35A-CFBAE3FAEDC3}"/>
+              </a:ext>
+            </a:extLst>
+          </p:cNvPr>
+          <p:cNvPicPr>
+            <a:picLocks noChangeAspect="1"/>
+          </p:cNvPicPr>
+          <p:nvPr/>
+        </p:nvPicPr>
+        <p:blipFill rotWithShape="1">
+          <a:blip r:embed="rId2"/>
+          <a:srcRect/>
+          <a:stretch/>
+        </p:blipFill>
+        <p:spPr>
+          <a:xfrm>
+            <a:off x="7170662" y="1680340"/>
+            <a:ext cx="951389" cy="951389"/>
+          </a:xfrm>
+          <a:prstGeom prst="rect">
+            <a:avLst/>
+          </a:prstGeom>
+        </p:spPr>
+      </p:pic>
+      <p:pic>
+        <p:nvPicPr>
           <p:cNvPr id="141" name="Picture 140">
             <a:extLst>
               <a:ext uri="{FF2B5EF4-FFF2-40B4-BE49-F238E27FC236}">
@@ -15327,7 +15436,7 @@
           <p:nvPr/>
         </p:nvPicPr>
         <p:blipFill>
-          <a:blip r:embed="rId2"/>
+          <a:blip r:embed="rId3"/>
           <a:stretch>
             <a:fillRect/>
           </a:stretch>
@@ -15342,6 +15451,86 @@
           </a:prstGeom>
         </p:spPr>
       </p:pic>
+      <p:grpSp>
+        <p:nvGrpSpPr>
+          <p:cNvPr id="143" name="Group 142">
+            <a:extLst>
+              <a:ext uri="{FF2B5EF4-FFF2-40B4-BE49-F238E27FC236}">
+                <a16:creationId xmlns:a16="http://schemas.microsoft.com/office/drawing/2014/main" id="{D7BAA2FD-E061-B347-8091-0EFD96FAED8E}"/>
+              </a:ext>
+            </a:extLst>
+          </p:cNvPr>
+          <p:cNvGrpSpPr/>
+          <p:nvPr/>
+        </p:nvGrpSpPr>
+        <p:grpSpPr>
+          <a:xfrm>
+            <a:off x="5144687" y="2241552"/>
+            <a:ext cx="951389" cy="951389"/>
+            <a:chOff x="3677842" y="4194807"/>
+            <a:chExt cx="951389" cy="951389"/>
+          </a:xfrm>
+        </p:grpSpPr>
+        <p:pic>
+          <p:nvPicPr>
+            <p:cNvPr id="144" name="Picture 143">
+              <a:extLst>
+                <a:ext uri="{FF2B5EF4-FFF2-40B4-BE49-F238E27FC236}">
+                  <a16:creationId xmlns:a16="http://schemas.microsoft.com/office/drawing/2014/main" id="{23DE0208-C82F-C64C-B3E2-87099ECA99DA}"/>
+                </a:ext>
+              </a:extLst>
+            </p:cNvPr>
+            <p:cNvPicPr>
+              <a:picLocks noChangeAspect="1"/>
+            </p:cNvPicPr>
+            <p:nvPr/>
+          </p:nvPicPr>
+          <p:blipFill rotWithShape="1">
+            <a:blip r:embed="rId2"/>
+            <a:srcRect/>
+            <a:stretch/>
+          </p:blipFill>
+          <p:spPr>
+            <a:xfrm>
+              <a:off x="3677842" y="4194807"/>
+              <a:ext cx="951389" cy="951389"/>
+            </a:xfrm>
+            <a:prstGeom prst="rect">
+              <a:avLst/>
+            </a:prstGeom>
+          </p:spPr>
+        </p:pic>
+        <p:pic>
+          <p:nvPicPr>
+            <p:cNvPr id="145" name="Picture 144">
+              <a:extLst>
+                <a:ext uri="{FF2B5EF4-FFF2-40B4-BE49-F238E27FC236}">
+                  <a16:creationId xmlns:a16="http://schemas.microsoft.com/office/drawing/2014/main" id="{D2F5C57D-70A9-264D-BA36-DCC9E0BA2AEE}"/>
+                </a:ext>
+              </a:extLst>
+            </p:cNvPr>
+            <p:cNvPicPr>
+              <a:picLocks noChangeAspect="1"/>
+            </p:cNvPicPr>
+            <p:nvPr/>
+          </p:nvPicPr>
+          <p:blipFill>
+            <a:blip r:embed="rId3"/>
+            <a:stretch>
+              <a:fillRect/>
+            </a:stretch>
+          </p:blipFill>
+          <p:spPr>
+            <a:xfrm>
+              <a:off x="3689599" y="4220909"/>
+              <a:ext cx="881743" cy="881743"/>
+            </a:xfrm>
+            <a:prstGeom prst="rect">
+              <a:avLst/>
+            </a:prstGeom>
+          </p:spPr>
+        </p:pic>
+      </p:grpSp>
       <p:grpSp>
         <p:nvGrpSpPr>
           <p:cNvPr id="149" name="Group 148">
@@ -15521,6 +15710,7 @@
             </p:cNvPr>
             <p:cNvCxnSpPr>
               <a:cxnSpLocks/>
+              <a:stCxn id="144" idx="3"/>
               <a:endCxn id="142" idx="6"/>
             </p:cNvCxnSpPr>
             <p:nvPr/>
@@ -15614,6 +15804,35 @@
       </p:sp>
       <p:pic>
         <p:nvPicPr>
+          <p:cNvPr id="71" name="Picture 70">
+            <a:extLst>
+              <a:ext uri="{FF2B5EF4-FFF2-40B4-BE49-F238E27FC236}">
+                <a16:creationId xmlns:a16="http://schemas.microsoft.com/office/drawing/2014/main" id="{7C989062-7B01-B54E-8C54-472A69F5FD47}"/>
+              </a:ext>
+            </a:extLst>
+          </p:cNvPr>
+          <p:cNvPicPr>
+            <a:picLocks noChangeAspect="1"/>
+          </p:cNvPicPr>
+          <p:nvPr/>
+        </p:nvPicPr>
+        <p:blipFill rotWithShape="1">
+          <a:blip r:embed="rId2"/>
+          <a:srcRect/>
+          <a:stretch/>
+        </p:blipFill>
+        <p:spPr>
+          <a:xfrm>
+            <a:off x="3686542" y="4206444"/>
+            <a:ext cx="951389" cy="951389"/>
+          </a:xfrm>
+          <a:prstGeom prst="rect">
+            <a:avLst/>
+          </a:prstGeom>
+        </p:spPr>
+      </p:pic>
+      <p:pic>
+        <p:nvPicPr>
           <p:cNvPr id="72" name="Picture 71">
             <a:extLst>
               <a:ext uri="{FF2B5EF4-FFF2-40B4-BE49-F238E27FC236}">
@@ -15627,7 +15846,7 @@
           <p:nvPr/>
         </p:nvPicPr>
         <p:blipFill>
-          <a:blip r:embed="rId2"/>
+          <a:blip r:embed="rId3"/>
           <a:stretch>
             <a:fillRect/>
           </a:stretch>
@@ -15696,6 +15915,86 @@
           </a:p>
         </p:txBody>
       </p:sp>
+      <p:grpSp>
+        <p:nvGrpSpPr>
+          <p:cNvPr id="74" name="Group 73">
+            <a:extLst>
+              <a:ext uri="{FF2B5EF4-FFF2-40B4-BE49-F238E27FC236}">
+                <a16:creationId xmlns:a16="http://schemas.microsoft.com/office/drawing/2014/main" id="{E2321ACD-8472-1448-A49E-D85D2FE7D7F4}"/>
+              </a:ext>
+            </a:extLst>
+          </p:cNvPr>
+          <p:cNvGrpSpPr/>
+          <p:nvPr/>
+        </p:nvGrpSpPr>
+        <p:grpSpPr>
+          <a:xfrm>
+            <a:off x="5712517" y="4760047"/>
+            <a:ext cx="951389" cy="951389"/>
+            <a:chOff x="3677842" y="4194807"/>
+            <a:chExt cx="951389" cy="951389"/>
+          </a:xfrm>
+        </p:grpSpPr>
+        <p:pic>
+          <p:nvPicPr>
+            <p:cNvPr id="75" name="Picture 74">
+              <a:extLst>
+                <a:ext uri="{FF2B5EF4-FFF2-40B4-BE49-F238E27FC236}">
+                  <a16:creationId xmlns:a16="http://schemas.microsoft.com/office/drawing/2014/main" id="{FE6F01EC-5994-E648-B5CD-7FD3BD7008B7}"/>
+                </a:ext>
+              </a:extLst>
+            </p:cNvPr>
+            <p:cNvPicPr>
+              <a:picLocks noChangeAspect="1"/>
+            </p:cNvPicPr>
+            <p:nvPr/>
+          </p:nvPicPr>
+          <p:blipFill rotWithShape="1">
+            <a:blip r:embed="rId2"/>
+            <a:srcRect/>
+            <a:stretch/>
+          </p:blipFill>
+          <p:spPr>
+            <a:xfrm>
+              <a:off x="3677842" y="4194807"/>
+              <a:ext cx="951389" cy="951389"/>
+            </a:xfrm>
+            <a:prstGeom prst="rect">
+              <a:avLst/>
+            </a:prstGeom>
+          </p:spPr>
+        </p:pic>
+        <p:pic>
+          <p:nvPicPr>
+            <p:cNvPr id="76" name="Picture 75">
+              <a:extLst>
+                <a:ext uri="{FF2B5EF4-FFF2-40B4-BE49-F238E27FC236}">
+                  <a16:creationId xmlns:a16="http://schemas.microsoft.com/office/drawing/2014/main" id="{7436F2B5-BBE2-3A4C-A83F-95DA689EC31E}"/>
+                </a:ext>
+              </a:extLst>
+            </p:cNvPr>
+            <p:cNvPicPr>
+              <a:picLocks noChangeAspect="1"/>
+            </p:cNvPicPr>
+            <p:nvPr/>
+          </p:nvPicPr>
+          <p:blipFill>
+            <a:blip r:embed="rId3"/>
+            <a:stretch>
+              <a:fillRect/>
+            </a:stretch>
+          </p:blipFill>
+          <p:spPr>
+            <a:xfrm>
+              <a:off x="3689599" y="4220909"/>
+              <a:ext cx="881743" cy="881743"/>
+            </a:xfrm>
+            <a:prstGeom prst="rect">
+              <a:avLst/>
+            </a:prstGeom>
+          </p:spPr>
+        </p:pic>
+      </p:grpSp>
       <p:cxnSp>
         <p:nvCxnSpPr>
           <p:cNvPr id="77" name="Straight Connector 76">
@@ -15797,6 +16096,7 @@
           </p:cNvPr>
           <p:cNvCxnSpPr>
             <a:cxnSpLocks/>
+            <a:stCxn id="76" idx="1"/>
             <a:endCxn id="73" idx="6"/>
           </p:cNvCxnSpPr>
           <p:nvPr/>
@@ -15934,10 +16234,10 @@
           <p:nvPr/>
         </p:nvPicPr>
         <p:blipFill>
-          <a:blip r:embed="rId3">
+          <a:blip r:embed="rId4">
             <a:extLst>
               <a:ext uri="{96DAC541-7B7A-43D3-8B79-37D633B846F1}">
-                <asvg:svgBlip xmlns:asvg="http://schemas.microsoft.com/office/drawing/2016/SVG/main" r:embed="rId4"/>
+                <asvg:svgBlip xmlns:asvg="http://schemas.microsoft.com/office/drawing/2016/SVG/main" r:embed="rId5"/>
               </a:ext>
             </a:extLst>
           </a:blip>
@@ -15955,434 +16255,6 @@
           </a:prstGeom>
         </p:spPr>
       </p:pic>
-      <p:sp>
-        <p:nvSpPr>
-          <p:cNvPr id="36" name="Rounded Rectangle 35">
-            <a:extLst>
-              <a:ext uri="{FF2B5EF4-FFF2-40B4-BE49-F238E27FC236}">
-                <a16:creationId xmlns:a16="http://schemas.microsoft.com/office/drawing/2014/main" id="{46C4377B-65A0-DC46-BDD4-646F9F1E53C3}"/>
-              </a:ext>
-            </a:extLst>
-          </p:cNvPr>
-          <p:cNvSpPr>
-            <a:spLocks/>
-          </p:cNvSpPr>
-          <p:nvPr/>
-        </p:nvSpPr>
-        <p:spPr>
-          <a:xfrm>
-            <a:off x="1769019" y="2078955"/>
-            <a:ext cx="576072" cy="320040"/>
-          </a:xfrm>
-          <a:prstGeom prst="roundRect">
-            <a:avLst>
-              <a:gd name="adj" fmla="val 50000"/>
-            </a:avLst>
-          </a:prstGeom>
-          <a:solidFill>
-            <a:schemeClr val="bg1"/>
-          </a:solidFill>
-          <a:ln w="19050">
-            <a:solidFill>
-              <a:schemeClr val="tx1"/>
-            </a:solidFill>
-          </a:ln>
-          <a:effectLst/>
-        </p:spPr>
-        <p:style>
-          <a:lnRef idx="1">
-            <a:schemeClr val="accent1"/>
-          </a:lnRef>
-          <a:fillRef idx="3">
-            <a:schemeClr val="accent1"/>
-          </a:fillRef>
-          <a:effectRef idx="2">
-            <a:schemeClr val="accent1"/>
-          </a:effectRef>
-          <a:fontRef idx="minor">
-            <a:schemeClr val="lt1"/>
-          </a:fontRef>
-        </p:style>
-        <p:txBody>
-          <a:bodyPr rtlCol="0" anchor="ctr"/>
-          <a:lstStyle/>
-          <a:p>
-            <a:pPr algn="ctr"/>
-            <a:endParaRPr lang="en-US"/>
-          </a:p>
-        </p:txBody>
-      </p:sp>
-      <p:sp>
-        <p:nvSpPr>
-          <p:cNvPr id="37" name="Rounded Rectangle 36">
-            <a:extLst>
-              <a:ext uri="{FF2B5EF4-FFF2-40B4-BE49-F238E27FC236}">
-                <a16:creationId xmlns:a16="http://schemas.microsoft.com/office/drawing/2014/main" id="{C9231FF2-7A72-134F-A404-DF93E46C5D58}"/>
-              </a:ext>
-            </a:extLst>
-          </p:cNvPr>
-          <p:cNvSpPr/>
-          <p:nvPr/>
-        </p:nvSpPr>
-        <p:spPr>
-          <a:xfrm>
-            <a:off x="3792385" y="4561838"/>
-            <a:ext cx="576072" cy="320040"/>
-          </a:xfrm>
-          <a:prstGeom prst="roundRect">
-            <a:avLst>
-              <a:gd name="adj" fmla="val 50000"/>
-            </a:avLst>
-          </a:prstGeom>
-          <a:solidFill>
-            <a:schemeClr val="bg1"/>
-          </a:solidFill>
-          <a:ln w="19050">
-            <a:solidFill>
-              <a:schemeClr val="tx1"/>
-            </a:solidFill>
-          </a:ln>
-          <a:effectLst/>
-        </p:spPr>
-        <p:style>
-          <a:lnRef idx="1">
-            <a:schemeClr val="accent1"/>
-          </a:lnRef>
-          <a:fillRef idx="3">
-            <a:schemeClr val="accent1"/>
-          </a:fillRef>
-          <a:effectRef idx="2">
-            <a:schemeClr val="accent1"/>
-          </a:effectRef>
-          <a:fontRef idx="minor">
-            <a:schemeClr val="lt1"/>
-          </a:fontRef>
-        </p:style>
-        <p:txBody>
-          <a:bodyPr rtlCol="0" anchor="ctr"/>
-          <a:lstStyle/>
-          <a:p>
-            <a:pPr algn="ctr"/>
-            <a:endParaRPr lang="en-US"/>
-          </a:p>
-        </p:txBody>
-      </p:sp>
-      <p:sp>
-        <p:nvSpPr>
-          <p:cNvPr id="38" name="Rounded Rectangle 37">
-            <a:extLst>
-              <a:ext uri="{FF2B5EF4-FFF2-40B4-BE49-F238E27FC236}">
-                <a16:creationId xmlns:a16="http://schemas.microsoft.com/office/drawing/2014/main" id="{07D0A110-D2E8-0E47-846E-20A78DDADC8D}"/>
-              </a:ext>
-            </a:extLst>
-          </p:cNvPr>
-          <p:cNvSpPr/>
-          <p:nvPr/>
-        </p:nvSpPr>
-        <p:spPr>
-          <a:xfrm>
-            <a:off x="7384491" y="2030414"/>
-            <a:ext cx="576072" cy="320040"/>
-          </a:xfrm>
-          <a:prstGeom prst="roundRect">
-            <a:avLst>
-              <a:gd name="adj" fmla="val 50000"/>
-            </a:avLst>
-          </a:prstGeom>
-          <a:solidFill>
-            <a:schemeClr val="bg1"/>
-          </a:solidFill>
-          <a:ln w="19050">
-            <a:solidFill>
-              <a:schemeClr val="tx1"/>
-            </a:solidFill>
-          </a:ln>
-          <a:effectLst/>
-        </p:spPr>
-        <p:style>
-          <a:lnRef idx="1">
-            <a:schemeClr val="accent1"/>
-          </a:lnRef>
-          <a:fillRef idx="3">
-            <a:schemeClr val="accent1"/>
-          </a:fillRef>
-          <a:effectRef idx="2">
-            <a:schemeClr val="accent1"/>
-          </a:effectRef>
-          <a:fontRef idx="minor">
-            <a:schemeClr val="lt1"/>
-          </a:fontRef>
-        </p:style>
-        <p:txBody>
-          <a:bodyPr rtlCol="0" anchor="ctr"/>
-          <a:lstStyle/>
-          <a:p>
-            <a:pPr algn="ctr"/>
-            <a:endParaRPr lang="en-US"/>
-          </a:p>
-        </p:txBody>
-      </p:sp>
-      <p:sp>
-        <p:nvSpPr>
-          <p:cNvPr id="39" name="Rounded Rectangle 38">
-            <a:extLst>
-              <a:ext uri="{FF2B5EF4-FFF2-40B4-BE49-F238E27FC236}">
-                <a16:creationId xmlns:a16="http://schemas.microsoft.com/office/drawing/2014/main" id="{4426FEB7-E6F2-9F4C-B73C-6856935F4DDC}"/>
-              </a:ext>
-            </a:extLst>
-          </p:cNvPr>
-          <p:cNvSpPr/>
-          <p:nvPr/>
-        </p:nvSpPr>
-        <p:spPr>
-          <a:xfrm>
-            <a:off x="3818801" y="2583365"/>
-            <a:ext cx="575914" cy="315637"/>
-          </a:xfrm>
-          <a:prstGeom prst="roundRect">
-            <a:avLst>
-              <a:gd name="adj" fmla="val 50000"/>
-            </a:avLst>
-          </a:prstGeom>
-          <a:noFill/>
-          <a:ln w="19050">
-            <a:solidFill>
-              <a:schemeClr val="tx1"/>
-            </a:solidFill>
-          </a:ln>
-          <a:effectLst/>
-        </p:spPr>
-        <p:style>
-          <a:lnRef idx="1">
-            <a:schemeClr val="accent1"/>
-          </a:lnRef>
-          <a:fillRef idx="3">
-            <a:schemeClr val="accent1"/>
-          </a:fillRef>
-          <a:effectRef idx="2">
-            <a:schemeClr val="accent1"/>
-          </a:effectRef>
-          <a:fontRef idx="minor">
-            <a:schemeClr val="lt1"/>
-          </a:fontRef>
-        </p:style>
-        <p:txBody>
-          <a:bodyPr rtlCol="0" anchor="ctr"/>
-          <a:lstStyle/>
-          <a:p>
-            <a:pPr algn="ctr"/>
-            <a:endParaRPr lang="en-US"/>
-          </a:p>
-        </p:txBody>
-      </p:sp>
-      <p:grpSp>
-        <p:nvGrpSpPr>
-          <p:cNvPr id="2" name="Group 1">
-            <a:extLst>
-              <a:ext uri="{FF2B5EF4-FFF2-40B4-BE49-F238E27FC236}">
-                <a16:creationId xmlns:a16="http://schemas.microsoft.com/office/drawing/2014/main" id="{3ECC78A6-7A47-9A4E-B794-96874C1D933D}"/>
-              </a:ext>
-            </a:extLst>
-          </p:cNvPr>
-          <p:cNvGrpSpPr/>
-          <p:nvPr/>
-        </p:nvGrpSpPr>
-        <p:grpSpPr>
-          <a:xfrm>
-            <a:off x="5245372" y="2283141"/>
-            <a:ext cx="881743" cy="881743"/>
-            <a:chOff x="3822793" y="2460894"/>
-            <a:chExt cx="881743" cy="881743"/>
-          </a:xfrm>
-        </p:grpSpPr>
-        <p:pic>
-          <p:nvPicPr>
-            <p:cNvPr id="41" name="Picture 40">
-              <a:extLst>
-                <a:ext uri="{FF2B5EF4-FFF2-40B4-BE49-F238E27FC236}">
-                  <a16:creationId xmlns:a16="http://schemas.microsoft.com/office/drawing/2014/main" id="{D79D3CAC-A4DC-2544-93EA-C3D2473FF585}"/>
-                </a:ext>
-              </a:extLst>
-            </p:cNvPr>
-            <p:cNvPicPr>
-              <a:picLocks noChangeAspect="1"/>
-            </p:cNvPicPr>
-            <p:nvPr/>
-          </p:nvPicPr>
-          <p:blipFill>
-            <a:blip r:embed="rId2"/>
-            <a:stretch>
-              <a:fillRect/>
-            </a:stretch>
-          </p:blipFill>
-          <p:spPr>
-            <a:xfrm>
-              <a:off x="3822793" y="2460894"/>
-              <a:ext cx="881743" cy="881743"/>
-            </a:xfrm>
-            <a:prstGeom prst="rect">
-              <a:avLst/>
-            </a:prstGeom>
-          </p:spPr>
-        </p:pic>
-        <p:sp>
-          <p:nvSpPr>
-            <p:cNvPr id="42" name="Rounded Rectangle 41">
-              <a:extLst>
-                <a:ext uri="{FF2B5EF4-FFF2-40B4-BE49-F238E27FC236}">
-                  <a16:creationId xmlns:a16="http://schemas.microsoft.com/office/drawing/2014/main" id="{876CB60B-FEDD-524C-900B-ACF5DF0D7AE3}"/>
-                </a:ext>
-              </a:extLst>
-            </p:cNvPr>
-            <p:cNvSpPr/>
-            <p:nvPr/>
-          </p:nvSpPr>
-          <p:spPr>
-            <a:xfrm>
-              <a:off x="3971201" y="2735765"/>
-              <a:ext cx="575914" cy="315637"/>
-            </a:xfrm>
-            <a:prstGeom prst="roundRect">
-              <a:avLst>
-                <a:gd name="adj" fmla="val 50000"/>
-              </a:avLst>
-            </a:prstGeom>
-            <a:noFill/>
-            <a:ln w="19050">
-              <a:solidFill>
-                <a:schemeClr val="tx1"/>
-              </a:solidFill>
-            </a:ln>
-            <a:effectLst/>
-          </p:spPr>
-          <p:style>
-            <a:lnRef idx="1">
-              <a:schemeClr val="accent1"/>
-            </a:lnRef>
-            <a:fillRef idx="3">
-              <a:schemeClr val="accent1"/>
-            </a:fillRef>
-            <a:effectRef idx="2">
-              <a:schemeClr val="accent1"/>
-            </a:effectRef>
-            <a:fontRef idx="minor">
-              <a:schemeClr val="lt1"/>
-            </a:fontRef>
-          </p:style>
-          <p:txBody>
-            <a:bodyPr rtlCol="0" anchor="ctr"/>
-            <a:lstStyle/>
-            <a:p>
-              <a:pPr algn="ctr"/>
-              <a:endParaRPr lang="en-US"/>
-            </a:p>
-          </p:txBody>
-        </p:sp>
-      </p:grpSp>
-      <p:grpSp>
-        <p:nvGrpSpPr>
-          <p:cNvPr id="47" name="Group 46">
-            <a:extLst>
-              <a:ext uri="{FF2B5EF4-FFF2-40B4-BE49-F238E27FC236}">
-                <a16:creationId xmlns:a16="http://schemas.microsoft.com/office/drawing/2014/main" id="{B547BE06-D499-5241-AE16-5182D0FEAFD2}"/>
-              </a:ext>
-            </a:extLst>
-          </p:cNvPr>
-          <p:cNvGrpSpPr/>
-          <p:nvPr/>
-        </p:nvGrpSpPr>
-        <p:grpSpPr>
-          <a:xfrm>
-            <a:off x="5669288" y="4798208"/>
-            <a:ext cx="881743" cy="881743"/>
-            <a:chOff x="3822793" y="2460894"/>
-            <a:chExt cx="881743" cy="881743"/>
-          </a:xfrm>
-        </p:grpSpPr>
-        <p:pic>
-          <p:nvPicPr>
-            <p:cNvPr id="48" name="Picture 47">
-              <a:extLst>
-                <a:ext uri="{FF2B5EF4-FFF2-40B4-BE49-F238E27FC236}">
-                  <a16:creationId xmlns:a16="http://schemas.microsoft.com/office/drawing/2014/main" id="{D613E500-BC0B-164E-BA42-06BFBF556396}"/>
-                </a:ext>
-              </a:extLst>
-            </p:cNvPr>
-            <p:cNvPicPr>
-              <a:picLocks noChangeAspect="1"/>
-            </p:cNvPicPr>
-            <p:nvPr/>
-          </p:nvPicPr>
-          <p:blipFill>
-            <a:blip r:embed="rId2"/>
-            <a:stretch>
-              <a:fillRect/>
-            </a:stretch>
-          </p:blipFill>
-          <p:spPr>
-            <a:xfrm>
-              <a:off x="3822793" y="2460894"/>
-              <a:ext cx="881743" cy="881743"/>
-            </a:xfrm>
-            <a:prstGeom prst="rect">
-              <a:avLst/>
-            </a:prstGeom>
-          </p:spPr>
-        </p:pic>
-        <p:sp>
-          <p:nvSpPr>
-            <p:cNvPr id="49" name="Rounded Rectangle 48">
-              <a:extLst>
-                <a:ext uri="{FF2B5EF4-FFF2-40B4-BE49-F238E27FC236}">
-                  <a16:creationId xmlns:a16="http://schemas.microsoft.com/office/drawing/2014/main" id="{9EB45C12-28A0-A94B-A2D9-4A7D81D49AF8}"/>
-                </a:ext>
-              </a:extLst>
-            </p:cNvPr>
-            <p:cNvSpPr/>
-            <p:nvPr/>
-          </p:nvSpPr>
-          <p:spPr>
-            <a:xfrm>
-              <a:off x="3971201" y="2735765"/>
-              <a:ext cx="575914" cy="315637"/>
-            </a:xfrm>
-            <a:prstGeom prst="roundRect">
-              <a:avLst>
-                <a:gd name="adj" fmla="val 50000"/>
-              </a:avLst>
-            </a:prstGeom>
-            <a:noFill/>
-            <a:ln w="19050">
-              <a:solidFill>
-                <a:schemeClr val="tx1"/>
-              </a:solidFill>
-            </a:ln>
-            <a:effectLst/>
-          </p:spPr>
-          <p:style>
-            <a:lnRef idx="1">
-              <a:schemeClr val="accent1"/>
-            </a:lnRef>
-            <a:fillRef idx="3">
-              <a:schemeClr val="accent1"/>
-            </a:fillRef>
-            <a:effectRef idx="2">
-              <a:schemeClr val="accent1"/>
-            </a:effectRef>
-            <a:fontRef idx="minor">
-              <a:schemeClr val="lt1"/>
-            </a:fontRef>
-          </p:style>
-          <p:txBody>
-            <a:bodyPr rtlCol="0" anchor="ctr"/>
-            <a:lstStyle/>
-            <a:p>
-              <a:pPr algn="ctr"/>
-              <a:endParaRPr lang="en-US"/>
-            </a:p>
-          </p:txBody>
-        </p:sp>
-      </p:grpSp>
     </p:spTree>
     <p:extLst>
       <p:ext uri="{BB962C8B-B14F-4D97-AF65-F5344CB8AC3E}">
@@ -18400,6 +18272,7 @@
             </p:cNvPr>
             <p:cNvCxnSpPr>
               <a:cxnSpLocks/>
+              <a:endCxn id="82" idx="2"/>
             </p:cNvCxnSpPr>
             <p:nvPr/>
           </p:nvCxnSpPr>
@@ -19205,62 +19078,56 @@
             </a:fontRef>
           </p:style>
         </p:cxnSp>
+        <p:sp>
+          <p:nvSpPr>
+            <p:cNvPr id="82" name="Oval 81">
+              <a:extLst>
+                <a:ext uri="{FF2B5EF4-FFF2-40B4-BE49-F238E27FC236}">
+                  <a16:creationId xmlns:a16="http://schemas.microsoft.com/office/drawing/2014/main" id="{F5823AE2-095C-F14F-B26E-7BE8D4982039}"/>
+                </a:ext>
+              </a:extLst>
+            </p:cNvPr>
+            <p:cNvSpPr/>
+            <p:nvPr/>
+          </p:nvSpPr>
+          <p:spPr>
+            <a:xfrm>
+              <a:off x="6289006" y="1502284"/>
+              <a:ext cx="496352" cy="248467"/>
+            </a:xfrm>
+            <a:prstGeom prst="ellipse">
+              <a:avLst/>
+            </a:prstGeom>
+            <a:ln>
+              <a:solidFill>
+                <a:schemeClr val="tx1"/>
+              </a:solidFill>
+            </a:ln>
+          </p:spPr>
+          <p:style>
+            <a:lnRef idx="2">
+              <a:schemeClr val="accent5"/>
+            </a:lnRef>
+            <a:fillRef idx="1">
+              <a:schemeClr val="lt1"/>
+            </a:fillRef>
+            <a:effectRef idx="0">
+              <a:schemeClr val="accent5"/>
+            </a:effectRef>
+            <a:fontRef idx="minor">
+              <a:schemeClr val="dk1"/>
+            </a:fontRef>
+          </p:style>
+          <p:txBody>
+            <a:bodyPr rtlCol="0" anchor="ctr"/>
+            <a:lstStyle/>
+            <a:p>
+              <a:pPr algn="ctr"/>
+              <a:endParaRPr lang="en-US"/>
+            </a:p>
+          </p:txBody>
+        </p:sp>
       </p:grpSp>
-      <p:sp>
-        <p:nvSpPr>
-          <p:cNvPr id="3" name="Rounded Rectangle 2">
-            <a:extLst>
-              <a:ext uri="{FF2B5EF4-FFF2-40B4-BE49-F238E27FC236}">
-                <a16:creationId xmlns:a16="http://schemas.microsoft.com/office/drawing/2014/main" id="{13845E32-4A72-2947-9E45-CF568034359A}"/>
-              </a:ext>
-            </a:extLst>
-          </p:cNvPr>
-          <p:cNvSpPr/>
-          <p:nvPr/>
-        </p:nvSpPr>
-        <p:spPr>
-          <a:xfrm>
-            <a:off x="6273155" y="1351215"/>
-            <a:ext cx="515764" cy="282671"/>
-          </a:xfrm>
-          <a:prstGeom prst="roundRect">
-            <a:avLst>
-              <a:gd name="adj" fmla="val 50000"/>
-            </a:avLst>
-          </a:prstGeom>
-          <a:solidFill>
-            <a:schemeClr val="bg1"/>
-          </a:solidFill>
-          <a:ln w="38100">
-            <a:solidFill>
-              <a:schemeClr val="tx1"/>
-            </a:solidFill>
-          </a:ln>
-          <a:effectLst/>
-        </p:spPr>
-        <p:style>
-          <a:lnRef idx="1">
-            <a:schemeClr val="accent1"/>
-          </a:lnRef>
-          <a:fillRef idx="3">
-            <a:schemeClr val="accent1"/>
-          </a:fillRef>
-          <a:effectRef idx="2">
-            <a:schemeClr val="accent1"/>
-          </a:effectRef>
-          <a:fontRef idx="minor">
-            <a:schemeClr val="lt1"/>
-          </a:fontRef>
-        </p:style>
-        <p:txBody>
-          <a:bodyPr rtlCol="0" anchor="ctr"/>
-          <a:lstStyle/>
-          <a:p>
-            <a:pPr algn="ctr"/>
-            <a:endParaRPr lang="en-US"/>
-          </a:p>
-        </p:txBody>
-      </p:sp>
     </p:spTree>
     <p:extLst>
       <p:ext uri="{BB962C8B-B14F-4D97-AF65-F5344CB8AC3E}">

</xml_diff>